<commit_message>
fixed Outline, removed animations
</commit_message>
<xml_diff>
--- a/GroupF/Presentations/Final Presentation.pptx
+++ b/GroupF/Presentations/Final Presentation.pptx
@@ -3799,233 +3799,16 @@
       </p:grpSp>
       <p:grpSp>
         <p:nvGrpSpPr>
-          <p:cNvPr id="21" name="Gruppieren 20"/>
-          <p:cNvGrpSpPr/>
-          <p:nvPr/>
-        </p:nvGrpSpPr>
-        <p:grpSpPr>
-          <a:xfrm>
-            <a:off x="3438785" y="1005495"/>
-            <a:ext cx="1932348" cy="2742573"/>
-            <a:chOff x="2734362" y="1005495"/>
-            <a:chExt cx="1932348" cy="2742573"/>
-          </a:xfrm>
-        </p:grpSpPr>
-        <p:cxnSp>
-          <p:nvCxnSpPr>
-            <p:cNvPr id="37" name="Straight Connector 23"/>
-            <p:cNvCxnSpPr>
-              <a:stCxn id="39" idx="4"/>
-              <a:endCxn id="38" idx="0"/>
-            </p:cNvCxnSpPr>
-            <p:nvPr/>
-          </p:nvCxnSpPr>
-          <p:spPr>
-            <a:xfrm>
-              <a:off x="3705955" y="2404504"/>
-              <a:ext cx="0" cy="1192434"/>
-            </a:xfrm>
-            <a:prstGeom prst="line">
-              <a:avLst/>
-            </a:prstGeom>
-            <a:ln w="25400">
-              <a:solidFill>
-                <a:schemeClr val="bg2"/>
-              </a:solidFill>
-            </a:ln>
-          </p:spPr>
-          <p:style>
-            <a:lnRef idx="1">
-              <a:schemeClr val="accent1"/>
-            </a:lnRef>
-            <a:fillRef idx="0">
-              <a:schemeClr val="accent1"/>
-            </a:fillRef>
-            <a:effectRef idx="0">
-              <a:schemeClr val="accent1"/>
-            </a:effectRef>
-            <a:fontRef idx="minor">
-              <a:schemeClr val="tx1"/>
-            </a:fontRef>
-          </p:style>
-        </p:cxnSp>
-        <p:sp>
-          <p:nvSpPr>
-            <p:cNvPr id="38" name="Oval 28"/>
-            <p:cNvSpPr>
-              <a:spLocks noChangeAspect="1"/>
-            </p:cNvSpPr>
-            <p:nvPr/>
-          </p:nvSpPr>
-          <p:spPr>
-            <a:xfrm>
-              <a:off x="3630390" y="3596938"/>
-              <a:ext cx="151130" cy="151130"/>
-            </a:xfrm>
-            <a:prstGeom prst="ellipse">
-              <a:avLst/>
-            </a:prstGeom>
-            <a:solidFill>
-              <a:schemeClr val="accent6"/>
-            </a:solidFill>
-            <a:ln w="57150">
-              <a:noFill/>
-            </a:ln>
-          </p:spPr>
-          <p:style>
-            <a:lnRef idx="2">
-              <a:schemeClr val="accent1">
-                <a:shade val="50000"/>
-              </a:schemeClr>
-            </a:lnRef>
-            <a:fillRef idx="1">
-              <a:schemeClr val="accent1"/>
-            </a:fillRef>
-            <a:effectRef idx="0">
-              <a:schemeClr val="accent1"/>
-            </a:effectRef>
-            <a:fontRef idx="minor">
-              <a:schemeClr val="lt1"/>
-            </a:fontRef>
-          </p:style>
-          <p:txBody>
-            <a:bodyPr rtlCol="0" anchor="ctr"/>
-            <a:lstStyle/>
-            <a:p>
-              <a:pPr algn="ctr"/>
-              <a:endParaRPr lang="en-US" sz="1351" dirty="0">
-                <a:solidFill>
-                  <a:srgbClr val="26A6CF"/>
-                </a:solidFill>
-              </a:endParaRPr>
-            </a:p>
-          </p:txBody>
-        </p:sp>
-        <p:sp>
-          <p:nvSpPr>
-            <p:cNvPr id="39" name="Oval 53"/>
-            <p:cNvSpPr>
-              <a:spLocks noChangeAspect="1"/>
-            </p:cNvSpPr>
-            <p:nvPr/>
-          </p:nvSpPr>
-          <p:spPr>
-            <a:xfrm>
-              <a:off x="3231945" y="1456486"/>
-              <a:ext cx="948020" cy="948018"/>
-            </a:xfrm>
-            <a:prstGeom prst="ellipse">
-              <a:avLst/>
-            </a:prstGeom>
-            <a:solidFill>
-              <a:schemeClr val="accent6"/>
-            </a:solidFill>
-            <a:ln>
-              <a:noFill/>
-            </a:ln>
-          </p:spPr>
-          <p:style>
-            <a:lnRef idx="2">
-              <a:schemeClr val="accent1">
-                <a:shade val="50000"/>
-              </a:schemeClr>
-            </a:lnRef>
-            <a:fillRef idx="1">
-              <a:schemeClr val="accent1"/>
-            </a:fillRef>
-            <a:effectRef idx="0">
-              <a:schemeClr val="accent1"/>
-            </a:effectRef>
-            <a:fontRef idx="minor">
-              <a:schemeClr val="lt1"/>
-            </a:fontRef>
-          </p:style>
-          <p:txBody>
-            <a:bodyPr rot="0" spcFirstLastPara="0" vertOverflow="overflow" horzOverflow="overflow" vert="horz" wrap="square" lIns="91440" tIns="45720" rIns="91440" bIns="45720" numCol="1" spcCol="0" rtlCol="0" fromWordArt="0" anchor="ctr" anchorCtr="0" forceAA="0" compatLnSpc="1">
-              <a:prstTxWarp prst="textNoShape">
-                <a:avLst/>
-              </a:prstTxWarp>
-              <a:noAutofit/>
-            </a:bodyPr>
-            <a:lstStyle/>
-            <a:p>
-              <a:pPr algn="ctr"/>
-              <a:r>
-                <a:rPr lang="en-US" sz="2000" dirty="0" smtClean="0">
-                  <a:solidFill>
-                    <a:srgbClr val="FFFFFF"/>
-                  </a:solidFill>
-                  <a:latin typeface="FontAwesome" pitchFamily="2" charset="0"/>
-                </a:rPr>
-                <a:t></a:t>
-              </a:r>
-              <a:endParaRPr lang="en-AU" sz="2000" dirty="0">
-                <a:solidFill>
-                  <a:schemeClr val="bg1"/>
-                </a:solidFill>
-                <a:latin typeface="FontAwesome" pitchFamily="2" charset="0"/>
-              </a:endParaRPr>
-            </a:p>
-          </p:txBody>
-        </p:sp>
-        <p:sp>
-          <p:nvSpPr>
-            <p:cNvPr id="40" name="TextBox 52"/>
-            <p:cNvSpPr txBox="1"/>
-            <p:nvPr/>
-          </p:nvSpPr>
-          <p:spPr>
-            <a:xfrm>
-              <a:off x="2734362" y="1005495"/>
-              <a:ext cx="1932348" cy="424732"/>
-            </a:xfrm>
-            <a:prstGeom prst="rect">
-              <a:avLst/>
-            </a:prstGeom>
-            <a:noFill/>
-          </p:spPr>
-          <p:txBody>
-            <a:bodyPr wrap="square" rtlCol="0">
-              <a:spAutoFit/>
-            </a:bodyPr>
-            <a:lstStyle/>
-            <a:p>
-              <a:pPr algn="ctr">
-                <a:lnSpc>
-                  <a:spcPct val="120000"/>
-                </a:lnSpc>
-              </a:pPr>
-              <a:r>
-                <a:rPr lang="en-US" dirty="0" smtClean="0">
-                  <a:solidFill>
-                    <a:schemeClr val="tx2"/>
-                  </a:solidFill>
-                  <a:latin typeface="+mj-lt"/>
-                </a:rPr>
-                <a:t>Architecture</a:t>
-              </a:r>
-              <a:endParaRPr lang="en-US" dirty="0">
-                <a:solidFill>
-                  <a:schemeClr val="tx2"/>
-                </a:solidFill>
-                <a:latin typeface="+mj-lt"/>
-              </a:endParaRPr>
-            </a:p>
-          </p:txBody>
-        </p:sp>
-      </p:grpSp>
-      <p:grpSp>
-        <p:nvGrpSpPr>
           <p:cNvPr id="23" name="Gruppieren 22"/>
           <p:cNvGrpSpPr/>
           <p:nvPr/>
         </p:nvGrpSpPr>
         <p:grpSpPr>
           <a:xfrm>
-            <a:off x="6233424" y="1250509"/>
-            <a:ext cx="2209425" cy="2505951"/>
-            <a:chOff x="6233424" y="1250509"/>
-            <a:chExt cx="2209425" cy="2505951"/>
+            <a:off x="6705345" y="917134"/>
+            <a:ext cx="2209425" cy="2839326"/>
+            <a:chOff x="6233424" y="917134"/>
+            <a:chExt cx="2209425" cy="2839326"/>
           </a:xfrm>
         </p:grpSpPr>
         <p:cxnSp>
@@ -4193,7 +3976,7 @@
           </p:nvSpPr>
           <p:spPr>
             <a:xfrm>
-              <a:off x="6233424" y="1250509"/>
+              <a:off x="6233424" y="917134"/>
               <a:ext cx="2209425" cy="424732"/>
             </a:xfrm>
             <a:prstGeom prst="rect">
@@ -4455,7 +4238,7 @@
         </p:nvGrpSpPr>
         <p:grpSpPr>
           <a:xfrm>
-            <a:off x="8141126" y="3654870"/>
+            <a:off x="8512601" y="3607245"/>
             <a:ext cx="2172650" cy="2236130"/>
             <a:chOff x="9872919" y="3596938"/>
             <a:chExt cx="2172650" cy="2236130"/>
@@ -4663,6 +4446,217 @@
           </p:txBody>
         </p:sp>
       </p:grpSp>
+      <p:grpSp>
+        <p:nvGrpSpPr>
+          <p:cNvPr id="73" name="Gruppieren 72"/>
+          <p:cNvGrpSpPr/>
+          <p:nvPr/>
+        </p:nvGrpSpPr>
+        <p:grpSpPr>
+          <a:xfrm>
+            <a:off x="3241631" y="921788"/>
+            <a:ext cx="2209425" cy="2839326"/>
+            <a:chOff x="6233424" y="917134"/>
+            <a:chExt cx="2209425" cy="2839326"/>
+          </a:xfrm>
+        </p:grpSpPr>
+        <p:cxnSp>
+          <p:nvCxnSpPr>
+            <p:cNvPr id="74" name="Straight Connector 23"/>
+            <p:cNvCxnSpPr>
+              <a:stCxn id="76" idx="4"/>
+              <a:endCxn id="75" idx="0"/>
+            </p:cNvCxnSpPr>
+            <p:nvPr/>
+          </p:nvCxnSpPr>
+          <p:spPr>
+            <a:xfrm>
+              <a:off x="7338137" y="2519060"/>
+              <a:ext cx="0" cy="1086270"/>
+            </a:xfrm>
+            <a:prstGeom prst="line">
+              <a:avLst/>
+            </a:prstGeom>
+            <a:ln w="25400">
+              <a:solidFill>
+                <a:schemeClr val="bg2"/>
+              </a:solidFill>
+            </a:ln>
+          </p:spPr>
+          <p:style>
+            <a:lnRef idx="1">
+              <a:schemeClr val="accent1"/>
+            </a:lnRef>
+            <a:fillRef idx="0">
+              <a:schemeClr val="accent1"/>
+            </a:fillRef>
+            <a:effectRef idx="0">
+              <a:schemeClr val="accent1"/>
+            </a:effectRef>
+            <a:fontRef idx="minor">
+              <a:schemeClr val="tx1"/>
+            </a:fontRef>
+          </p:style>
+        </p:cxnSp>
+        <p:sp>
+          <p:nvSpPr>
+            <p:cNvPr id="75" name="Oval 28"/>
+            <p:cNvSpPr>
+              <a:spLocks noChangeAspect="1"/>
+            </p:cNvSpPr>
+            <p:nvPr/>
+          </p:nvSpPr>
+          <p:spPr>
+            <a:xfrm>
+              <a:off x="7262572" y="3605330"/>
+              <a:ext cx="151130" cy="151130"/>
+            </a:xfrm>
+            <a:prstGeom prst="ellipse">
+              <a:avLst/>
+            </a:prstGeom>
+            <a:solidFill>
+              <a:schemeClr val="accent6"/>
+            </a:solidFill>
+            <a:ln w="57150">
+              <a:noFill/>
+            </a:ln>
+          </p:spPr>
+          <p:style>
+            <a:lnRef idx="2">
+              <a:schemeClr val="accent1">
+                <a:shade val="50000"/>
+              </a:schemeClr>
+            </a:lnRef>
+            <a:fillRef idx="1">
+              <a:schemeClr val="accent1"/>
+            </a:fillRef>
+            <a:effectRef idx="0">
+              <a:schemeClr val="accent1"/>
+            </a:effectRef>
+            <a:fontRef idx="minor">
+              <a:schemeClr val="lt1"/>
+            </a:fontRef>
+          </p:style>
+          <p:txBody>
+            <a:bodyPr rtlCol="0" anchor="ctr"/>
+            <a:lstStyle/>
+            <a:p>
+              <a:pPr algn="ctr"/>
+              <a:endParaRPr lang="en-US" sz="1351" dirty="0">
+                <a:solidFill>
+                  <a:srgbClr val="26A6CF"/>
+                </a:solidFill>
+              </a:endParaRPr>
+            </a:p>
+          </p:txBody>
+        </p:sp>
+        <p:sp>
+          <p:nvSpPr>
+            <p:cNvPr id="76" name="Oval 53"/>
+            <p:cNvSpPr>
+              <a:spLocks noChangeAspect="1"/>
+            </p:cNvSpPr>
+            <p:nvPr/>
+          </p:nvSpPr>
+          <p:spPr>
+            <a:xfrm>
+              <a:off x="6916226" y="1675241"/>
+              <a:ext cx="843821" cy="843819"/>
+            </a:xfrm>
+            <a:prstGeom prst="ellipse">
+              <a:avLst/>
+            </a:prstGeom>
+            <a:solidFill>
+              <a:schemeClr val="accent6"/>
+            </a:solidFill>
+            <a:ln>
+              <a:noFill/>
+            </a:ln>
+          </p:spPr>
+          <p:style>
+            <a:lnRef idx="2">
+              <a:schemeClr val="accent1">
+                <a:shade val="50000"/>
+              </a:schemeClr>
+            </a:lnRef>
+            <a:fillRef idx="1">
+              <a:schemeClr val="accent1"/>
+            </a:fillRef>
+            <a:effectRef idx="0">
+              <a:schemeClr val="accent1"/>
+            </a:effectRef>
+            <a:fontRef idx="minor">
+              <a:schemeClr val="lt1"/>
+            </a:fontRef>
+          </p:style>
+          <p:txBody>
+            <a:bodyPr rot="0" spcFirstLastPara="0" vertOverflow="overflow" horzOverflow="overflow" vert="horz" wrap="square" lIns="91440" tIns="45720" rIns="91440" bIns="45720" numCol="1" spcCol="0" rtlCol="0" fromWordArt="0" anchor="ctr" anchorCtr="0" forceAA="0" compatLnSpc="1">
+              <a:prstTxWarp prst="textNoShape">
+                <a:avLst/>
+              </a:prstTxWarp>
+              <a:noAutofit/>
+            </a:bodyPr>
+            <a:lstStyle/>
+            <a:p>
+              <a:pPr algn="ctr"/>
+              <a:r>
+                <a:rPr lang="en-US" sz="2000" dirty="0">
+                  <a:solidFill>
+                    <a:srgbClr val="FFFFFF"/>
+                  </a:solidFill>
+                  <a:latin typeface="FontAwesome" pitchFamily="2" charset="0"/>
+                </a:rPr>
+                <a:t></a:t>
+              </a:r>
+              <a:endParaRPr lang="en-AU" sz="2000" dirty="0">
+                <a:solidFill>
+                  <a:schemeClr val="bg1"/>
+                </a:solidFill>
+                <a:latin typeface="FontAwesome" pitchFamily="2" charset="0"/>
+              </a:endParaRPr>
+            </a:p>
+          </p:txBody>
+        </p:sp>
+        <p:sp>
+          <p:nvSpPr>
+            <p:cNvPr id="77" name="TextBox 52"/>
+            <p:cNvSpPr txBox="1"/>
+            <p:nvPr/>
+          </p:nvSpPr>
+          <p:spPr>
+            <a:xfrm>
+              <a:off x="6233424" y="917134"/>
+              <a:ext cx="2209425" cy="399340"/>
+            </a:xfrm>
+            <a:prstGeom prst="rect">
+              <a:avLst/>
+            </a:prstGeom>
+            <a:noFill/>
+          </p:spPr>
+          <p:txBody>
+            <a:bodyPr wrap="square" rtlCol="0">
+              <a:spAutoFit/>
+            </a:bodyPr>
+            <a:lstStyle/>
+            <a:p>
+              <a:pPr algn="ctr">
+                <a:lnSpc>
+                  <a:spcPct val="120000"/>
+                </a:lnSpc>
+              </a:pPr>
+              <a:r>
+                <a:rPr lang="en-US" dirty="0">
+                  <a:solidFill>
+                    <a:schemeClr val="tx2"/>
+                  </a:solidFill>
+                  <a:latin typeface="+mj-lt"/>
+                </a:rPr>
+                <a:t>Architecture</a:t>
+              </a:r>
+            </a:p>
+          </p:txBody>
+        </p:sp>
+      </p:grpSp>
     </p:spTree>
     <p:extLst>
       <p:ext uri="{BB962C8B-B14F-4D97-AF65-F5344CB8AC3E}">
@@ -4676,300 +4670,7 @@
   <p:timing>
     <p:tnLst>
       <p:par>
-        <p:cTn id="1" dur="indefinite" restart="never" nodeType="tmRoot">
-          <p:childTnLst>
-            <p:seq concurrent="1" nextAc="seek">
-              <p:cTn id="2" dur="indefinite" nodeType="mainSeq">
-                <p:childTnLst>
-                  <p:par>
-                    <p:cTn id="3" fill="hold">
-                      <p:stCondLst>
-                        <p:cond delay="indefinite"/>
-                      </p:stCondLst>
-                      <p:childTnLst>
-                        <p:par>
-                          <p:cTn id="4" fill="hold">
-                            <p:stCondLst>
-                              <p:cond delay="0"/>
-                            </p:stCondLst>
-                            <p:childTnLst>
-                              <p:par>
-                                <p:cTn id="5" presetID="1" presetClass="entr" presetSubtype="0" fill="hold" nodeType="clickEffect">
-                                  <p:stCondLst>
-                                    <p:cond delay="0"/>
-                                  </p:stCondLst>
-                                  <p:childTnLst>
-                                    <p:set>
-                                      <p:cBhvr>
-                                        <p:cTn id="6" dur="1" fill="hold">
-                                          <p:stCondLst>
-                                            <p:cond delay="0"/>
-                                          </p:stCondLst>
-                                        </p:cTn>
-                                        <p:tgtEl>
-                                          <p:spTgt spid="21"/>
-                                        </p:tgtEl>
-                                        <p:attrNameLst>
-                                          <p:attrName>style.visibility</p:attrName>
-                                        </p:attrNameLst>
-                                      </p:cBhvr>
-                                      <p:to>
-                                        <p:strVal val="visible"/>
-                                      </p:to>
-                                    </p:set>
-                                  </p:childTnLst>
-                                </p:cTn>
-                              </p:par>
-                            </p:childTnLst>
-                          </p:cTn>
-                        </p:par>
-                      </p:childTnLst>
-                    </p:cTn>
-                  </p:par>
-                  <p:par>
-                    <p:cTn id="7" fill="hold">
-                      <p:stCondLst>
-                        <p:cond delay="indefinite"/>
-                      </p:stCondLst>
-                      <p:childTnLst>
-                        <p:par>
-                          <p:cTn id="8" fill="hold">
-                            <p:stCondLst>
-                              <p:cond delay="0"/>
-                            </p:stCondLst>
-                            <p:childTnLst>
-                              <p:par>
-                                <p:cTn id="9" presetID="1" presetClass="entr" presetSubtype="0" fill="hold" nodeType="clickEffect">
-                                  <p:stCondLst>
-                                    <p:cond delay="0"/>
-                                  </p:stCondLst>
-                                  <p:childTnLst>
-                                    <p:set>
-                                      <p:cBhvr>
-                                        <p:cTn id="10" dur="1" fill="hold">
-                                          <p:stCondLst>
-                                            <p:cond delay="0"/>
-                                          </p:stCondLst>
-                                        </p:cTn>
-                                        <p:tgtEl>
-                                          <p:spTgt spid="22"/>
-                                        </p:tgtEl>
-                                        <p:attrNameLst>
-                                          <p:attrName>style.visibility</p:attrName>
-                                        </p:attrNameLst>
-                                      </p:cBhvr>
-                                      <p:to>
-                                        <p:strVal val="visible"/>
-                                      </p:to>
-                                    </p:set>
-                                  </p:childTnLst>
-                                </p:cTn>
-                              </p:par>
-                            </p:childTnLst>
-                          </p:cTn>
-                        </p:par>
-                      </p:childTnLst>
-                    </p:cTn>
-                  </p:par>
-                  <p:par>
-                    <p:cTn id="11" fill="hold">
-                      <p:stCondLst>
-                        <p:cond delay="indefinite"/>
-                      </p:stCondLst>
-                      <p:childTnLst>
-                        <p:par>
-                          <p:cTn id="12" fill="hold">
-                            <p:stCondLst>
-                              <p:cond delay="0"/>
-                            </p:stCondLst>
-                            <p:childTnLst>
-                              <p:par>
-                                <p:cTn id="13" presetID="1" presetClass="entr" presetSubtype="0" fill="hold" nodeType="clickEffect">
-                                  <p:stCondLst>
-                                    <p:cond delay="0"/>
-                                  </p:stCondLst>
-                                  <p:childTnLst>
-                                    <p:set>
-                                      <p:cBhvr>
-                                        <p:cTn id="14" dur="1" fill="hold">
-                                          <p:stCondLst>
-                                            <p:cond delay="0"/>
-                                          </p:stCondLst>
-                                        </p:cTn>
-                                        <p:tgtEl>
-                                          <p:spTgt spid="23"/>
-                                        </p:tgtEl>
-                                        <p:attrNameLst>
-                                          <p:attrName>style.visibility</p:attrName>
-                                        </p:attrNameLst>
-                                      </p:cBhvr>
-                                      <p:to>
-                                        <p:strVal val="visible"/>
-                                      </p:to>
-                                    </p:set>
-                                  </p:childTnLst>
-                                </p:cTn>
-                              </p:par>
-                            </p:childTnLst>
-                          </p:cTn>
-                        </p:par>
-                      </p:childTnLst>
-                    </p:cTn>
-                  </p:par>
-                  <p:par>
-                    <p:cTn id="15" fill="hold">
-                      <p:stCondLst>
-                        <p:cond delay="indefinite"/>
-                      </p:stCondLst>
-                      <p:childTnLst>
-                        <p:par>
-                          <p:cTn id="16" fill="hold">
-                            <p:stCondLst>
-                              <p:cond delay="0"/>
-                            </p:stCondLst>
-                            <p:childTnLst>
-                              <p:par>
-                                <p:cTn id="17" presetID="1" presetClass="entr" presetSubtype="0" fill="hold" nodeType="clickEffect">
-                                  <p:stCondLst>
-                                    <p:cond delay="0"/>
-                                  </p:stCondLst>
-                                  <p:childTnLst>
-                                    <p:set>
-                                      <p:cBhvr>
-                                        <p:cTn id="18" dur="1" fill="hold">
-                                          <p:stCondLst>
-                                            <p:cond delay="0"/>
-                                          </p:stCondLst>
-                                        </p:cTn>
-                                        <p:tgtEl>
-                                          <p:spTgt spid="24"/>
-                                        </p:tgtEl>
-                                        <p:attrNameLst>
-                                          <p:attrName>style.visibility</p:attrName>
-                                        </p:attrNameLst>
-                                      </p:cBhvr>
-                                      <p:to>
-                                        <p:strVal val="visible"/>
-                                      </p:to>
-                                    </p:set>
-                                  </p:childTnLst>
-                                </p:cTn>
-                              </p:par>
-                            </p:childTnLst>
-                          </p:cTn>
-                        </p:par>
-                      </p:childTnLst>
-                    </p:cTn>
-                  </p:par>
-                  <p:par>
-                    <p:cTn id="19" fill="hold">
-                      <p:stCondLst>
-                        <p:cond delay="indefinite"/>
-                      </p:stCondLst>
-                      <p:childTnLst>
-                        <p:par>
-                          <p:cTn id="20" fill="hold">
-                            <p:stCondLst>
-                              <p:cond delay="0"/>
-                            </p:stCondLst>
-                            <p:childTnLst>
-                              <p:par>
-                                <p:cTn id="21" presetID="1" presetClass="entr" presetSubtype="0" fill="hold" nodeType="clickEffect">
-                                  <p:stCondLst>
-                                    <p:cond delay="0"/>
-                                  </p:stCondLst>
-                                  <p:childTnLst>
-                                    <p:set>
-                                      <p:cBhvr>
-                                        <p:cTn id="22" dur="1" fill="hold">
-                                          <p:stCondLst>
-                                            <p:cond delay="0"/>
-                                          </p:stCondLst>
-                                        </p:cTn>
-                                        <p:tgtEl>
-                                          <p:spTgt spid="46"/>
-                                        </p:tgtEl>
-                                        <p:attrNameLst>
-                                          <p:attrName>style.visibility</p:attrName>
-                                        </p:attrNameLst>
-                                      </p:cBhvr>
-                                      <p:to>
-                                        <p:strVal val="visible"/>
-                                      </p:to>
-                                    </p:set>
-                                  </p:childTnLst>
-                                </p:cTn>
-                              </p:par>
-                            </p:childTnLst>
-                          </p:cTn>
-                        </p:par>
-                      </p:childTnLst>
-                    </p:cTn>
-                  </p:par>
-                  <p:par>
-                    <p:cTn id="23" fill="hold">
-                      <p:stCondLst>
-                        <p:cond delay="indefinite"/>
-                      </p:stCondLst>
-                      <p:childTnLst>
-                        <p:par>
-                          <p:cTn id="24" fill="hold">
-                            <p:stCondLst>
-                              <p:cond delay="0"/>
-                            </p:stCondLst>
-                            <p:childTnLst>
-                              <p:par>
-                                <p:cTn id="25" presetID="1" presetClass="entr" presetSubtype="0" fill="hold" nodeType="clickEffect">
-                                  <p:stCondLst>
-                                    <p:cond delay="0"/>
-                                  </p:stCondLst>
-                                  <p:childTnLst>
-                                    <p:set>
-                                      <p:cBhvr>
-                                        <p:cTn id="26" dur="1" fill="hold">
-                                          <p:stCondLst>
-                                            <p:cond delay="0"/>
-                                          </p:stCondLst>
-                                        </p:cTn>
-                                        <p:tgtEl>
-                                          <p:spTgt spid="68"/>
-                                        </p:tgtEl>
-                                        <p:attrNameLst>
-                                          <p:attrName>style.visibility</p:attrName>
-                                        </p:attrNameLst>
-                                      </p:cBhvr>
-                                      <p:to>
-                                        <p:strVal val="visible"/>
-                                      </p:to>
-                                    </p:set>
-                                  </p:childTnLst>
-                                </p:cTn>
-                              </p:par>
-                            </p:childTnLst>
-                          </p:cTn>
-                        </p:par>
-                      </p:childTnLst>
-                    </p:cTn>
-                  </p:par>
-                </p:childTnLst>
-              </p:cTn>
-              <p:prevCondLst>
-                <p:cond evt="onPrev" delay="0">
-                  <p:tgtEl>
-                    <p:sldTgt/>
-                  </p:tgtEl>
-                </p:cond>
-              </p:prevCondLst>
-              <p:nextCondLst>
-                <p:cond evt="onNext" delay="0">
-                  <p:tgtEl>
-                    <p:sldTgt/>
-                  </p:tgtEl>
-                </p:cond>
-              </p:nextCondLst>
-            </p:seq>
-          </p:childTnLst>
-        </p:cTn>
+        <p:cTn id="1" dur="indefinite" restart="never" nodeType="tmRoot"/>
       </p:par>
     </p:tnLst>
   </p:timing>

</xml_diff>

<commit_message>
added chapter titles and architecture part
</commit_message>
<xml_diff>
--- a/GroupF/Presentations/Final Presentation.pptx
+++ b/GroupF/Presentations/Final Presentation.pptx
@@ -5,14 +5,22 @@
     <p:sldMasterId id="2147483648" r:id="rId1"/>
   </p:sldMasterIdLst>
   <p:notesMasterIdLst>
-    <p:notesMasterId r:id="rId4"/>
+    <p:notesMasterId r:id="rId12"/>
   </p:notesMasterIdLst>
   <p:handoutMasterIdLst>
-    <p:handoutMasterId r:id="rId5"/>
+    <p:handoutMasterId r:id="rId13"/>
   </p:handoutMasterIdLst>
   <p:sldIdLst>
     <p:sldId id="624" r:id="rId2"/>
     <p:sldId id="628" r:id="rId3"/>
+    <p:sldId id="632" r:id="rId4"/>
+    <p:sldId id="633" r:id="rId5"/>
+    <p:sldId id="635" r:id="rId6"/>
+    <p:sldId id="629" r:id="rId7"/>
+    <p:sldId id="630" r:id="rId8"/>
+    <p:sldId id="636" r:id="rId9"/>
+    <p:sldId id="631" r:id="rId10"/>
+    <p:sldId id="634" r:id="rId11"/>
   </p:sldIdLst>
   <p:sldSz cx="12192000" cy="6858000"/>
   <p:notesSz cx="6858000" cy="9144000"/>
@@ -3011,6 +3019,339 @@
 </p:sld>
 </file>
 
+<file path=ppt/slides/slide10.xml><?xml version="1.0" encoding="utf-8"?>
+<p:sld xmlns:a="http://schemas.openxmlformats.org/drawingml/2006/main" xmlns:r="http://schemas.openxmlformats.org/officeDocument/2006/relationships" xmlns:p="http://schemas.openxmlformats.org/presentationml/2006/main">
+  <p:cSld>
+    <p:spTree>
+      <p:nvGrpSpPr>
+        <p:cNvPr id="1" name=""/>
+        <p:cNvGrpSpPr/>
+        <p:nvPr/>
+      </p:nvGrpSpPr>
+      <p:grpSpPr>
+        <a:xfrm>
+          <a:off x="0" y="0"/>
+          <a:ext cx="0" cy="0"/>
+          <a:chOff x="0" y="0"/>
+          <a:chExt cx="0" cy="0"/>
+        </a:xfrm>
+      </p:grpSpPr>
+      <p:sp>
+        <p:nvSpPr>
+          <p:cNvPr id="2" name="Foliennummernplatzhalter 1"/>
+          <p:cNvSpPr>
+            <a:spLocks noGrp="1"/>
+          </p:cNvSpPr>
+          <p:nvPr>
+            <p:ph type="sldNum" sz="quarter" idx="12"/>
+          </p:nvPr>
+        </p:nvSpPr>
+        <p:spPr/>
+        <p:txBody>
+          <a:bodyPr/>
+          <a:lstStyle/>
+          <a:p>
+            <a:fld id="{FCEE2C88-6C8F-484D-AF69-578F576B1F44}" type="slidenum">
+              <a:rPr lang="en-US" smtClean="0"/>
+              <a:pPr/>
+              <a:t>10</a:t>
+            </a:fld>
+            <a:endParaRPr lang="en-US" dirty="0"/>
+          </a:p>
+        </p:txBody>
+      </p:sp>
+      <p:sp>
+        <p:nvSpPr>
+          <p:cNvPr id="3" name="Text Placeholder 33"/>
+          <p:cNvSpPr txBox="1">
+            <a:spLocks/>
+          </p:cNvSpPr>
+          <p:nvPr/>
+        </p:nvSpPr>
+        <p:spPr>
+          <a:xfrm>
+            <a:off x="3718030" y="3488189"/>
+            <a:ext cx="4755935" cy="499941"/>
+          </a:xfrm>
+          <a:prstGeom prst="rect">
+            <a:avLst/>
+          </a:prstGeom>
+        </p:spPr>
+        <p:txBody>
+          <a:bodyPr lIns="0" tIns="0" rIns="0" bIns="0"/>
+          <a:lstStyle>
+            <a:lvl1pPr marL="171450" indent="-171450" algn="l" defTabSz="685800" rtl="0" eaLnBrk="1" latinLnBrk="0" hangingPunct="1">
+              <a:lnSpc>
+                <a:spcPct val="90000"/>
+              </a:lnSpc>
+              <a:spcBef>
+                <a:spcPts val="750"/>
+              </a:spcBef>
+              <a:buFont typeface="Arial" panose="020B0604020202020204" pitchFamily="34" charset="0"/>
+              <a:buChar char="•"/>
+              <a:defRPr sz="2100" kern="1200">
+                <a:solidFill>
+                  <a:schemeClr val="tx1"/>
+                </a:solidFill>
+                <a:latin typeface="Neris Thin" panose="00000300000000000000" pitchFamily="50" charset="0"/>
+                <a:ea typeface="+mn-ea"/>
+                <a:cs typeface="+mn-cs"/>
+              </a:defRPr>
+            </a:lvl1pPr>
+            <a:lvl2pPr marL="514350" indent="-171450" algn="l" defTabSz="685800" rtl="0" eaLnBrk="1" latinLnBrk="0" hangingPunct="1">
+              <a:lnSpc>
+                <a:spcPct val="90000"/>
+              </a:lnSpc>
+              <a:spcBef>
+                <a:spcPts val="375"/>
+              </a:spcBef>
+              <a:buFont typeface="Arial" panose="020B0604020202020204" pitchFamily="34" charset="0"/>
+              <a:buChar char="•"/>
+              <a:defRPr sz="1800" kern="1200">
+                <a:solidFill>
+                  <a:schemeClr val="tx1"/>
+                </a:solidFill>
+                <a:latin typeface="Neris Thin" panose="00000300000000000000" pitchFamily="50" charset="0"/>
+                <a:ea typeface="+mn-ea"/>
+                <a:cs typeface="+mn-cs"/>
+              </a:defRPr>
+            </a:lvl2pPr>
+            <a:lvl3pPr marL="857250" indent="-171450" algn="l" defTabSz="685800" rtl="0" eaLnBrk="1" latinLnBrk="0" hangingPunct="1">
+              <a:lnSpc>
+                <a:spcPct val="90000"/>
+              </a:lnSpc>
+              <a:spcBef>
+                <a:spcPts val="375"/>
+              </a:spcBef>
+              <a:buFont typeface="Arial" panose="020B0604020202020204" pitchFamily="34" charset="0"/>
+              <a:buChar char="•"/>
+              <a:defRPr sz="1500" kern="1200">
+                <a:solidFill>
+                  <a:schemeClr val="tx1"/>
+                </a:solidFill>
+                <a:latin typeface="Neris Thin" panose="00000300000000000000" pitchFamily="50" charset="0"/>
+                <a:ea typeface="+mn-ea"/>
+                <a:cs typeface="+mn-cs"/>
+              </a:defRPr>
+            </a:lvl3pPr>
+            <a:lvl4pPr marL="1200150" indent="-171450" algn="l" defTabSz="685800" rtl="0" eaLnBrk="1" latinLnBrk="0" hangingPunct="1">
+              <a:lnSpc>
+                <a:spcPct val="90000"/>
+              </a:lnSpc>
+              <a:spcBef>
+                <a:spcPts val="375"/>
+              </a:spcBef>
+              <a:buFont typeface="Arial" panose="020B0604020202020204" pitchFamily="34" charset="0"/>
+              <a:buChar char="•"/>
+              <a:defRPr sz="1350" kern="1200">
+                <a:solidFill>
+                  <a:schemeClr val="tx1"/>
+                </a:solidFill>
+                <a:latin typeface="Neris Thin" panose="00000300000000000000" pitchFamily="50" charset="0"/>
+                <a:ea typeface="+mn-ea"/>
+                <a:cs typeface="+mn-cs"/>
+              </a:defRPr>
+            </a:lvl4pPr>
+            <a:lvl5pPr marL="1543050" indent="-171450" algn="l" defTabSz="685800" rtl="0" eaLnBrk="1" latinLnBrk="0" hangingPunct="1">
+              <a:lnSpc>
+                <a:spcPct val="90000"/>
+              </a:lnSpc>
+              <a:spcBef>
+                <a:spcPts val="375"/>
+              </a:spcBef>
+              <a:buFont typeface="Arial" panose="020B0604020202020204" pitchFamily="34" charset="0"/>
+              <a:buChar char="•"/>
+              <a:defRPr sz="1350" kern="1200">
+                <a:solidFill>
+                  <a:schemeClr val="tx1"/>
+                </a:solidFill>
+                <a:latin typeface="Neris Thin" panose="00000300000000000000" pitchFamily="50" charset="0"/>
+                <a:ea typeface="+mn-ea"/>
+                <a:cs typeface="+mn-cs"/>
+              </a:defRPr>
+            </a:lvl5pPr>
+            <a:lvl6pPr marL="1885950" indent="-171450" algn="l" defTabSz="685800" rtl="0" eaLnBrk="1" latinLnBrk="0" hangingPunct="1">
+              <a:lnSpc>
+                <a:spcPct val="90000"/>
+              </a:lnSpc>
+              <a:spcBef>
+                <a:spcPts val="375"/>
+              </a:spcBef>
+              <a:buFont typeface="Arial" panose="020B0604020202020204" pitchFamily="34" charset="0"/>
+              <a:buChar char="•"/>
+              <a:defRPr sz="1350" kern="1200">
+                <a:solidFill>
+                  <a:schemeClr val="tx1"/>
+                </a:solidFill>
+                <a:latin typeface="+mn-lt"/>
+                <a:ea typeface="+mn-ea"/>
+                <a:cs typeface="+mn-cs"/>
+              </a:defRPr>
+            </a:lvl6pPr>
+            <a:lvl7pPr marL="2228850" indent="-171450" algn="l" defTabSz="685800" rtl="0" eaLnBrk="1" latinLnBrk="0" hangingPunct="1">
+              <a:lnSpc>
+                <a:spcPct val="90000"/>
+              </a:lnSpc>
+              <a:spcBef>
+                <a:spcPts val="375"/>
+              </a:spcBef>
+              <a:buFont typeface="Arial" panose="020B0604020202020204" pitchFamily="34" charset="0"/>
+              <a:buChar char="•"/>
+              <a:defRPr sz="1350" kern="1200">
+                <a:solidFill>
+                  <a:schemeClr val="tx1"/>
+                </a:solidFill>
+                <a:latin typeface="+mn-lt"/>
+                <a:ea typeface="+mn-ea"/>
+                <a:cs typeface="+mn-cs"/>
+              </a:defRPr>
+            </a:lvl7pPr>
+            <a:lvl8pPr marL="2571750" indent="-171450" algn="l" defTabSz="685800" rtl="0" eaLnBrk="1" latinLnBrk="0" hangingPunct="1">
+              <a:lnSpc>
+                <a:spcPct val="90000"/>
+              </a:lnSpc>
+              <a:spcBef>
+                <a:spcPts val="375"/>
+              </a:spcBef>
+              <a:buFont typeface="Arial" panose="020B0604020202020204" pitchFamily="34" charset="0"/>
+              <a:buChar char="•"/>
+              <a:defRPr sz="1350" kern="1200">
+                <a:solidFill>
+                  <a:schemeClr val="tx1"/>
+                </a:solidFill>
+                <a:latin typeface="+mn-lt"/>
+                <a:ea typeface="+mn-ea"/>
+                <a:cs typeface="+mn-cs"/>
+              </a:defRPr>
+            </a:lvl8pPr>
+            <a:lvl9pPr marL="2914650" indent="-171450" algn="l" defTabSz="685800" rtl="0" eaLnBrk="1" latinLnBrk="0" hangingPunct="1">
+              <a:lnSpc>
+                <a:spcPct val="90000"/>
+              </a:lnSpc>
+              <a:spcBef>
+                <a:spcPts val="375"/>
+              </a:spcBef>
+              <a:buFont typeface="Arial" panose="020B0604020202020204" pitchFamily="34" charset="0"/>
+              <a:buChar char="•"/>
+              <a:defRPr sz="1350" kern="1200">
+                <a:solidFill>
+                  <a:schemeClr val="tx1"/>
+                </a:solidFill>
+                <a:latin typeface="+mn-lt"/>
+                <a:ea typeface="+mn-ea"/>
+                <a:cs typeface="+mn-cs"/>
+              </a:defRPr>
+            </a:lvl9pPr>
+          </a:lstStyle>
+          <a:p>
+            <a:pPr marL="0" indent="0" algn="ctr">
+              <a:buNone/>
+            </a:pPr>
+            <a:r>
+              <a:rPr lang="en-AU" sz="3200" dirty="0" smtClean="0">
+                <a:solidFill>
+                  <a:schemeClr val="tx2"/>
+                </a:solidFill>
+                <a:latin typeface="+mj-lt"/>
+              </a:rPr>
+              <a:t>Demo</a:t>
+            </a:r>
+            <a:endParaRPr lang="en-AU" sz="3200" dirty="0" smtClean="0">
+              <a:solidFill>
+                <a:schemeClr val="tx2"/>
+              </a:solidFill>
+              <a:latin typeface="+mj-lt"/>
+            </a:endParaRPr>
+          </a:p>
+        </p:txBody>
+      </p:sp>
+      <p:sp>
+        <p:nvSpPr>
+          <p:cNvPr id="5" name="Oval 57"/>
+          <p:cNvSpPr>
+            <a:spLocks noChangeAspect="1"/>
+          </p:cNvSpPr>
+          <p:nvPr/>
+        </p:nvSpPr>
+        <p:spPr>
+          <a:xfrm>
+            <a:off x="5696696" y="2492117"/>
+            <a:ext cx="798602" cy="798600"/>
+          </a:xfrm>
+          <a:prstGeom prst="ellipse">
+            <a:avLst/>
+          </a:prstGeom>
+          <a:solidFill>
+            <a:schemeClr val="accent5"/>
+          </a:solidFill>
+          <a:ln>
+            <a:noFill/>
+          </a:ln>
+        </p:spPr>
+        <p:style>
+          <a:lnRef idx="2">
+            <a:schemeClr val="accent1">
+              <a:shade val="50000"/>
+            </a:schemeClr>
+          </a:lnRef>
+          <a:fillRef idx="1">
+            <a:schemeClr val="accent1"/>
+          </a:fillRef>
+          <a:effectRef idx="0">
+            <a:schemeClr val="accent1"/>
+          </a:effectRef>
+          <a:fontRef idx="minor">
+            <a:schemeClr val="lt1"/>
+          </a:fontRef>
+        </p:style>
+        <p:txBody>
+          <a:bodyPr rot="0" spcFirstLastPara="0" vertOverflow="overflow" horzOverflow="overflow" vert="horz" wrap="square" lIns="91440" tIns="45720" rIns="91440" bIns="45720" numCol="1" spcCol="0" rtlCol="0" fromWordArt="0" anchor="ctr" anchorCtr="0" forceAA="0" compatLnSpc="1">
+            <a:prstTxWarp prst="textNoShape">
+              <a:avLst/>
+            </a:prstTxWarp>
+            <a:noAutofit/>
+          </a:bodyPr>
+          <a:lstStyle/>
+          <a:p>
+            <a:pPr algn="ctr"/>
+            <a:r>
+              <a:rPr lang="en-AU" sz="2000" dirty="0" smtClean="0">
+                <a:solidFill>
+                  <a:srgbClr val="FFFFFF"/>
+                </a:solidFill>
+                <a:latin typeface="FontAwesome" pitchFamily="2" charset="0"/>
+              </a:rPr>
+              <a:t></a:t>
+            </a:r>
+            <a:endParaRPr lang="en-AU" sz="2000" dirty="0">
+              <a:solidFill>
+                <a:schemeClr val="bg1"/>
+              </a:solidFill>
+              <a:latin typeface="FontAwesome" pitchFamily="2" charset="0"/>
+            </a:endParaRPr>
+          </a:p>
+        </p:txBody>
+      </p:sp>
+    </p:spTree>
+    <p:extLst>
+      <p:ext uri="{BB962C8B-B14F-4D97-AF65-F5344CB8AC3E}">
+        <p14:creationId xmlns:p14="http://schemas.microsoft.com/office/powerpoint/2010/main" val="1093437298"/>
+      </p:ext>
+    </p:extLst>
+  </p:cSld>
+  <p:clrMapOvr>
+    <a:masterClrMapping/>
+  </p:clrMapOvr>
+  <p:timing>
+    <p:tnLst>
+      <p:par>
+        <p:cTn id="1" dur="indefinite" restart="never" nodeType="tmRoot"/>
+      </p:par>
+    </p:tnLst>
+  </p:timing>
+</p:sld>
+</file>
+
 <file path=ppt/slides/slide2.xml><?xml version="1.0" encoding="utf-8"?>
 <p:sld xmlns:a="http://schemas.openxmlformats.org/drawingml/2006/main" xmlns:r="http://schemas.openxmlformats.org/officeDocument/2006/relationships" xmlns:p="http://schemas.openxmlformats.org/presentationml/2006/main">
   <p:cSld>
@@ -4661,6 +5002,2238 @@
     <p:extLst>
       <p:ext uri="{BB962C8B-B14F-4D97-AF65-F5344CB8AC3E}">
         <p14:creationId xmlns:p14="http://schemas.microsoft.com/office/powerpoint/2010/main" val="1508593330"/>
+      </p:ext>
+    </p:extLst>
+  </p:cSld>
+  <p:clrMapOvr>
+    <a:masterClrMapping/>
+  </p:clrMapOvr>
+  <p:timing>
+    <p:tnLst>
+      <p:par>
+        <p:cTn id="1" dur="indefinite" restart="never" nodeType="tmRoot"/>
+      </p:par>
+    </p:tnLst>
+  </p:timing>
+</p:sld>
+</file>
+
+<file path=ppt/slides/slide3.xml><?xml version="1.0" encoding="utf-8"?>
+<p:sld xmlns:a="http://schemas.openxmlformats.org/drawingml/2006/main" xmlns:r="http://schemas.openxmlformats.org/officeDocument/2006/relationships" xmlns:p="http://schemas.openxmlformats.org/presentationml/2006/main">
+  <p:cSld>
+    <p:spTree>
+      <p:nvGrpSpPr>
+        <p:cNvPr id="1" name=""/>
+        <p:cNvGrpSpPr/>
+        <p:nvPr/>
+      </p:nvGrpSpPr>
+      <p:grpSpPr>
+        <a:xfrm>
+          <a:off x="0" y="0"/>
+          <a:ext cx="0" cy="0"/>
+          <a:chOff x="0" y="0"/>
+          <a:chExt cx="0" cy="0"/>
+        </a:xfrm>
+      </p:grpSpPr>
+      <p:sp>
+        <p:nvSpPr>
+          <p:cNvPr id="2" name="Foliennummernplatzhalter 1"/>
+          <p:cNvSpPr>
+            <a:spLocks noGrp="1"/>
+          </p:cNvSpPr>
+          <p:nvPr>
+            <p:ph type="sldNum" sz="quarter" idx="12"/>
+          </p:nvPr>
+        </p:nvSpPr>
+        <p:spPr/>
+        <p:txBody>
+          <a:bodyPr/>
+          <a:lstStyle/>
+          <a:p>
+            <a:fld id="{FCEE2C88-6C8F-484D-AF69-578F576B1F44}" type="slidenum">
+              <a:rPr lang="en-US" smtClean="0"/>
+              <a:pPr/>
+              <a:t>3</a:t>
+            </a:fld>
+            <a:endParaRPr lang="en-US" dirty="0"/>
+          </a:p>
+        </p:txBody>
+      </p:sp>
+      <p:sp>
+        <p:nvSpPr>
+          <p:cNvPr id="3" name="Text Placeholder 33"/>
+          <p:cNvSpPr txBox="1">
+            <a:spLocks/>
+          </p:cNvSpPr>
+          <p:nvPr/>
+        </p:nvSpPr>
+        <p:spPr>
+          <a:xfrm>
+            <a:off x="3718030" y="3488189"/>
+            <a:ext cx="4755935" cy="499941"/>
+          </a:xfrm>
+          <a:prstGeom prst="rect">
+            <a:avLst/>
+          </a:prstGeom>
+        </p:spPr>
+        <p:txBody>
+          <a:bodyPr lIns="0" tIns="0" rIns="0" bIns="0"/>
+          <a:lstStyle>
+            <a:lvl1pPr marL="171450" indent="-171450" algn="l" defTabSz="685800" rtl="0" eaLnBrk="1" latinLnBrk="0" hangingPunct="1">
+              <a:lnSpc>
+                <a:spcPct val="90000"/>
+              </a:lnSpc>
+              <a:spcBef>
+                <a:spcPts val="750"/>
+              </a:spcBef>
+              <a:buFont typeface="Arial" panose="020B0604020202020204" pitchFamily="34" charset="0"/>
+              <a:buChar char="•"/>
+              <a:defRPr sz="2100" kern="1200">
+                <a:solidFill>
+                  <a:schemeClr val="tx1"/>
+                </a:solidFill>
+                <a:latin typeface="Neris Thin" panose="00000300000000000000" pitchFamily="50" charset="0"/>
+                <a:ea typeface="+mn-ea"/>
+                <a:cs typeface="+mn-cs"/>
+              </a:defRPr>
+            </a:lvl1pPr>
+            <a:lvl2pPr marL="514350" indent="-171450" algn="l" defTabSz="685800" rtl="0" eaLnBrk="1" latinLnBrk="0" hangingPunct="1">
+              <a:lnSpc>
+                <a:spcPct val="90000"/>
+              </a:lnSpc>
+              <a:spcBef>
+                <a:spcPts val="375"/>
+              </a:spcBef>
+              <a:buFont typeface="Arial" panose="020B0604020202020204" pitchFamily="34" charset="0"/>
+              <a:buChar char="•"/>
+              <a:defRPr sz="1800" kern="1200">
+                <a:solidFill>
+                  <a:schemeClr val="tx1"/>
+                </a:solidFill>
+                <a:latin typeface="Neris Thin" panose="00000300000000000000" pitchFamily="50" charset="0"/>
+                <a:ea typeface="+mn-ea"/>
+                <a:cs typeface="+mn-cs"/>
+              </a:defRPr>
+            </a:lvl2pPr>
+            <a:lvl3pPr marL="857250" indent="-171450" algn="l" defTabSz="685800" rtl="0" eaLnBrk="1" latinLnBrk="0" hangingPunct="1">
+              <a:lnSpc>
+                <a:spcPct val="90000"/>
+              </a:lnSpc>
+              <a:spcBef>
+                <a:spcPts val="375"/>
+              </a:spcBef>
+              <a:buFont typeface="Arial" panose="020B0604020202020204" pitchFamily="34" charset="0"/>
+              <a:buChar char="•"/>
+              <a:defRPr sz="1500" kern="1200">
+                <a:solidFill>
+                  <a:schemeClr val="tx1"/>
+                </a:solidFill>
+                <a:latin typeface="Neris Thin" panose="00000300000000000000" pitchFamily="50" charset="0"/>
+                <a:ea typeface="+mn-ea"/>
+                <a:cs typeface="+mn-cs"/>
+              </a:defRPr>
+            </a:lvl3pPr>
+            <a:lvl4pPr marL="1200150" indent="-171450" algn="l" defTabSz="685800" rtl="0" eaLnBrk="1" latinLnBrk="0" hangingPunct="1">
+              <a:lnSpc>
+                <a:spcPct val="90000"/>
+              </a:lnSpc>
+              <a:spcBef>
+                <a:spcPts val="375"/>
+              </a:spcBef>
+              <a:buFont typeface="Arial" panose="020B0604020202020204" pitchFamily="34" charset="0"/>
+              <a:buChar char="•"/>
+              <a:defRPr sz="1350" kern="1200">
+                <a:solidFill>
+                  <a:schemeClr val="tx1"/>
+                </a:solidFill>
+                <a:latin typeface="Neris Thin" panose="00000300000000000000" pitchFamily="50" charset="0"/>
+                <a:ea typeface="+mn-ea"/>
+                <a:cs typeface="+mn-cs"/>
+              </a:defRPr>
+            </a:lvl4pPr>
+            <a:lvl5pPr marL="1543050" indent="-171450" algn="l" defTabSz="685800" rtl="0" eaLnBrk="1" latinLnBrk="0" hangingPunct="1">
+              <a:lnSpc>
+                <a:spcPct val="90000"/>
+              </a:lnSpc>
+              <a:spcBef>
+                <a:spcPts val="375"/>
+              </a:spcBef>
+              <a:buFont typeface="Arial" panose="020B0604020202020204" pitchFamily="34" charset="0"/>
+              <a:buChar char="•"/>
+              <a:defRPr sz="1350" kern="1200">
+                <a:solidFill>
+                  <a:schemeClr val="tx1"/>
+                </a:solidFill>
+                <a:latin typeface="Neris Thin" panose="00000300000000000000" pitchFamily="50" charset="0"/>
+                <a:ea typeface="+mn-ea"/>
+                <a:cs typeface="+mn-cs"/>
+              </a:defRPr>
+            </a:lvl5pPr>
+            <a:lvl6pPr marL="1885950" indent="-171450" algn="l" defTabSz="685800" rtl="0" eaLnBrk="1" latinLnBrk="0" hangingPunct="1">
+              <a:lnSpc>
+                <a:spcPct val="90000"/>
+              </a:lnSpc>
+              <a:spcBef>
+                <a:spcPts val="375"/>
+              </a:spcBef>
+              <a:buFont typeface="Arial" panose="020B0604020202020204" pitchFamily="34" charset="0"/>
+              <a:buChar char="•"/>
+              <a:defRPr sz="1350" kern="1200">
+                <a:solidFill>
+                  <a:schemeClr val="tx1"/>
+                </a:solidFill>
+                <a:latin typeface="+mn-lt"/>
+                <a:ea typeface="+mn-ea"/>
+                <a:cs typeface="+mn-cs"/>
+              </a:defRPr>
+            </a:lvl6pPr>
+            <a:lvl7pPr marL="2228850" indent="-171450" algn="l" defTabSz="685800" rtl="0" eaLnBrk="1" latinLnBrk="0" hangingPunct="1">
+              <a:lnSpc>
+                <a:spcPct val="90000"/>
+              </a:lnSpc>
+              <a:spcBef>
+                <a:spcPts val="375"/>
+              </a:spcBef>
+              <a:buFont typeface="Arial" panose="020B0604020202020204" pitchFamily="34" charset="0"/>
+              <a:buChar char="•"/>
+              <a:defRPr sz="1350" kern="1200">
+                <a:solidFill>
+                  <a:schemeClr val="tx1"/>
+                </a:solidFill>
+                <a:latin typeface="+mn-lt"/>
+                <a:ea typeface="+mn-ea"/>
+                <a:cs typeface="+mn-cs"/>
+              </a:defRPr>
+            </a:lvl7pPr>
+            <a:lvl8pPr marL="2571750" indent="-171450" algn="l" defTabSz="685800" rtl="0" eaLnBrk="1" latinLnBrk="0" hangingPunct="1">
+              <a:lnSpc>
+                <a:spcPct val="90000"/>
+              </a:lnSpc>
+              <a:spcBef>
+                <a:spcPts val="375"/>
+              </a:spcBef>
+              <a:buFont typeface="Arial" panose="020B0604020202020204" pitchFamily="34" charset="0"/>
+              <a:buChar char="•"/>
+              <a:defRPr sz="1350" kern="1200">
+                <a:solidFill>
+                  <a:schemeClr val="tx1"/>
+                </a:solidFill>
+                <a:latin typeface="+mn-lt"/>
+                <a:ea typeface="+mn-ea"/>
+                <a:cs typeface="+mn-cs"/>
+              </a:defRPr>
+            </a:lvl8pPr>
+            <a:lvl9pPr marL="2914650" indent="-171450" algn="l" defTabSz="685800" rtl="0" eaLnBrk="1" latinLnBrk="0" hangingPunct="1">
+              <a:lnSpc>
+                <a:spcPct val="90000"/>
+              </a:lnSpc>
+              <a:spcBef>
+                <a:spcPts val="375"/>
+              </a:spcBef>
+              <a:buFont typeface="Arial" panose="020B0604020202020204" pitchFamily="34" charset="0"/>
+              <a:buChar char="•"/>
+              <a:defRPr sz="1350" kern="1200">
+                <a:solidFill>
+                  <a:schemeClr val="tx1"/>
+                </a:solidFill>
+                <a:latin typeface="+mn-lt"/>
+                <a:ea typeface="+mn-ea"/>
+                <a:cs typeface="+mn-cs"/>
+              </a:defRPr>
+            </a:lvl9pPr>
+          </a:lstStyle>
+          <a:p>
+            <a:pPr marL="0" indent="0" algn="ctr">
+              <a:buNone/>
+            </a:pPr>
+            <a:r>
+              <a:rPr lang="en-AU" sz="3200" dirty="0" smtClean="0">
+                <a:solidFill>
+                  <a:schemeClr val="tx2"/>
+                </a:solidFill>
+                <a:latin typeface="+mj-lt"/>
+              </a:rPr>
+              <a:t>Introduction</a:t>
+            </a:r>
+            <a:endParaRPr lang="en-AU" sz="3200" dirty="0" smtClean="0">
+              <a:solidFill>
+                <a:schemeClr val="tx2"/>
+              </a:solidFill>
+              <a:latin typeface="+mj-lt"/>
+            </a:endParaRPr>
+          </a:p>
+        </p:txBody>
+      </p:sp>
+      <p:sp>
+        <p:nvSpPr>
+          <p:cNvPr id="7" name="Oval 49"/>
+          <p:cNvSpPr>
+            <a:spLocks noChangeAspect="1"/>
+          </p:cNvSpPr>
+          <p:nvPr/>
+        </p:nvSpPr>
+        <p:spPr>
+          <a:xfrm>
+            <a:off x="5744617" y="2605493"/>
+            <a:ext cx="702759" cy="702757"/>
+          </a:xfrm>
+          <a:prstGeom prst="ellipse">
+            <a:avLst/>
+          </a:prstGeom>
+          <a:solidFill>
+            <a:schemeClr val="accent6"/>
+          </a:solidFill>
+          <a:ln>
+            <a:noFill/>
+          </a:ln>
+        </p:spPr>
+        <p:style>
+          <a:lnRef idx="2">
+            <a:schemeClr val="accent1">
+              <a:shade val="50000"/>
+            </a:schemeClr>
+          </a:lnRef>
+          <a:fillRef idx="1">
+            <a:schemeClr val="accent1"/>
+          </a:fillRef>
+          <a:effectRef idx="0">
+            <a:schemeClr val="accent1"/>
+          </a:effectRef>
+          <a:fontRef idx="minor">
+            <a:schemeClr val="lt1"/>
+          </a:fontRef>
+        </p:style>
+        <p:txBody>
+          <a:bodyPr rot="0" spcFirstLastPara="0" vertOverflow="overflow" horzOverflow="overflow" vert="horz" wrap="square" lIns="91440" tIns="45720" rIns="91440" bIns="45720" numCol="1" spcCol="0" rtlCol="0" fromWordArt="0" anchor="ctr" anchorCtr="0" forceAA="0" compatLnSpc="1">
+            <a:prstTxWarp prst="textNoShape">
+              <a:avLst/>
+            </a:prstTxWarp>
+            <a:noAutofit/>
+          </a:bodyPr>
+          <a:lstStyle/>
+          <a:p>
+            <a:pPr algn="ctr"/>
+            <a:r>
+              <a:rPr lang="en-AU" sz="2000" dirty="0" smtClean="0">
+                <a:solidFill>
+                  <a:schemeClr val="bg1"/>
+                </a:solidFill>
+                <a:latin typeface="FontAwesome" pitchFamily="2" charset="0"/>
+              </a:rPr>
+              <a:t></a:t>
+            </a:r>
+            <a:endParaRPr lang="en-US" sz="2000" dirty="0">
+              <a:solidFill>
+                <a:srgbClr val="FFFFFF"/>
+              </a:solidFill>
+            </a:endParaRPr>
+          </a:p>
+        </p:txBody>
+      </p:sp>
+    </p:spTree>
+    <p:extLst>
+      <p:ext uri="{BB962C8B-B14F-4D97-AF65-F5344CB8AC3E}">
+        <p14:creationId xmlns:p14="http://schemas.microsoft.com/office/powerpoint/2010/main" val="1357075004"/>
+      </p:ext>
+    </p:extLst>
+  </p:cSld>
+  <p:clrMapOvr>
+    <a:masterClrMapping/>
+  </p:clrMapOvr>
+  <p:timing>
+    <p:tnLst>
+      <p:par>
+        <p:cTn id="1" dur="indefinite" restart="never" nodeType="tmRoot"/>
+      </p:par>
+    </p:tnLst>
+  </p:timing>
+</p:sld>
+</file>
+
+<file path=ppt/slides/slide4.xml><?xml version="1.0" encoding="utf-8"?>
+<p:sld xmlns:a="http://schemas.openxmlformats.org/drawingml/2006/main" xmlns:r="http://schemas.openxmlformats.org/officeDocument/2006/relationships" xmlns:p="http://schemas.openxmlformats.org/presentationml/2006/main">
+  <p:cSld>
+    <p:spTree>
+      <p:nvGrpSpPr>
+        <p:cNvPr id="1" name=""/>
+        <p:cNvGrpSpPr/>
+        <p:nvPr/>
+      </p:nvGrpSpPr>
+      <p:grpSpPr>
+        <a:xfrm>
+          <a:off x="0" y="0"/>
+          <a:ext cx="0" cy="0"/>
+          <a:chOff x="0" y="0"/>
+          <a:chExt cx="0" cy="0"/>
+        </a:xfrm>
+      </p:grpSpPr>
+      <p:sp>
+        <p:nvSpPr>
+          <p:cNvPr id="2" name="Foliennummernplatzhalter 1"/>
+          <p:cNvSpPr>
+            <a:spLocks noGrp="1"/>
+          </p:cNvSpPr>
+          <p:nvPr>
+            <p:ph type="sldNum" sz="quarter" idx="12"/>
+          </p:nvPr>
+        </p:nvSpPr>
+        <p:spPr/>
+        <p:txBody>
+          <a:bodyPr/>
+          <a:lstStyle/>
+          <a:p>
+            <a:fld id="{FCEE2C88-6C8F-484D-AF69-578F576B1F44}" type="slidenum">
+              <a:rPr lang="en-US" smtClean="0"/>
+              <a:pPr/>
+              <a:t>4</a:t>
+            </a:fld>
+            <a:endParaRPr lang="en-US" dirty="0"/>
+          </a:p>
+        </p:txBody>
+      </p:sp>
+      <p:sp>
+        <p:nvSpPr>
+          <p:cNvPr id="3" name="Text Placeholder 33"/>
+          <p:cNvSpPr txBox="1">
+            <a:spLocks/>
+          </p:cNvSpPr>
+          <p:nvPr/>
+        </p:nvSpPr>
+        <p:spPr>
+          <a:xfrm>
+            <a:off x="3718030" y="3488189"/>
+            <a:ext cx="4755935" cy="499941"/>
+          </a:xfrm>
+          <a:prstGeom prst="rect">
+            <a:avLst/>
+          </a:prstGeom>
+        </p:spPr>
+        <p:txBody>
+          <a:bodyPr lIns="0" tIns="0" rIns="0" bIns="0"/>
+          <a:lstStyle>
+            <a:lvl1pPr marL="171450" indent="-171450" algn="l" defTabSz="685800" rtl="0" eaLnBrk="1" latinLnBrk="0" hangingPunct="1">
+              <a:lnSpc>
+                <a:spcPct val="90000"/>
+              </a:lnSpc>
+              <a:spcBef>
+                <a:spcPts val="750"/>
+              </a:spcBef>
+              <a:buFont typeface="Arial" panose="020B0604020202020204" pitchFamily="34" charset="0"/>
+              <a:buChar char="•"/>
+              <a:defRPr sz="2100" kern="1200">
+                <a:solidFill>
+                  <a:schemeClr val="tx1"/>
+                </a:solidFill>
+                <a:latin typeface="Neris Thin" panose="00000300000000000000" pitchFamily="50" charset="0"/>
+                <a:ea typeface="+mn-ea"/>
+                <a:cs typeface="+mn-cs"/>
+              </a:defRPr>
+            </a:lvl1pPr>
+            <a:lvl2pPr marL="514350" indent="-171450" algn="l" defTabSz="685800" rtl="0" eaLnBrk="1" latinLnBrk="0" hangingPunct="1">
+              <a:lnSpc>
+                <a:spcPct val="90000"/>
+              </a:lnSpc>
+              <a:spcBef>
+                <a:spcPts val="375"/>
+              </a:spcBef>
+              <a:buFont typeface="Arial" panose="020B0604020202020204" pitchFamily="34" charset="0"/>
+              <a:buChar char="•"/>
+              <a:defRPr sz="1800" kern="1200">
+                <a:solidFill>
+                  <a:schemeClr val="tx1"/>
+                </a:solidFill>
+                <a:latin typeface="Neris Thin" panose="00000300000000000000" pitchFamily="50" charset="0"/>
+                <a:ea typeface="+mn-ea"/>
+                <a:cs typeface="+mn-cs"/>
+              </a:defRPr>
+            </a:lvl2pPr>
+            <a:lvl3pPr marL="857250" indent="-171450" algn="l" defTabSz="685800" rtl="0" eaLnBrk="1" latinLnBrk="0" hangingPunct="1">
+              <a:lnSpc>
+                <a:spcPct val="90000"/>
+              </a:lnSpc>
+              <a:spcBef>
+                <a:spcPts val="375"/>
+              </a:spcBef>
+              <a:buFont typeface="Arial" panose="020B0604020202020204" pitchFamily="34" charset="0"/>
+              <a:buChar char="•"/>
+              <a:defRPr sz="1500" kern="1200">
+                <a:solidFill>
+                  <a:schemeClr val="tx1"/>
+                </a:solidFill>
+                <a:latin typeface="Neris Thin" panose="00000300000000000000" pitchFamily="50" charset="0"/>
+                <a:ea typeface="+mn-ea"/>
+                <a:cs typeface="+mn-cs"/>
+              </a:defRPr>
+            </a:lvl3pPr>
+            <a:lvl4pPr marL="1200150" indent="-171450" algn="l" defTabSz="685800" rtl="0" eaLnBrk="1" latinLnBrk="0" hangingPunct="1">
+              <a:lnSpc>
+                <a:spcPct val="90000"/>
+              </a:lnSpc>
+              <a:spcBef>
+                <a:spcPts val="375"/>
+              </a:spcBef>
+              <a:buFont typeface="Arial" panose="020B0604020202020204" pitchFamily="34" charset="0"/>
+              <a:buChar char="•"/>
+              <a:defRPr sz="1350" kern="1200">
+                <a:solidFill>
+                  <a:schemeClr val="tx1"/>
+                </a:solidFill>
+                <a:latin typeface="Neris Thin" panose="00000300000000000000" pitchFamily="50" charset="0"/>
+                <a:ea typeface="+mn-ea"/>
+                <a:cs typeface="+mn-cs"/>
+              </a:defRPr>
+            </a:lvl4pPr>
+            <a:lvl5pPr marL="1543050" indent="-171450" algn="l" defTabSz="685800" rtl="0" eaLnBrk="1" latinLnBrk="0" hangingPunct="1">
+              <a:lnSpc>
+                <a:spcPct val="90000"/>
+              </a:lnSpc>
+              <a:spcBef>
+                <a:spcPts val="375"/>
+              </a:spcBef>
+              <a:buFont typeface="Arial" panose="020B0604020202020204" pitchFamily="34" charset="0"/>
+              <a:buChar char="•"/>
+              <a:defRPr sz="1350" kern="1200">
+                <a:solidFill>
+                  <a:schemeClr val="tx1"/>
+                </a:solidFill>
+                <a:latin typeface="Neris Thin" panose="00000300000000000000" pitchFamily="50" charset="0"/>
+                <a:ea typeface="+mn-ea"/>
+                <a:cs typeface="+mn-cs"/>
+              </a:defRPr>
+            </a:lvl5pPr>
+            <a:lvl6pPr marL="1885950" indent="-171450" algn="l" defTabSz="685800" rtl="0" eaLnBrk="1" latinLnBrk="0" hangingPunct="1">
+              <a:lnSpc>
+                <a:spcPct val="90000"/>
+              </a:lnSpc>
+              <a:spcBef>
+                <a:spcPts val="375"/>
+              </a:spcBef>
+              <a:buFont typeface="Arial" panose="020B0604020202020204" pitchFamily="34" charset="0"/>
+              <a:buChar char="•"/>
+              <a:defRPr sz="1350" kern="1200">
+                <a:solidFill>
+                  <a:schemeClr val="tx1"/>
+                </a:solidFill>
+                <a:latin typeface="+mn-lt"/>
+                <a:ea typeface="+mn-ea"/>
+                <a:cs typeface="+mn-cs"/>
+              </a:defRPr>
+            </a:lvl6pPr>
+            <a:lvl7pPr marL="2228850" indent="-171450" algn="l" defTabSz="685800" rtl="0" eaLnBrk="1" latinLnBrk="0" hangingPunct="1">
+              <a:lnSpc>
+                <a:spcPct val="90000"/>
+              </a:lnSpc>
+              <a:spcBef>
+                <a:spcPts val="375"/>
+              </a:spcBef>
+              <a:buFont typeface="Arial" panose="020B0604020202020204" pitchFamily="34" charset="0"/>
+              <a:buChar char="•"/>
+              <a:defRPr sz="1350" kern="1200">
+                <a:solidFill>
+                  <a:schemeClr val="tx1"/>
+                </a:solidFill>
+                <a:latin typeface="+mn-lt"/>
+                <a:ea typeface="+mn-ea"/>
+                <a:cs typeface="+mn-cs"/>
+              </a:defRPr>
+            </a:lvl7pPr>
+            <a:lvl8pPr marL="2571750" indent="-171450" algn="l" defTabSz="685800" rtl="0" eaLnBrk="1" latinLnBrk="0" hangingPunct="1">
+              <a:lnSpc>
+                <a:spcPct val="90000"/>
+              </a:lnSpc>
+              <a:spcBef>
+                <a:spcPts val="375"/>
+              </a:spcBef>
+              <a:buFont typeface="Arial" panose="020B0604020202020204" pitchFamily="34" charset="0"/>
+              <a:buChar char="•"/>
+              <a:defRPr sz="1350" kern="1200">
+                <a:solidFill>
+                  <a:schemeClr val="tx1"/>
+                </a:solidFill>
+                <a:latin typeface="+mn-lt"/>
+                <a:ea typeface="+mn-ea"/>
+                <a:cs typeface="+mn-cs"/>
+              </a:defRPr>
+            </a:lvl8pPr>
+            <a:lvl9pPr marL="2914650" indent="-171450" algn="l" defTabSz="685800" rtl="0" eaLnBrk="1" latinLnBrk="0" hangingPunct="1">
+              <a:lnSpc>
+                <a:spcPct val="90000"/>
+              </a:lnSpc>
+              <a:spcBef>
+                <a:spcPts val="375"/>
+              </a:spcBef>
+              <a:buFont typeface="Arial" panose="020B0604020202020204" pitchFamily="34" charset="0"/>
+              <a:buChar char="•"/>
+              <a:defRPr sz="1350" kern="1200">
+                <a:solidFill>
+                  <a:schemeClr val="tx1"/>
+                </a:solidFill>
+                <a:latin typeface="+mn-lt"/>
+                <a:ea typeface="+mn-ea"/>
+                <a:cs typeface="+mn-cs"/>
+              </a:defRPr>
+            </a:lvl9pPr>
+          </a:lstStyle>
+          <a:p>
+            <a:pPr marL="0" indent="0" algn="ctr">
+              <a:buNone/>
+            </a:pPr>
+            <a:r>
+              <a:rPr lang="en-AU" sz="3200" dirty="0" smtClean="0">
+                <a:solidFill>
+                  <a:schemeClr val="tx2"/>
+                </a:solidFill>
+                <a:latin typeface="+mj-lt"/>
+              </a:rPr>
+              <a:t>Requirements</a:t>
+            </a:r>
+            <a:endParaRPr lang="en-AU" sz="3200" dirty="0" smtClean="0">
+              <a:solidFill>
+                <a:schemeClr val="tx2"/>
+              </a:solidFill>
+              <a:latin typeface="+mj-lt"/>
+            </a:endParaRPr>
+          </a:p>
+        </p:txBody>
+      </p:sp>
+      <p:sp>
+        <p:nvSpPr>
+          <p:cNvPr id="5" name="Oval 57"/>
+          <p:cNvSpPr>
+            <a:spLocks noChangeAspect="1"/>
+          </p:cNvSpPr>
+          <p:nvPr/>
+        </p:nvSpPr>
+        <p:spPr>
+          <a:xfrm>
+            <a:off x="5696696" y="2492117"/>
+            <a:ext cx="798602" cy="798600"/>
+          </a:xfrm>
+          <a:prstGeom prst="ellipse">
+            <a:avLst/>
+          </a:prstGeom>
+          <a:solidFill>
+            <a:schemeClr val="accent5"/>
+          </a:solidFill>
+          <a:ln>
+            <a:noFill/>
+          </a:ln>
+        </p:spPr>
+        <p:style>
+          <a:lnRef idx="2">
+            <a:schemeClr val="accent1">
+              <a:shade val="50000"/>
+            </a:schemeClr>
+          </a:lnRef>
+          <a:fillRef idx="1">
+            <a:schemeClr val="accent1"/>
+          </a:fillRef>
+          <a:effectRef idx="0">
+            <a:schemeClr val="accent1"/>
+          </a:effectRef>
+          <a:fontRef idx="minor">
+            <a:schemeClr val="lt1"/>
+          </a:fontRef>
+        </p:style>
+        <p:txBody>
+          <a:bodyPr rot="0" spcFirstLastPara="0" vertOverflow="overflow" horzOverflow="overflow" vert="horz" wrap="square" lIns="91440" tIns="45720" rIns="91440" bIns="45720" numCol="1" spcCol="0" rtlCol="0" fromWordArt="0" anchor="ctr" anchorCtr="0" forceAA="0" compatLnSpc="1">
+            <a:prstTxWarp prst="textNoShape">
+              <a:avLst/>
+            </a:prstTxWarp>
+            <a:noAutofit/>
+          </a:bodyPr>
+          <a:lstStyle/>
+          <a:p>
+            <a:pPr algn="ctr"/>
+            <a:r>
+              <a:rPr lang="en-US" sz="2000" dirty="0" smtClean="0">
+                <a:solidFill>
+                  <a:schemeClr val="bg1"/>
+                </a:solidFill>
+                <a:latin typeface="FontAwesome" pitchFamily="2" charset="0"/>
+              </a:rPr>
+              <a:t></a:t>
+            </a:r>
+            <a:endParaRPr lang="en-US" sz="2000" dirty="0">
+              <a:solidFill>
+                <a:schemeClr val="bg1"/>
+              </a:solidFill>
+              <a:latin typeface="FontAwesome" pitchFamily="2" charset="0"/>
+            </a:endParaRPr>
+          </a:p>
+        </p:txBody>
+      </p:sp>
+    </p:spTree>
+    <p:extLst>
+      <p:ext uri="{BB962C8B-B14F-4D97-AF65-F5344CB8AC3E}">
+        <p14:creationId xmlns:p14="http://schemas.microsoft.com/office/powerpoint/2010/main" val="2627562729"/>
+      </p:ext>
+    </p:extLst>
+  </p:cSld>
+  <p:clrMapOvr>
+    <a:masterClrMapping/>
+  </p:clrMapOvr>
+  <p:timing>
+    <p:tnLst>
+      <p:par>
+        <p:cTn id="1" dur="indefinite" restart="never" nodeType="tmRoot"/>
+      </p:par>
+    </p:tnLst>
+  </p:timing>
+</p:sld>
+</file>
+
+<file path=ppt/slides/slide5.xml><?xml version="1.0" encoding="utf-8"?>
+<p:sld xmlns:a="http://schemas.openxmlformats.org/drawingml/2006/main" xmlns:r="http://schemas.openxmlformats.org/officeDocument/2006/relationships" xmlns:p="http://schemas.openxmlformats.org/presentationml/2006/main">
+  <p:cSld>
+    <p:spTree>
+      <p:nvGrpSpPr>
+        <p:cNvPr id="1" name=""/>
+        <p:cNvGrpSpPr/>
+        <p:nvPr/>
+      </p:nvGrpSpPr>
+      <p:grpSpPr>
+        <a:xfrm>
+          <a:off x="0" y="0"/>
+          <a:ext cx="0" cy="0"/>
+          <a:chOff x="0" y="0"/>
+          <a:chExt cx="0" cy="0"/>
+        </a:xfrm>
+      </p:grpSpPr>
+      <p:sp>
+        <p:nvSpPr>
+          <p:cNvPr id="2" name="Foliennummernplatzhalter 1"/>
+          <p:cNvSpPr>
+            <a:spLocks noGrp="1"/>
+          </p:cNvSpPr>
+          <p:nvPr>
+            <p:ph type="sldNum" sz="quarter" idx="12"/>
+          </p:nvPr>
+        </p:nvSpPr>
+        <p:spPr/>
+        <p:txBody>
+          <a:bodyPr/>
+          <a:lstStyle/>
+          <a:p>
+            <a:fld id="{FCEE2C88-6C8F-484D-AF69-578F576B1F44}" type="slidenum">
+              <a:rPr lang="en-US" smtClean="0"/>
+              <a:pPr/>
+              <a:t>5</a:t>
+            </a:fld>
+            <a:endParaRPr lang="en-US" dirty="0"/>
+          </a:p>
+        </p:txBody>
+      </p:sp>
+      <p:grpSp>
+        <p:nvGrpSpPr>
+          <p:cNvPr id="6" name="Gruppieren 5"/>
+          <p:cNvGrpSpPr/>
+          <p:nvPr/>
+        </p:nvGrpSpPr>
+        <p:grpSpPr>
+          <a:xfrm>
+            <a:off x="3718030" y="2462654"/>
+            <a:ext cx="4755935" cy="1525476"/>
+            <a:chOff x="3718030" y="2199857"/>
+            <a:chExt cx="4755935" cy="1525476"/>
+          </a:xfrm>
+        </p:grpSpPr>
+        <p:sp>
+          <p:nvSpPr>
+            <p:cNvPr id="3" name="Text Placeholder 33"/>
+            <p:cNvSpPr txBox="1">
+              <a:spLocks/>
+            </p:cNvSpPr>
+            <p:nvPr/>
+          </p:nvSpPr>
+          <p:spPr>
+            <a:xfrm>
+              <a:off x="3718030" y="3225392"/>
+              <a:ext cx="4755935" cy="499941"/>
+            </a:xfrm>
+            <a:prstGeom prst="rect">
+              <a:avLst/>
+            </a:prstGeom>
+          </p:spPr>
+          <p:txBody>
+            <a:bodyPr lIns="0" tIns="0" rIns="0" bIns="0"/>
+            <a:lstStyle>
+              <a:lvl1pPr marL="171450" indent="-171450" algn="l" defTabSz="685800" rtl="0" eaLnBrk="1" latinLnBrk="0" hangingPunct="1">
+                <a:lnSpc>
+                  <a:spcPct val="90000"/>
+                </a:lnSpc>
+                <a:spcBef>
+                  <a:spcPts val="750"/>
+                </a:spcBef>
+                <a:buFont typeface="Arial" panose="020B0604020202020204" pitchFamily="34" charset="0"/>
+                <a:buChar char="•"/>
+                <a:defRPr sz="2100" kern="1200">
+                  <a:solidFill>
+                    <a:schemeClr val="tx1"/>
+                  </a:solidFill>
+                  <a:latin typeface="Neris Thin" panose="00000300000000000000" pitchFamily="50" charset="0"/>
+                  <a:ea typeface="+mn-ea"/>
+                  <a:cs typeface="+mn-cs"/>
+                </a:defRPr>
+              </a:lvl1pPr>
+              <a:lvl2pPr marL="514350" indent="-171450" algn="l" defTabSz="685800" rtl="0" eaLnBrk="1" latinLnBrk="0" hangingPunct="1">
+                <a:lnSpc>
+                  <a:spcPct val="90000"/>
+                </a:lnSpc>
+                <a:spcBef>
+                  <a:spcPts val="375"/>
+                </a:spcBef>
+                <a:buFont typeface="Arial" panose="020B0604020202020204" pitchFamily="34" charset="0"/>
+                <a:buChar char="•"/>
+                <a:defRPr sz="1800" kern="1200">
+                  <a:solidFill>
+                    <a:schemeClr val="tx1"/>
+                  </a:solidFill>
+                  <a:latin typeface="Neris Thin" panose="00000300000000000000" pitchFamily="50" charset="0"/>
+                  <a:ea typeface="+mn-ea"/>
+                  <a:cs typeface="+mn-cs"/>
+                </a:defRPr>
+              </a:lvl2pPr>
+              <a:lvl3pPr marL="857250" indent="-171450" algn="l" defTabSz="685800" rtl="0" eaLnBrk="1" latinLnBrk="0" hangingPunct="1">
+                <a:lnSpc>
+                  <a:spcPct val="90000"/>
+                </a:lnSpc>
+                <a:spcBef>
+                  <a:spcPts val="375"/>
+                </a:spcBef>
+                <a:buFont typeface="Arial" panose="020B0604020202020204" pitchFamily="34" charset="0"/>
+                <a:buChar char="•"/>
+                <a:defRPr sz="1500" kern="1200">
+                  <a:solidFill>
+                    <a:schemeClr val="tx1"/>
+                  </a:solidFill>
+                  <a:latin typeface="Neris Thin" panose="00000300000000000000" pitchFamily="50" charset="0"/>
+                  <a:ea typeface="+mn-ea"/>
+                  <a:cs typeface="+mn-cs"/>
+                </a:defRPr>
+              </a:lvl3pPr>
+              <a:lvl4pPr marL="1200150" indent="-171450" algn="l" defTabSz="685800" rtl="0" eaLnBrk="1" latinLnBrk="0" hangingPunct="1">
+                <a:lnSpc>
+                  <a:spcPct val="90000"/>
+                </a:lnSpc>
+                <a:spcBef>
+                  <a:spcPts val="375"/>
+                </a:spcBef>
+                <a:buFont typeface="Arial" panose="020B0604020202020204" pitchFamily="34" charset="0"/>
+                <a:buChar char="•"/>
+                <a:defRPr sz="1350" kern="1200">
+                  <a:solidFill>
+                    <a:schemeClr val="tx1"/>
+                  </a:solidFill>
+                  <a:latin typeface="Neris Thin" panose="00000300000000000000" pitchFamily="50" charset="0"/>
+                  <a:ea typeface="+mn-ea"/>
+                  <a:cs typeface="+mn-cs"/>
+                </a:defRPr>
+              </a:lvl4pPr>
+              <a:lvl5pPr marL="1543050" indent="-171450" algn="l" defTabSz="685800" rtl="0" eaLnBrk="1" latinLnBrk="0" hangingPunct="1">
+                <a:lnSpc>
+                  <a:spcPct val="90000"/>
+                </a:lnSpc>
+                <a:spcBef>
+                  <a:spcPts val="375"/>
+                </a:spcBef>
+                <a:buFont typeface="Arial" panose="020B0604020202020204" pitchFamily="34" charset="0"/>
+                <a:buChar char="•"/>
+                <a:defRPr sz="1350" kern="1200">
+                  <a:solidFill>
+                    <a:schemeClr val="tx1"/>
+                  </a:solidFill>
+                  <a:latin typeface="Neris Thin" panose="00000300000000000000" pitchFamily="50" charset="0"/>
+                  <a:ea typeface="+mn-ea"/>
+                  <a:cs typeface="+mn-cs"/>
+                </a:defRPr>
+              </a:lvl5pPr>
+              <a:lvl6pPr marL="1885950" indent="-171450" algn="l" defTabSz="685800" rtl="0" eaLnBrk="1" latinLnBrk="0" hangingPunct="1">
+                <a:lnSpc>
+                  <a:spcPct val="90000"/>
+                </a:lnSpc>
+                <a:spcBef>
+                  <a:spcPts val="375"/>
+                </a:spcBef>
+                <a:buFont typeface="Arial" panose="020B0604020202020204" pitchFamily="34" charset="0"/>
+                <a:buChar char="•"/>
+                <a:defRPr sz="1350" kern="1200">
+                  <a:solidFill>
+                    <a:schemeClr val="tx1"/>
+                  </a:solidFill>
+                  <a:latin typeface="+mn-lt"/>
+                  <a:ea typeface="+mn-ea"/>
+                  <a:cs typeface="+mn-cs"/>
+                </a:defRPr>
+              </a:lvl6pPr>
+              <a:lvl7pPr marL="2228850" indent="-171450" algn="l" defTabSz="685800" rtl="0" eaLnBrk="1" latinLnBrk="0" hangingPunct="1">
+                <a:lnSpc>
+                  <a:spcPct val="90000"/>
+                </a:lnSpc>
+                <a:spcBef>
+                  <a:spcPts val="375"/>
+                </a:spcBef>
+                <a:buFont typeface="Arial" panose="020B0604020202020204" pitchFamily="34" charset="0"/>
+                <a:buChar char="•"/>
+                <a:defRPr sz="1350" kern="1200">
+                  <a:solidFill>
+                    <a:schemeClr val="tx1"/>
+                  </a:solidFill>
+                  <a:latin typeface="+mn-lt"/>
+                  <a:ea typeface="+mn-ea"/>
+                  <a:cs typeface="+mn-cs"/>
+                </a:defRPr>
+              </a:lvl7pPr>
+              <a:lvl8pPr marL="2571750" indent="-171450" algn="l" defTabSz="685800" rtl="0" eaLnBrk="1" latinLnBrk="0" hangingPunct="1">
+                <a:lnSpc>
+                  <a:spcPct val="90000"/>
+                </a:lnSpc>
+                <a:spcBef>
+                  <a:spcPts val="375"/>
+                </a:spcBef>
+                <a:buFont typeface="Arial" panose="020B0604020202020204" pitchFamily="34" charset="0"/>
+                <a:buChar char="•"/>
+                <a:defRPr sz="1350" kern="1200">
+                  <a:solidFill>
+                    <a:schemeClr val="tx1"/>
+                  </a:solidFill>
+                  <a:latin typeface="+mn-lt"/>
+                  <a:ea typeface="+mn-ea"/>
+                  <a:cs typeface="+mn-cs"/>
+                </a:defRPr>
+              </a:lvl8pPr>
+              <a:lvl9pPr marL="2914650" indent="-171450" algn="l" defTabSz="685800" rtl="0" eaLnBrk="1" latinLnBrk="0" hangingPunct="1">
+                <a:lnSpc>
+                  <a:spcPct val="90000"/>
+                </a:lnSpc>
+                <a:spcBef>
+                  <a:spcPts val="375"/>
+                </a:spcBef>
+                <a:buFont typeface="Arial" panose="020B0604020202020204" pitchFamily="34" charset="0"/>
+                <a:buChar char="•"/>
+                <a:defRPr sz="1350" kern="1200">
+                  <a:solidFill>
+                    <a:schemeClr val="tx1"/>
+                  </a:solidFill>
+                  <a:latin typeface="+mn-lt"/>
+                  <a:ea typeface="+mn-ea"/>
+                  <a:cs typeface="+mn-cs"/>
+                </a:defRPr>
+              </a:lvl9pPr>
+            </a:lstStyle>
+            <a:p>
+              <a:pPr marL="0" indent="0" algn="ctr">
+                <a:buNone/>
+              </a:pPr>
+              <a:r>
+                <a:rPr lang="en-AU" sz="3200" dirty="0" smtClean="0">
+                  <a:solidFill>
+                    <a:schemeClr val="tx2"/>
+                  </a:solidFill>
+                  <a:latin typeface="+mj-lt"/>
+                </a:rPr>
+                <a:t>Architecture</a:t>
+              </a:r>
+            </a:p>
+          </p:txBody>
+        </p:sp>
+        <p:sp>
+          <p:nvSpPr>
+            <p:cNvPr id="5" name="Oval 53"/>
+            <p:cNvSpPr>
+              <a:spLocks noChangeAspect="1"/>
+            </p:cNvSpPr>
+            <p:nvPr/>
+          </p:nvSpPr>
+          <p:spPr>
+            <a:xfrm>
+              <a:off x="5674088" y="2199857"/>
+              <a:ext cx="843821" cy="843819"/>
+            </a:xfrm>
+            <a:prstGeom prst="ellipse">
+              <a:avLst/>
+            </a:prstGeom>
+            <a:solidFill>
+              <a:schemeClr val="accent6"/>
+            </a:solidFill>
+            <a:ln>
+              <a:noFill/>
+            </a:ln>
+          </p:spPr>
+          <p:style>
+            <a:lnRef idx="2">
+              <a:schemeClr val="accent1">
+                <a:shade val="50000"/>
+              </a:schemeClr>
+            </a:lnRef>
+            <a:fillRef idx="1">
+              <a:schemeClr val="accent1"/>
+            </a:fillRef>
+            <a:effectRef idx="0">
+              <a:schemeClr val="accent1"/>
+            </a:effectRef>
+            <a:fontRef idx="minor">
+              <a:schemeClr val="lt1"/>
+            </a:fontRef>
+          </p:style>
+          <p:txBody>
+            <a:bodyPr rot="0" spcFirstLastPara="0" vertOverflow="overflow" horzOverflow="overflow" vert="horz" wrap="square" lIns="91440" tIns="45720" rIns="91440" bIns="45720" numCol="1" spcCol="0" rtlCol="0" fromWordArt="0" anchor="ctr" anchorCtr="0" forceAA="0" compatLnSpc="1">
+              <a:prstTxWarp prst="textNoShape">
+                <a:avLst/>
+              </a:prstTxWarp>
+              <a:noAutofit/>
+            </a:bodyPr>
+            <a:lstStyle/>
+            <a:p>
+              <a:pPr algn="ctr"/>
+              <a:r>
+                <a:rPr lang="en-US" sz="2000" dirty="0">
+                  <a:solidFill>
+                    <a:srgbClr val="FFFFFF"/>
+                  </a:solidFill>
+                  <a:latin typeface="FontAwesome" pitchFamily="2" charset="0"/>
+                </a:rPr>
+                <a:t></a:t>
+              </a:r>
+              <a:endParaRPr lang="en-AU" sz="2000" dirty="0">
+                <a:solidFill>
+                  <a:schemeClr val="bg1"/>
+                </a:solidFill>
+                <a:latin typeface="FontAwesome" pitchFamily="2" charset="0"/>
+              </a:endParaRPr>
+            </a:p>
+          </p:txBody>
+        </p:sp>
+      </p:grpSp>
+    </p:spTree>
+    <p:extLst>
+      <p:ext uri="{BB962C8B-B14F-4D97-AF65-F5344CB8AC3E}">
+        <p14:creationId xmlns:p14="http://schemas.microsoft.com/office/powerpoint/2010/main" val="931775689"/>
+      </p:ext>
+    </p:extLst>
+  </p:cSld>
+  <p:clrMapOvr>
+    <a:masterClrMapping/>
+  </p:clrMapOvr>
+  <p:timing>
+    <p:tnLst>
+      <p:par>
+        <p:cTn id="1" dur="indefinite" restart="never" nodeType="tmRoot"/>
+      </p:par>
+    </p:tnLst>
+  </p:timing>
+</p:sld>
+</file>
+
+<file path=ppt/slides/slide6.xml><?xml version="1.0" encoding="utf-8"?>
+<p:sld xmlns:a="http://schemas.openxmlformats.org/drawingml/2006/main" xmlns:r="http://schemas.openxmlformats.org/officeDocument/2006/relationships" xmlns:p="http://schemas.openxmlformats.org/presentationml/2006/main">
+  <p:cSld>
+    <p:spTree>
+      <p:nvGrpSpPr>
+        <p:cNvPr id="1" name=""/>
+        <p:cNvGrpSpPr/>
+        <p:nvPr/>
+      </p:nvGrpSpPr>
+      <p:grpSpPr>
+        <a:xfrm>
+          <a:off x="0" y="0"/>
+          <a:ext cx="0" cy="0"/>
+          <a:chOff x="0" y="0"/>
+          <a:chExt cx="0" cy="0"/>
+        </a:xfrm>
+      </p:grpSpPr>
+      <p:sp>
+        <p:nvSpPr>
+          <p:cNvPr id="3" name="Foliennummernplatzhalter 2"/>
+          <p:cNvSpPr>
+            <a:spLocks noGrp="1"/>
+          </p:cNvSpPr>
+          <p:nvPr>
+            <p:ph type="sldNum" sz="quarter" idx="12"/>
+          </p:nvPr>
+        </p:nvSpPr>
+        <p:spPr/>
+        <p:txBody>
+          <a:bodyPr/>
+          <a:lstStyle/>
+          <a:p>
+            <a:fld id="{FCEE2C88-6C8F-484D-AF69-578F576B1F44}" type="slidenum">
+              <a:rPr lang="en-US" smtClean="0"/>
+              <a:pPr/>
+              <a:t>6</a:t>
+            </a:fld>
+            <a:endParaRPr lang="en-US" dirty="0"/>
+          </a:p>
+        </p:txBody>
+      </p:sp>
+      <p:sp>
+        <p:nvSpPr>
+          <p:cNvPr id="4" name="Textplatzhalter 3"/>
+          <p:cNvSpPr>
+            <a:spLocks noGrp="1"/>
+          </p:cNvSpPr>
+          <p:nvPr>
+            <p:ph type="body" sz="quarter" idx="14"/>
+          </p:nvPr>
+        </p:nvSpPr>
+        <p:spPr/>
+        <p:txBody>
+          <a:bodyPr>
+            <a:noAutofit/>
+          </a:bodyPr>
+          <a:lstStyle/>
+          <a:p>
+            <a:r>
+              <a:rPr lang="de-DE" sz="3200" dirty="0" err="1" smtClean="0"/>
+              <a:t>Architecture</a:t>
+            </a:r>
+            <a:r>
+              <a:rPr lang="de-DE" sz="3200" dirty="0" smtClean="0"/>
+              <a:t> </a:t>
+            </a:r>
+            <a:r>
+              <a:rPr lang="de-DE" sz="3200" dirty="0" err="1" smtClean="0"/>
+              <a:t>overview</a:t>
+            </a:r>
+            <a:endParaRPr lang="en-US" sz="3200" dirty="0"/>
+          </a:p>
+        </p:txBody>
+      </p:sp>
+      <p:sp>
+        <p:nvSpPr>
+          <p:cNvPr id="5" name="Textplatzhalter 4"/>
+          <p:cNvSpPr>
+            <a:spLocks noGrp="1"/>
+          </p:cNvSpPr>
+          <p:nvPr>
+            <p:ph type="body" sz="quarter" idx="15"/>
+          </p:nvPr>
+        </p:nvSpPr>
+        <p:spPr/>
+        <p:txBody>
+          <a:bodyPr/>
+          <a:lstStyle/>
+          <a:p>
+            <a:endParaRPr lang="en-US"/>
+          </a:p>
+        </p:txBody>
+      </p:sp>
+      <p:pic>
+        <p:nvPicPr>
+          <p:cNvPr id="7" name="Grafik 6"/>
+          <p:cNvPicPr>
+            <a:picLocks noChangeAspect="1"/>
+          </p:cNvPicPr>
+          <p:nvPr/>
+        </p:nvPicPr>
+        <p:blipFill>
+          <a:blip r:embed="rId2">
+            <a:extLst>
+              <a:ext uri="{28A0092B-C50C-407E-A947-70E740481C1C}">
+                <a14:useLocalDpi xmlns:a14="http://schemas.microsoft.com/office/drawing/2010/main" val="0"/>
+              </a:ext>
+            </a:extLst>
+          </a:blip>
+          <a:stretch>
+            <a:fillRect/>
+          </a:stretch>
+        </p:blipFill>
+        <p:spPr>
+          <a:xfrm>
+            <a:off x="1663414" y="2091509"/>
+            <a:ext cx="9372327" cy="3099615"/>
+          </a:xfrm>
+          <a:prstGeom prst="rect">
+            <a:avLst/>
+          </a:prstGeom>
+          <a:effectLst>
+            <a:outerShdw blurRad="50800" dist="38100" dir="8100000" algn="tr" rotWithShape="0">
+              <a:prstClr val="black">
+                <a:alpha val="40000"/>
+              </a:prstClr>
+            </a:outerShdw>
+          </a:effectLst>
+        </p:spPr>
+      </p:pic>
+    </p:spTree>
+    <p:extLst>
+      <p:ext uri="{BB962C8B-B14F-4D97-AF65-F5344CB8AC3E}">
+        <p14:creationId xmlns:p14="http://schemas.microsoft.com/office/powerpoint/2010/main" val="1901838052"/>
+      </p:ext>
+    </p:extLst>
+  </p:cSld>
+  <p:clrMapOvr>
+    <a:masterClrMapping/>
+  </p:clrMapOvr>
+  <p:timing>
+    <p:tnLst>
+      <p:par>
+        <p:cTn id="1" dur="indefinite" restart="never" nodeType="tmRoot"/>
+      </p:par>
+    </p:tnLst>
+  </p:timing>
+</p:sld>
+</file>
+
+<file path=ppt/slides/slide7.xml><?xml version="1.0" encoding="utf-8"?>
+<p:sld xmlns:a="http://schemas.openxmlformats.org/drawingml/2006/main" xmlns:r="http://schemas.openxmlformats.org/officeDocument/2006/relationships" xmlns:p="http://schemas.openxmlformats.org/presentationml/2006/main">
+  <p:cSld>
+    <p:spTree>
+      <p:nvGrpSpPr>
+        <p:cNvPr id="1" name=""/>
+        <p:cNvGrpSpPr/>
+        <p:nvPr/>
+      </p:nvGrpSpPr>
+      <p:grpSpPr>
+        <a:xfrm>
+          <a:off x="0" y="0"/>
+          <a:ext cx="0" cy="0"/>
+          <a:chOff x="0" y="0"/>
+          <a:chExt cx="0" cy="0"/>
+        </a:xfrm>
+      </p:grpSpPr>
+      <p:sp>
+        <p:nvSpPr>
+          <p:cNvPr id="3" name="Foliennummernplatzhalter 2"/>
+          <p:cNvSpPr>
+            <a:spLocks noGrp="1"/>
+          </p:cNvSpPr>
+          <p:nvPr>
+            <p:ph type="sldNum" sz="quarter" idx="12"/>
+          </p:nvPr>
+        </p:nvSpPr>
+        <p:spPr/>
+        <p:txBody>
+          <a:bodyPr/>
+          <a:lstStyle/>
+          <a:p>
+            <a:fld id="{FCEE2C88-6C8F-484D-AF69-578F576B1F44}" type="slidenum">
+              <a:rPr lang="en-US" smtClean="0"/>
+              <a:pPr/>
+              <a:t>7</a:t>
+            </a:fld>
+            <a:endParaRPr lang="en-US" dirty="0"/>
+          </a:p>
+        </p:txBody>
+      </p:sp>
+      <p:sp>
+        <p:nvSpPr>
+          <p:cNvPr id="4" name="Textplatzhalter 3"/>
+          <p:cNvSpPr>
+            <a:spLocks noGrp="1"/>
+          </p:cNvSpPr>
+          <p:nvPr>
+            <p:ph type="body" sz="quarter" idx="14"/>
+          </p:nvPr>
+        </p:nvSpPr>
+        <p:spPr/>
+        <p:txBody>
+          <a:bodyPr>
+            <a:noAutofit/>
+          </a:bodyPr>
+          <a:lstStyle/>
+          <a:p>
+            <a:r>
+              <a:rPr lang="de-DE" sz="3200" dirty="0" smtClean="0"/>
+              <a:t>Components</a:t>
+            </a:r>
+            <a:endParaRPr lang="en-US" sz="3200" dirty="0"/>
+          </a:p>
+        </p:txBody>
+      </p:sp>
+      <p:sp>
+        <p:nvSpPr>
+          <p:cNvPr id="5" name="Textplatzhalter 4"/>
+          <p:cNvSpPr>
+            <a:spLocks noGrp="1"/>
+          </p:cNvSpPr>
+          <p:nvPr>
+            <p:ph type="body" sz="quarter" idx="15"/>
+          </p:nvPr>
+        </p:nvSpPr>
+        <p:spPr/>
+        <p:txBody>
+          <a:bodyPr/>
+          <a:lstStyle/>
+          <a:p>
+            <a:endParaRPr lang="en-US"/>
+          </a:p>
+        </p:txBody>
+      </p:sp>
+      <p:cxnSp>
+        <p:nvCxnSpPr>
+          <p:cNvPr id="8" name="Straight Connector 9"/>
+          <p:cNvCxnSpPr/>
+          <p:nvPr/>
+        </p:nvCxnSpPr>
+        <p:spPr>
+          <a:xfrm>
+            <a:off x="6096000" y="-118872"/>
+            <a:ext cx="0" cy="7086600"/>
+          </a:xfrm>
+          <a:prstGeom prst="line">
+            <a:avLst/>
+          </a:prstGeom>
+          <a:ln w="19050">
+            <a:solidFill>
+              <a:schemeClr val="bg2"/>
+            </a:solidFill>
+          </a:ln>
+        </p:spPr>
+        <p:style>
+          <a:lnRef idx="1">
+            <a:schemeClr val="accent1"/>
+          </a:lnRef>
+          <a:fillRef idx="0">
+            <a:schemeClr val="accent1"/>
+          </a:fillRef>
+          <a:effectRef idx="0">
+            <a:schemeClr val="accent1"/>
+          </a:effectRef>
+          <a:fontRef idx="minor">
+            <a:schemeClr val="tx1"/>
+          </a:fontRef>
+        </p:style>
+      </p:cxnSp>
+      <p:sp>
+        <p:nvSpPr>
+          <p:cNvPr id="2" name="Textfeld 1"/>
+          <p:cNvSpPr txBox="1"/>
+          <p:nvPr/>
+        </p:nvSpPr>
+        <p:spPr>
+          <a:xfrm>
+            <a:off x="913277" y="1327432"/>
+            <a:ext cx="4571769" cy="3677930"/>
+          </a:xfrm>
+          <a:prstGeom prst="rect">
+            <a:avLst/>
+          </a:prstGeom>
+          <a:noFill/>
+        </p:spPr>
+        <p:txBody>
+          <a:bodyPr wrap="square" rtlCol="0">
+            <a:spAutoFit/>
+          </a:bodyPr>
+          <a:lstStyle/>
+          <a:p>
+            <a:pPr>
+              <a:spcAft>
+                <a:spcPts val="2400"/>
+              </a:spcAft>
+            </a:pPr>
+            <a:r>
+              <a:rPr lang="en-US" sz="2800" dirty="0" smtClean="0">
+                <a:latin typeface="Roboto medium" pitchFamily="2" charset="0"/>
+                <a:ea typeface="Roboto medium" pitchFamily="2" charset="0"/>
+              </a:rPr>
+              <a:t>Salesforce REST API client</a:t>
+            </a:r>
+            <a:endParaRPr lang="en-US" dirty="0" smtClean="0">
+              <a:latin typeface="Roboto medium" pitchFamily="2" charset="0"/>
+              <a:ea typeface="Roboto medium" pitchFamily="2" charset="0"/>
+            </a:endParaRPr>
+          </a:p>
+          <a:p>
+            <a:pPr marL="342900" indent="-342900">
+              <a:buFont typeface="Arial" panose="020B0604020202020204" pitchFamily="34" charset="0"/>
+              <a:buChar char="•"/>
+            </a:pPr>
+            <a:r>
+              <a:rPr lang="en-US" sz="2400" dirty="0">
+                <a:ea typeface="Roboto medium" pitchFamily="2" charset="0"/>
+              </a:rPr>
+              <a:t>Core communication with API</a:t>
+            </a:r>
+          </a:p>
+          <a:p>
+            <a:pPr marL="342900" indent="-342900">
+              <a:buFont typeface="Arial" panose="020B0604020202020204" pitchFamily="34" charset="0"/>
+              <a:buChar char="•"/>
+            </a:pPr>
+            <a:r>
+              <a:rPr lang="de-DE" sz="2400" dirty="0" err="1">
+                <a:ea typeface="Roboto medium" pitchFamily="2" charset="0"/>
+              </a:rPr>
+              <a:t>Provide</a:t>
+            </a:r>
+            <a:r>
+              <a:rPr lang="de-DE" sz="2400" dirty="0">
+                <a:ea typeface="Roboto medium" pitchFamily="2" charset="0"/>
+              </a:rPr>
+              <a:t> limited </a:t>
+            </a:r>
+            <a:r>
+              <a:rPr lang="de-DE" sz="2400" dirty="0" err="1" smtClean="0">
+                <a:ea typeface="Roboto medium" pitchFamily="2" charset="0"/>
+              </a:rPr>
+              <a:t>access</a:t>
+            </a:r>
+            <a:endParaRPr lang="en-US" sz="2400" dirty="0" smtClean="0">
+              <a:ea typeface="Roboto medium" pitchFamily="2" charset="0"/>
+            </a:endParaRPr>
+          </a:p>
+          <a:p>
+            <a:pPr>
+              <a:spcBef>
+                <a:spcPts val="5400"/>
+              </a:spcBef>
+              <a:spcAft>
+                <a:spcPts val="2400"/>
+              </a:spcAft>
+            </a:pPr>
+            <a:r>
+              <a:rPr lang="en-US" sz="2400" dirty="0" smtClean="0">
+                <a:latin typeface="Roboto medium" pitchFamily="2" charset="0"/>
+                <a:ea typeface="Roboto medium" pitchFamily="2" charset="0"/>
+              </a:rPr>
+              <a:t>RDF2JSON transformer</a:t>
+            </a:r>
+            <a:endParaRPr lang="en-US" sz="2400" dirty="0" smtClean="0">
+              <a:ea typeface="Roboto medium" pitchFamily="2" charset="0"/>
+            </a:endParaRPr>
+          </a:p>
+          <a:p>
+            <a:pPr marL="342900" indent="-342900">
+              <a:buFont typeface="Arial" panose="020B0604020202020204" pitchFamily="34" charset="0"/>
+              <a:buChar char="•"/>
+            </a:pPr>
+            <a:r>
+              <a:rPr lang="en-US" sz="2400" dirty="0" smtClean="0">
+                <a:ea typeface="Roboto medium" pitchFamily="2" charset="0"/>
+              </a:rPr>
+              <a:t>Transformation </a:t>
+            </a:r>
+            <a:r>
+              <a:rPr lang="en-US" sz="2400" dirty="0">
+                <a:ea typeface="Roboto medium" pitchFamily="2" charset="0"/>
+              </a:rPr>
+              <a:t>of RDF, </a:t>
+            </a:r>
+            <a:r>
+              <a:rPr lang="en-US" sz="2400" dirty="0" smtClean="0">
+                <a:ea typeface="Roboto medium" pitchFamily="2" charset="0"/>
+              </a:rPr>
+              <a:t>JSON</a:t>
+            </a:r>
+          </a:p>
+          <a:p>
+            <a:pPr marL="342900" indent="-342900">
+              <a:buFont typeface="Arial" panose="020B0604020202020204" pitchFamily="34" charset="0"/>
+              <a:buChar char="•"/>
+            </a:pPr>
+            <a:r>
+              <a:rPr lang="en-US" sz="2400" dirty="0" smtClean="0">
+                <a:ea typeface="Roboto medium" pitchFamily="2" charset="0"/>
+              </a:rPr>
+              <a:t>Based on provided input</a:t>
+            </a:r>
+            <a:endParaRPr lang="en-US" sz="2400" dirty="0">
+              <a:ea typeface="Roboto medium" pitchFamily="2" charset="0"/>
+            </a:endParaRPr>
+          </a:p>
+        </p:txBody>
+      </p:sp>
+      <p:sp>
+        <p:nvSpPr>
+          <p:cNvPr id="15" name="Textfeld 14"/>
+          <p:cNvSpPr txBox="1"/>
+          <p:nvPr/>
+        </p:nvSpPr>
+        <p:spPr>
+          <a:xfrm>
+            <a:off x="6706955" y="1317724"/>
+            <a:ext cx="4571769" cy="3677930"/>
+          </a:xfrm>
+          <a:prstGeom prst="rect">
+            <a:avLst/>
+          </a:prstGeom>
+          <a:noFill/>
+        </p:spPr>
+        <p:txBody>
+          <a:bodyPr wrap="square" rtlCol="0">
+            <a:spAutoFit/>
+          </a:bodyPr>
+          <a:lstStyle/>
+          <a:p>
+            <a:pPr>
+              <a:spcAft>
+                <a:spcPts val="2400"/>
+              </a:spcAft>
+            </a:pPr>
+            <a:r>
+              <a:rPr lang="en-US" sz="2800" dirty="0" smtClean="0">
+                <a:latin typeface="Roboto medium" pitchFamily="2" charset="0"/>
+                <a:ea typeface="Roboto medium" pitchFamily="2" charset="0"/>
+              </a:rPr>
+              <a:t>Salesforce RDF extension</a:t>
+            </a:r>
+            <a:endParaRPr lang="en-US" dirty="0" smtClean="0">
+              <a:latin typeface="Roboto medium" pitchFamily="2" charset="0"/>
+              <a:ea typeface="Roboto medium" pitchFamily="2" charset="0"/>
+            </a:endParaRPr>
+          </a:p>
+          <a:p>
+            <a:pPr marL="342900" indent="-342900">
+              <a:buFont typeface="Arial" panose="020B0604020202020204" pitchFamily="34" charset="0"/>
+              <a:buChar char="•"/>
+            </a:pPr>
+            <a:r>
+              <a:rPr lang="de-DE" sz="2400" dirty="0">
+                <a:ea typeface="Roboto medium" pitchFamily="2" charset="0"/>
+              </a:rPr>
+              <a:t>REST Web Service</a:t>
+            </a:r>
+            <a:endParaRPr lang="en-US" sz="2400" dirty="0">
+              <a:ea typeface="Roboto medium" pitchFamily="2" charset="0"/>
+            </a:endParaRPr>
+          </a:p>
+          <a:p>
+            <a:pPr marL="342900" indent="-342900">
+              <a:buFont typeface="Arial" panose="020B0604020202020204" pitchFamily="34" charset="0"/>
+              <a:buChar char="•"/>
+            </a:pPr>
+            <a:r>
+              <a:rPr lang="en-US" sz="2400" dirty="0">
+                <a:ea typeface="Roboto medium" pitchFamily="2" charset="0"/>
+              </a:rPr>
+              <a:t>Integration of </a:t>
+            </a:r>
+            <a:r>
+              <a:rPr lang="en-US" sz="2400" dirty="0" smtClean="0">
+                <a:ea typeface="Roboto medium" pitchFamily="2" charset="0"/>
+              </a:rPr>
+              <a:t>components</a:t>
+            </a:r>
+          </a:p>
+          <a:p>
+            <a:pPr>
+              <a:spcBef>
+                <a:spcPts val="5400"/>
+              </a:spcBef>
+              <a:spcAft>
+                <a:spcPts val="2400"/>
+              </a:spcAft>
+            </a:pPr>
+            <a:r>
+              <a:rPr lang="en-US" sz="2400" dirty="0" smtClean="0">
+                <a:latin typeface="Roboto medium" pitchFamily="2" charset="0"/>
+                <a:ea typeface="Roboto medium" pitchFamily="2" charset="0"/>
+              </a:rPr>
+              <a:t>RDF Provider / Test client</a:t>
+            </a:r>
+            <a:endParaRPr lang="en-US" sz="2400" dirty="0" smtClean="0">
+              <a:ea typeface="Roboto medium" pitchFamily="2" charset="0"/>
+            </a:endParaRPr>
+          </a:p>
+          <a:p>
+            <a:pPr marL="342900" indent="-342900">
+              <a:buFont typeface="Arial" panose="020B0604020202020204" pitchFamily="34" charset="0"/>
+              <a:buChar char="•"/>
+            </a:pPr>
+            <a:r>
+              <a:rPr lang="en-US" sz="2400" dirty="0" smtClean="0">
+                <a:ea typeface="Roboto medium" pitchFamily="2" charset="0"/>
+              </a:rPr>
+              <a:t>Input for the extension</a:t>
+            </a:r>
+          </a:p>
+          <a:p>
+            <a:pPr marL="342900" indent="-342900">
+              <a:buFont typeface="Arial" panose="020B0604020202020204" pitchFamily="34" charset="0"/>
+              <a:buChar char="•"/>
+            </a:pPr>
+            <a:r>
+              <a:rPr lang="en-US" sz="2400" dirty="0" smtClean="0">
+                <a:ea typeface="Roboto medium" pitchFamily="2" charset="0"/>
+              </a:rPr>
+              <a:t>Testing purposes</a:t>
+            </a:r>
+            <a:endParaRPr lang="en-US" sz="2400" dirty="0">
+              <a:ea typeface="Roboto medium" pitchFamily="2" charset="0"/>
+            </a:endParaRPr>
+          </a:p>
+        </p:txBody>
+      </p:sp>
+    </p:spTree>
+    <p:extLst>
+      <p:ext uri="{BB962C8B-B14F-4D97-AF65-F5344CB8AC3E}">
+        <p14:creationId xmlns:p14="http://schemas.microsoft.com/office/powerpoint/2010/main" val="2205123534"/>
+      </p:ext>
+    </p:extLst>
+  </p:cSld>
+  <p:clrMapOvr>
+    <a:masterClrMapping/>
+  </p:clrMapOvr>
+  <p:timing>
+    <p:tnLst>
+      <p:par>
+        <p:cTn id="1" dur="indefinite" restart="never" nodeType="tmRoot"/>
+      </p:par>
+    </p:tnLst>
+  </p:timing>
+</p:sld>
+</file>
+
+<file path=ppt/slides/slide8.xml><?xml version="1.0" encoding="utf-8"?>
+<p:sld xmlns:a="http://schemas.openxmlformats.org/drawingml/2006/main" xmlns:r="http://schemas.openxmlformats.org/officeDocument/2006/relationships" xmlns:p="http://schemas.openxmlformats.org/presentationml/2006/main">
+  <p:cSld>
+    <p:spTree>
+      <p:nvGrpSpPr>
+        <p:cNvPr id="1" name=""/>
+        <p:cNvGrpSpPr/>
+        <p:nvPr/>
+      </p:nvGrpSpPr>
+      <p:grpSpPr>
+        <a:xfrm>
+          <a:off x="0" y="0"/>
+          <a:ext cx="0" cy="0"/>
+          <a:chOff x="0" y="0"/>
+          <a:chExt cx="0" cy="0"/>
+        </a:xfrm>
+      </p:grpSpPr>
+      <p:sp>
+        <p:nvSpPr>
+          <p:cNvPr id="2" name="Foliennummernplatzhalter 1"/>
+          <p:cNvSpPr>
+            <a:spLocks noGrp="1"/>
+          </p:cNvSpPr>
+          <p:nvPr>
+            <p:ph type="sldNum" sz="quarter" idx="12"/>
+          </p:nvPr>
+        </p:nvSpPr>
+        <p:spPr/>
+        <p:txBody>
+          <a:bodyPr/>
+          <a:lstStyle/>
+          <a:p>
+            <a:fld id="{FCEE2C88-6C8F-484D-AF69-578F576B1F44}" type="slidenum">
+              <a:rPr lang="en-US" smtClean="0"/>
+              <a:pPr/>
+              <a:t>8</a:t>
+            </a:fld>
+            <a:endParaRPr lang="en-US" dirty="0"/>
+          </a:p>
+        </p:txBody>
+      </p:sp>
+      <p:sp>
+        <p:nvSpPr>
+          <p:cNvPr id="3" name="Text Placeholder 33"/>
+          <p:cNvSpPr txBox="1">
+            <a:spLocks/>
+          </p:cNvSpPr>
+          <p:nvPr/>
+        </p:nvSpPr>
+        <p:spPr>
+          <a:xfrm>
+            <a:off x="3718030" y="3488189"/>
+            <a:ext cx="4755935" cy="499941"/>
+          </a:xfrm>
+          <a:prstGeom prst="rect">
+            <a:avLst/>
+          </a:prstGeom>
+        </p:spPr>
+        <p:txBody>
+          <a:bodyPr lIns="0" tIns="0" rIns="0" bIns="0"/>
+          <a:lstStyle>
+            <a:lvl1pPr marL="171450" indent="-171450" algn="l" defTabSz="685800" rtl="0" eaLnBrk="1" latinLnBrk="0" hangingPunct="1">
+              <a:lnSpc>
+                <a:spcPct val="90000"/>
+              </a:lnSpc>
+              <a:spcBef>
+                <a:spcPts val="750"/>
+              </a:spcBef>
+              <a:buFont typeface="Arial" panose="020B0604020202020204" pitchFamily="34" charset="0"/>
+              <a:buChar char="•"/>
+              <a:defRPr sz="2100" kern="1200">
+                <a:solidFill>
+                  <a:schemeClr val="tx1"/>
+                </a:solidFill>
+                <a:latin typeface="Neris Thin" panose="00000300000000000000" pitchFamily="50" charset="0"/>
+                <a:ea typeface="+mn-ea"/>
+                <a:cs typeface="+mn-cs"/>
+              </a:defRPr>
+            </a:lvl1pPr>
+            <a:lvl2pPr marL="514350" indent="-171450" algn="l" defTabSz="685800" rtl="0" eaLnBrk="1" latinLnBrk="0" hangingPunct="1">
+              <a:lnSpc>
+                <a:spcPct val="90000"/>
+              </a:lnSpc>
+              <a:spcBef>
+                <a:spcPts val="375"/>
+              </a:spcBef>
+              <a:buFont typeface="Arial" panose="020B0604020202020204" pitchFamily="34" charset="0"/>
+              <a:buChar char="•"/>
+              <a:defRPr sz="1800" kern="1200">
+                <a:solidFill>
+                  <a:schemeClr val="tx1"/>
+                </a:solidFill>
+                <a:latin typeface="Neris Thin" panose="00000300000000000000" pitchFamily="50" charset="0"/>
+                <a:ea typeface="+mn-ea"/>
+                <a:cs typeface="+mn-cs"/>
+              </a:defRPr>
+            </a:lvl2pPr>
+            <a:lvl3pPr marL="857250" indent="-171450" algn="l" defTabSz="685800" rtl="0" eaLnBrk="1" latinLnBrk="0" hangingPunct="1">
+              <a:lnSpc>
+                <a:spcPct val="90000"/>
+              </a:lnSpc>
+              <a:spcBef>
+                <a:spcPts val="375"/>
+              </a:spcBef>
+              <a:buFont typeface="Arial" panose="020B0604020202020204" pitchFamily="34" charset="0"/>
+              <a:buChar char="•"/>
+              <a:defRPr sz="1500" kern="1200">
+                <a:solidFill>
+                  <a:schemeClr val="tx1"/>
+                </a:solidFill>
+                <a:latin typeface="Neris Thin" panose="00000300000000000000" pitchFamily="50" charset="0"/>
+                <a:ea typeface="+mn-ea"/>
+                <a:cs typeface="+mn-cs"/>
+              </a:defRPr>
+            </a:lvl3pPr>
+            <a:lvl4pPr marL="1200150" indent="-171450" algn="l" defTabSz="685800" rtl="0" eaLnBrk="1" latinLnBrk="0" hangingPunct="1">
+              <a:lnSpc>
+                <a:spcPct val="90000"/>
+              </a:lnSpc>
+              <a:spcBef>
+                <a:spcPts val="375"/>
+              </a:spcBef>
+              <a:buFont typeface="Arial" panose="020B0604020202020204" pitchFamily="34" charset="0"/>
+              <a:buChar char="•"/>
+              <a:defRPr sz="1350" kern="1200">
+                <a:solidFill>
+                  <a:schemeClr val="tx1"/>
+                </a:solidFill>
+                <a:latin typeface="Neris Thin" panose="00000300000000000000" pitchFamily="50" charset="0"/>
+                <a:ea typeface="+mn-ea"/>
+                <a:cs typeface="+mn-cs"/>
+              </a:defRPr>
+            </a:lvl4pPr>
+            <a:lvl5pPr marL="1543050" indent="-171450" algn="l" defTabSz="685800" rtl="0" eaLnBrk="1" latinLnBrk="0" hangingPunct="1">
+              <a:lnSpc>
+                <a:spcPct val="90000"/>
+              </a:lnSpc>
+              <a:spcBef>
+                <a:spcPts val="375"/>
+              </a:spcBef>
+              <a:buFont typeface="Arial" panose="020B0604020202020204" pitchFamily="34" charset="0"/>
+              <a:buChar char="•"/>
+              <a:defRPr sz="1350" kern="1200">
+                <a:solidFill>
+                  <a:schemeClr val="tx1"/>
+                </a:solidFill>
+                <a:latin typeface="Neris Thin" panose="00000300000000000000" pitchFamily="50" charset="0"/>
+                <a:ea typeface="+mn-ea"/>
+                <a:cs typeface="+mn-cs"/>
+              </a:defRPr>
+            </a:lvl5pPr>
+            <a:lvl6pPr marL="1885950" indent="-171450" algn="l" defTabSz="685800" rtl="0" eaLnBrk="1" latinLnBrk="0" hangingPunct="1">
+              <a:lnSpc>
+                <a:spcPct val="90000"/>
+              </a:lnSpc>
+              <a:spcBef>
+                <a:spcPts val="375"/>
+              </a:spcBef>
+              <a:buFont typeface="Arial" panose="020B0604020202020204" pitchFamily="34" charset="0"/>
+              <a:buChar char="•"/>
+              <a:defRPr sz="1350" kern="1200">
+                <a:solidFill>
+                  <a:schemeClr val="tx1"/>
+                </a:solidFill>
+                <a:latin typeface="+mn-lt"/>
+                <a:ea typeface="+mn-ea"/>
+                <a:cs typeface="+mn-cs"/>
+              </a:defRPr>
+            </a:lvl6pPr>
+            <a:lvl7pPr marL="2228850" indent="-171450" algn="l" defTabSz="685800" rtl="0" eaLnBrk="1" latinLnBrk="0" hangingPunct="1">
+              <a:lnSpc>
+                <a:spcPct val="90000"/>
+              </a:lnSpc>
+              <a:spcBef>
+                <a:spcPts val="375"/>
+              </a:spcBef>
+              <a:buFont typeface="Arial" panose="020B0604020202020204" pitchFamily="34" charset="0"/>
+              <a:buChar char="•"/>
+              <a:defRPr sz="1350" kern="1200">
+                <a:solidFill>
+                  <a:schemeClr val="tx1"/>
+                </a:solidFill>
+                <a:latin typeface="+mn-lt"/>
+                <a:ea typeface="+mn-ea"/>
+                <a:cs typeface="+mn-cs"/>
+              </a:defRPr>
+            </a:lvl7pPr>
+            <a:lvl8pPr marL="2571750" indent="-171450" algn="l" defTabSz="685800" rtl="0" eaLnBrk="1" latinLnBrk="0" hangingPunct="1">
+              <a:lnSpc>
+                <a:spcPct val="90000"/>
+              </a:lnSpc>
+              <a:spcBef>
+                <a:spcPts val="375"/>
+              </a:spcBef>
+              <a:buFont typeface="Arial" panose="020B0604020202020204" pitchFamily="34" charset="0"/>
+              <a:buChar char="•"/>
+              <a:defRPr sz="1350" kern="1200">
+                <a:solidFill>
+                  <a:schemeClr val="tx1"/>
+                </a:solidFill>
+                <a:latin typeface="+mn-lt"/>
+                <a:ea typeface="+mn-ea"/>
+                <a:cs typeface="+mn-cs"/>
+              </a:defRPr>
+            </a:lvl8pPr>
+            <a:lvl9pPr marL="2914650" indent="-171450" algn="l" defTabSz="685800" rtl="0" eaLnBrk="1" latinLnBrk="0" hangingPunct="1">
+              <a:lnSpc>
+                <a:spcPct val="90000"/>
+              </a:lnSpc>
+              <a:spcBef>
+                <a:spcPts val="375"/>
+              </a:spcBef>
+              <a:buFont typeface="Arial" panose="020B0604020202020204" pitchFamily="34" charset="0"/>
+              <a:buChar char="•"/>
+              <a:defRPr sz="1350" kern="1200">
+                <a:solidFill>
+                  <a:schemeClr val="tx1"/>
+                </a:solidFill>
+                <a:latin typeface="+mn-lt"/>
+                <a:ea typeface="+mn-ea"/>
+                <a:cs typeface="+mn-cs"/>
+              </a:defRPr>
+            </a:lvl9pPr>
+          </a:lstStyle>
+          <a:p>
+            <a:pPr marL="0" indent="0" algn="ctr">
+              <a:buNone/>
+            </a:pPr>
+            <a:r>
+              <a:rPr lang="en-AU" sz="3200" dirty="0" smtClean="0">
+                <a:solidFill>
+                  <a:schemeClr val="tx2"/>
+                </a:solidFill>
+                <a:latin typeface="+mj-lt"/>
+              </a:rPr>
+              <a:t>Results</a:t>
+            </a:r>
+            <a:endParaRPr lang="en-AU" sz="3200" dirty="0" smtClean="0">
+              <a:solidFill>
+                <a:schemeClr val="tx2"/>
+              </a:solidFill>
+              <a:latin typeface="+mj-lt"/>
+            </a:endParaRPr>
+          </a:p>
+        </p:txBody>
+      </p:sp>
+      <p:sp>
+        <p:nvSpPr>
+          <p:cNvPr id="5" name="Oval 57"/>
+          <p:cNvSpPr>
+            <a:spLocks noChangeAspect="1"/>
+          </p:cNvSpPr>
+          <p:nvPr/>
+        </p:nvSpPr>
+        <p:spPr>
+          <a:xfrm>
+            <a:off x="5696696" y="2492117"/>
+            <a:ext cx="798602" cy="798600"/>
+          </a:xfrm>
+          <a:prstGeom prst="ellipse">
+            <a:avLst/>
+          </a:prstGeom>
+          <a:solidFill>
+            <a:schemeClr val="accent5"/>
+          </a:solidFill>
+          <a:ln>
+            <a:noFill/>
+          </a:ln>
+        </p:spPr>
+        <p:style>
+          <a:lnRef idx="2">
+            <a:schemeClr val="accent1">
+              <a:shade val="50000"/>
+            </a:schemeClr>
+          </a:lnRef>
+          <a:fillRef idx="1">
+            <a:schemeClr val="accent1"/>
+          </a:fillRef>
+          <a:effectRef idx="0">
+            <a:schemeClr val="accent1"/>
+          </a:effectRef>
+          <a:fontRef idx="minor">
+            <a:schemeClr val="lt1"/>
+          </a:fontRef>
+        </p:style>
+        <p:txBody>
+          <a:bodyPr rot="0" spcFirstLastPara="0" vertOverflow="overflow" horzOverflow="overflow" vert="horz" wrap="square" lIns="91440" tIns="45720" rIns="91440" bIns="45720" numCol="1" spcCol="0" rtlCol="0" fromWordArt="0" anchor="ctr" anchorCtr="0" forceAA="0" compatLnSpc="1">
+            <a:prstTxWarp prst="textNoShape">
+              <a:avLst/>
+            </a:prstTxWarp>
+            <a:noAutofit/>
+          </a:bodyPr>
+          <a:lstStyle/>
+          <a:p>
+            <a:pPr algn="ctr"/>
+            <a:r>
+              <a:rPr lang="en-US" sz="2000" dirty="0" smtClean="0">
+                <a:solidFill>
+                  <a:schemeClr val="bg1"/>
+                </a:solidFill>
+                <a:latin typeface="FontAwesome" pitchFamily="2" charset="0"/>
+              </a:rPr>
+              <a:t></a:t>
+            </a:r>
+            <a:endParaRPr lang="en-US" sz="2000" dirty="0">
+              <a:solidFill>
+                <a:schemeClr val="bg1"/>
+              </a:solidFill>
+              <a:latin typeface="FontAwesome" pitchFamily="2" charset="0"/>
+            </a:endParaRPr>
+          </a:p>
+        </p:txBody>
+      </p:sp>
+    </p:spTree>
+    <p:extLst>
+      <p:ext uri="{BB962C8B-B14F-4D97-AF65-F5344CB8AC3E}">
+        <p14:creationId xmlns:p14="http://schemas.microsoft.com/office/powerpoint/2010/main" val="3335418898"/>
+      </p:ext>
+    </p:extLst>
+  </p:cSld>
+  <p:clrMapOvr>
+    <a:masterClrMapping/>
+  </p:clrMapOvr>
+  <p:timing>
+    <p:tnLst>
+      <p:par>
+        <p:cTn id="1" dur="indefinite" restart="never" nodeType="tmRoot"/>
+      </p:par>
+    </p:tnLst>
+  </p:timing>
+</p:sld>
+</file>
+
+<file path=ppt/slides/slide9.xml><?xml version="1.0" encoding="utf-8"?>
+<p:sld xmlns:a="http://schemas.openxmlformats.org/drawingml/2006/main" xmlns:r="http://schemas.openxmlformats.org/officeDocument/2006/relationships" xmlns:p="http://schemas.openxmlformats.org/presentationml/2006/main">
+  <p:cSld>
+    <p:spTree>
+      <p:nvGrpSpPr>
+        <p:cNvPr id="1" name=""/>
+        <p:cNvGrpSpPr/>
+        <p:nvPr/>
+      </p:nvGrpSpPr>
+      <p:grpSpPr>
+        <a:xfrm>
+          <a:off x="0" y="0"/>
+          <a:ext cx="0" cy="0"/>
+          <a:chOff x="0" y="0"/>
+          <a:chExt cx="0" cy="0"/>
+        </a:xfrm>
+      </p:grpSpPr>
+      <p:sp>
+        <p:nvSpPr>
+          <p:cNvPr id="2" name="Foliennummernplatzhalter 1"/>
+          <p:cNvSpPr>
+            <a:spLocks noGrp="1"/>
+          </p:cNvSpPr>
+          <p:nvPr>
+            <p:ph type="sldNum" sz="quarter" idx="12"/>
+          </p:nvPr>
+        </p:nvSpPr>
+        <p:spPr/>
+        <p:txBody>
+          <a:bodyPr/>
+          <a:lstStyle/>
+          <a:p>
+            <a:fld id="{FCEE2C88-6C8F-484D-AF69-578F576B1F44}" type="slidenum">
+              <a:rPr lang="en-US" smtClean="0"/>
+              <a:pPr/>
+              <a:t>9</a:t>
+            </a:fld>
+            <a:endParaRPr lang="en-US" dirty="0"/>
+          </a:p>
+        </p:txBody>
+      </p:sp>
+      <p:grpSp>
+        <p:nvGrpSpPr>
+          <p:cNvPr id="6" name="Gruppieren 5"/>
+          <p:cNvGrpSpPr/>
+          <p:nvPr/>
+        </p:nvGrpSpPr>
+        <p:grpSpPr>
+          <a:xfrm>
+            <a:off x="3718030" y="2462654"/>
+            <a:ext cx="4755935" cy="1525476"/>
+            <a:chOff x="3718030" y="2199857"/>
+            <a:chExt cx="4755935" cy="1525476"/>
+          </a:xfrm>
+        </p:grpSpPr>
+        <p:sp>
+          <p:nvSpPr>
+            <p:cNvPr id="3" name="Text Placeholder 33"/>
+            <p:cNvSpPr txBox="1">
+              <a:spLocks/>
+            </p:cNvSpPr>
+            <p:nvPr/>
+          </p:nvSpPr>
+          <p:spPr>
+            <a:xfrm>
+              <a:off x="3718030" y="3225392"/>
+              <a:ext cx="4755935" cy="499941"/>
+            </a:xfrm>
+            <a:prstGeom prst="rect">
+              <a:avLst/>
+            </a:prstGeom>
+          </p:spPr>
+          <p:txBody>
+            <a:bodyPr lIns="0" tIns="0" rIns="0" bIns="0"/>
+            <a:lstStyle>
+              <a:lvl1pPr marL="171450" indent="-171450" algn="l" defTabSz="685800" rtl="0" eaLnBrk="1" latinLnBrk="0" hangingPunct="1">
+                <a:lnSpc>
+                  <a:spcPct val="90000"/>
+                </a:lnSpc>
+                <a:spcBef>
+                  <a:spcPts val="750"/>
+                </a:spcBef>
+                <a:buFont typeface="Arial" panose="020B0604020202020204" pitchFamily="34" charset="0"/>
+                <a:buChar char="•"/>
+                <a:defRPr sz="2100" kern="1200">
+                  <a:solidFill>
+                    <a:schemeClr val="tx1"/>
+                  </a:solidFill>
+                  <a:latin typeface="Neris Thin" panose="00000300000000000000" pitchFamily="50" charset="0"/>
+                  <a:ea typeface="+mn-ea"/>
+                  <a:cs typeface="+mn-cs"/>
+                </a:defRPr>
+              </a:lvl1pPr>
+              <a:lvl2pPr marL="514350" indent="-171450" algn="l" defTabSz="685800" rtl="0" eaLnBrk="1" latinLnBrk="0" hangingPunct="1">
+                <a:lnSpc>
+                  <a:spcPct val="90000"/>
+                </a:lnSpc>
+                <a:spcBef>
+                  <a:spcPts val="375"/>
+                </a:spcBef>
+                <a:buFont typeface="Arial" panose="020B0604020202020204" pitchFamily="34" charset="0"/>
+                <a:buChar char="•"/>
+                <a:defRPr sz="1800" kern="1200">
+                  <a:solidFill>
+                    <a:schemeClr val="tx1"/>
+                  </a:solidFill>
+                  <a:latin typeface="Neris Thin" panose="00000300000000000000" pitchFamily="50" charset="0"/>
+                  <a:ea typeface="+mn-ea"/>
+                  <a:cs typeface="+mn-cs"/>
+                </a:defRPr>
+              </a:lvl2pPr>
+              <a:lvl3pPr marL="857250" indent="-171450" algn="l" defTabSz="685800" rtl="0" eaLnBrk="1" latinLnBrk="0" hangingPunct="1">
+                <a:lnSpc>
+                  <a:spcPct val="90000"/>
+                </a:lnSpc>
+                <a:spcBef>
+                  <a:spcPts val="375"/>
+                </a:spcBef>
+                <a:buFont typeface="Arial" panose="020B0604020202020204" pitchFamily="34" charset="0"/>
+                <a:buChar char="•"/>
+                <a:defRPr sz="1500" kern="1200">
+                  <a:solidFill>
+                    <a:schemeClr val="tx1"/>
+                  </a:solidFill>
+                  <a:latin typeface="Neris Thin" panose="00000300000000000000" pitchFamily="50" charset="0"/>
+                  <a:ea typeface="+mn-ea"/>
+                  <a:cs typeface="+mn-cs"/>
+                </a:defRPr>
+              </a:lvl3pPr>
+              <a:lvl4pPr marL="1200150" indent="-171450" algn="l" defTabSz="685800" rtl="0" eaLnBrk="1" latinLnBrk="0" hangingPunct="1">
+                <a:lnSpc>
+                  <a:spcPct val="90000"/>
+                </a:lnSpc>
+                <a:spcBef>
+                  <a:spcPts val="375"/>
+                </a:spcBef>
+                <a:buFont typeface="Arial" panose="020B0604020202020204" pitchFamily="34" charset="0"/>
+                <a:buChar char="•"/>
+                <a:defRPr sz="1350" kern="1200">
+                  <a:solidFill>
+                    <a:schemeClr val="tx1"/>
+                  </a:solidFill>
+                  <a:latin typeface="Neris Thin" panose="00000300000000000000" pitchFamily="50" charset="0"/>
+                  <a:ea typeface="+mn-ea"/>
+                  <a:cs typeface="+mn-cs"/>
+                </a:defRPr>
+              </a:lvl4pPr>
+              <a:lvl5pPr marL="1543050" indent="-171450" algn="l" defTabSz="685800" rtl="0" eaLnBrk="1" latinLnBrk="0" hangingPunct="1">
+                <a:lnSpc>
+                  <a:spcPct val="90000"/>
+                </a:lnSpc>
+                <a:spcBef>
+                  <a:spcPts val="375"/>
+                </a:spcBef>
+                <a:buFont typeface="Arial" panose="020B0604020202020204" pitchFamily="34" charset="0"/>
+                <a:buChar char="•"/>
+                <a:defRPr sz="1350" kern="1200">
+                  <a:solidFill>
+                    <a:schemeClr val="tx1"/>
+                  </a:solidFill>
+                  <a:latin typeface="Neris Thin" panose="00000300000000000000" pitchFamily="50" charset="0"/>
+                  <a:ea typeface="+mn-ea"/>
+                  <a:cs typeface="+mn-cs"/>
+                </a:defRPr>
+              </a:lvl5pPr>
+              <a:lvl6pPr marL="1885950" indent="-171450" algn="l" defTabSz="685800" rtl="0" eaLnBrk="1" latinLnBrk="0" hangingPunct="1">
+                <a:lnSpc>
+                  <a:spcPct val="90000"/>
+                </a:lnSpc>
+                <a:spcBef>
+                  <a:spcPts val="375"/>
+                </a:spcBef>
+                <a:buFont typeface="Arial" panose="020B0604020202020204" pitchFamily="34" charset="0"/>
+                <a:buChar char="•"/>
+                <a:defRPr sz="1350" kern="1200">
+                  <a:solidFill>
+                    <a:schemeClr val="tx1"/>
+                  </a:solidFill>
+                  <a:latin typeface="+mn-lt"/>
+                  <a:ea typeface="+mn-ea"/>
+                  <a:cs typeface="+mn-cs"/>
+                </a:defRPr>
+              </a:lvl6pPr>
+              <a:lvl7pPr marL="2228850" indent="-171450" algn="l" defTabSz="685800" rtl="0" eaLnBrk="1" latinLnBrk="0" hangingPunct="1">
+                <a:lnSpc>
+                  <a:spcPct val="90000"/>
+                </a:lnSpc>
+                <a:spcBef>
+                  <a:spcPts val="375"/>
+                </a:spcBef>
+                <a:buFont typeface="Arial" panose="020B0604020202020204" pitchFamily="34" charset="0"/>
+                <a:buChar char="•"/>
+                <a:defRPr sz="1350" kern="1200">
+                  <a:solidFill>
+                    <a:schemeClr val="tx1"/>
+                  </a:solidFill>
+                  <a:latin typeface="+mn-lt"/>
+                  <a:ea typeface="+mn-ea"/>
+                  <a:cs typeface="+mn-cs"/>
+                </a:defRPr>
+              </a:lvl7pPr>
+              <a:lvl8pPr marL="2571750" indent="-171450" algn="l" defTabSz="685800" rtl="0" eaLnBrk="1" latinLnBrk="0" hangingPunct="1">
+                <a:lnSpc>
+                  <a:spcPct val="90000"/>
+                </a:lnSpc>
+                <a:spcBef>
+                  <a:spcPts val="375"/>
+                </a:spcBef>
+                <a:buFont typeface="Arial" panose="020B0604020202020204" pitchFamily="34" charset="0"/>
+                <a:buChar char="•"/>
+                <a:defRPr sz="1350" kern="1200">
+                  <a:solidFill>
+                    <a:schemeClr val="tx1"/>
+                  </a:solidFill>
+                  <a:latin typeface="+mn-lt"/>
+                  <a:ea typeface="+mn-ea"/>
+                  <a:cs typeface="+mn-cs"/>
+                </a:defRPr>
+              </a:lvl8pPr>
+              <a:lvl9pPr marL="2914650" indent="-171450" algn="l" defTabSz="685800" rtl="0" eaLnBrk="1" latinLnBrk="0" hangingPunct="1">
+                <a:lnSpc>
+                  <a:spcPct val="90000"/>
+                </a:lnSpc>
+                <a:spcBef>
+                  <a:spcPts val="375"/>
+                </a:spcBef>
+                <a:buFont typeface="Arial" panose="020B0604020202020204" pitchFamily="34" charset="0"/>
+                <a:buChar char="•"/>
+                <a:defRPr sz="1350" kern="1200">
+                  <a:solidFill>
+                    <a:schemeClr val="tx1"/>
+                  </a:solidFill>
+                  <a:latin typeface="+mn-lt"/>
+                  <a:ea typeface="+mn-ea"/>
+                  <a:cs typeface="+mn-cs"/>
+                </a:defRPr>
+              </a:lvl9pPr>
+            </a:lstStyle>
+            <a:p>
+              <a:pPr marL="0" indent="0" algn="ctr">
+                <a:buNone/>
+              </a:pPr>
+              <a:r>
+                <a:rPr lang="en-AU" sz="3200" dirty="0" smtClean="0">
+                  <a:solidFill>
+                    <a:schemeClr val="tx2"/>
+                  </a:solidFill>
+                  <a:latin typeface="+mj-lt"/>
+                </a:rPr>
+                <a:t>Future Work</a:t>
+              </a:r>
+            </a:p>
+          </p:txBody>
+        </p:sp>
+        <p:sp>
+          <p:nvSpPr>
+            <p:cNvPr id="5" name="Oval 53"/>
+            <p:cNvSpPr>
+              <a:spLocks noChangeAspect="1"/>
+            </p:cNvSpPr>
+            <p:nvPr/>
+          </p:nvSpPr>
+          <p:spPr>
+            <a:xfrm>
+              <a:off x="5674088" y="2199857"/>
+              <a:ext cx="843821" cy="843819"/>
+            </a:xfrm>
+            <a:prstGeom prst="ellipse">
+              <a:avLst/>
+            </a:prstGeom>
+            <a:solidFill>
+              <a:schemeClr val="accent6"/>
+            </a:solidFill>
+            <a:ln>
+              <a:noFill/>
+            </a:ln>
+          </p:spPr>
+          <p:style>
+            <a:lnRef idx="2">
+              <a:schemeClr val="accent1">
+                <a:shade val="50000"/>
+              </a:schemeClr>
+            </a:lnRef>
+            <a:fillRef idx="1">
+              <a:schemeClr val="accent1"/>
+            </a:fillRef>
+            <a:effectRef idx="0">
+              <a:schemeClr val="accent1"/>
+            </a:effectRef>
+            <a:fontRef idx="minor">
+              <a:schemeClr val="lt1"/>
+            </a:fontRef>
+          </p:style>
+          <p:txBody>
+            <a:bodyPr rot="0" spcFirstLastPara="0" vertOverflow="overflow" horzOverflow="overflow" vert="horz" wrap="square" lIns="91440" tIns="45720" rIns="91440" bIns="45720" numCol="1" spcCol="0" rtlCol="0" fromWordArt="0" anchor="ctr" anchorCtr="0" forceAA="0" compatLnSpc="1">
+              <a:prstTxWarp prst="textNoShape">
+                <a:avLst/>
+              </a:prstTxWarp>
+              <a:noAutofit/>
+            </a:bodyPr>
+            <a:lstStyle/>
+            <a:p>
+              <a:pPr algn="ctr"/>
+              <a:r>
+                <a:rPr lang="en-AU" sz="2000" dirty="0">
+                  <a:solidFill>
+                    <a:srgbClr val="FFFFFF"/>
+                  </a:solidFill>
+                  <a:latin typeface="FontAwesome" pitchFamily="2" charset="0"/>
+                </a:rPr>
+                <a:t></a:t>
+              </a:r>
+              <a:endParaRPr lang="en-AU" sz="2000" dirty="0">
+                <a:solidFill>
+                  <a:schemeClr val="bg1"/>
+                </a:solidFill>
+                <a:latin typeface="FontAwesome" pitchFamily="2" charset="0"/>
+              </a:endParaRPr>
+            </a:p>
+          </p:txBody>
+        </p:sp>
+      </p:grpSp>
+    </p:spTree>
+    <p:extLst>
+      <p:ext uri="{BB962C8B-B14F-4D97-AF65-F5344CB8AC3E}">
+        <p14:creationId xmlns:p14="http://schemas.microsoft.com/office/powerpoint/2010/main" val="1119260509"/>
       </p:ext>
     </p:extLst>
   </p:cSld>

</xml_diff>

<commit_message>
added introduction and requirements part
</commit_message>
<xml_diff>
--- a/GroupF/Presentations/Final Presentation.pptx
+++ b/GroupF/Presentations/Final Presentation.pptx
@@ -5,22 +5,26 @@
     <p:sldMasterId id="2147483648" r:id="rId1"/>
   </p:sldMasterIdLst>
   <p:notesMasterIdLst>
-    <p:notesMasterId r:id="rId12"/>
+    <p:notesMasterId r:id="rId16"/>
   </p:notesMasterIdLst>
   <p:handoutMasterIdLst>
-    <p:handoutMasterId r:id="rId13"/>
+    <p:handoutMasterId r:id="rId17"/>
   </p:handoutMasterIdLst>
   <p:sldIdLst>
     <p:sldId id="624" r:id="rId2"/>
     <p:sldId id="628" r:id="rId3"/>
     <p:sldId id="632" r:id="rId4"/>
-    <p:sldId id="633" r:id="rId5"/>
-    <p:sldId id="635" r:id="rId6"/>
-    <p:sldId id="629" r:id="rId7"/>
-    <p:sldId id="630" r:id="rId8"/>
-    <p:sldId id="636" r:id="rId9"/>
-    <p:sldId id="631" r:id="rId10"/>
-    <p:sldId id="634" r:id="rId11"/>
+    <p:sldId id="637" r:id="rId5"/>
+    <p:sldId id="638" r:id="rId6"/>
+    <p:sldId id="640" r:id="rId7"/>
+    <p:sldId id="633" r:id="rId8"/>
+    <p:sldId id="641" r:id="rId9"/>
+    <p:sldId id="635" r:id="rId10"/>
+    <p:sldId id="629" r:id="rId11"/>
+    <p:sldId id="630" r:id="rId12"/>
+    <p:sldId id="636" r:id="rId13"/>
+    <p:sldId id="631" r:id="rId14"/>
+    <p:sldId id="634" r:id="rId15"/>
   </p:sldIdLst>
   <p:sldSz cx="12192000" cy="6858000"/>
   <p:notesSz cx="6858000" cy="9144000"/>
@@ -141,6 +145,32 @@
 </p:presentation>
 </file>
 
+<file path=ppt/commentAuthors.xml><?xml version="1.0" encoding="utf-8"?>
+<p:cmAuthorLst xmlns:a="http://schemas.openxmlformats.org/drawingml/2006/main" xmlns:r="http://schemas.openxmlformats.org/officeDocument/2006/relationships" xmlns:p="http://schemas.openxmlformats.org/presentationml/2006/main">
+  <p:cmAuthor id="1" name="Alexander Melnyk" initials="AM" lastIdx="1" clrIdx="0">
+    <p:extLst>
+      <p:ext uri="{19B8F6BF-5375-455C-9EA6-DF929625EA0E}">
+        <p15:presenceInfo xmlns:p15="http://schemas.microsoft.com/office/powerpoint/2012/main" userId="a55871c5279bbde3" providerId="Windows Live"/>
+      </p:ext>
+    </p:extLst>
+  </p:cmAuthor>
+</p:cmAuthorLst>
+</file>
+
+<file path=ppt/comments/comment1.xml><?xml version="1.0" encoding="utf-8"?>
+<p:cmLst xmlns:a="http://schemas.openxmlformats.org/drawingml/2006/main" xmlns:r="http://schemas.openxmlformats.org/officeDocument/2006/relationships" xmlns:p="http://schemas.openxmlformats.org/presentationml/2006/main">
+  <p:cm authorId="1" dt="2015-10-14T22:16:14.757" idx="1">
+    <p:pos x="10" y="10"/>
+    <p:text/>
+    <p:extLst>
+      <p:ext uri="{C676402C-5697-4E1C-873F-D02D1690AC5C}">
+        <p15:threadingInfo xmlns:p15="http://schemas.microsoft.com/office/powerpoint/2012/main" timeZoneBias="-120"/>
+      </p:ext>
+    </p:extLst>
+  </p:cm>
+</p:cmLst>
+</file>
+
 <file path=ppt/handoutMasters/handoutMaster1.xml><?xml version="1.0" encoding="utf-8"?>
 <p:handoutMaster xmlns:a="http://schemas.openxmlformats.org/drawingml/2006/main" xmlns:r="http://schemas.openxmlformats.org/officeDocument/2006/relationships" xmlns:p="http://schemas.openxmlformats.org/presentationml/2006/main">
   <p:cSld>
@@ -223,7 +253,7 @@
           <a:p>
             <a:fld id="{2AD1A594-041B-449E-89BC-5A6CB1F5A9AB}" type="datetimeFigureOut">
               <a:rPr lang="id-ID" smtClean="0"/>
-              <a:t>13/10/2015</a:t>
+              <a:t>14/10/2015</a:t>
             </a:fld>
             <a:endParaRPr lang="id-ID"/>
           </a:p>
@@ -388,7 +418,7 @@
           <a:p>
             <a:fld id="{3E3CCC32-3486-46B1-A8B7-921064D8D59D}" type="datetimeFigureOut">
               <a:rPr lang="en-US" smtClean="0"/>
-              <a:t>10/13/2015</a:t>
+              <a:t>10/14/2015</a:t>
             </a:fld>
             <a:endParaRPr lang="en-US"/>
           </a:p>
@@ -654,6 +684,122 @@
     </a:lvl9pPr>
   </p:notesStyle>
 </p:notesMaster>
+</file>
+
+<file path=ppt/notesSlides/notesSlide1.xml><?xml version="1.0" encoding="utf-8"?>
+<p:notes xmlns:a="http://schemas.openxmlformats.org/drawingml/2006/main" xmlns:r="http://schemas.openxmlformats.org/officeDocument/2006/relationships" xmlns:p="http://schemas.openxmlformats.org/presentationml/2006/main">
+  <p:cSld>
+    <p:spTree>
+      <p:nvGrpSpPr>
+        <p:cNvPr id="1" name=""/>
+        <p:cNvGrpSpPr/>
+        <p:nvPr/>
+      </p:nvGrpSpPr>
+      <p:grpSpPr>
+        <a:xfrm>
+          <a:off x="0" y="0"/>
+          <a:ext cx="0" cy="0"/>
+          <a:chOff x="0" y="0"/>
+          <a:chExt cx="0" cy="0"/>
+        </a:xfrm>
+      </p:grpSpPr>
+      <p:sp>
+        <p:nvSpPr>
+          <p:cNvPr id="2" name="Folienbildplatzhalter 1"/>
+          <p:cNvSpPr>
+            <a:spLocks noGrp="1" noRot="1" noChangeAspect="1"/>
+          </p:cNvSpPr>
+          <p:nvPr>
+            <p:ph type="sldImg"/>
+          </p:nvPr>
+        </p:nvSpPr>
+        <p:spPr/>
+      </p:sp>
+      <p:sp>
+        <p:nvSpPr>
+          <p:cNvPr id="3" name="Notizenplatzhalter 2"/>
+          <p:cNvSpPr>
+            <a:spLocks noGrp="1"/>
+          </p:cNvSpPr>
+          <p:nvPr>
+            <p:ph type="body" idx="1"/>
+          </p:nvPr>
+        </p:nvSpPr>
+        <p:spPr/>
+        <p:txBody>
+          <a:bodyPr/>
+          <a:lstStyle/>
+          <a:p>
+            <a:r>
+              <a:rPr lang="en-US" dirty="0" smtClean="0"/>
+              <a:t>Import and Export</a:t>
+            </a:r>
+            <a:r>
+              <a:rPr lang="en-US" baseline="0" dirty="0" smtClean="0"/>
+              <a:t> Objects from Salesforce</a:t>
+            </a:r>
+          </a:p>
+          <a:p>
+            <a:r>
+              <a:rPr lang="en-US" baseline="0" dirty="0" smtClean="0"/>
+              <a:t>Transform RDF to Salesforce Objects and vice versa</a:t>
+            </a:r>
+          </a:p>
+          <a:p>
+            <a:r>
+              <a:rPr lang="en-US" baseline="0" dirty="0" smtClean="0"/>
+              <a:t>Interoperability: provide as a REST web service</a:t>
+            </a:r>
+          </a:p>
+          <a:p>
+            <a:r>
+              <a:rPr lang="en-US" baseline="0" dirty="0" smtClean="0"/>
+              <a:t>Usability: keep terms and workflows similar to salesforce</a:t>
+            </a:r>
+          </a:p>
+          <a:p>
+            <a:r>
+              <a:rPr lang="en-US" baseline="0" dirty="0" smtClean="0"/>
+              <a:t>Performance: API limitations, response time of requests &lt; 5 sec</a:t>
+            </a:r>
+            <a:endParaRPr lang="de-DE" dirty="0"/>
+          </a:p>
+        </p:txBody>
+      </p:sp>
+      <p:sp>
+        <p:nvSpPr>
+          <p:cNvPr id="4" name="Foliennummernplatzhalter 3"/>
+          <p:cNvSpPr>
+            <a:spLocks noGrp="1"/>
+          </p:cNvSpPr>
+          <p:nvPr>
+            <p:ph type="sldNum" sz="quarter" idx="10"/>
+          </p:nvPr>
+        </p:nvSpPr>
+        <p:spPr/>
+        <p:txBody>
+          <a:bodyPr/>
+          <a:lstStyle/>
+          <a:p>
+            <a:fld id="{74D1495A-DD81-44F4-9F54-1F39867BF2D9}" type="slidenum">
+              <a:rPr lang="en-US" smtClean="0"/>
+              <a:t>8</a:t>
+            </a:fld>
+            <a:endParaRPr lang="en-US"/>
+          </a:p>
+        </p:txBody>
+      </p:sp>
+    </p:spTree>
+    <p:extLst>
+      <p:ext uri="{BB962C8B-B14F-4D97-AF65-F5344CB8AC3E}">
+        <p14:creationId xmlns:p14="http://schemas.microsoft.com/office/powerpoint/2010/main" val="3427193664"/>
+      </p:ext>
+    </p:extLst>
+  </p:cSld>
+  <p:clrMapOvr>
+    <a:masterClrMapping/>
+  </p:clrMapOvr>
+</p:notes>
 </file>
 
 <file path=ppt/slideLayouts/slideLayout1.xml><?xml version="1.0" encoding="utf-8"?>
@@ -2365,23 +2511,8 @@
                 </a:solidFill>
                 <a:latin typeface="+mj-lt"/>
               </a:rPr>
-              <a:t>Salesforce RDF </a:t>
+              <a:t>Salesforce RDF extension</a:t>
             </a:r>
-            <a:r>
-              <a:rPr lang="en-AU" sz="3200" dirty="0" smtClean="0">
-                <a:solidFill>
-                  <a:schemeClr val="tx2"/>
-                </a:solidFill>
-                <a:latin typeface="+mj-lt"/>
-              </a:rPr>
-              <a:t>extension</a:t>
-            </a:r>
-            <a:endParaRPr lang="en-AU" sz="3200" dirty="0" smtClean="0">
-              <a:solidFill>
-                <a:schemeClr val="tx2"/>
-              </a:solidFill>
-              <a:latin typeface="+mj-lt"/>
-            </a:endParaRPr>
           </a:p>
         </p:txBody>
       </p:sp>
@@ -2578,22 +2709,13 @@
               <a:buNone/>
             </a:pPr>
             <a:r>
-              <a:rPr lang="en-US" sz="2000" dirty="0" err="1" smtClean="0">
+              <a:rPr lang="en-US" sz="2000" dirty="0" smtClean="0">
                 <a:solidFill>
                   <a:schemeClr val="tx2"/>
                 </a:solidFill>
                 <a:latin typeface="+mn-lt"/>
               </a:rPr>
-              <a:t>Niklas</a:t>
-            </a:r>
-            <a:r>
-              <a:rPr lang="en-US" sz="2000" dirty="0" smtClean="0">
-                <a:solidFill>
-                  <a:schemeClr val="tx2"/>
-                </a:solidFill>
-                <a:latin typeface="+mn-lt"/>
-              </a:rPr>
-              <a:t> Petersen</a:t>
+              <a:t>Niklas Petersen</a:t>
             </a:r>
           </a:p>
         </p:txBody>
@@ -2913,23 +3035,8 @@
                 </a:solidFill>
                 <a:latin typeface="+mn-lt"/>
               </a:rPr>
-              <a:t>Omar </a:t>
+              <a:t>Omar Rana</a:t>
             </a:r>
-            <a:r>
-              <a:rPr lang="en-US" sz="2000" dirty="0" err="1" smtClean="0">
-                <a:solidFill>
-                  <a:schemeClr val="tx2"/>
-                </a:solidFill>
-                <a:latin typeface="+mn-lt"/>
-              </a:rPr>
-              <a:t>Rana</a:t>
-            </a:r>
-            <a:endParaRPr lang="en-US" sz="2000" dirty="0" smtClean="0">
-              <a:solidFill>
-                <a:schemeClr val="tx2"/>
-              </a:solidFill>
-              <a:latin typeface="+mn-lt"/>
-            </a:endParaRPr>
           </a:p>
           <a:p>
             <a:pPr marL="0" indent="0">
@@ -3038,6 +3145,556 @@
       </p:grpSpPr>
       <p:sp>
         <p:nvSpPr>
+          <p:cNvPr id="3" name="Foliennummernplatzhalter 2"/>
+          <p:cNvSpPr>
+            <a:spLocks noGrp="1"/>
+          </p:cNvSpPr>
+          <p:nvPr>
+            <p:ph type="sldNum" sz="quarter" idx="12"/>
+          </p:nvPr>
+        </p:nvSpPr>
+        <p:spPr/>
+        <p:txBody>
+          <a:bodyPr/>
+          <a:lstStyle/>
+          <a:p>
+            <a:fld id="{FCEE2C88-6C8F-484D-AF69-578F576B1F44}" type="slidenum">
+              <a:rPr lang="en-US" smtClean="0"/>
+              <a:pPr/>
+              <a:t>10</a:t>
+            </a:fld>
+            <a:endParaRPr lang="en-US" dirty="0"/>
+          </a:p>
+        </p:txBody>
+      </p:sp>
+      <p:sp>
+        <p:nvSpPr>
+          <p:cNvPr id="4" name="Textplatzhalter 3"/>
+          <p:cNvSpPr>
+            <a:spLocks noGrp="1"/>
+          </p:cNvSpPr>
+          <p:nvPr>
+            <p:ph type="body" sz="quarter" idx="14"/>
+          </p:nvPr>
+        </p:nvSpPr>
+        <p:spPr/>
+        <p:txBody>
+          <a:bodyPr>
+            <a:noAutofit/>
+          </a:bodyPr>
+          <a:lstStyle/>
+          <a:p>
+            <a:r>
+              <a:rPr lang="de-DE" sz="3200" dirty="0" err="1" smtClean="0"/>
+              <a:t>Architecture</a:t>
+            </a:r>
+            <a:r>
+              <a:rPr lang="de-DE" sz="3200" dirty="0" smtClean="0"/>
+              <a:t> </a:t>
+            </a:r>
+            <a:r>
+              <a:rPr lang="de-DE" sz="3200" dirty="0" err="1" smtClean="0"/>
+              <a:t>overview</a:t>
+            </a:r>
+            <a:endParaRPr lang="en-US" sz="3200" dirty="0"/>
+          </a:p>
+        </p:txBody>
+      </p:sp>
+      <p:sp>
+        <p:nvSpPr>
+          <p:cNvPr id="5" name="Textplatzhalter 4"/>
+          <p:cNvSpPr>
+            <a:spLocks noGrp="1"/>
+          </p:cNvSpPr>
+          <p:nvPr>
+            <p:ph type="body" sz="quarter" idx="15"/>
+          </p:nvPr>
+        </p:nvSpPr>
+        <p:spPr/>
+        <p:txBody>
+          <a:bodyPr/>
+          <a:lstStyle/>
+          <a:p>
+            <a:endParaRPr lang="en-US"/>
+          </a:p>
+        </p:txBody>
+      </p:sp>
+      <p:pic>
+        <p:nvPicPr>
+          <p:cNvPr id="7" name="Grafik 6"/>
+          <p:cNvPicPr>
+            <a:picLocks noChangeAspect="1"/>
+          </p:cNvPicPr>
+          <p:nvPr/>
+        </p:nvPicPr>
+        <p:blipFill>
+          <a:blip r:embed="rId2">
+            <a:extLst>
+              <a:ext uri="{28A0092B-C50C-407E-A947-70E740481C1C}">
+                <a14:useLocalDpi xmlns:a14="http://schemas.microsoft.com/office/drawing/2010/main" val="0"/>
+              </a:ext>
+            </a:extLst>
+          </a:blip>
+          <a:stretch>
+            <a:fillRect/>
+          </a:stretch>
+        </p:blipFill>
+        <p:spPr>
+          <a:xfrm>
+            <a:off x="1663414" y="2091509"/>
+            <a:ext cx="9372327" cy="3099615"/>
+          </a:xfrm>
+          <a:prstGeom prst="rect">
+            <a:avLst/>
+          </a:prstGeom>
+          <a:effectLst>
+            <a:outerShdw blurRad="50800" dist="38100" dir="8100000" algn="tr" rotWithShape="0">
+              <a:prstClr val="black">
+                <a:alpha val="40000"/>
+              </a:prstClr>
+            </a:outerShdw>
+          </a:effectLst>
+        </p:spPr>
+      </p:pic>
+    </p:spTree>
+    <p:extLst>
+      <p:ext uri="{BB962C8B-B14F-4D97-AF65-F5344CB8AC3E}">
+        <p14:creationId xmlns:p14="http://schemas.microsoft.com/office/powerpoint/2010/main" val="1901838052"/>
+      </p:ext>
+    </p:extLst>
+  </p:cSld>
+  <p:clrMapOvr>
+    <a:masterClrMapping/>
+  </p:clrMapOvr>
+  <p:timing>
+    <p:tnLst>
+      <p:par>
+        <p:cTn id="1" dur="indefinite" restart="never" nodeType="tmRoot"/>
+      </p:par>
+    </p:tnLst>
+  </p:timing>
+</p:sld>
+</file>
+
+<file path=ppt/slides/slide11.xml><?xml version="1.0" encoding="utf-8"?>
+<p:sld xmlns:a="http://schemas.openxmlformats.org/drawingml/2006/main" xmlns:r="http://schemas.openxmlformats.org/officeDocument/2006/relationships" xmlns:p="http://schemas.openxmlformats.org/presentationml/2006/main">
+  <p:cSld>
+    <p:spTree>
+      <p:nvGrpSpPr>
+        <p:cNvPr id="1" name=""/>
+        <p:cNvGrpSpPr/>
+        <p:nvPr/>
+      </p:nvGrpSpPr>
+      <p:grpSpPr>
+        <a:xfrm>
+          <a:off x="0" y="0"/>
+          <a:ext cx="0" cy="0"/>
+          <a:chOff x="0" y="0"/>
+          <a:chExt cx="0" cy="0"/>
+        </a:xfrm>
+      </p:grpSpPr>
+      <p:sp>
+        <p:nvSpPr>
+          <p:cNvPr id="3" name="Foliennummernplatzhalter 2"/>
+          <p:cNvSpPr>
+            <a:spLocks noGrp="1"/>
+          </p:cNvSpPr>
+          <p:nvPr>
+            <p:ph type="sldNum" sz="quarter" idx="12"/>
+          </p:nvPr>
+        </p:nvSpPr>
+        <p:spPr/>
+        <p:txBody>
+          <a:bodyPr/>
+          <a:lstStyle/>
+          <a:p>
+            <a:fld id="{FCEE2C88-6C8F-484D-AF69-578F576B1F44}" type="slidenum">
+              <a:rPr lang="en-US" smtClean="0"/>
+              <a:pPr/>
+              <a:t>11</a:t>
+            </a:fld>
+            <a:endParaRPr lang="en-US" dirty="0"/>
+          </a:p>
+        </p:txBody>
+      </p:sp>
+      <p:sp>
+        <p:nvSpPr>
+          <p:cNvPr id="4" name="Textplatzhalter 3"/>
+          <p:cNvSpPr>
+            <a:spLocks noGrp="1"/>
+          </p:cNvSpPr>
+          <p:nvPr>
+            <p:ph type="body" sz="quarter" idx="14"/>
+          </p:nvPr>
+        </p:nvSpPr>
+        <p:spPr/>
+        <p:txBody>
+          <a:bodyPr>
+            <a:noAutofit/>
+          </a:bodyPr>
+          <a:lstStyle/>
+          <a:p>
+            <a:r>
+              <a:rPr lang="de-DE" sz="3200" dirty="0" smtClean="0"/>
+              <a:t>Components</a:t>
+            </a:r>
+            <a:endParaRPr lang="en-US" sz="3200" dirty="0"/>
+          </a:p>
+        </p:txBody>
+      </p:sp>
+      <p:sp>
+        <p:nvSpPr>
+          <p:cNvPr id="5" name="Textplatzhalter 4"/>
+          <p:cNvSpPr>
+            <a:spLocks noGrp="1"/>
+          </p:cNvSpPr>
+          <p:nvPr>
+            <p:ph type="body" sz="quarter" idx="15"/>
+          </p:nvPr>
+        </p:nvSpPr>
+        <p:spPr/>
+        <p:txBody>
+          <a:bodyPr/>
+          <a:lstStyle/>
+          <a:p>
+            <a:endParaRPr lang="en-US"/>
+          </a:p>
+        </p:txBody>
+      </p:sp>
+      <p:cxnSp>
+        <p:nvCxnSpPr>
+          <p:cNvPr id="8" name="Straight Connector 9"/>
+          <p:cNvCxnSpPr/>
+          <p:nvPr/>
+        </p:nvCxnSpPr>
+        <p:spPr>
+          <a:xfrm>
+            <a:off x="6096000" y="-118872"/>
+            <a:ext cx="0" cy="7086600"/>
+          </a:xfrm>
+          <a:prstGeom prst="line">
+            <a:avLst/>
+          </a:prstGeom>
+          <a:ln w="19050">
+            <a:solidFill>
+              <a:schemeClr val="bg2"/>
+            </a:solidFill>
+          </a:ln>
+        </p:spPr>
+        <p:style>
+          <a:lnRef idx="1">
+            <a:schemeClr val="accent1"/>
+          </a:lnRef>
+          <a:fillRef idx="0">
+            <a:schemeClr val="accent1"/>
+          </a:fillRef>
+          <a:effectRef idx="0">
+            <a:schemeClr val="accent1"/>
+          </a:effectRef>
+          <a:fontRef idx="minor">
+            <a:schemeClr val="tx1"/>
+          </a:fontRef>
+        </p:style>
+      </p:cxnSp>
+      <p:sp>
+        <p:nvSpPr>
+          <p:cNvPr id="2" name="Textfeld 1"/>
+          <p:cNvSpPr txBox="1"/>
+          <p:nvPr/>
+        </p:nvSpPr>
+        <p:spPr>
+          <a:xfrm>
+            <a:off x="913277" y="1585463"/>
+            <a:ext cx="4571769" cy="3677930"/>
+          </a:xfrm>
+          <a:prstGeom prst="rect">
+            <a:avLst/>
+          </a:prstGeom>
+          <a:noFill/>
+        </p:spPr>
+        <p:txBody>
+          <a:bodyPr wrap="square" rtlCol="0">
+            <a:spAutoFit/>
+          </a:bodyPr>
+          <a:lstStyle/>
+          <a:p>
+            <a:pPr>
+              <a:spcAft>
+                <a:spcPts val="2400"/>
+              </a:spcAft>
+            </a:pPr>
+            <a:r>
+              <a:rPr lang="en-US" sz="2800" dirty="0" smtClean="0">
+                <a:latin typeface="Roboto medium" pitchFamily="2" charset="0"/>
+                <a:ea typeface="Roboto medium" pitchFamily="2" charset="0"/>
+              </a:rPr>
+              <a:t>Salesforce REST API client</a:t>
+            </a:r>
+            <a:endParaRPr lang="en-US" dirty="0" smtClean="0">
+              <a:latin typeface="Roboto medium" pitchFamily="2" charset="0"/>
+              <a:ea typeface="Roboto medium" pitchFamily="2" charset="0"/>
+            </a:endParaRPr>
+          </a:p>
+          <a:p>
+            <a:pPr marL="342900" indent="-342900">
+              <a:buFont typeface="Arial" panose="020B0604020202020204" pitchFamily="34" charset="0"/>
+              <a:buChar char="•"/>
+            </a:pPr>
+            <a:r>
+              <a:rPr lang="en-US" sz="2400" dirty="0">
+                <a:ea typeface="Roboto medium" pitchFamily="2" charset="0"/>
+              </a:rPr>
+              <a:t>Core communication with API</a:t>
+            </a:r>
+          </a:p>
+          <a:p>
+            <a:pPr marL="342900" indent="-342900">
+              <a:buFont typeface="Arial" panose="020B0604020202020204" pitchFamily="34" charset="0"/>
+              <a:buChar char="•"/>
+            </a:pPr>
+            <a:r>
+              <a:rPr lang="de-DE" sz="2400" dirty="0" err="1">
+                <a:ea typeface="Roboto medium" pitchFamily="2" charset="0"/>
+              </a:rPr>
+              <a:t>Provide</a:t>
+            </a:r>
+            <a:r>
+              <a:rPr lang="de-DE" sz="2400" dirty="0">
+                <a:ea typeface="Roboto medium" pitchFamily="2" charset="0"/>
+              </a:rPr>
+              <a:t> limited </a:t>
+            </a:r>
+            <a:r>
+              <a:rPr lang="de-DE" sz="2400" dirty="0" err="1" smtClean="0">
+                <a:ea typeface="Roboto medium" pitchFamily="2" charset="0"/>
+              </a:rPr>
+              <a:t>access</a:t>
+            </a:r>
+            <a:endParaRPr lang="en-US" sz="2400" dirty="0" smtClean="0">
+              <a:ea typeface="Roboto medium" pitchFamily="2" charset="0"/>
+            </a:endParaRPr>
+          </a:p>
+          <a:p>
+            <a:pPr>
+              <a:spcBef>
+                <a:spcPts val="5400"/>
+              </a:spcBef>
+              <a:spcAft>
+                <a:spcPts val="2400"/>
+              </a:spcAft>
+            </a:pPr>
+            <a:r>
+              <a:rPr lang="en-US" sz="2400" dirty="0" smtClean="0">
+                <a:latin typeface="Roboto medium" pitchFamily="2" charset="0"/>
+                <a:ea typeface="Roboto medium" pitchFamily="2" charset="0"/>
+              </a:rPr>
+              <a:t>RDF2JSON transformer</a:t>
+            </a:r>
+            <a:endParaRPr lang="en-US" sz="2400" dirty="0" smtClean="0">
+              <a:ea typeface="Roboto medium" pitchFamily="2" charset="0"/>
+            </a:endParaRPr>
+          </a:p>
+          <a:p>
+            <a:pPr marL="342900" indent="-342900">
+              <a:buFont typeface="Arial" panose="020B0604020202020204" pitchFamily="34" charset="0"/>
+              <a:buChar char="•"/>
+            </a:pPr>
+            <a:r>
+              <a:rPr lang="en-US" sz="2400" dirty="0" smtClean="0">
+                <a:ea typeface="Roboto medium" pitchFamily="2" charset="0"/>
+              </a:rPr>
+              <a:t>Transformation </a:t>
+            </a:r>
+            <a:r>
+              <a:rPr lang="en-US" sz="2400" dirty="0">
+                <a:ea typeface="Roboto medium" pitchFamily="2" charset="0"/>
+              </a:rPr>
+              <a:t>of RDF, </a:t>
+            </a:r>
+            <a:r>
+              <a:rPr lang="en-US" sz="2400" dirty="0" smtClean="0">
+                <a:ea typeface="Roboto medium" pitchFamily="2" charset="0"/>
+              </a:rPr>
+              <a:t>JSON</a:t>
+            </a:r>
+          </a:p>
+          <a:p>
+            <a:pPr marL="342900" indent="-342900">
+              <a:buFont typeface="Arial" panose="020B0604020202020204" pitchFamily="34" charset="0"/>
+              <a:buChar char="•"/>
+            </a:pPr>
+            <a:r>
+              <a:rPr lang="en-US" sz="2400" dirty="0" smtClean="0">
+                <a:ea typeface="Roboto medium" pitchFamily="2" charset="0"/>
+              </a:rPr>
+              <a:t>Based on provided input</a:t>
+            </a:r>
+            <a:endParaRPr lang="en-US" sz="2400" dirty="0">
+              <a:ea typeface="Roboto medium" pitchFamily="2" charset="0"/>
+            </a:endParaRPr>
+          </a:p>
+        </p:txBody>
+      </p:sp>
+      <p:sp>
+        <p:nvSpPr>
+          <p:cNvPr id="15" name="Textfeld 14"/>
+          <p:cNvSpPr txBox="1"/>
+          <p:nvPr/>
+        </p:nvSpPr>
+        <p:spPr>
+          <a:xfrm>
+            <a:off x="6706955" y="1575656"/>
+            <a:ext cx="4571769" cy="3677930"/>
+          </a:xfrm>
+          <a:prstGeom prst="rect">
+            <a:avLst/>
+          </a:prstGeom>
+          <a:noFill/>
+        </p:spPr>
+        <p:txBody>
+          <a:bodyPr wrap="square" rtlCol="0">
+            <a:spAutoFit/>
+          </a:bodyPr>
+          <a:lstStyle/>
+          <a:p>
+            <a:pPr>
+              <a:spcAft>
+                <a:spcPts val="2400"/>
+              </a:spcAft>
+            </a:pPr>
+            <a:r>
+              <a:rPr lang="en-US" sz="2800" dirty="0" smtClean="0">
+                <a:latin typeface="Roboto medium" pitchFamily="2" charset="0"/>
+                <a:ea typeface="Roboto medium" pitchFamily="2" charset="0"/>
+              </a:rPr>
+              <a:t>Salesforce RDF extension</a:t>
+            </a:r>
+            <a:endParaRPr lang="en-US" dirty="0" smtClean="0">
+              <a:latin typeface="Roboto medium" pitchFamily="2" charset="0"/>
+              <a:ea typeface="Roboto medium" pitchFamily="2" charset="0"/>
+            </a:endParaRPr>
+          </a:p>
+          <a:p>
+            <a:pPr marL="342900" indent="-342900">
+              <a:buFont typeface="Arial" panose="020B0604020202020204" pitchFamily="34" charset="0"/>
+              <a:buChar char="•"/>
+            </a:pPr>
+            <a:r>
+              <a:rPr lang="de-DE" sz="2400" dirty="0">
+                <a:ea typeface="Roboto medium" pitchFamily="2" charset="0"/>
+              </a:rPr>
+              <a:t>REST Web Service</a:t>
+            </a:r>
+            <a:endParaRPr lang="en-US" sz="2400" dirty="0">
+              <a:ea typeface="Roboto medium" pitchFamily="2" charset="0"/>
+            </a:endParaRPr>
+          </a:p>
+          <a:p>
+            <a:pPr marL="342900" indent="-342900">
+              <a:buFont typeface="Arial" panose="020B0604020202020204" pitchFamily="34" charset="0"/>
+              <a:buChar char="•"/>
+            </a:pPr>
+            <a:r>
+              <a:rPr lang="en-US" sz="2400" dirty="0">
+                <a:ea typeface="Roboto medium" pitchFamily="2" charset="0"/>
+              </a:rPr>
+              <a:t>Integration of </a:t>
+            </a:r>
+            <a:r>
+              <a:rPr lang="en-US" sz="2400" dirty="0" smtClean="0">
+                <a:ea typeface="Roboto medium" pitchFamily="2" charset="0"/>
+              </a:rPr>
+              <a:t>components</a:t>
+            </a:r>
+          </a:p>
+          <a:p>
+            <a:pPr>
+              <a:spcBef>
+                <a:spcPts val="5400"/>
+              </a:spcBef>
+              <a:spcAft>
+                <a:spcPts val="2400"/>
+              </a:spcAft>
+            </a:pPr>
+            <a:r>
+              <a:rPr lang="en-US" sz="2400" dirty="0" smtClean="0">
+                <a:latin typeface="Roboto medium" pitchFamily="2" charset="0"/>
+                <a:ea typeface="Roboto medium" pitchFamily="2" charset="0"/>
+              </a:rPr>
+              <a:t>RDF Provider / Test client</a:t>
+            </a:r>
+            <a:endParaRPr lang="en-US" sz="2400" dirty="0" smtClean="0">
+              <a:ea typeface="Roboto medium" pitchFamily="2" charset="0"/>
+            </a:endParaRPr>
+          </a:p>
+          <a:p>
+            <a:pPr marL="342900" indent="-342900">
+              <a:buFont typeface="Arial" panose="020B0604020202020204" pitchFamily="34" charset="0"/>
+              <a:buChar char="•"/>
+            </a:pPr>
+            <a:r>
+              <a:rPr lang="en-US" sz="2400" dirty="0" smtClean="0">
+                <a:ea typeface="Roboto medium" pitchFamily="2" charset="0"/>
+              </a:rPr>
+              <a:t>Input for the extension</a:t>
+            </a:r>
+          </a:p>
+          <a:p>
+            <a:pPr marL="342900" indent="-342900">
+              <a:buFont typeface="Arial" panose="020B0604020202020204" pitchFamily="34" charset="0"/>
+              <a:buChar char="•"/>
+            </a:pPr>
+            <a:r>
+              <a:rPr lang="en-US" sz="2400" dirty="0" smtClean="0">
+                <a:ea typeface="Roboto medium" pitchFamily="2" charset="0"/>
+              </a:rPr>
+              <a:t>Testing purposes</a:t>
+            </a:r>
+            <a:endParaRPr lang="en-US" sz="2400" dirty="0">
+              <a:ea typeface="Roboto medium" pitchFamily="2" charset="0"/>
+            </a:endParaRPr>
+          </a:p>
+        </p:txBody>
+      </p:sp>
+    </p:spTree>
+    <p:extLst>
+      <p:ext uri="{BB962C8B-B14F-4D97-AF65-F5344CB8AC3E}">
+        <p14:creationId xmlns:p14="http://schemas.microsoft.com/office/powerpoint/2010/main" val="2205123534"/>
+      </p:ext>
+    </p:extLst>
+  </p:cSld>
+  <p:clrMapOvr>
+    <a:masterClrMapping/>
+  </p:clrMapOvr>
+  <p:timing>
+    <p:tnLst>
+      <p:par>
+        <p:cTn id="1" dur="indefinite" restart="never" nodeType="tmRoot"/>
+      </p:par>
+    </p:tnLst>
+  </p:timing>
+</p:sld>
+</file>
+
+<file path=ppt/slides/slide12.xml><?xml version="1.0" encoding="utf-8"?>
+<p:sld xmlns:a="http://schemas.openxmlformats.org/drawingml/2006/main" xmlns:r="http://schemas.openxmlformats.org/officeDocument/2006/relationships" xmlns:p="http://schemas.openxmlformats.org/presentationml/2006/main">
+  <p:cSld>
+    <p:spTree>
+      <p:nvGrpSpPr>
+        <p:cNvPr id="1" name=""/>
+        <p:cNvGrpSpPr/>
+        <p:nvPr/>
+      </p:nvGrpSpPr>
+      <p:grpSpPr>
+        <a:xfrm>
+          <a:off x="0" y="0"/>
+          <a:ext cx="0" cy="0"/>
+          <a:chOff x="0" y="0"/>
+          <a:chExt cx="0" cy="0"/>
+        </a:xfrm>
+      </p:grpSpPr>
+      <p:sp>
+        <p:nvSpPr>
           <p:cNvPr id="2" name="Foliennummernplatzhalter 1"/>
           <p:cNvSpPr>
             <a:spLocks noGrp="1"/>
@@ -3054,7 +3711,7 @@
             <a:fld id="{FCEE2C88-6C8F-484D-AF69-578F576B1F44}" type="slidenum">
               <a:rPr lang="en-US" smtClean="0"/>
               <a:pPr/>
-              <a:t>10</a:t>
+              <a:t>12</a:t>
             </a:fld>
             <a:endParaRPr lang="en-US" dirty="0"/>
           </a:p>
@@ -3254,14 +3911,677 @@
                 </a:solidFill>
                 <a:latin typeface="+mj-lt"/>
               </a:rPr>
+              <a:t>Results</a:t>
+            </a:r>
+          </a:p>
+        </p:txBody>
+      </p:sp>
+      <p:sp>
+        <p:nvSpPr>
+          <p:cNvPr id="5" name="Oval 57"/>
+          <p:cNvSpPr>
+            <a:spLocks noChangeAspect="1"/>
+          </p:cNvSpPr>
+          <p:nvPr/>
+        </p:nvSpPr>
+        <p:spPr>
+          <a:xfrm>
+            <a:off x="5696696" y="2492117"/>
+            <a:ext cx="798602" cy="798600"/>
+          </a:xfrm>
+          <a:prstGeom prst="ellipse">
+            <a:avLst/>
+          </a:prstGeom>
+          <a:solidFill>
+            <a:schemeClr val="accent5"/>
+          </a:solidFill>
+          <a:ln>
+            <a:noFill/>
+          </a:ln>
+        </p:spPr>
+        <p:style>
+          <a:lnRef idx="2">
+            <a:schemeClr val="accent1">
+              <a:shade val="50000"/>
+            </a:schemeClr>
+          </a:lnRef>
+          <a:fillRef idx="1">
+            <a:schemeClr val="accent1"/>
+          </a:fillRef>
+          <a:effectRef idx="0">
+            <a:schemeClr val="accent1"/>
+          </a:effectRef>
+          <a:fontRef idx="minor">
+            <a:schemeClr val="lt1"/>
+          </a:fontRef>
+        </p:style>
+        <p:txBody>
+          <a:bodyPr rot="0" spcFirstLastPara="0" vertOverflow="overflow" horzOverflow="overflow" vert="horz" wrap="square" lIns="91440" tIns="45720" rIns="91440" bIns="45720" numCol="1" spcCol="0" rtlCol="0" fromWordArt="0" anchor="ctr" anchorCtr="0" forceAA="0" compatLnSpc="1">
+            <a:prstTxWarp prst="textNoShape">
+              <a:avLst/>
+            </a:prstTxWarp>
+            <a:noAutofit/>
+          </a:bodyPr>
+          <a:lstStyle/>
+          <a:p>
+            <a:pPr algn="ctr"/>
+            <a:r>
+              <a:rPr lang="en-US" sz="2000" dirty="0" smtClean="0">
+                <a:solidFill>
+                  <a:schemeClr val="bg1"/>
+                </a:solidFill>
+                <a:latin typeface="FontAwesome" pitchFamily="2" charset="0"/>
+              </a:rPr>
+              <a:t></a:t>
+            </a:r>
+            <a:endParaRPr lang="en-US" sz="2000" dirty="0">
+              <a:solidFill>
+                <a:schemeClr val="bg1"/>
+              </a:solidFill>
+              <a:latin typeface="FontAwesome" pitchFamily="2" charset="0"/>
+            </a:endParaRPr>
+          </a:p>
+        </p:txBody>
+      </p:sp>
+    </p:spTree>
+    <p:extLst>
+      <p:ext uri="{BB962C8B-B14F-4D97-AF65-F5344CB8AC3E}">
+        <p14:creationId xmlns:p14="http://schemas.microsoft.com/office/powerpoint/2010/main" val="3335418898"/>
+      </p:ext>
+    </p:extLst>
+  </p:cSld>
+  <p:clrMapOvr>
+    <a:masterClrMapping/>
+  </p:clrMapOvr>
+  <p:timing>
+    <p:tnLst>
+      <p:par>
+        <p:cTn id="1" dur="indefinite" restart="never" nodeType="tmRoot"/>
+      </p:par>
+    </p:tnLst>
+  </p:timing>
+</p:sld>
+</file>
+
+<file path=ppt/slides/slide13.xml><?xml version="1.0" encoding="utf-8"?>
+<p:sld xmlns:a="http://schemas.openxmlformats.org/drawingml/2006/main" xmlns:r="http://schemas.openxmlformats.org/officeDocument/2006/relationships" xmlns:p="http://schemas.openxmlformats.org/presentationml/2006/main">
+  <p:cSld>
+    <p:spTree>
+      <p:nvGrpSpPr>
+        <p:cNvPr id="1" name=""/>
+        <p:cNvGrpSpPr/>
+        <p:nvPr/>
+      </p:nvGrpSpPr>
+      <p:grpSpPr>
+        <a:xfrm>
+          <a:off x="0" y="0"/>
+          <a:ext cx="0" cy="0"/>
+          <a:chOff x="0" y="0"/>
+          <a:chExt cx="0" cy="0"/>
+        </a:xfrm>
+      </p:grpSpPr>
+      <p:sp>
+        <p:nvSpPr>
+          <p:cNvPr id="2" name="Foliennummernplatzhalter 1"/>
+          <p:cNvSpPr>
+            <a:spLocks noGrp="1"/>
+          </p:cNvSpPr>
+          <p:nvPr>
+            <p:ph type="sldNum" sz="quarter" idx="12"/>
+          </p:nvPr>
+        </p:nvSpPr>
+        <p:spPr/>
+        <p:txBody>
+          <a:bodyPr/>
+          <a:lstStyle/>
+          <a:p>
+            <a:fld id="{FCEE2C88-6C8F-484D-AF69-578F576B1F44}" type="slidenum">
+              <a:rPr lang="en-US" smtClean="0"/>
+              <a:pPr/>
+              <a:t>13</a:t>
+            </a:fld>
+            <a:endParaRPr lang="en-US" dirty="0"/>
+          </a:p>
+        </p:txBody>
+      </p:sp>
+      <p:grpSp>
+        <p:nvGrpSpPr>
+          <p:cNvPr id="6" name="Gruppieren 5"/>
+          <p:cNvGrpSpPr/>
+          <p:nvPr/>
+        </p:nvGrpSpPr>
+        <p:grpSpPr>
+          <a:xfrm>
+            <a:off x="3718030" y="2462654"/>
+            <a:ext cx="4755935" cy="1525476"/>
+            <a:chOff x="3718030" y="2199857"/>
+            <a:chExt cx="4755935" cy="1525476"/>
+          </a:xfrm>
+        </p:grpSpPr>
+        <p:sp>
+          <p:nvSpPr>
+            <p:cNvPr id="3" name="Text Placeholder 33"/>
+            <p:cNvSpPr txBox="1">
+              <a:spLocks/>
+            </p:cNvSpPr>
+            <p:nvPr/>
+          </p:nvSpPr>
+          <p:spPr>
+            <a:xfrm>
+              <a:off x="3718030" y="3225392"/>
+              <a:ext cx="4755935" cy="499941"/>
+            </a:xfrm>
+            <a:prstGeom prst="rect">
+              <a:avLst/>
+            </a:prstGeom>
+          </p:spPr>
+          <p:txBody>
+            <a:bodyPr lIns="0" tIns="0" rIns="0" bIns="0"/>
+            <a:lstStyle>
+              <a:lvl1pPr marL="171450" indent="-171450" algn="l" defTabSz="685800" rtl="0" eaLnBrk="1" latinLnBrk="0" hangingPunct="1">
+                <a:lnSpc>
+                  <a:spcPct val="90000"/>
+                </a:lnSpc>
+                <a:spcBef>
+                  <a:spcPts val="750"/>
+                </a:spcBef>
+                <a:buFont typeface="Arial" panose="020B0604020202020204" pitchFamily="34" charset="0"/>
+                <a:buChar char="•"/>
+                <a:defRPr sz="2100" kern="1200">
+                  <a:solidFill>
+                    <a:schemeClr val="tx1"/>
+                  </a:solidFill>
+                  <a:latin typeface="Neris Thin" panose="00000300000000000000" pitchFamily="50" charset="0"/>
+                  <a:ea typeface="+mn-ea"/>
+                  <a:cs typeface="+mn-cs"/>
+                </a:defRPr>
+              </a:lvl1pPr>
+              <a:lvl2pPr marL="514350" indent="-171450" algn="l" defTabSz="685800" rtl="0" eaLnBrk="1" latinLnBrk="0" hangingPunct="1">
+                <a:lnSpc>
+                  <a:spcPct val="90000"/>
+                </a:lnSpc>
+                <a:spcBef>
+                  <a:spcPts val="375"/>
+                </a:spcBef>
+                <a:buFont typeface="Arial" panose="020B0604020202020204" pitchFamily="34" charset="0"/>
+                <a:buChar char="•"/>
+                <a:defRPr sz="1800" kern="1200">
+                  <a:solidFill>
+                    <a:schemeClr val="tx1"/>
+                  </a:solidFill>
+                  <a:latin typeface="Neris Thin" panose="00000300000000000000" pitchFamily="50" charset="0"/>
+                  <a:ea typeface="+mn-ea"/>
+                  <a:cs typeface="+mn-cs"/>
+                </a:defRPr>
+              </a:lvl2pPr>
+              <a:lvl3pPr marL="857250" indent="-171450" algn="l" defTabSz="685800" rtl="0" eaLnBrk="1" latinLnBrk="0" hangingPunct="1">
+                <a:lnSpc>
+                  <a:spcPct val="90000"/>
+                </a:lnSpc>
+                <a:spcBef>
+                  <a:spcPts val="375"/>
+                </a:spcBef>
+                <a:buFont typeface="Arial" panose="020B0604020202020204" pitchFamily="34" charset="0"/>
+                <a:buChar char="•"/>
+                <a:defRPr sz="1500" kern="1200">
+                  <a:solidFill>
+                    <a:schemeClr val="tx1"/>
+                  </a:solidFill>
+                  <a:latin typeface="Neris Thin" panose="00000300000000000000" pitchFamily="50" charset="0"/>
+                  <a:ea typeface="+mn-ea"/>
+                  <a:cs typeface="+mn-cs"/>
+                </a:defRPr>
+              </a:lvl3pPr>
+              <a:lvl4pPr marL="1200150" indent="-171450" algn="l" defTabSz="685800" rtl="0" eaLnBrk="1" latinLnBrk="0" hangingPunct="1">
+                <a:lnSpc>
+                  <a:spcPct val="90000"/>
+                </a:lnSpc>
+                <a:spcBef>
+                  <a:spcPts val="375"/>
+                </a:spcBef>
+                <a:buFont typeface="Arial" panose="020B0604020202020204" pitchFamily="34" charset="0"/>
+                <a:buChar char="•"/>
+                <a:defRPr sz="1350" kern="1200">
+                  <a:solidFill>
+                    <a:schemeClr val="tx1"/>
+                  </a:solidFill>
+                  <a:latin typeface="Neris Thin" panose="00000300000000000000" pitchFamily="50" charset="0"/>
+                  <a:ea typeface="+mn-ea"/>
+                  <a:cs typeface="+mn-cs"/>
+                </a:defRPr>
+              </a:lvl4pPr>
+              <a:lvl5pPr marL="1543050" indent="-171450" algn="l" defTabSz="685800" rtl="0" eaLnBrk="1" latinLnBrk="0" hangingPunct="1">
+                <a:lnSpc>
+                  <a:spcPct val="90000"/>
+                </a:lnSpc>
+                <a:spcBef>
+                  <a:spcPts val="375"/>
+                </a:spcBef>
+                <a:buFont typeface="Arial" panose="020B0604020202020204" pitchFamily="34" charset="0"/>
+                <a:buChar char="•"/>
+                <a:defRPr sz="1350" kern="1200">
+                  <a:solidFill>
+                    <a:schemeClr val="tx1"/>
+                  </a:solidFill>
+                  <a:latin typeface="Neris Thin" panose="00000300000000000000" pitchFamily="50" charset="0"/>
+                  <a:ea typeface="+mn-ea"/>
+                  <a:cs typeface="+mn-cs"/>
+                </a:defRPr>
+              </a:lvl5pPr>
+              <a:lvl6pPr marL="1885950" indent="-171450" algn="l" defTabSz="685800" rtl="0" eaLnBrk="1" latinLnBrk="0" hangingPunct="1">
+                <a:lnSpc>
+                  <a:spcPct val="90000"/>
+                </a:lnSpc>
+                <a:spcBef>
+                  <a:spcPts val="375"/>
+                </a:spcBef>
+                <a:buFont typeface="Arial" panose="020B0604020202020204" pitchFamily="34" charset="0"/>
+                <a:buChar char="•"/>
+                <a:defRPr sz="1350" kern="1200">
+                  <a:solidFill>
+                    <a:schemeClr val="tx1"/>
+                  </a:solidFill>
+                  <a:latin typeface="+mn-lt"/>
+                  <a:ea typeface="+mn-ea"/>
+                  <a:cs typeface="+mn-cs"/>
+                </a:defRPr>
+              </a:lvl6pPr>
+              <a:lvl7pPr marL="2228850" indent="-171450" algn="l" defTabSz="685800" rtl="0" eaLnBrk="1" latinLnBrk="0" hangingPunct="1">
+                <a:lnSpc>
+                  <a:spcPct val="90000"/>
+                </a:lnSpc>
+                <a:spcBef>
+                  <a:spcPts val="375"/>
+                </a:spcBef>
+                <a:buFont typeface="Arial" panose="020B0604020202020204" pitchFamily="34" charset="0"/>
+                <a:buChar char="•"/>
+                <a:defRPr sz="1350" kern="1200">
+                  <a:solidFill>
+                    <a:schemeClr val="tx1"/>
+                  </a:solidFill>
+                  <a:latin typeface="+mn-lt"/>
+                  <a:ea typeface="+mn-ea"/>
+                  <a:cs typeface="+mn-cs"/>
+                </a:defRPr>
+              </a:lvl7pPr>
+              <a:lvl8pPr marL="2571750" indent="-171450" algn="l" defTabSz="685800" rtl="0" eaLnBrk="1" latinLnBrk="0" hangingPunct="1">
+                <a:lnSpc>
+                  <a:spcPct val="90000"/>
+                </a:lnSpc>
+                <a:spcBef>
+                  <a:spcPts val="375"/>
+                </a:spcBef>
+                <a:buFont typeface="Arial" panose="020B0604020202020204" pitchFamily="34" charset="0"/>
+                <a:buChar char="•"/>
+                <a:defRPr sz="1350" kern="1200">
+                  <a:solidFill>
+                    <a:schemeClr val="tx1"/>
+                  </a:solidFill>
+                  <a:latin typeface="+mn-lt"/>
+                  <a:ea typeface="+mn-ea"/>
+                  <a:cs typeface="+mn-cs"/>
+                </a:defRPr>
+              </a:lvl8pPr>
+              <a:lvl9pPr marL="2914650" indent="-171450" algn="l" defTabSz="685800" rtl="0" eaLnBrk="1" latinLnBrk="0" hangingPunct="1">
+                <a:lnSpc>
+                  <a:spcPct val="90000"/>
+                </a:lnSpc>
+                <a:spcBef>
+                  <a:spcPts val="375"/>
+                </a:spcBef>
+                <a:buFont typeface="Arial" panose="020B0604020202020204" pitchFamily="34" charset="0"/>
+                <a:buChar char="•"/>
+                <a:defRPr sz="1350" kern="1200">
+                  <a:solidFill>
+                    <a:schemeClr val="tx1"/>
+                  </a:solidFill>
+                  <a:latin typeface="+mn-lt"/>
+                  <a:ea typeface="+mn-ea"/>
+                  <a:cs typeface="+mn-cs"/>
+                </a:defRPr>
+              </a:lvl9pPr>
+            </a:lstStyle>
+            <a:p>
+              <a:pPr marL="0" indent="0" algn="ctr">
+                <a:buNone/>
+              </a:pPr>
+              <a:r>
+                <a:rPr lang="en-AU" sz="3200" dirty="0" smtClean="0">
+                  <a:solidFill>
+                    <a:schemeClr val="tx2"/>
+                  </a:solidFill>
+                  <a:latin typeface="+mj-lt"/>
+                </a:rPr>
+                <a:t>Future Work</a:t>
+              </a:r>
+            </a:p>
+          </p:txBody>
+        </p:sp>
+        <p:sp>
+          <p:nvSpPr>
+            <p:cNvPr id="5" name="Oval 53"/>
+            <p:cNvSpPr>
+              <a:spLocks noChangeAspect="1"/>
+            </p:cNvSpPr>
+            <p:nvPr/>
+          </p:nvSpPr>
+          <p:spPr>
+            <a:xfrm>
+              <a:off x="5674088" y="2199857"/>
+              <a:ext cx="843821" cy="843819"/>
+            </a:xfrm>
+            <a:prstGeom prst="ellipse">
+              <a:avLst/>
+            </a:prstGeom>
+            <a:solidFill>
+              <a:schemeClr val="accent6"/>
+            </a:solidFill>
+            <a:ln>
+              <a:noFill/>
+            </a:ln>
+          </p:spPr>
+          <p:style>
+            <a:lnRef idx="2">
+              <a:schemeClr val="accent1">
+                <a:shade val="50000"/>
+              </a:schemeClr>
+            </a:lnRef>
+            <a:fillRef idx="1">
+              <a:schemeClr val="accent1"/>
+            </a:fillRef>
+            <a:effectRef idx="0">
+              <a:schemeClr val="accent1"/>
+            </a:effectRef>
+            <a:fontRef idx="minor">
+              <a:schemeClr val="lt1"/>
+            </a:fontRef>
+          </p:style>
+          <p:txBody>
+            <a:bodyPr rot="0" spcFirstLastPara="0" vertOverflow="overflow" horzOverflow="overflow" vert="horz" wrap="square" lIns="91440" tIns="45720" rIns="91440" bIns="45720" numCol="1" spcCol="0" rtlCol="0" fromWordArt="0" anchor="ctr" anchorCtr="0" forceAA="0" compatLnSpc="1">
+              <a:prstTxWarp prst="textNoShape">
+                <a:avLst/>
+              </a:prstTxWarp>
+              <a:noAutofit/>
+            </a:bodyPr>
+            <a:lstStyle/>
+            <a:p>
+              <a:pPr algn="ctr"/>
+              <a:r>
+                <a:rPr lang="en-AU" sz="2000" dirty="0">
+                  <a:solidFill>
+                    <a:srgbClr val="FFFFFF"/>
+                  </a:solidFill>
+                  <a:latin typeface="FontAwesome" pitchFamily="2" charset="0"/>
+                </a:rPr>
+                <a:t></a:t>
+              </a:r>
+              <a:endParaRPr lang="en-AU" sz="2000" dirty="0">
+                <a:solidFill>
+                  <a:schemeClr val="bg1"/>
+                </a:solidFill>
+                <a:latin typeface="FontAwesome" pitchFamily="2" charset="0"/>
+              </a:endParaRPr>
+            </a:p>
+          </p:txBody>
+        </p:sp>
+      </p:grpSp>
+    </p:spTree>
+    <p:extLst>
+      <p:ext uri="{BB962C8B-B14F-4D97-AF65-F5344CB8AC3E}">
+        <p14:creationId xmlns:p14="http://schemas.microsoft.com/office/powerpoint/2010/main" val="1119260509"/>
+      </p:ext>
+    </p:extLst>
+  </p:cSld>
+  <p:clrMapOvr>
+    <a:masterClrMapping/>
+  </p:clrMapOvr>
+  <p:timing>
+    <p:tnLst>
+      <p:par>
+        <p:cTn id="1" dur="indefinite" restart="never" nodeType="tmRoot"/>
+      </p:par>
+    </p:tnLst>
+  </p:timing>
+</p:sld>
+</file>
+
+<file path=ppt/slides/slide14.xml><?xml version="1.0" encoding="utf-8"?>
+<p:sld xmlns:a="http://schemas.openxmlformats.org/drawingml/2006/main" xmlns:r="http://schemas.openxmlformats.org/officeDocument/2006/relationships" xmlns:p="http://schemas.openxmlformats.org/presentationml/2006/main">
+  <p:cSld>
+    <p:spTree>
+      <p:nvGrpSpPr>
+        <p:cNvPr id="1" name=""/>
+        <p:cNvGrpSpPr/>
+        <p:nvPr/>
+      </p:nvGrpSpPr>
+      <p:grpSpPr>
+        <a:xfrm>
+          <a:off x="0" y="0"/>
+          <a:ext cx="0" cy="0"/>
+          <a:chOff x="0" y="0"/>
+          <a:chExt cx="0" cy="0"/>
+        </a:xfrm>
+      </p:grpSpPr>
+      <p:sp>
+        <p:nvSpPr>
+          <p:cNvPr id="2" name="Foliennummernplatzhalter 1"/>
+          <p:cNvSpPr>
+            <a:spLocks noGrp="1"/>
+          </p:cNvSpPr>
+          <p:nvPr>
+            <p:ph type="sldNum" sz="quarter" idx="12"/>
+          </p:nvPr>
+        </p:nvSpPr>
+        <p:spPr/>
+        <p:txBody>
+          <a:bodyPr/>
+          <a:lstStyle/>
+          <a:p>
+            <a:fld id="{FCEE2C88-6C8F-484D-AF69-578F576B1F44}" type="slidenum">
+              <a:rPr lang="en-US" smtClean="0"/>
+              <a:pPr/>
+              <a:t>14</a:t>
+            </a:fld>
+            <a:endParaRPr lang="en-US" dirty="0"/>
+          </a:p>
+        </p:txBody>
+      </p:sp>
+      <p:sp>
+        <p:nvSpPr>
+          <p:cNvPr id="3" name="Text Placeholder 33"/>
+          <p:cNvSpPr txBox="1">
+            <a:spLocks/>
+          </p:cNvSpPr>
+          <p:nvPr/>
+        </p:nvSpPr>
+        <p:spPr>
+          <a:xfrm>
+            <a:off x="3718030" y="3488189"/>
+            <a:ext cx="4755935" cy="499941"/>
+          </a:xfrm>
+          <a:prstGeom prst="rect">
+            <a:avLst/>
+          </a:prstGeom>
+        </p:spPr>
+        <p:txBody>
+          <a:bodyPr lIns="0" tIns="0" rIns="0" bIns="0"/>
+          <a:lstStyle>
+            <a:lvl1pPr marL="171450" indent="-171450" algn="l" defTabSz="685800" rtl="0" eaLnBrk="1" latinLnBrk="0" hangingPunct="1">
+              <a:lnSpc>
+                <a:spcPct val="90000"/>
+              </a:lnSpc>
+              <a:spcBef>
+                <a:spcPts val="750"/>
+              </a:spcBef>
+              <a:buFont typeface="Arial" panose="020B0604020202020204" pitchFamily="34" charset="0"/>
+              <a:buChar char="•"/>
+              <a:defRPr sz="2100" kern="1200">
+                <a:solidFill>
+                  <a:schemeClr val="tx1"/>
+                </a:solidFill>
+                <a:latin typeface="Neris Thin" panose="00000300000000000000" pitchFamily="50" charset="0"/>
+                <a:ea typeface="+mn-ea"/>
+                <a:cs typeface="+mn-cs"/>
+              </a:defRPr>
+            </a:lvl1pPr>
+            <a:lvl2pPr marL="514350" indent="-171450" algn="l" defTabSz="685800" rtl="0" eaLnBrk="1" latinLnBrk="0" hangingPunct="1">
+              <a:lnSpc>
+                <a:spcPct val="90000"/>
+              </a:lnSpc>
+              <a:spcBef>
+                <a:spcPts val="375"/>
+              </a:spcBef>
+              <a:buFont typeface="Arial" panose="020B0604020202020204" pitchFamily="34" charset="0"/>
+              <a:buChar char="•"/>
+              <a:defRPr sz="1800" kern="1200">
+                <a:solidFill>
+                  <a:schemeClr val="tx1"/>
+                </a:solidFill>
+                <a:latin typeface="Neris Thin" panose="00000300000000000000" pitchFamily="50" charset="0"/>
+                <a:ea typeface="+mn-ea"/>
+                <a:cs typeface="+mn-cs"/>
+              </a:defRPr>
+            </a:lvl2pPr>
+            <a:lvl3pPr marL="857250" indent="-171450" algn="l" defTabSz="685800" rtl="0" eaLnBrk="1" latinLnBrk="0" hangingPunct="1">
+              <a:lnSpc>
+                <a:spcPct val="90000"/>
+              </a:lnSpc>
+              <a:spcBef>
+                <a:spcPts val="375"/>
+              </a:spcBef>
+              <a:buFont typeface="Arial" panose="020B0604020202020204" pitchFamily="34" charset="0"/>
+              <a:buChar char="•"/>
+              <a:defRPr sz="1500" kern="1200">
+                <a:solidFill>
+                  <a:schemeClr val="tx1"/>
+                </a:solidFill>
+                <a:latin typeface="Neris Thin" panose="00000300000000000000" pitchFamily="50" charset="0"/>
+                <a:ea typeface="+mn-ea"/>
+                <a:cs typeface="+mn-cs"/>
+              </a:defRPr>
+            </a:lvl3pPr>
+            <a:lvl4pPr marL="1200150" indent="-171450" algn="l" defTabSz="685800" rtl="0" eaLnBrk="1" latinLnBrk="0" hangingPunct="1">
+              <a:lnSpc>
+                <a:spcPct val="90000"/>
+              </a:lnSpc>
+              <a:spcBef>
+                <a:spcPts val="375"/>
+              </a:spcBef>
+              <a:buFont typeface="Arial" panose="020B0604020202020204" pitchFamily="34" charset="0"/>
+              <a:buChar char="•"/>
+              <a:defRPr sz="1350" kern="1200">
+                <a:solidFill>
+                  <a:schemeClr val="tx1"/>
+                </a:solidFill>
+                <a:latin typeface="Neris Thin" panose="00000300000000000000" pitchFamily="50" charset="0"/>
+                <a:ea typeface="+mn-ea"/>
+                <a:cs typeface="+mn-cs"/>
+              </a:defRPr>
+            </a:lvl4pPr>
+            <a:lvl5pPr marL="1543050" indent="-171450" algn="l" defTabSz="685800" rtl="0" eaLnBrk="1" latinLnBrk="0" hangingPunct="1">
+              <a:lnSpc>
+                <a:spcPct val="90000"/>
+              </a:lnSpc>
+              <a:spcBef>
+                <a:spcPts val="375"/>
+              </a:spcBef>
+              <a:buFont typeface="Arial" panose="020B0604020202020204" pitchFamily="34" charset="0"/>
+              <a:buChar char="•"/>
+              <a:defRPr sz="1350" kern="1200">
+                <a:solidFill>
+                  <a:schemeClr val="tx1"/>
+                </a:solidFill>
+                <a:latin typeface="Neris Thin" panose="00000300000000000000" pitchFamily="50" charset="0"/>
+                <a:ea typeface="+mn-ea"/>
+                <a:cs typeface="+mn-cs"/>
+              </a:defRPr>
+            </a:lvl5pPr>
+            <a:lvl6pPr marL="1885950" indent="-171450" algn="l" defTabSz="685800" rtl="0" eaLnBrk="1" latinLnBrk="0" hangingPunct="1">
+              <a:lnSpc>
+                <a:spcPct val="90000"/>
+              </a:lnSpc>
+              <a:spcBef>
+                <a:spcPts val="375"/>
+              </a:spcBef>
+              <a:buFont typeface="Arial" panose="020B0604020202020204" pitchFamily="34" charset="0"/>
+              <a:buChar char="•"/>
+              <a:defRPr sz="1350" kern="1200">
+                <a:solidFill>
+                  <a:schemeClr val="tx1"/>
+                </a:solidFill>
+                <a:latin typeface="+mn-lt"/>
+                <a:ea typeface="+mn-ea"/>
+                <a:cs typeface="+mn-cs"/>
+              </a:defRPr>
+            </a:lvl6pPr>
+            <a:lvl7pPr marL="2228850" indent="-171450" algn="l" defTabSz="685800" rtl="0" eaLnBrk="1" latinLnBrk="0" hangingPunct="1">
+              <a:lnSpc>
+                <a:spcPct val="90000"/>
+              </a:lnSpc>
+              <a:spcBef>
+                <a:spcPts val="375"/>
+              </a:spcBef>
+              <a:buFont typeface="Arial" panose="020B0604020202020204" pitchFamily="34" charset="0"/>
+              <a:buChar char="•"/>
+              <a:defRPr sz="1350" kern="1200">
+                <a:solidFill>
+                  <a:schemeClr val="tx1"/>
+                </a:solidFill>
+                <a:latin typeface="+mn-lt"/>
+                <a:ea typeface="+mn-ea"/>
+                <a:cs typeface="+mn-cs"/>
+              </a:defRPr>
+            </a:lvl7pPr>
+            <a:lvl8pPr marL="2571750" indent="-171450" algn="l" defTabSz="685800" rtl="0" eaLnBrk="1" latinLnBrk="0" hangingPunct="1">
+              <a:lnSpc>
+                <a:spcPct val="90000"/>
+              </a:lnSpc>
+              <a:spcBef>
+                <a:spcPts val="375"/>
+              </a:spcBef>
+              <a:buFont typeface="Arial" panose="020B0604020202020204" pitchFamily="34" charset="0"/>
+              <a:buChar char="•"/>
+              <a:defRPr sz="1350" kern="1200">
+                <a:solidFill>
+                  <a:schemeClr val="tx1"/>
+                </a:solidFill>
+                <a:latin typeface="+mn-lt"/>
+                <a:ea typeface="+mn-ea"/>
+                <a:cs typeface="+mn-cs"/>
+              </a:defRPr>
+            </a:lvl8pPr>
+            <a:lvl9pPr marL="2914650" indent="-171450" algn="l" defTabSz="685800" rtl="0" eaLnBrk="1" latinLnBrk="0" hangingPunct="1">
+              <a:lnSpc>
+                <a:spcPct val="90000"/>
+              </a:lnSpc>
+              <a:spcBef>
+                <a:spcPts val="375"/>
+              </a:spcBef>
+              <a:buFont typeface="Arial" panose="020B0604020202020204" pitchFamily="34" charset="0"/>
+              <a:buChar char="•"/>
+              <a:defRPr sz="1350" kern="1200">
+                <a:solidFill>
+                  <a:schemeClr val="tx1"/>
+                </a:solidFill>
+                <a:latin typeface="+mn-lt"/>
+                <a:ea typeface="+mn-ea"/>
+                <a:cs typeface="+mn-cs"/>
+              </a:defRPr>
+            </a:lvl9pPr>
+          </a:lstStyle>
+          <a:p>
+            <a:pPr marL="0" indent="0" algn="ctr">
+              <a:buNone/>
+            </a:pPr>
+            <a:r>
+              <a:rPr lang="en-AU" sz="3200" dirty="0" smtClean="0">
+                <a:solidFill>
+                  <a:schemeClr val="tx2"/>
+                </a:solidFill>
+                <a:latin typeface="+mj-lt"/>
+              </a:rPr>
               <a:t>Demo</a:t>
             </a:r>
-            <a:endParaRPr lang="en-AU" sz="3200" dirty="0" smtClean="0">
-              <a:solidFill>
-                <a:schemeClr val="tx2"/>
-              </a:solidFill>
-              <a:latin typeface="+mj-lt"/>
-            </a:endParaRPr>
           </a:p>
         </p:txBody>
       </p:sp>
@@ -4083,12 +5403,6 @@
                 </a:rPr>
                 <a:t></a:t>
               </a:r>
-              <a:endParaRPr lang="en-US" sz="2000" dirty="0">
-                <a:solidFill>
-                  <a:schemeClr val="bg1"/>
-                </a:solidFill>
-                <a:latin typeface="FontAwesome" pitchFamily="2" charset="0"/>
-              </a:endParaRPr>
             </a:p>
           </p:txBody>
         </p:sp>
@@ -5255,12 +6569,6 @@
               </a:rPr>
               <a:t>Introduction</a:t>
             </a:r>
-            <a:endParaRPr lang="en-AU" sz="3200" dirty="0" smtClean="0">
-              <a:solidFill>
-                <a:schemeClr val="tx2"/>
-              </a:solidFill>
-              <a:latin typeface="+mj-lt"/>
-            </a:endParaRPr>
           </a:p>
         </p:txBody>
       </p:sp>
@@ -5369,6 +6677,1057 @@
       </p:grpSpPr>
       <p:sp>
         <p:nvSpPr>
+          <p:cNvPr id="3" name="Foliennummernplatzhalter 2"/>
+          <p:cNvSpPr>
+            <a:spLocks noGrp="1"/>
+          </p:cNvSpPr>
+          <p:nvPr>
+            <p:ph type="sldNum" sz="quarter" idx="12"/>
+          </p:nvPr>
+        </p:nvSpPr>
+        <p:spPr/>
+        <p:txBody>
+          <a:bodyPr/>
+          <a:lstStyle/>
+          <a:p>
+            <a:fld id="{FCEE2C88-6C8F-484D-AF69-578F576B1F44}" type="slidenum">
+              <a:rPr lang="en-US" smtClean="0"/>
+              <a:pPr/>
+              <a:t>4</a:t>
+            </a:fld>
+            <a:endParaRPr lang="en-US" dirty="0"/>
+          </a:p>
+        </p:txBody>
+      </p:sp>
+      <p:sp>
+        <p:nvSpPr>
+          <p:cNvPr id="4" name="Textplatzhalter 3"/>
+          <p:cNvSpPr>
+            <a:spLocks noGrp="1"/>
+          </p:cNvSpPr>
+          <p:nvPr>
+            <p:ph type="body" sz="quarter" idx="14"/>
+          </p:nvPr>
+        </p:nvSpPr>
+        <p:spPr/>
+        <p:txBody>
+          <a:bodyPr>
+            <a:noAutofit/>
+          </a:bodyPr>
+          <a:lstStyle/>
+          <a:p>
+            <a:r>
+              <a:rPr lang="en-US" sz="3200" dirty="0" smtClean="0"/>
+              <a:t>Introduction</a:t>
+            </a:r>
+            <a:endParaRPr lang="en-US" sz="3200" dirty="0"/>
+          </a:p>
+        </p:txBody>
+      </p:sp>
+      <p:sp>
+        <p:nvSpPr>
+          <p:cNvPr id="5" name="Textplatzhalter 4"/>
+          <p:cNvSpPr>
+            <a:spLocks noGrp="1"/>
+          </p:cNvSpPr>
+          <p:nvPr>
+            <p:ph type="body" sz="quarter" idx="15"/>
+          </p:nvPr>
+        </p:nvSpPr>
+        <p:spPr/>
+        <p:txBody>
+          <a:bodyPr/>
+          <a:lstStyle/>
+          <a:p>
+            <a:endParaRPr lang="en-US"/>
+          </a:p>
+        </p:txBody>
+      </p:sp>
+      <p:sp>
+        <p:nvSpPr>
+          <p:cNvPr id="6" name="Textfeld 5"/>
+          <p:cNvSpPr txBox="1"/>
+          <p:nvPr/>
+        </p:nvSpPr>
+        <p:spPr>
+          <a:xfrm>
+            <a:off x="791054" y="1716268"/>
+            <a:ext cx="5151773" cy="3416320"/>
+          </a:xfrm>
+          <a:prstGeom prst="rect">
+            <a:avLst/>
+          </a:prstGeom>
+          <a:noFill/>
+        </p:spPr>
+        <p:txBody>
+          <a:bodyPr wrap="square" rtlCol="0">
+            <a:spAutoFit/>
+          </a:bodyPr>
+          <a:lstStyle/>
+          <a:p>
+            <a:pPr algn="ctr"/>
+            <a:r>
+              <a:rPr lang="en-US" sz="2800" dirty="0" smtClean="0">
+                <a:latin typeface="Roboto medium" pitchFamily="2" charset="0"/>
+                <a:ea typeface="Roboto medium" pitchFamily="2" charset="0"/>
+              </a:rPr>
+              <a:t>LUCID Project </a:t>
+            </a:r>
+          </a:p>
+          <a:p>
+            <a:pPr algn="ctr">
+              <a:spcAft>
+                <a:spcPts val="2400"/>
+              </a:spcAft>
+            </a:pPr>
+            <a:r>
+              <a:rPr lang="en-US" sz="2800" dirty="0" smtClean="0">
+                <a:latin typeface="Roboto medium" pitchFamily="2" charset="0"/>
+                <a:ea typeface="Roboto medium" pitchFamily="2" charset="0"/>
+              </a:rPr>
+              <a:t> </a:t>
+            </a:r>
+            <a:r>
+              <a:rPr lang="en-US" sz="2800" dirty="0" smtClean="0">
+                <a:solidFill>
+                  <a:srgbClr val="00B050"/>
+                </a:solidFill>
+                <a:latin typeface="Roboto medium" pitchFamily="2" charset="0"/>
+                <a:ea typeface="Roboto medium" pitchFamily="2" charset="0"/>
+              </a:rPr>
+              <a:t>L</a:t>
+            </a:r>
+            <a:r>
+              <a:rPr lang="en-US" sz="2800" dirty="0" smtClean="0">
+                <a:latin typeface="Roboto medium" pitchFamily="2" charset="0"/>
+                <a:ea typeface="Roboto medium" pitchFamily="2" charset="0"/>
+              </a:rPr>
+              <a:t>inked </a:t>
+            </a:r>
+            <a:r>
+              <a:rPr lang="en-US" sz="2800" dirty="0" err="1" smtClean="0">
+                <a:latin typeface="Roboto medium" pitchFamily="2" charset="0"/>
+                <a:ea typeface="Roboto medium" pitchFamily="2" charset="0"/>
+              </a:rPr>
+              <a:t>val</a:t>
+            </a:r>
+            <a:r>
+              <a:rPr lang="en-US" sz="2800" dirty="0" err="1" smtClean="0">
+                <a:solidFill>
+                  <a:srgbClr val="CC6600"/>
+                </a:solidFill>
+                <a:latin typeface="Roboto medium" pitchFamily="2" charset="0"/>
+                <a:ea typeface="Roboto medium" pitchFamily="2" charset="0"/>
+              </a:rPr>
+              <a:t>U</a:t>
+            </a:r>
+            <a:r>
+              <a:rPr lang="en-US" sz="2800" dirty="0" err="1" smtClean="0">
+                <a:latin typeface="Roboto medium" pitchFamily="2" charset="0"/>
+                <a:ea typeface="Roboto medium" pitchFamily="2" charset="0"/>
+              </a:rPr>
+              <a:t>e</a:t>
+            </a:r>
+            <a:r>
+              <a:rPr lang="en-US" sz="2800" dirty="0" smtClean="0">
+                <a:latin typeface="Roboto medium" pitchFamily="2" charset="0"/>
+                <a:ea typeface="Roboto medium" pitchFamily="2" charset="0"/>
+              </a:rPr>
+              <a:t> </a:t>
+            </a:r>
+            <a:r>
+              <a:rPr lang="en-US" sz="2800" dirty="0" err="1" smtClean="0">
+                <a:solidFill>
+                  <a:srgbClr val="CC0066"/>
+                </a:solidFill>
+                <a:latin typeface="Roboto medium" pitchFamily="2" charset="0"/>
+                <a:ea typeface="Roboto medium" pitchFamily="2" charset="0"/>
+              </a:rPr>
+              <a:t>C</a:t>
+            </a:r>
+            <a:r>
+              <a:rPr lang="en-US" sz="2800" dirty="0" err="1" smtClean="0">
+                <a:latin typeface="Roboto medium" pitchFamily="2" charset="0"/>
+                <a:ea typeface="Roboto medium" pitchFamily="2" charset="0"/>
+              </a:rPr>
+              <a:t>ha</a:t>
+            </a:r>
+            <a:r>
+              <a:rPr lang="en-US" sz="2800" dirty="0" err="1" smtClean="0">
+                <a:solidFill>
+                  <a:srgbClr val="CC0066"/>
+                </a:solidFill>
+                <a:latin typeface="Roboto medium" pitchFamily="2" charset="0"/>
+                <a:ea typeface="Roboto medium" pitchFamily="2" charset="0"/>
+              </a:rPr>
+              <a:t>I</a:t>
+            </a:r>
+            <a:r>
+              <a:rPr lang="en-US" sz="2800" dirty="0" err="1" smtClean="0">
+                <a:latin typeface="Roboto medium" pitchFamily="2" charset="0"/>
+                <a:ea typeface="Roboto medium" pitchFamily="2" charset="0"/>
+              </a:rPr>
+              <a:t>n</a:t>
+            </a:r>
+            <a:r>
+              <a:rPr lang="en-US" sz="2800" dirty="0" smtClean="0">
+                <a:latin typeface="Roboto medium" pitchFamily="2" charset="0"/>
+                <a:ea typeface="Roboto medium" pitchFamily="2" charset="0"/>
+              </a:rPr>
+              <a:t> </a:t>
+            </a:r>
+            <a:r>
+              <a:rPr lang="en-US" sz="2800" dirty="0" smtClean="0">
+                <a:solidFill>
+                  <a:srgbClr val="0070C0"/>
+                </a:solidFill>
+                <a:latin typeface="Roboto medium" pitchFamily="2" charset="0"/>
+                <a:ea typeface="Roboto medium" pitchFamily="2" charset="0"/>
+              </a:rPr>
+              <a:t>D</a:t>
+            </a:r>
+            <a:r>
+              <a:rPr lang="en-US" sz="2800" dirty="0" smtClean="0">
+                <a:latin typeface="Roboto medium" pitchFamily="2" charset="0"/>
+                <a:ea typeface="Roboto medium" pitchFamily="2" charset="0"/>
+              </a:rPr>
+              <a:t>ata</a:t>
+            </a:r>
+          </a:p>
+          <a:p>
+            <a:pPr>
+              <a:spcAft>
+                <a:spcPts val="2400"/>
+              </a:spcAft>
+            </a:pPr>
+            <a:r>
+              <a:rPr lang="en-US" sz="2800" dirty="0" smtClean="0">
+                <a:ea typeface="Roboto medium" pitchFamily="2" charset="0"/>
+              </a:rPr>
+              <a:t>Development of distributed networks of supply chain partners in order to exchange data about their work, their organization and their products.</a:t>
+            </a:r>
+          </a:p>
+        </p:txBody>
+      </p:sp>
+      <p:sp>
+        <p:nvSpPr>
+          <p:cNvPr id="8" name="Textfeld 7"/>
+          <p:cNvSpPr txBox="1"/>
+          <p:nvPr/>
+        </p:nvSpPr>
+        <p:spPr>
+          <a:xfrm>
+            <a:off x="6542053" y="1716268"/>
+            <a:ext cx="4483460" cy="2977738"/>
+          </a:xfrm>
+          <a:prstGeom prst="rect">
+            <a:avLst/>
+          </a:prstGeom>
+          <a:noFill/>
+        </p:spPr>
+        <p:txBody>
+          <a:bodyPr wrap="square" rtlCol="0">
+            <a:spAutoFit/>
+          </a:bodyPr>
+          <a:lstStyle/>
+          <a:p>
+            <a:pPr algn="ctr">
+              <a:spcAft>
+                <a:spcPts val="5700"/>
+              </a:spcAft>
+            </a:pPr>
+            <a:r>
+              <a:rPr lang="en-US" sz="2800" dirty="0" smtClean="0">
+                <a:latin typeface="Roboto medium" pitchFamily="2" charset="0"/>
+                <a:ea typeface="Roboto medium" pitchFamily="2" charset="0"/>
+              </a:rPr>
+              <a:t>Salesforce</a:t>
+            </a:r>
+          </a:p>
+          <a:p>
+            <a:pPr>
+              <a:spcAft>
+                <a:spcPts val="2400"/>
+              </a:spcAft>
+            </a:pPr>
+            <a:r>
+              <a:rPr lang="en-US" sz="2800" dirty="0">
+                <a:ea typeface="Roboto medium" pitchFamily="2" charset="0"/>
+              </a:rPr>
+              <a:t>Cloud computing company that provides a customer relationship management platform (SaaS and PaaS</a:t>
+            </a:r>
+            <a:r>
+              <a:rPr lang="en-US" sz="2800" dirty="0" smtClean="0">
+                <a:ea typeface="Roboto medium" pitchFamily="2" charset="0"/>
+              </a:rPr>
+              <a:t>).</a:t>
+            </a:r>
+          </a:p>
+        </p:txBody>
+      </p:sp>
+      <p:cxnSp>
+        <p:nvCxnSpPr>
+          <p:cNvPr id="9" name="Straight Connector 9"/>
+          <p:cNvCxnSpPr/>
+          <p:nvPr/>
+        </p:nvCxnSpPr>
+        <p:spPr>
+          <a:xfrm>
+            <a:off x="6096000" y="-118872"/>
+            <a:ext cx="0" cy="7086600"/>
+          </a:xfrm>
+          <a:prstGeom prst="line">
+            <a:avLst/>
+          </a:prstGeom>
+          <a:ln w="19050">
+            <a:solidFill>
+              <a:schemeClr val="bg2"/>
+            </a:solidFill>
+          </a:ln>
+        </p:spPr>
+        <p:style>
+          <a:lnRef idx="1">
+            <a:schemeClr val="accent1"/>
+          </a:lnRef>
+          <a:fillRef idx="0">
+            <a:schemeClr val="accent1"/>
+          </a:fillRef>
+          <a:effectRef idx="0">
+            <a:schemeClr val="accent1"/>
+          </a:effectRef>
+          <a:fontRef idx="minor">
+            <a:schemeClr val="tx1"/>
+          </a:fontRef>
+        </p:style>
+      </p:cxnSp>
+    </p:spTree>
+    <p:extLst>
+      <p:ext uri="{BB962C8B-B14F-4D97-AF65-F5344CB8AC3E}">
+        <p14:creationId xmlns:p14="http://schemas.microsoft.com/office/powerpoint/2010/main" val="2960521799"/>
+      </p:ext>
+    </p:extLst>
+  </p:cSld>
+  <p:clrMapOvr>
+    <a:masterClrMapping/>
+  </p:clrMapOvr>
+  <p:timing>
+    <p:tnLst>
+      <p:par>
+        <p:cTn id="1" dur="indefinite" restart="never" nodeType="tmRoot"/>
+      </p:par>
+    </p:tnLst>
+  </p:timing>
+</p:sld>
+</file>
+
+<file path=ppt/slides/slide5.xml><?xml version="1.0" encoding="utf-8"?>
+<p:sld xmlns:a="http://schemas.openxmlformats.org/drawingml/2006/main" xmlns:r="http://schemas.openxmlformats.org/officeDocument/2006/relationships" xmlns:p="http://schemas.openxmlformats.org/presentationml/2006/main">
+  <p:cSld>
+    <p:spTree>
+      <p:nvGrpSpPr>
+        <p:cNvPr id="1" name=""/>
+        <p:cNvGrpSpPr/>
+        <p:nvPr/>
+      </p:nvGrpSpPr>
+      <p:grpSpPr>
+        <a:xfrm>
+          <a:off x="0" y="0"/>
+          <a:ext cx="0" cy="0"/>
+          <a:chOff x="0" y="0"/>
+          <a:chExt cx="0" cy="0"/>
+        </a:xfrm>
+      </p:grpSpPr>
+      <p:grpSp>
+        <p:nvGrpSpPr>
+          <p:cNvPr id="27" name="Gruppieren 26"/>
+          <p:cNvGrpSpPr/>
+          <p:nvPr/>
+        </p:nvGrpSpPr>
+        <p:grpSpPr>
+          <a:xfrm>
+            <a:off x="4835679" y="2811551"/>
+            <a:ext cx="4784318" cy="2115846"/>
+            <a:chOff x="4835679" y="2811551"/>
+            <a:chExt cx="4784318" cy="2115846"/>
+          </a:xfrm>
+        </p:grpSpPr>
+        <p:sp>
+          <p:nvSpPr>
+            <p:cNvPr id="17" name="Wolkenförmige Legende 16"/>
+            <p:cNvSpPr/>
+            <p:nvPr/>
+          </p:nvSpPr>
+          <p:spPr>
+            <a:xfrm>
+              <a:off x="4835679" y="3126270"/>
+              <a:ext cx="2380061" cy="1801127"/>
+            </a:xfrm>
+            <a:prstGeom prst="cloudCallout">
+              <a:avLst>
+                <a:gd name="adj1" fmla="val -47826"/>
+                <a:gd name="adj2" fmla="val -3235"/>
+              </a:avLst>
+            </a:prstGeom>
+            <a:solidFill>
+              <a:srgbClr val="CC6600"/>
+            </a:solidFill>
+            <a:ln>
+              <a:solidFill>
+                <a:schemeClr val="accent4">
+                  <a:lumMod val="50000"/>
+                </a:schemeClr>
+              </a:solidFill>
+            </a:ln>
+          </p:spPr>
+          <p:style>
+            <a:lnRef idx="2">
+              <a:schemeClr val="accent6">
+                <a:shade val="50000"/>
+              </a:schemeClr>
+            </a:lnRef>
+            <a:fillRef idx="1">
+              <a:schemeClr val="accent6"/>
+            </a:fillRef>
+            <a:effectRef idx="0">
+              <a:schemeClr val="accent6"/>
+            </a:effectRef>
+            <a:fontRef idx="minor">
+              <a:schemeClr val="lt1"/>
+            </a:fontRef>
+          </p:style>
+          <p:txBody>
+            <a:bodyPr rtlCol="0" anchor="ctr"/>
+            <a:lstStyle/>
+            <a:p>
+              <a:pPr algn="ctr"/>
+              <a:endParaRPr lang="de-DE">
+                <a:solidFill>
+                  <a:srgbClr val="CC6600"/>
+                </a:solidFill>
+              </a:endParaRPr>
+            </a:p>
+          </p:txBody>
+        </p:sp>
+        <p:sp>
+          <p:nvSpPr>
+            <p:cNvPr id="25" name="Textfeld 24"/>
+            <p:cNvSpPr txBox="1"/>
+            <p:nvPr/>
+          </p:nvSpPr>
+          <p:spPr>
+            <a:xfrm>
+              <a:off x="6636807" y="2811551"/>
+              <a:ext cx="2983190" cy="603069"/>
+            </a:xfrm>
+            <a:prstGeom prst="rect">
+              <a:avLst/>
+            </a:prstGeom>
+            <a:noFill/>
+          </p:spPr>
+          <p:txBody>
+            <a:bodyPr wrap="square" rtlCol="0">
+              <a:spAutoFit/>
+            </a:bodyPr>
+            <a:lstStyle/>
+            <a:p>
+              <a:pPr algn="ctr"/>
+              <a:r>
+                <a:rPr lang="en-US" sz="2400" dirty="0" smtClean="0"/>
+                <a:t>RDF extension</a:t>
+              </a:r>
+              <a:endParaRPr lang="de-DE" sz="2400" dirty="0"/>
+            </a:p>
+          </p:txBody>
+        </p:sp>
+      </p:grpSp>
+      <p:sp>
+        <p:nvSpPr>
+          <p:cNvPr id="3" name="Foliennummernplatzhalter 2"/>
+          <p:cNvSpPr>
+            <a:spLocks noGrp="1"/>
+          </p:cNvSpPr>
+          <p:nvPr>
+            <p:ph type="sldNum" sz="quarter" idx="12"/>
+          </p:nvPr>
+        </p:nvSpPr>
+        <p:spPr/>
+        <p:txBody>
+          <a:bodyPr/>
+          <a:lstStyle/>
+          <a:p>
+            <a:fld id="{FCEE2C88-6C8F-484D-AF69-578F576B1F44}" type="slidenum">
+              <a:rPr lang="en-US" smtClean="0"/>
+              <a:pPr/>
+              <a:t>5</a:t>
+            </a:fld>
+            <a:endParaRPr lang="en-US" dirty="0"/>
+          </a:p>
+        </p:txBody>
+      </p:sp>
+      <p:sp>
+        <p:nvSpPr>
+          <p:cNvPr id="4" name="Textplatzhalter 3"/>
+          <p:cNvSpPr>
+            <a:spLocks noGrp="1"/>
+          </p:cNvSpPr>
+          <p:nvPr>
+            <p:ph type="body" sz="quarter" idx="14"/>
+          </p:nvPr>
+        </p:nvSpPr>
+        <p:spPr/>
+        <p:txBody>
+          <a:bodyPr>
+            <a:noAutofit/>
+          </a:bodyPr>
+          <a:lstStyle/>
+          <a:p>
+            <a:r>
+              <a:rPr lang="en-US" sz="3200" dirty="0" smtClean="0"/>
+              <a:t>Perspective</a:t>
+            </a:r>
+            <a:endParaRPr lang="en-US" sz="3200" dirty="0"/>
+          </a:p>
+        </p:txBody>
+      </p:sp>
+      <p:sp>
+        <p:nvSpPr>
+          <p:cNvPr id="5" name="Textplatzhalter 4"/>
+          <p:cNvSpPr>
+            <a:spLocks noGrp="1"/>
+          </p:cNvSpPr>
+          <p:nvPr>
+            <p:ph type="body" sz="quarter" idx="15"/>
+          </p:nvPr>
+        </p:nvSpPr>
+        <p:spPr/>
+        <p:txBody>
+          <a:bodyPr/>
+          <a:lstStyle/>
+          <a:p>
+            <a:endParaRPr lang="en-US"/>
+          </a:p>
+        </p:txBody>
+      </p:sp>
+      <p:grpSp>
+        <p:nvGrpSpPr>
+          <p:cNvPr id="26" name="Gruppieren 25"/>
+          <p:cNvGrpSpPr/>
+          <p:nvPr/>
+        </p:nvGrpSpPr>
+        <p:grpSpPr>
+          <a:xfrm>
+            <a:off x="3227530" y="1518121"/>
+            <a:ext cx="5725939" cy="4358213"/>
+            <a:chOff x="3227530" y="1518121"/>
+            <a:chExt cx="5725939" cy="4358213"/>
+          </a:xfrm>
+        </p:grpSpPr>
+        <p:pic>
+          <p:nvPicPr>
+            <p:cNvPr id="18" name="Inhaltsplatzhalter 13" descr="g3728.png"/>
+            <p:cNvPicPr>
+              <a:picLocks noChangeAspect="1"/>
+            </p:cNvPicPr>
+            <p:nvPr/>
+          </p:nvPicPr>
+          <p:blipFill>
+            <a:blip r:embed="rId2" cstate="print"/>
+            <a:stretch>
+              <a:fillRect/>
+            </a:stretch>
+          </p:blipFill>
+          <p:spPr>
+            <a:xfrm>
+              <a:off x="5600231" y="1518121"/>
+              <a:ext cx="1036576" cy="1091132"/>
+            </a:xfrm>
+            <a:prstGeom prst="rect">
+              <a:avLst/>
+            </a:prstGeom>
+          </p:spPr>
+        </p:pic>
+        <p:pic>
+          <p:nvPicPr>
+            <p:cNvPr id="19" name="Inhaltsplatzhalter 13" descr="g3728.png"/>
+            <p:cNvPicPr>
+              <a:picLocks noChangeAspect="1"/>
+            </p:cNvPicPr>
+            <p:nvPr/>
+          </p:nvPicPr>
+          <p:blipFill>
+            <a:blip r:embed="rId2" cstate="print"/>
+            <a:stretch>
+              <a:fillRect/>
+            </a:stretch>
+          </p:blipFill>
+          <p:spPr>
+            <a:xfrm>
+              <a:off x="3227530" y="4863071"/>
+              <a:ext cx="962601" cy="1013263"/>
+            </a:xfrm>
+            <a:prstGeom prst="rect">
+              <a:avLst/>
+            </a:prstGeom>
+          </p:spPr>
+        </p:pic>
+        <p:pic>
+          <p:nvPicPr>
+            <p:cNvPr id="20" name="Inhaltsplatzhalter 13" descr="g3728.png"/>
+            <p:cNvPicPr>
+              <a:picLocks noChangeAspect="1"/>
+            </p:cNvPicPr>
+            <p:nvPr/>
+          </p:nvPicPr>
+          <p:blipFill>
+            <a:blip r:embed="rId2" cstate="print"/>
+            <a:stretch>
+              <a:fillRect/>
+            </a:stretch>
+          </p:blipFill>
+          <p:spPr>
+            <a:xfrm>
+              <a:off x="8051978" y="4798745"/>
+              <a:ext cx="901491" cy="948937"/>
+            </a:xfrm>
+            <a:prstGeom prst="rect">
+              <a:avLst/>
+            </a:prstGeom>
+          </p:spPr>
+        </p:pic>
+        <p:cxnSp>
+          <p:nvCxnSpPr>
+            <p:cNvPr id="21" name="Gerade Verbindung mit Pfeil 20"/>
+            <p:cNvCxnSpPr/>
+            <p:nvPr/>
+          </p:nvCxnSpPr>
+          <p:spPr>
+            <a:xfrm flipV="1">
+              <a:off x="5993547" y="2611662"/>
+              <a:ext cx="0" cy="514608"/>
+            </a:xfrm>
+            <a:prstGeom prst="straightConnector1">
+              <a:avLst/>
+            </a:prstGeom>
+            <a:ln>
+              <a:headEnd type="arrow"/>
+              <a:tailEnd type="arrow"/>
+            </a:ln>
+          </p:spPr>
+          <p:style>
+            <a:lnRef idx="3">
+              <a:schemeClr val="dk1"/>
+            </a:lnRef>
+            <a:fillRef idx="0">
+              <a:schemeClr val="dk1"/>
+            </a:fillRef>
+            <a:effectRef idx="2">
+              <a:schemeClr val="dk1"/>
+            </a:effectRef>
+            <a:fontRef idx="minor">
+              <a:schemeClr val="tx1"/>
+            </a:fontRef>
+          </p:style>
+        </p:cxnSp>
+        <p:cxnSp>
+          <p:nvCxnSpPr>
+            <p:cNvPr id="22" name="Gerade Verbindung mit Pfeil 21"/>
+            <p:cNvCxnSpPr/>
+            <p:nvPr/>
+          </p:nvCxnSpPr>
+          <p:spPr>
+            <a:xfrm flipV="1">
+              <a:off x="4192420" y="4605767"/>
+              <a:ext cx="643260" cy="450282"/>
+            </a:xfrm>
+            <a:prstGeom prst="straightConnector1">
+              <a:avLst/>
+            </a:prstGeom>
+            <a:ln>
+              <a:headEnd type="arrow"/>
+              <a:tailEnd type="arrow"/>
+            </a:ln>
+          </p:spPr>
+          <p:style>
+            <a:lnRef idx="3">
+              <a:schemeClr val="dk1"/>
+            </a:lnRef>
+            <a:fillRef idx="0">
+              <a:schemeClr val="dk1"/>
+            </a:fillRef>
+            <a:effectRef idx="2">
+              <a:schemeClr val="dk1"/>
+            </a:effectRef>
+            <a:fontRef idx="minor">
+              <a:schemeClr val="tx1"/>
+            </a:fontRef>
+          </p:style>
+        </p:cxnSp>
+        <p:cxnSp>
+          <p:nvCxnSpPr>
+            <p:cNvPr id="23" name="Gerade Verbindung mit Pfeil 22"/>
+            <p:cNvCxnSpPr/>
+            <p:nvPr/>
+          </p:nvCxnSpPr>
+          <p:spPr>
+            <a:xfrm flipH="1" flipV="1">
+              <a:off x="7215740" y="4477115"/>
+              <a:ext cx="707586" cy="514608"/>
+            </a:xfrm>
+            <a:prstGeom prst="straightConnector1">
+              <a:avLst/>
+            </a:prstGeom>
+            <a:ln>
+              <a:headEnd type="arrow"/>
+              <a:tailEnd type="arrow"/>
+            </a:ln>
+          </p:spPr>
+          <p:style>
+            <a:lnRef idx="3">
+              <a:schemeClr val="dk1"/>
+            </a:lnRef>
+            <a:fillRef idx="0">
+              <a:schemeClr val="dk1"/>
+            </a:fillRef>
+            <a:effectRef idx="2">
+              <a:schemeClr val="dk1"/>
+            </a:effectRef>
+            <a:fontRef idx="minor">
+              <a:schemeClr val="tx1"/>
+            </a:fontRef>
+          </p:style>
+        </p:cxnSp>
+        <p:pic>
+          <p:nvPicPr>
+            <p:cNvPr id="24" name="Grafik 23" descr="logo190.png"/>
+            <p:cNvPicPr>
+              <a:picLocks noChangeAspect="1"/>
+            </p:cNvPicPr>
+            <p:nvPr/>
+          </p:nvPicPr>
+          <p:blipFill>
+            <a:blip r:embed="rId3" cstate="print"/>
+            <a:stretch>
+              <a:fillRect/>
+            </a:stretch>
+          </p:blipFill>
+          <p:spPr>
+            <a:xfrm>
+              <a:off x="4514049" y="3447900"/>
+              <a:ext cx="3063184" cy="1276326"/>
+            </a:xfrm>
+            <a:prstGeom prst="rect">
+              <a:avLst/>
+            </a:prstGeom>
+          </p:spPr>
+        </p:pic>
+      </p:grpSp>
+    </p:spTree>
+    <p:extLst>
+      <p:ext uri="{BB962C8B-B14F-4D97-AF65-F5344CB8AC3E}">
+        <p14:creationId xmlns:p14="http://schemas.microsoft.com/office/powerpoint/2010/main" val="2911959640"/>
+      </p:ext>
+    </p:extLst>
+  </p:cSld>
+  <p:clrMapOvr>
+    <a:masterClrMapping/>
+  </p:clrMapOvr>
+  <p:timing>
+    <p:tnLst>
+      <p:par>
+        <p:cTn id="1" dur="indefinite" restart="never" nodeType="tmRoot">
+          <p:childTnLst>
+            <p:seq concurrent="1" nextAc="seek">
+              <p:cTn id="2" dur="indefinite" nodeType="mainSeq">
+                <p:childTnLst>
+                  <p:par>
+                    <p:cTn id="3" fill="hold">
+                      <p:stCondLst>
+                        <p:cond delay="indefinite"/>
+                      </p:stCondLst>
+                      <p:childTnLst>
+                        <p:par>
+                          <p:cTn id="4" fill="hold">
+                            <p:stCondLst>
+                              <p:cond delay="0"/>
+                            </p:stCondLst>
+                            <p:childTnLst>
+                              <p:par>
+                                <p:cTn id="5" presetID="1" presetClass="entr" presetSubtype="0" fill="hold" nodeType="clickEffect">
+                                  <p:stCondLst>
+                                    <p:cond delay="0"/>
+                                  </p:stCondLst>
+                                  <p:childTnLst>
+                                    <p:set>
+                                      <p:cBhvr>
+                                        <p:cTn id="6" dur="1" fill="hold">
+                                          <p:stCondLst>
+                                            <p:cond delay="0"/>
+                                          </p:stCondLst>
+                                        </p:cTn>
+                                        <p:tgtEl>
+                                          <p:spTgt spid="26"/>
+                                        </p:tgtEl>
+                                        <p:attrNameLst>
+                                          <p:attrName>style.visibility</p:attrName>
+                                        </p:attrNameLst>
+                                      </p:cBhvr>
+                                      <p:to>
+                                        <p:strVal val="visible"/>
+                                      </p:to>
+                                    </p:set>
+                                  </p:childTnLst>
+                                </p:cTn>
+                              </p:par>
+                            </p:childTnLst>
+                          </p:cTn>
+                        </p:par>
+                      </p:childTnLst>
+                    </p:cTn>
+                  </p:par>
+                  <p:par>
+                    <p:cTn id="7" fill="hold">
+                      <p:stCondLst>
+                        <p:cond delay="indefinite"/>
+                      </p:stCondLst>
+                      <p:childTnLst>
+                        <p:par>
+                          <p:cTn id="8" fill="hold">
+                            <p:stCondLst>
+                              <p:cond delay="0"/>
+                            </p:stCondLst>
+                            <p:childTnLst>
+                              <p:par>
+                                <p:cTn id="9" presetID="1" presetClass="entr" presetSubtype="0" fill="hold" nodeType="clickEffect">
+                                  <p:stCondLst>
+                                    <p:cond delay="0"/>
+                                  </p:stCondLst>
+                                  <p:childTnLst>
+                                    <p:set>
+                                      <p:cBhvr>
+                                        <p:cTn id="10" dur="1" fill="hold">
+                                          <p:stCondLst>
+                                            <p:cond delay="0"/>
+                                          </p:stCondLst>
+                                        </p:cTn>
+                                        <p:tgtEl>
+                                          <p:spTgt spid="27"/>
+                                        </p:tgtEl>
+                                        <p:attrNameLst>
+                                          <p:attrName>style.visibility</p:attrName>
+                                        </p:attrNameLst>
+                                      </p:cBhvr>
+                                      <p:to>
+                                        <p:strVal val="visible"/>
+                                      </p:to>
+                                    </p:set>
+                                  </p:childTnLst>
+                                </p:cTn>
+                              </p:par>
+                            </p:childTnLst>
+                          </p:cTn>
+                        </p:par>
+                      </p:childTnLst>
+                    </p:cTn>
+                  </p:par>
+                </p:childTnLst>
+              </p:cTn>
+              <p:prevCondLst>
+                <p:cond evt="onPrev" delay="0">
+                  <p:tgtEl>
+                    <p:sldTgt/>
+                  </p:tgtEl>
+                </p:cond>
+              </p:prevCondLst>
+              <p:nextCondLst>
+                <p:cond evt="onNext" delay="0">
+                  <p:tgtEl>
+                    <p:sldTgt/>
+                  </p:tgtEl>
+                </p:cond>
+              </p:nextCondLst>
+            </p:seq>
+          </p:childTnLst>
+        </p:cTn>
+      </p:par>
+    </p:tnLst>
+  </p:timing>
+</p:sld>
+</file>
+
+<file path=ppt/slides/slide6.xml><?xml version="1.0" encoding="utf-8"?>
+<p:sld xmlns:a="http://schemas.openxmlformats.org/drawingml/2006/main" xmlns:r="http://schemas.openxmlformats.org/officeDocument/2006/relationships" xmlns:p="http://schemas.openxmlformats.org/presentationml/2006/main">
+  <p:cSld>
+    <p:spTree>
+      <p:nvGrpSpPr>
+        <p:cNvPr id="1" name=""/>
+        <p:cNvGrpSpPr/>
+        <p:nvPr/>
+      </p:nvGrpSpPr>
+      <p:grpSpPr>
+        <a:xfrm>
+          <a:off x="0" y="0"/>
+          <a:ext cx="0" cy="0"/>
+          <a:chOff x="0" y="0"/>
+          <a:chExt cx="0" cy="0"/>
+        </a:xfrm>
+      </p:grpSpPr>
+      <p:sp>
+        <p:nvSpPr>
+          <p:cNvPr id="3" name="Foliennummernplatzhalter 2"/>
+          <p:cNvSpPr>
+            <a:spLocks noGrp="1"/>
+          </p:cNvSpPr>
+          <p:nvPr>
+            <p:ph type="sldNum" sz="quarter" idx="12"/>
+          </p:nvPr>
+        </p:nvSpPr>
+        <p:spPr/>
+        <p:txBody>
+          <a:bodyPr/>
+          <a:lstStyle/>
+          <a:p>
+            <a:fld id="{FCEE2C88-6C8F-484D-AF69-578F576B1F44}" type="slidenum">
+              <a:rPr lang="en-US" smtClean="0"/>
+              <a:pPr/>
+              <a:t>6</a:t>
+            </a:fld>
+            <a:endParaRPr lang="en-US" dirty="0"/>
+          </a:p>
+        </p:txBody>
+      </p:sp>
+      <p:sp>
+        <p:nvSpPr>
+          <p:cNvPr id="4" name="Textplatzhalter 3"/>
+          <p:cNvSpPr>
+            <a:spLocks noGrp="1"/>
+          </p:cNvSpPr>
+          <p:nvPr>
+            <p:ph type="body" sz="quarter" idx="14"/>
+          </p:nvPr>
+        </p:nvSpPr>
+        <p:spPr/>
+        <p:txBody>
+          <a:bodyPr>
+            <a:noAutofit/>
+          </a:bodyPr>
+          <a:lstStyle/>
+          <a:p>
+            <a:r>
+              <a:rPr lang="en-US" sz="3200" dirty="0" smtClean="0"/>
+              <a:t>Introduction</a:t>
+            </a:r>
+            <a:endParaRPr lang="en-US" sz="3200" dirty="0"/>
+          </a:p>
+        </p:txBody>
+      </p:sp>
+      <p:sp>
+        <p:nvSpPr>
+          <p:cNvPr id="5" name="Textplatzhalter 4"/>
+          <p:cNvSpPr>
+            <a:spLocks noGrp="1"/>
+          </p:cNvSpPr>
+          <p:nvPr>
+            <p:ph type="body" sz="quarter" idx="15"/>
+          </p:nvPr>
+        </p:nvSpPr>
+        <p:spPr/>
+        <p:txBody>
+          <a:bodyPr/>
+          <a:lstStyle/>
+          <a:p>
+            <a:endParaRPr lang="en-US"/>
+          </a:p>
+        </p:txBody>
+      </p:sp>
+      <p:sp>
+        <p:nvSpPr>
+          <p:cNvPr id="6" name="Textfeld 5"/>
+          <p:cNvSpPr txBox="1"/>
+          <p:nvPr/>
+        </p:nvSpPr>
+        <p:spPr>
+          <a:xfrm>
+            <a:off x="625182" y="2783679"/>
+            <a:ext cx="10917938" cy="1261884"/>
+          </a:xfrm>
+          <a:prstGeom prst="rect">
+            <a:avLst/>
+          </a:prstGeom>
+          <a:noFill/>
+        </p:spPr>
+        <p:txBody>
+          <a:bodyPr wrap="square" rtlCol="0">
+            <a:spAutoFit/>
+          </a:bodyPr>
+          <a:lstStyle/>
+          <a:p>
+            <a:pPr algn="ctr">
+              <a:spcAft>
+                <a:spcPts val="2400"/>
+              </a:spcAft>
+            </a:pPr>
+            <a:r>
+              <a:rPr lang="en-US" sz="2800" dirty="0" smtClean="0">
+                <a:latin typeface="Roboto medium" pitchFamily="2" charset="0"/>
+                <a:ea typeface="Roboto medium" pitchFamily="2" charset="0"/>
+              </a:rPr>
+              <a:t>Goal</a:t>
+            </a:r>
+          </a:p>
+          <a:p>
+            <a:pPr>
+              <a:spcAft>
+                <a:spcPts val="2400"/>
+              </a:spcAft>
+            </a:pPr>
+            <a:r>
+              <a:rPr lang="en-US" sz="2800" dirty="0" smtClean="0">
+                <a:ea typeface="Roboto medium" pitchFamily="2" charset="0"/>
+              </a:rPr>
+              <a:t>Create a prototype to read, write and transform data from salesforce. </a:t>
+            </a:r>
+          </a:p>
+        </p:txBody>
+      </p:sp>
+    </p:spTree>
+    <p:extLst>
+      <p:ext uri="{BB962C8B-B14F-4D97-AF65-F5344CB8AC3E}">
+        <p14:creationId xmlns:p14="http://schemas.microsoft.com/office/powerpoint/2010/main" val="973220913"/>
+      </p:ext>
+    </p:extLst>
+  </p:cSld>
+  <p:clrMapOvr>
+    <a:masterClrMapping/>
+  </p:clrMapOvr>
+  <p:timing>
+    <p:tnLst>
+      <p:par>
+        <p:cTn id="1" dur="indefinite" restart="never" nodeType="tmRoot"/>
+      </p:par>
+    </p:tnLst>
+  </p:timing>
+</p:sld>
+</file>
+
+<file path=ppt/slides/slide7.xml><?xml version="1.0" encoding="utf-8"?>
+<p:sld xmlns:a="http://schemas.openxmlformats.org/drawingml/2006/main" xmlns:r="http://schemas.openxmlformats.org/officeDocument/2006/relationships" xmlns:p="http://schemas.openxmlformats.org/presentationml/2006/main">
+  <p:cSld>
+    <p:spTree>
+      <p:nvGrpSpPr>
+        <p:cNvPr id="1" name=""/>
+        <p:cNvGrpSpPr/>
+        <p:nvPr/>
+      </p:nvGrpSpPr>
+      <p:grpSpPr>
+        <a:xfrm>
+          <a:off x="0" y="0"/>
+          <a:ext cx="0" cy="0"/>
+          <a:chOff x="0" y="0"/>
+          <a:chExt cx="0" cy="0"/>
+        </a:xfrm>
+      </p:grpSpPr>
+      <p:sp>
+        <p:nvSpPr>
           <p:cNvPr id="2" name="Foliennummernplatzhalter 1"/>
           <p:cNvSpPr>
             <a:spLocks noGrp="1"/>
@@ -5385,7 +7744,7 @@
             <a:fld id="{FCEE2C88-6C8F-484D-AF69-578F576B1F44}" type="slidenum">
               <a:rPr lang="en-US" smtClean="0"/>
               <a:pPr/>
-              <a:t>4</a:t>
+              <a:t>7</a:t>
             </a:fld>
             <a:endParaRPr lang="en-US" dirty="0"/>
           </a:p>
@@ -5587,12 +7946,6 @@
               </a:rPr>
               <a:t>Requirements</a:t>
             </a:r>
-            <a:endParaRPr lang="en-AU" sz="3200" dirty="0" smtClean="0">
-              <a:solidFill>
-                <a:schemeClr val="tx2"/>
-              </a:solidFill>
-              <a:latin typeface="+mj-lt"/>
-            </a:endParaRPr>
           </a:p>
         </p:txBody>
       </p:sp>
@@ -5683,7 +8036,311 @@
 </p:sld>
 </file>
 
-<file path=ppt/slides/slide5.xml><?xml version="1.0" encoding="utf-8"?>
+<file path=ppt/slides/slide8.xml><?xml version="1.0" encoding="utf-8"?>
+<p:sld xmlns:a="http://schemas.openxmlformats.org/drawingml/2006/main" xmlns:r="http://schemas.openxmlformats.org/officeDocument/2006/relationships" xmlns:p="http://schemas.openxmlformats.org/presentationml/2006/main">
+  <p:cSld>
+    <p:spTree>
+      <p:nvGrpSpPr>
+        <p:cNvPr id="1" name=""/>
+        <p:cNvGrpSpPr/>
+        <p:nvPr/>
+      </p:nvGrpSpPr>
+      <p:grpSpPr>
+        <a:xfrm>
+          <a:off x="0" y="0"/>
+          <a:ext cx="0" cy="0"/>
+          <a:chOff x="0" y="0"/>
+          <a:chExt cx="0" cy="0"/>
+        </a:xfrm>
+      </p:grpSpPr>
+      <p:sp>
+        <p:nvSpPr>
+          <p:cNvPr id="3" name="Foliennummernplatzhalter 2"/>
+          <p:cNvSpPr>
+            <a:spLocks noGrp="1"/>
+          </p:cNvSpPr>
+          <p:nvPr>
+            <p:ph type="sldNum" sz="quarter" idx="12"/>
+          </p:nvPr>
+        </p:nvSpPr>
+        <p:spPr/>
+        <p:txBody>
+          <a:bodyPr/>
+          <a:lstStyle/>
+          <a:p>
+            <a:fld id="{FCEE2C88-6C8F-484D-AF69-578F576B1F44}" type="slidenum">
+              <a:rPr lang="en-US" smtClean="0"/>
+              <a:pPr/>
+              <a:t>8</a:t>
+            </a:fld>
+            <a:endParaRPr lang="en-US" dirty="0"/>
+          </a:p>
+        </p:txBody>
+      </p:sp>
+      <p:sp>
+        <p:nvSpPr>
+          <p:cNvPr id="4" name="Textplatzhalter 3"/>
+          <p:cNvSpPr>
+            <a:spLocks noGrp="1"/>
+          </p:cNvSpPr>
+          <p:nvPr>
+            <p:ph type="body" sz="quarter" idx="14"/>
+          </p:nvPr>
+        </p:nvSpPr>
+        <p:spPr/>
+        <p:txBody>
+          <a:bodyPr>
+            <a:noAutofit/>
+          </a:bodyPr>
+          <a:lstStyle/>
+          <a:p>
+            <a:r>
+              <a:rPr lang="en-US" sz="3200" dirty="0" smtClean="0"/>
+              <a:t>Requirements</a:t>
+            </a:r>
+            <a:endParaRPr lang="en-US" sz="3200" dirty="0"/>
+          </a:p>
+        </p:txBody>
+      </p:sp>
+      <p:sp>
+        <p:nvSpPr>
+          <p:cNvPr id="5" name="Textplatzhalter 4"/>
+          <p:cNvSpPr>
+            <a:spLocks noGrp="1"/>
+          </p:cNvSpPr>
+          <p:nvPr>
+            <p:ph type="body" sz="quarter" idx="15"/>
+          </p:nvPr>
+        </p:nvSpPr>
+        <p:spPr/>
+        <p:txBody>
+          <a:bodyPr/>
+          <a:lstStyle/>
+          <a:p>
+            <a:endParaRPr lang="en-US"/>
+          </a:p>
+        </p:txBody>
+      </p:sp>
+      <p:sp>
+        <p:nvSpPr>
+          <p:cNvPr id="6" name="Textfeld 5"/>
+          <p:cNvSpPr txBox="1"/>
+          <p:nvPr/>
+        </p:nvSpPr>
+        <p:spPr>
+          <a:xfrm>
+            <a:off x="1152618" y="1808693"/>
+            <a:ext cx="4441346" cy="2970044"/>
+          </a:xfrm>
+          <a:prstGeom prst="rect">
+            <a:avLst/>
+          </a:prstGeom>
+          <a:noFill/>
+        </p:spPr>
+        <p:txBody>
+          <a:bodyPr wrap="square" rtlCol="0">
+            <a:spAutoFit/>
+          </a:bodyPr>
+          <a:lstStyle/>
+          <a:p>
+            <a:pPr algn="ctr">
+              <a:spcAft>
+                <a:spcPts val="4200"/>
+              </a:spcAft>
+            </a:pPr>
+            <a:r>
+              <a:rPr lang="en-US" sz="2800" dirty="0" smtClean="0">
+                <a:latin typeface="Roboto medium" pitchFamily="2" charset="0"/>
+                <a:ea typeface="Roboto medium" pitchFamily="2" charset="0"/>
+              </a:rPr>
+              <a:t>Functional</a:t>
+            </a:r>
+          </a:p>
+          <a:p>
+            <a:pPr marL="457200" indent="-457200">
+              <a:spcAft>
+                <a:spcPts val="2400"/>
+              </a:spcAft>
+              <a:buFont typeface="Arial" panose="020B0604020202020204" pitchFamily="34" charset="0"/>
+              <a:buChar char="•"/>
+            </a:pPr>
+            <a:r>
+              <a:rPr lang="en-US" sz="2800" dirty="0" smtClean="0">
+                <a:ea typeface="Roboto medium" pitchFamily="2" charset="0"/>
+              </a:rPr>
+              <a:t>Import</a:t>
+            </a:r>
+          </a:p>
+          <a:p>
+            <a:pPr marL="457200" indent="-457200">
+              <a:spcAft>
+                <a:spcPts val="2400"/>
+              </a:spcAft>
+              <a:buFont typeface="Arial" panose="020B0604020202020204" pitchFamily="34" charset="0"/>
+              <a:buChar char="•"/>
+            </a:pPr>
+            <a:r>
+              <a:rPr lang="en-US" sz="2800" dirty="0" smtClean="0">
+                <a:ea typeface="Roboto medium" pitchFamily="2" charset="0"/>
+              </a:rPr>
+              <a:t>Export</a:t>
+            </a:r>
+          </a:p>
+          <a:p>
+            <a:pPr marL="457200" indent="-457200">
+              <a:spcAft>
+                <a:spcPts val="2400"/>
+              </a:spcAft>
+              <a:buFont typeface="Arial" panose="020B0604020202020204" pitchFamily="34" charset="0"/>
+              <a:buChar char="•"/>
+            </a:pPr>
+            <a:r>
+              <a:rPr lang="en-US" sz="2800" dirty="0" smtClean="0">
+                <a:ea typeface="Roboto medium" pitchFamily="2" charset="0"/>
+              </a:rPr>
+              <a:t>Transformation</a:t>
+            </a:r>
+          </a:p>
+        </p:txBody>
+      </p:sp>
+      <p:sp>
+        <p:nvSpPr>
+          <p:cNvPr id="8" name="Textfeld 7"/>
+          <p:cNvSpPr txBox="1"/>
+          <p:nvPr/>
+        </p:nvSpPr>
+        <p:spPr>
+          <a:xfrm>
+            <a:off x="7030220" y="1751914"/>
+            <a:ext cx="4441346" cy="2970044"/>
+          </a:xfrm>
+          <a:prstGeom prst="rect">
+            <a:avLst/>
+          </a:prstGeom>
+          <a:noFill/>
+        </p:spPr>
+        <p:txBody>
+          <a:bodyPr wrap="square" rtlCol="0">
+            <a:spAutoFit/>
+          </a:bodyPr>
+          <a:lstStyle/>
+          <a:p>
+            <a:pPr algn="ctr">
+              <a:spcAft>
+                <a:spcPts val="4200"/>
+              </a:spcAft>
+            </a:pPr>
+            <a:r>
+              <a:rPr lang="en-US" sz="2800" dirty="0" smtClean="0">
+                <a:latin typeface="Roboto medium" pitchFamily="2" charset="0"/>
+                <a:ea typeface="Roboto medium" pitchFamily="2" charset="0"/>
+              </a:rPr>
+              <a:t>Nonfunctional</a:t>
+            </a:r>
+          </a:p>
+          <a:p>
+            <a:pPr marL="457200" indent="-457200">
+              <a:spcAft>
+                <a:spcPts val="2400"/>
+              </a:spcAft>
+              <a:buFont typeface="Arial" panose="020B0604020202020204" pitchFamily="34" charset="0"/>
+              <a:buChar char="•"/>
+            </a:pPr>
+            <a:r>
+              <a:rPr lang="en-US" sz="2800" dirty="0" smtClean="0">
+                <a:ea typeface="Roboto medium" pitchFamily="2" charset="0"/>
+              </a:rPr>
+              <a:t>Interoperability </a:t>
+            </a:r>
+          </a:p>
+          <a:p>
+            <a:pPr marL="457200" indent="-457200">
+              <a:spcAft>
+                <a:spcPts val="2400"/>
+              </a:spcAft>
+              <a:buFont typeface="Arial" panose="020B0604020202020204" pitchFamily="34" charset="0"/>
+              <a:buChar char="•"/>
+            </a:pPr>
+            <a:r>
+              <a:rPr lang="en-US" sz="2800" dirty="0" smtClean="0">
+                <a:ea typeface="Roboto medium" pitchFamily="2" charset="0"/>
+              </a:rPr>
+              <a:t>Usability</a:t>
+            </a:r>
+          </a:p>
+          <a:p>
+            <a:pPr marL="457200" indent="-457200">
+              <a:spcAft>
+                <a:spcPts val="2400"/>
+              </a:spcAft>
+              <a:buFont typeface="Arial" panose="020B0604020202020204" pitchFamily="34" charset="0"/>
+              <a:buChar char="•"/>
+            </a:pPr>
+            <a:r>
+              <a:rPr lang="en-US" sz="2800" dirty="0" smtClean="0">
+                <a:ea typeface="Roboto medium" pitchFamily="2" charset="0"/>
+              </a:rPr>
+              <a:t>Performance </a:t>
+            </a:r>
+          </a:p>
+        </p:txBody>
+      </p:sp>
+      <p:cxnSp>
+        <p:nvCxnSpPr>
+          <p:cNvPr id="9" name="Straight Connector 9"/>
+          <p:cNvCxnSpPr/>
+          <p:nvPr/>
+        </p:nvCxnSpPr>
+        <p:spPr>
+          <a:xfrm>
+            <a:off x="6096000" y="-118872"/>
+            <a:ext cx="0" cy="7086600"/>
+          </a:xfrm>
+          <a:prstGeom prst="line">
+            <a:avLst/>
+          </a:prstGeom>
+          <a:ln w="19050">
+            <a:solidFill>
+              <a:schemeClr val="bg2"/>
+            </a:solidFill>
+          </a:ln>
+        </p:spPr>
+        <p:style>
+          <a:lnRef idx="1">
+            <a:schemeClr val="accent1"/>
+          </a:lnRef>
+          <a:fillRef idx="0">
+            <a:schemeClr val="accent1"/>
+          </a:fillRef>
+          <a:effectRef idx="0">
+            <a:schemeClr val="accent1"/>
+          </a:effectRef>
+          <a:fontRef idx="minor">
+            <a:schemeClr val="tx1"/>
+          </a:fontRef>
+        </p:style>
+      </p:cxnSp>
+    </p:spTree>
+    <p:extLst>
+      <p:ext uri="{BB962C8B-B14F-4D97-AF65-F5344CB8AC3E}">
+        <p14:creationId xmlns:p14="http://schemas.microsoft.com/office/powerpoint/2010/main" val="190106842"/>
+      </p:ext>
+    </p:extLst>
+  </p:cSld>
+  <p:clrMapOvr>
+    <a:masterClrMapping/>
+  </p:clrMapOvr>
+  <p:timing>
+    <p:tnLst>
+      <p:par>
+        <p:cTn id="1" dur="indefinite" restart="never" nodeType="tmRoot"/>
+      </p:par>
+    </p:tnLst>
+  </p:timing>
+</p:sld>
+</file>
+
+<file path=ppt/slides/slide9.xml><?xml version="1.0" encoding="utf-8"?>
 <p:sld xmlns:a="http://schemas.openxmlformats.org/drawingml/2006/main" xmlns:r="http://schemas.openxmlformats.org/officeDocument/2006/relationships" xmlns:p="http://schemas.openxmlformats.org/presentationml/2006/main">
   <p:cSld>
     <p:spTree>
@@ -5718,7 +8375,7 @@
             <a:fld id="{FCEE2C88-6C8F-484D-AF69-578F576B1F44}" type="slidenum">
               <a:rPr lang="en-US" smtClean="0"/>
               <a:pPr/>
-              <a:t>5</a:t>
+              <a:t>9</a:t>
             </a:fld>
             <a:endParaRPr lang="en-US" dirty="0"/>
           </a:p>
@@ -6009,1231 +8666,6 @@
     <p:extLst>
       <p:ext uri="{BB962C8B-B14F-4D97-AF65-F5344CB8AC3E}">
         <p14:creationId xmlns:p14="http://schemas.microsoft.com/office/powerpoint/2010/main" val="931775689"/>
-      </p:ext>
-    </p:extLst>
-  </p:cSld>
-  <p:clrMapOvr>
-    <a:masterClrMapping/>
-  </p:clrMapOvr>
-  <p:timing>
-    <p:tnLst>
-      <p:par>
-        <p:cTn id="1" dur="indefinite" restart="never" nodeType="tmRoot"/>
-      </p:par>
-    </p:tnLst>
-  </p:timing>
-</p:sld>
-</file>
-
-<file path=ppt/slides/slide6.xml><?xml version="1.0" encoding="utf-8"?>
-<p:sld xmlns:a="http://schemas.openxmlformats.org/drawingml/2006/main" xmlns:r="http://schemas.openxmlformats.org/officeDocument/2006/relationships" xmlns:p="http://schemas.openxmlformats.org/presentationml/2006/main">
-  <p:cSld>
-    <p:spTree>
-      <p:nvGrpSpPr>
-        <p:cNvPr id="1" name=""/>
-        <p:cNvGrpSpPr/>
-        <p:nvPr/>
-      </p:nvGrpSpPr>
-      <p:grpSpPr>
-        <a:xfrm>
-          <a:off x="0" y="0"/>
-          <a:ext cx="0" cy="0"/>
-          <a:chOff x="0" y="0"/>
-          <a:chExt cx="0" cy="0"/>
-        </a:xfrm>
-      </p:grpSpPr>
-      <p:sp>
-        <p:nvSpPr>
-          <p:cNvPr id="3" name="Foliennummernplatzhalter 2"/>
-          <p:cNvSpPr>
-            <a:spLocks noGrp="1"/>
-          </p:cNvSpPr>
-          <p:nvPr>
-            <p:ph type="sldNum" sz="quarter" idx="12"/>
-          </p:nvPr>
-        </p:nvSpPr>
-        <p:spPr/>
-        <p:txBody>
-          <a:bodyPr/>
-          <a:lstStyle/>
-          <a:p>
-            <a:fld id="{FCEE2C88-6C8F-484D-AF69-578F576B1F44}" type="slidenum">
-              <a:rPr lang="en-US" smtClean="0"/>
-              <a:pPr/>
-              <a:t>6</a:t>
-            </a:fld>
-            <a:endParaRPr lang="en-US" dirty="0"/>
-          </a:p>
-        </p:txBody>
-      </p:sp>
-      <p:sp>
-        <p:nvSpPr>
-          <p:cNvPr id="4" name="Textplatzhalter 3"/>
-          <p:cNvSpPr>
-            <a:spLocks noGrp="1"/>
-          </p:cNvSpPr>
-          <p:nvPr>
-            <p:ph type="body" sz="quarter" idx="14"/>
-          </p:nvPr>
-        </p:nvSpPr>
-        <p:spPr/>
-        <p:txBody>
-          <a:bodyPr>
-            <a:noAutofit/>
-          </a:bodyPr>
-          <a:lstStyle/>
-          <a:p>
-            <a:r>
-              <a:rPr lang="de-DE" sz="3200" dirty="0" err="1" smtClean="0"/>
-              <a:t>Architecture</a:t>
-            </a:r>
-            <a:r>
-              <a:rPr lang="de-DE" sz="3200" dirty="0" smtClean="0"/>
-              <a:t> </a:t>
-            </a:r>
-            <a:r>
-              <a:rPr lang="de-DE" sz="3200" dirty="0" err="1" smtClean="0"/>
-              <a:t>overview</a:t>
-            </a:r>
-            <a:endParaRPr lang="en-US" sz="3200" dirty="0"/>
-          </a:p>
-        </p:txBody>
-      </p:sp>
-      <p:sp>
-        <p:nvSpPr>
-          <p:cNvPr id="5" name="Textplatzhalter 4"/>
-          <p:cNvSpPr>
-            <a:spLocks noGrp="1"/>
-          </p:cNvSpPr>
-          <p:nvPr>
-            <p:ph type="body" sz="quarter" idx="15"/>
-          </p:nvPr>
-        </p:nvSpPr>
-        <p:spPr/>
-        <p:txBody>
-          <a:bodyPr/>
-          <a:lstStyle/>
-          <a:p>
-            <a:endParaRPr lang="en-US"/>
-          </a:p>
-        </p:txBody>
-      </p:sp>
-      <p:pic>
-        <p:nvPicPr>
-          <p:cNvPr id="7" name="Grafik 6"/>
-          <p:cNvPicPr>
-            <a:picLocks noChangeAspect="1"/>
-          </p:cNvPicPr>
-          <p:nvPr/>
-        </p:nvPicPr>
-        <p:blipFill>
-          <a:blip r:embed="rId2">
-            <a:extLst>
-              <a:ext uri="{28A0092B-C50C-407E-A947-70E740481C1C}">
-                <a14:useLocalDpi xmlns:a14="http://schemas.microsoft.com/office/drawing/2010/main" val="0"/>
-              </a:ext>
-            </a:extLst>
-          </a:blip>
-          <a:stretch>
-            <a:fillRect/>
-          </a:stretch>
-        </p:blipFill>
-        <p:spPr>
-          <a:xfrm>
-            <a:off x="1663414" y="2091509"/>
-            <a:ext cx="9372327" cy="3099615"/>
-          </a:xfrm>
-          <a:prstGeom prst="rect">
-            <a:avLst/>
-          </a:prstGeom>
-          <a:effectLst>
-            <a:outerShdw blurRad="50800" dist="38100" dir="8100000" algn="tr" rotWithShape="0">
-              <a:prstClr val="black">
-                <a:alpha val="40000"/>
-              </a:prstClr>
-            </a:outerShdw>
-          </a:effectLst>
-        </p:spPr>
-      </p:pic>
-    </p:spTree>
-    <p:extLst>
-      <p:ext uri="{BB962C8B-B14F-4D97-AF65-F5344CB8AC3E}">
-        <p14:creationId xmlns:p14="http://schemas.microsoft.com/office/powerpoint/2010/main" val="1901838052"/>
-      </p:ext>
-    </p:extLst>
-  </p:cSld>
-  <p:clrMapOvr>
-    <a:masterClrMapping/>
-  </p:clrMapOvr>
-  <p:timing>
-    <p:tnLst>
-      <p:par>
-        <p:cTn id="1" dur="indefinite" restart="never" nodeType="tmRoot"/>
-      </p:par>
-    </p:tnLst>
-  </p:timing>
-</p:sld>
-</file>
-
-<file path=ppt/slides/slide7.xml><?xml version="1.0" encoding="utf-8"?>
-<p:sld xmlns:a="http://schemas.openxmlformats.org/drawingml/2006/main" xmlns:r="http://schemas.openxmlformats.org/officeDocument/2006/relationships" xmlns:p="http://schemas.openxmlformats.org/presentationml/2006/main">
-  <p:cSld>
-    <p:spTree>
-      <p:nvGrpSpPr>
-        <p:cNvPr id="1" name=""/>
-        <p:cNvGrpSpPr/>
-        <p:nvPr/>
-      </p:nvGrpSpPr>
-      <p:grpSpPr>
-        <a:xfrm>
-          <a:off x="0" y="0"/>
-          <a:ext cx="0" cy="0"/>
-          <a:chOff x="0" y="0"/>
-          <a:chExt cx="0" cy="0"/>
-        </a:xfrm>
-      </p:grpSpPr>
-      <p:sp>
-        <p:nvSpPr>
-          <p:cNvPr id="3" name="Foliennummernplatzhalter 2"/>
-          <p:cNvSpPr>
-            <a:spLocks noGrp="1"/>
-          </p:cNvSpPr>
-          <p:nvPr>
-            <p:ph type="sldNum" sz="quarter" idx="12"/>
-          </p:nvPr>
-        </p:nvSpPr>
-        <p:spPr/>
-        <p:txBody>
-          <a:bodyPr/>
-          <a:lstStyle/>
-          <a:p>
-            <a:fld id="{FCEE2C88-6C8F-484D-AF69-578F576B1F44}" type="slidenum">
-              <a:rPr lang="en-US" smtClean="0"/>
-              <a:pPr/>
-              <a:t>7</a:t>
-            </a:fld>
-            <a:endParaRPr lang="en-US" dirty="0"/>
-          </a:p>
-        </p:txBody>
-      </p:sp>
-      <p:sp>
-        <p:nvSpPr>
-          <p:cNvPr id="4" name="Textplatzhalter 3"/>
-          <p:cNvSpPr>
-            <a:spLocks noGrp="1"/>
-          </p:cNvSpPr>
-          <p:nvPr>
-            <p:ph type="body" sz="quarter" idx="14"/>
-          </p:nvPr>
-        </p:nvSpPr>
-        <p:spPr/>
-        <p:txBody>
-          <a:bodyPr>
-            <a:noAutofit/>
-          </a:bodyPr>
-          <a:lstStyle/>
-          <a:p>
-            <a:r>
-              <a:rPr lang="de-DE" sz="3200" dirty="0" smtClean="0"/>
-              <a:t>Components</a:t>
-            </a:r>
-            <a:endParaRPr lang="en-US" sz="3200" dirty="0"/>
-          </a:p>
-        </p:txBody>
-      </p:sp>
-      <p:sp>
-        <p:nvSpPr>
-          <p:cNvPr id="5" name="Textplatzhalter 4"/>
-          <p:cNvSpPr>
-            <a:spLocks noGrp="1"/>
-          </p:cNvSpPr>
-          <p:nvPr>
-            <p:ph type="body" sz="quarter" idx="15"/>
-          </p:nvPr>
-        </p:nvSpPr>
-        <p:spPr/>
-        <p:txBody>
-          <a:bodyPr/>
-          <a:lstStyle/>
-          <a:p>
-            <a:endParaRPr lang="en-US"/>
-          </a:p>
-        </p:txBody>
-      </p:sp>
-      <p:cxnSp>
-        <p:nvCxnSpPr>
-          <p:cNvPr id="8" name="Straight Connector 9"/>
-          <p:cNvCxnSpPr/>
-          <p:nvPr/>
-        </p:nvCxnSpPr>
-        <p:spPr>
-          <a:xfrm>
-            <a:off x="6096000" y="-118872"/>
-            <a:ext cx="0" cy="7086600"/>
-          </a:xfrm>
-          <a:prstGeom prst="line">
-            <a:avLst/>
-          </a:prstGeom>
-          <a:ln w="19050">
-            <a:solidFill>
-              <a:schemeClr val="bg2"/>
-            </a:solidFill>
-          </a:ln>
-        </p:spPr>
-        <p:style>
-          <a:lnRef idx="1">
-            <a:schemeClr val="accent1"/>
-          </a:lnRef>
-          <a:fillRef idx="0">
-            <a:schemeClr val="accent1"/>
-          </a:fillRef>
-          <a:effectRef idx="0">
-            <a:schemeClr val="accent1"/>
-          </a:effectRef>
-          <a:fontRef idx="minor">
-            <a:schemeClr val="tx1"/>
-          </a:fontRef>
-        </p:style>
-      </p:cxnSp>
-      <p:sp>
-        <p:nvSpPr>
-          <p:cNvPr id="2" name="Textfeld 1"/>
-          <p:cNvSpPr txBox="1"/>
-          <p:nvPr/>
-        </p:nvSpPr>
-        <p:spPr>
-          <a:xfrm>
-            <a:off x="913277" y="1585463"/>
-            <a:ext cx="4571769" cy="3677930"/>
-          </a:xfrm>
-          <a:prstGeom prst="rect">
-            <a:avLst/>
-          </a:prstGeom>
-          <a:noFill/>
-        </p:spPr>
-        <p:txBody>
-          <a:bodyPr wrap="square" rtlCol="0">
-            <a:spAutoFit/>
-          </a:bodyPr>
-          <a:lstStyle/>
-          <a:p>
-            <a:pPr>
-              <a:spcAft>
-                <a:spcPts val="2400"/>
-              </a:spcAft>
-            </a:pPr>
-            <a:r>
-              <a:rPr lang="en-US" sz="2800" dirty="0" smtClean="0">
-                <a:latin typeface="Roboto medium" pitchFamily="2" charset="0"/>
-                <a:ea typeface="Roboto medium" pitchFamily="2" charset="0"/>
-              </a:rPr>
-              <a:t>Salesforce REST API client</a:t>
-            </a:r>
-            <a:endParaRPr lang="en-US" dirty="0" smtClean="0">
-              <a:latin typeface="Roboto medium" pitchFamily="2" charset="0"/>
-              <a:ea typeface="Roboto medium" pitchFamily="2" charset="0"/>
-            </a:endParaRPr>
-          </a:p>
-          <a:p>
-            <a:pPr marL="342900" indent="-342900">
-              <a:buFont typeface="Arial" panose="020B0604020202020204" pitchFamily="34" charset="0"/>
-              <a:buChar char="•"/>
-            </a:pPr>
-            <a:r>
-              <a:rPr lang="en-US" sz="2400" dirty="0">
-                <a:ea typeface="Roboto medium" pitchFamily="2" charset="0"/>
-              </a:rPr>
-              <a:t>Core communication with API</a:t>
-            </a:r>
-          </a:p>
-          <a:p>
-            <a:pPr marL="342900" indent="-342900">
-              <a:buFont typeface="Arial" panose="020B0604020202020204" pitchFamily="34" charset="0"/>
-              <a:buChar char="•"/>
-            </a:pPr>
-            <a:r>
-              <a:rPr lang="de-DE" sz="2400" dirty="0" err="1">
-                <a:ea typeface="Roboto medium" pitchFamily="2" charset="0"/>
-              </a:rPr>
-              <a:t>Provide</a:t>
-            </a:r>
-            <a:r>
-              <a:rPr lang="de-DE" sz="2400" dirty="0">
-                <a:ea typeface="Roboto medium" pitchFamily="2" charset="0"/>
-              </a:rPr>
-              <a:t> limited </a:t>
-            </a:r>
-            <a:r>
-              <a:rPr lang="de-DE" sz="2400" dirty="0" err="1" smtClean="0">
-                <a:ea typeface="Roboto medium" pitchFamily="2" charset="0"/>
-              </a:rPr>
-              <a:t>access</a:t>
-            </a:r>
-            <a:endParaRPr lang="en-US" sz="2400" dirty="0" smtClean="0">
-              <a:ea typeface="Roboto medium" pitchFamily="2" charset="0"/>
-            </a:endParaRPr>
-          </a:p>
-          <a:p>
-            <a:pPr>
-              <a:spcBef>
-                <a:spcPts val="5400"/>
-              </a:spcBef>
-              <a:spcAft>
-                <a:spcPts val="2400"/>
-              </a:spcAft>
-            </a:pPr>
-            <a:r>
-              <a:rPr lang="en-US" sz="2400" dirty="0" smtClean="0">
-                <a:latin typeface="Roboto medium" pitchFamily="2" charset="0"/>
-                <a:ea typeface="Roboto medium" pitchFamily="2" charset="0"/>
-              </a:rPr>
-              <a:t>RDF2JSON transformer</a:t>
-            </a:r>
-            <a:endParaRPr lang="en-US" sz="2400" dirty="0" smtClean="0">
-              <a:ea typeface="Roboto medium" pitchFamily="2" charset="0"/>
-            </a:endParaRPr>
-          </a:p>
-          <a:p>
-            <a:pPr marL="342900" indent="-342900">
-              <a:buFont typeface="Arial" panose="020B0604020202020204" pitchFamily="34" charset="0"/>
-              <a:buChar char="•"/>
-            </a:pPr>
-            <a:r>
-              <a:rPr lang="en-US" sz="2400" dirty="0" smtClean="0">
-                <a:ea typeface="Roboto medium" pitchFamily="2" charset="0"/>
-              </a:rPr>
-              <a:t>Transformation </a:t>
-            </a:r>
-            <a:r>
-              <a:rPr lang="en-US" sz="2400" dirty="0">
-                <a:ea typeface="Roboto medium" pitchFamily="2" charset="0"/>
-              </a:rPr>
-              <a:t>of RDF, </a:t>
-            </a:r>
-            <a:r>
-              <a:rPr lang="en-US" sz="2400" dirty="0" smtClean="0">
-                <a:ea typeface="Roboto medium" pitchFamily="2" charset="0"/>
-              </a:rPr>
-              <a:t>JSON</a:t>
-            </a:r>
-          </a:p>
-          <a:p>
-            <a:pPr marL="342900" indent="-342900">
-              <a:buFont typeface="Arial" panose="020B0604020202020204" pitchFamily="34" charset="0"/>
-              <a:buChar char="•"/>
-            </a:pPr>
-            <a:r>
-              <a:rPr lang="en-US" sz="2400" dirty="0" smtClean="0">
-                <a:ea typeface="Roboto medium" pitchFamily="2" charset="0"/>
-              </a:rPr>
-              <a:t>Based on provided input</a:t>
-            </a:r>
-            <a:endParaRPr lang="en-US" sz="2400" dirty="0">
-              <a:ea typeface="Roboto medium" pitchFamily="2" charset="0"/>
-            </a:endParaRPr>
-          </a:p>
-        </p:txBody>
-      </p:sp>
-      <p:sp>
-        <p:nvSpPr>
-          <p:cNvPr id="15" name="Textfeld 14"/>
-          <p:cNvSpPr txBox="1"/>
-          <p:nvPr/>
-        </p:nvSpPr>
-        <p:spPr>
-          <a:xfrm>
-            <a:off x="6706955" y="1575656"/>
-            <a:ext cx="4571769" cy="3677930"/>
-          </a:xfrm>
-          <a:prstGeom prst="rect">
-            <a:avLst/>
-          </a:prstGeom>
-          <a:noFill/>
-        </p:spPr>
-        <p:txBody>
-          <a:bodyPr wrap="square" rtlCol="0">
-            <a:spAutoFit/>
-          </a:bodyPr>
-          <a:lstStyle/>
-          <a:p>
-            <a:pPr>
-              <a:spcAft>
-                <a:spcPts val="2400"/>
-              </a:spcAft>
-            </a:pPr>
-            <a:r>
-              <a:rPr lang="en-US" sz="2800" dirty="0" smtClean="0">
-                <a:latin typeface="Roboto medium" pitchFamily="2" charset="0"/>
-                <a:ea typeface="Roboto medium" pitchFamily="2" charset="0"/>
-              </a:rPr>
-              <a:t>Salesforce RDF extension</a:t>
-            </a:r>
-            <a:endParaRPr lang="en-US" dirty="0" smtClean="0">
-              <a:latin typeface="Roboto medium" pitchFamily="2" charset="0"/>
-              <a:ea typeface="Roboto medium" pitchFamily="2" charset="0"/>
-            </a:endParaRPr>
-          </a:p>
-          <a:p>
-            <a:pPr marL="342900" indent="-342900">
-              <a:buFont typeface="Arial" panose="020B0604020202020204" pitchFamily="34" charset="0"/>
-              <a:buChar char="•"/>
-            </a:pPr>
-            <a:r>
-              <a:rPr lang="de-DE" sz="2400" dirty="0">
-                <a:ea typeface="Roboto medium" pitchFamily="2" charset="0"/>
-              </a:rPr>
-              <a:t>REST Web Service</a:t>
-            </a:r>
-            <a:endParaRPr lang="en-US" sz="2400" dirty="0">
-              <a:ea typeface="Roboto medium" pitchFamily="2" charset="0"/>
-            </a:endParaRPr>
-          </a:p>
-          <a:p>
-            <a:pPr marL="342900" indent="-342900">
-              <a:buFont typeface="Arial" panose="020B0604020202020204" pitchFamily="34" charset="0"/>
-              <a:buChar char="•"/>
-            </a:pPr>
-            <a:r>
-              <a:rPr lang="en-US" sz="2400" dirty="0">
-                <a:ea typeface="Roboto medium" pitchFamily="2" charset="0"/>
-              </a:rPr>
-              <a:t>Integration of </a:t>
-            </a:r>
-            <a:r>
-              <a:rPr lang="en-US" sz="2400" dirty="0" smtClean="0">
-                <a:ea typeface="Roboto medium" pitchFamily="2" charset="0"/>
-              </a:rPr>
-              <a:t>components</a:t>
-            </a:r>
-          </a:p>
-          <a:p>
-            <a:pPr>
-              <a:spcBef>
-                <a:spcPts val="5400"/>
-              </a:spcBef>
-              <a:spcAft>
-                <a:spcPts val="2400"/>
-              </a:spcAft>
-            </a:pPr>
-            <a:r>
-              <a:rPr lang="en-US" sz="2400" dirty="0" smtClean="0">
-                <a:latin typeface="Roboto medium" pitchFamily="2" charset="0"/>
-                <a:ea typeface="Roboto medium" pitchFamily="2" charset="0"/>
-              </a:rPr>
-              <a:t>RDF Provider / Test client</a:t>
-            </a:r>
-            <a:endParaRPr lang="en-US" sz="2400" dirty="0" smtClean="0">
-              <a:ea typeface="Roboto medium" pitchFamily="2" charset="0"/>
-            </a:endParaRPr>
-          </a:p>
-          <a:p>
-            <a:pPr marL="342900" indent="-342900">
-              <a:buFont typeface="Arial" panose="020B0604020202020204" pitchFamily="34" charset="0"/>
-              <a:buChar char="•"/>
-            </a:pPr>
-            <a:r>
-              <a:rPr lang="en-US" sz="2400" dirty="0" smtClean="0">
-                <a:ea typeface="Roboto medium" pitchFamily="2" charset="0"/>
-              </a:rPr>
-              <a:t>Input for the extension</a:t>
-            </a:r>
-          </a:p>
-          <a:p>
-            <a:pPr marL="342900" indent="-342900">
-              <a:buFont typeface="Arial" panose="020B0604020202020204" pitchFamily="34" charset="0"/>
-              <a:buChar char="•"/>
-            </a:pPr>
-            <a:r>
-              <a:rPr lang="en-US" sz="2400" dirty="0" smtClean="0">
-                <a:ea typeface="Roboto medium" pitchFamily="2" charset="0"/>
-              </a:rPr>
-              <a:t>Testing purposes</a:t>
-            </a:r>
-            <a:endParaRPr lang="en-US" sz="2400" dirty="0">
-              <a:ea typeface="Roboto medium" pitchFamily="2" charset="0"/>
-            </a:endParaRPr>
-          </a:p>
-        </p:txBody>
-      </p:sp>
-    </p:spTree>
-    <p:extLst>
-      <p:ext uri="{BB962C8B-B14F-4D97-AF65-F5344CB8AC3E}">
-        <p14:creationId xmlns:p14="http://schemas.microsoft.com/office/powerpoint/2010/main" val="2205123534"/>
-      </p:ext>
-    </p:extLst>
-  </p:cSld>
-  <p:clrMapOvr>
-    <a:masterClrMapping/>
-  </p:clrMapOvr>
-  <p:timing>
-    <p:tnLst>
-      <p:par>
-        <p:cTn id="1" dur="indefinite" restart="never" nodeType="tmRoot"/>
-      </p:par>
-    </p:tnLst>
-  </p:timing>
-</p:sld>
-</file>
-
-<file path=ppt/slides/slide8.xml><?xml version="1.0" encoding="utf-8"?>
-<p:sld xmlns:a="http://schemas.openxmlformats.org/drawingml/2006/main" xmlns:r="http://schemas.openxmlformats.org/officeDocument/2006/relationships" xmlns:p="http://schemas.openxmlformats.org/presentationml/2006/main">
-  <p:cSld>
-    <p:spTree>
-      <p:nvGrpSpPr>
-        <p:cNvPr id="1" name=""/>
-        <p:cNvGrpSpPr/>
-        <p:nvPr/>
-      </p:nvGrpSpPr>
-      <p:grpSpPr>
-        <a:xfrm>
-          <a:off x="0" y="0"/>
-          <a:ext cx="0" cy="0"/>
-          <a:chOff x="0" y="0"/>
-          <a:chExt cx="0" cy="0"/>
-        </a:xfrm>
-      </p:grpSpPr>
-      <p:sp>
-        <p:nvSpPr>
-          <p:cNvPr id="2" name="Foliennummernplatzhalter 1"/>
-          <p:cNvSpPr>
-            <a:spLocks noGrp="1"/>
-          </p:cNvSpPr>
-          <p:nvPr>
-            <p:ph type="sldNum" sz="quarter" idx="12"/>
-          </p:nvPr>
-        </p:nvSpPr>
-        <p:spPr/>
-        <p:txBody>
-          <a:bodyPr/>
-          <a:lstStyle/>
-          <a:p>
-            <a:fld id="{FCEE2C88-6C8F-484D-AF69-578F576B1F44}" type="slidenum">
-              <a:rPr lang="en-US" smtClean="0"/>
-              <a:pPr/>
-              <a:t>8</a:t>
-            </a:fld>
-            <a:endParaRPr lang="en-US" dirty="0"/>
-          </a:p>
-        </p:txBody>
-      </p:sp>
-      <p:sp>
-        <p:nvSpPr>
-          <p:cNvPr id="3" name="Text Placeholder 33"/>
-          <p:cNvSpPr txBox="1">
-            <a:spLocks/>
-          </p:cNvSpPr>
-          <p:nvPr/>
-        </p:nvSpPr>
-        <p:spPr>
-          <a:xfrm>
-            <a:off x="3718030" y="3488189"/>
-            <a:ext cx="4755935" cy="499941"/>
-          </a:xfrm>
-          <a:prstGeom prst="rect">
-            <a:avLst/>
-          </a:prstGeom>
-        </p:spPr>
-        <p:txBody>
-          <a:bodyPr lIns="0" tIns="0" rIns="0" bIns="0"/>
-          <a:lstStyle>
-            <a:lvl1pPr marL="171450" indent="-171450" algn="l" defTabSz="685800" rtl="0" eaLnBrk="1" latinLnBrk="0" hangingPunct="1">
-              <a:lnSpc>
-                <a:spcPct val="90000"/>
-              </a:lnSpc>
-              <a:spcBef>
-                <a:spcPts val="750"/>
-              </a:spcBef>
-              <a:buFont typeface="Arial" panose="020B0604020202020204" pitchFamily="34" charset="0"/>
-              <a:buChar char="•"/>
-              <a:defRPr sz="2100" kern="1200">
-                <a:solidFill>
-                  <a:schemeClr val="tx1"/>
-                </a:solidFill>
-                <a:latin typeface="Neris Thin" panose="00000300000000000000" pitchFamily="50" charset="0"/>
-                <a:ea typeface="+mn-ea"/>
-                <a:cs typeface="+mn-cs"/>
-              </a:defRPr>
-            </a:lvl1pPr>
-            <a:lvl2pPr marL="514350" indent="-171450" algn="l" defTabSz="685800" rtl="0" eaLnBrk="1" latinLnBrk="0" hangingPunct="1">
-              <a:lnSpc>
-                <a:spcPct val="90000"/>
-              </a:lnSpc>
-              <a:spcBef>
-                <a:spcPts val="375"/>
-              </a:spcBef>
-              <a:buFont typeface="Arial" panose="020B0604020202020204" pitchFamily="34" charset="0"/>
-              <a:buChar char="•"/>
-              <a:defRPr sz="1800" kern="1200">
-                <a:solidFill>
-                  <a:schemeClr val="tx1"/>
-                </a:solidFill>
-                <a:latin typeface="Neris Thin" panose="00000300000000000000" pitchFamily="50" charset="0"/>
-                <a:ea typeface="+mn-ea"/>
-                <a:cs typeface="+mn-cs"/>
-              </a:defRPr>
-            </a:lvl2pPr>
-            <a:lvl3pPr marL="857250" indent="-171450" algn="l" defTabSz="685800" rtl="0" eaLnBrk="1" latinLnBrk="0" hangingPunct="1">
-              <a:lnSpc>
-                <a:spcPct val="90000"/>
-              </a:lnSpc>
-              <a:spcBef>
-                <a:spcPts val="375"/>
-              </a:spcBef>
-              <a:buFont typeface="Arial" panose="020B0604020202020204" pitchFamily="34" charset="0"/>
-              <a:buChar char="•"/>
-              <a:defRPr sz="1500" kern="1200">
-                <a:solidFill>
-                  <a:schemeClr val="tx1"/>
-                </a:solidFill>
-                <a:latin typeface="Neris Thin" panose="00000300000000000000" pitchFamily="50" charset="0"/>
-                <a:ea typeface="+mn-ea"/>
-                <a:cs typeface="+mn-cs"/>
-              </a:defRPr>
-            </a:lvl3pPr>
-            <a:lvl4pPr marL="1200150" indent="-171450" algn="l" defTabSz="685800" rtl="0" eaLnBrk="1" latinLnBrk="0" hangingPunct="1">
-              <a:lnSpc>
-                <a:spcPct val="90000"/>
-              </a:lnSpc>
-              <a:spcBef>
-                <a:spcPts val="375"/>
-              </a:spcBef>
-              <a:buFont typeface="Arial" panose="020B0604020202020204" pitchFamily="34" charset="0"/>
-              <a:buChar char="•"/>
-              <a:defRPr sz="1350" kern="1200">
-                <a:solidFill>
-                  <a:schemeClr val="tx1"/>
-                </a:solidFill>
-                <a:latin typeface="Neris Thin" panose="00000300000000000000" pitchFamily="50" charset="0"/>
-                <a:ea typeface="+mn-ea"/>
-                <a:cs typeface="+mn-cs"/>
-              </a:defRPr>
-            </a:lvl4pPr>
-            <a:lvl5pPr marL="1543050" indent="-171450" algn="l" defTabSz="685800" rtl="0" eaLnBrk="1" latinLnBrk="0" hangingPunct="1">
-              <a:lnSpc>
-                <a:spcPct val="90000"/>
-              </a:lnSpc>
-              <a:spcBef>
-                <a:spcPts val="375"/>
-              </a:spcBef>
-              <a:buFont typeface="Arial" panose="020B0604020202020204" pitchFamily="34" charset="0"/>
-              <a:buChar char="•"/>
-              <a:defRPr sz="1350" kern="1200">
-                <a:solidFill>
-                  <a:schemeClr val="tx1"/>
-                </a:solidFill>
-                <a:latin typeface="Neris Thin" panose="00000300000000000000" pitchFamily="50" charset="0"/>
-                <a:ea typeface="+mn-ea"/>
-                <a:cs typeface="+mn-cs"/>
-              </a:defRPr>
-            </a:lvl5pPr>
-            <a:lvl6pPr marL="1885950" indent="-171450" algn="l" defTabSz="685800" rtl="0" eaLnBrk="1" latinLnBrk="0" hangingPunct="1">
-              <a:lnSpc>
-                <a:spcPct val="90000"/>
-              </a:lnSpc>
-              <a:spcBef>
-                <a:spcPts val="375"/>
-              </a:spcBef>
-              <a:buFont typeface="Arial" panose="020B0604020202020204" pitchFamily="34" charset="0"/>
-              <a:buChar char="•"/>
-              <a:defRPr sz="1350" kern="1200">
-                <a:solidFill>
-                  <a:schemeClr val="tx1"/>
-                </a:solidFill>
-                <a:latin typeface="+mn-lt"/>
-                <a:ea typeface="+mn-ea"/>
-                <a:cs typeface="+mn-cs"/>
-              </a:defRPr>
-            </a:lvl6pPr>
-            <a:lvl7pPr marL="2228850" indent="-171450" algn="l" defTabSz="685800" rtl="0" eaLnBrk="1" latinLnBrk="0" hangingPunct="1">
-              <a:lnSpc>
-                <a:spcPct val="90000"/>
-              </a:lnSpc>
-              <a:spcBef>
-                <a:spcPts val="375"/>
-              </a:spcBef>
-              <a:buFont typeface="Arial" panose="020B0604020202020204" pitchFamily="34" charset="0"/>
-              <a:buChar char="•"/>
-              <a:defRPr sz="1350" kern="1200">
-                <a:solidFill>
-                  <a:schemeClr val="tx1"/>
-                </a:solidFill>
-                <a:latin typeface="+mn-lt"/>
-                <a:ea typeface="+mn-ea"/>
-                <a:cs typeface="+mn-cs"/>
-              </a:defRPr>
-            </a:lvl7pPr>
-            <a:lvl8pPr marL="2571750" indent="-171450" algn="l" defTabSz="685800" rtl="0" eaLnBrk="1" latinLnBrk="0" hangingPunct="1">
-              <a:lnSpc>
-                <a:spcPct val="90000"/>
-              </a:lnSpc>
-              <a:spcBef>
-                <a:spcPts val="375"/>
-              </a:spcBef>
-              <a:buFont typeface="Arial" panose="020B0604020202020204" pitchFamily="34" charset="0"/>
-              <a:buChar char="•"/>
-              <a:defRPr sz="1350" kern="1200">
-                <a:solidFill>
-                  <a:schemeClr val="tx1"/>
-                </a:solidFill>
-                <a:latin typeface="+mn-lt"/>
-                <a:ea typeface="+mn-ea"/>
-                <a:cs typeface="+mn-cs"/>
-              </a:defRPr>
-            </a:lvl8pPr>
-            <a:lvl9pPr marL="2914650" indent="-171450" algn="l" defTabSz="685800" rtl="0" eaLnBrk="1" latinLnBrk="0" hangingPunct="1">
-              <a:lnSpc>
-                <a:spcPct val="90000"/>
-              </a:lnSpc>
-              <a:spcBef>
-                <a:spcPts val="375"/>
-              </a:spcBef>
-              <a:buFont typeface="Arial" panose="020B0604020202020204" pitchFamily="34" charset="0"/>
-              <a:buChar char="•"/>
-              <a:defRPr sz="1350" kern="1200">
-                <a:solidFill>
-                  <a:schemeClr val="tx1"/>
-                </a:solidFill>
-                <a:latin typeface="+mn-lt"/>
-                <a:ea typeface="+mn-ea"/>
-                <a:cs typeface="+mn-cs"/>
-              </a:defRPr>
-            </a:lvl9pPr>
-          </a:lstStyle>
-          <a:p>
-            <a:pPr marL="0" indent="0" algn="ctr">
-              <a:buNone/>
-            </a:pPr>
-            <a:r>
-              <a:rPr lang="en-AU" sz="3200" dirty="0" smtClean="0">
-                <a:solidFill>
-                  <a:schemeClr val="tx2"/>
-                </a:solidFill>
-                <a:latin typeface="+mj-lt"/>
-              </a:rPr>
-              <a:t>Results</a:t>
-            </a:r>
-            <a:endParaRPr lang="en-AU" sz="3200" dirty="0" smtClean="0">
-              <a:solidFill>
-                <a:schemeClr val="tx2"/>
-              </a:solidFill>
-              <a:latin typeface="+mj-lt"/>
-            </a:endParaRPr>
-          </a:p>
-        </p:txBody>
-      </p:sp>
-      <p:sp>
-        <p:nvSpPr>
-          <p:cNvPr id="5" name="Oval 57"/>
-          <p:cNvSpPr>
-            <a:spLocks noChangeAspect="1"/>
-          </p:cNvSpPr>
-          <p:nvPr/>
-        </p:nvSpPr>
-        <p:spPr>
-          <a:xfrm>
-            <a:off x="5696696" y="2492117"/>
-            <a:ext cx="798602" cy="798600"/>
-          </a:xfrm>
-          <a:prstGeom prst="ellipse">
-            <a:avLst/>
-          </a:prstGeom>
-          <a:solidFill>
-            <a:schemeClr val="accent5"/>
-          </a:solidFill>
-          <a:ln>
-            <a:noFill/>
-          </a:ln>
-        </p:spPr>
-        <p:style>
-          <a:lnRef idx="2">
-            <a:schemeClr val="accent1">
-              <a:shade val="50000"/>
-            </a:schemeClr>
-          </a:lnRef>
-          <a:fillRef idx="1">
-            <a:schemeClr val="accent1"/>
-          </a:fillRef>
-          <a:effectRef idx="0">
-            <a:schemeClr val="accent1"/>
-          </a:effectRef>
-          <a:fontRef idx="minor">
-            <a:schemeClr val="lt1"/>
-          </a:fontRef>
-        </p:style>
-        <p:txBody>
-          <a:bodyPr rot="0" spcFirstLastPara="0" vertOverflow="overflow" horzOverflow="overflow" vert="horz" wrap="square" lIns="91440" tIns="45720" rIns="91440" bIns="45720" numCol="1" spcCol="0" rtlCol="0" fromWordArt="0" anchor="ctr" anchorCtr="0" forceAA="0" compatLnSpc="1">
-            <a:prstTxWarp prst="textNoShape">
-              <a:avLst/>
-            </a:prstTxWarp>
-            <a:noAutofit/>
-          </a:bodyPr>
-          <a:lstStyle/>
-          <a:p>
-            <a:pPr algn="ctr"/>
-            <a:r>
-              <a:rPr lang="en-US" sz="2000" dirty="0" smtClean="0">
-                <a:solidFill>
-                  <a:schemeClr val="bg1"/>
-                </a:solidFill>
-                <a:latin typeface="FontAwesome" pitchFamily="2" charset="0"/>
-              </a:rPr>
-              <a:t></a:t>
-            </a:r>
-            <a:endParaRPr lang="en-US" sz="2000" dirty="0">
-              <a:solidFill>
-                <a:schemeClr val="bg1"/>
-              </a:solidFill>
-              <a:latin typeface="FontAwesome" pitchFamily="2" charset="0"/>
-            </a:endParaRPr>
-          </a:p>
-        </p:txBody>
-      </p:sp>
-    </p:spTree>
-    <p:extLst>
-      <p:ext uri="{BB962C8B-B14F-4D97-AF65-F5344CB8AC3E}">
-        <p14:creationId xmlns:p14="http://schemas.microsoft.com/office/powerpoint/2010/main" val="3335418898"/>
-      </p:ext>
-    </p:extLst>
-  </p:cSld>
-  <p:clrMapOvr>
-    <a:masterClrMapping/>
-  </p:clrMapOvr>
-  <p:timing>
-    <p:tnLst>
-      <p:par>
-        <p:cTn id="1" dur="indefinite" restart="never" nodeType="tmRoot"/>
-      </p:par>
-    </p:tnLst>
-  </p:timing>
-</p:sld>
-</file>
-
-<file path=ppt/slides/slide9.xml><?xml version="1.0" encoding="utf-8"?>
-<p:sld xmlns:a="http://schemas.openxmlformats.org/drawingml/2006/main" xmlns:r="http://schemas.openxmlformats.org/officeDocument/2006/relationships" xmlns:p="http://schemas.openxmlformats.org/presentationml/2006/main">
-  <p:cSld>
-    <p:spTree>
-      <p:nvGrpSpPr>
-        <p:cNvPr id="1" name=""/>
-        <p:cNvGrpSpPr/>
-        <p:nvPr/>
-      </p:nvGrpSpPr>
-      <p:grpSpPr>
-        <a:xfrm>
-          <a:off x="0" y="0"/>
-          <a:ext cx="0" cy="0"/>
-          <a:chOff x="0" y="0"/>
-          <a:chExt cx="0" cy="0"/>
-        </a:xfrm>
-      </p:grpSpPr>
-      <p:sp>
-        <p:nvSpPr>
-          <p:cNvPr id="2" name="Foliennummernplatzhalter 1"/>
-          <p:cNvSpPr>
-            <a:spLocks noGrp="1"/>
-          </p:cNvSpPr>
-          <p:nvPr>
-            <p:ph type="sldNum" sz="quarter" idx="12"/>
-          </p:nvPr>
-        </p:nvSpPr>
-        <p:spPr/>
-        <p:txBody>
-          <a:bodyPr/>
-          <a:lstStyle/>
-          <a:p>
-            <a:fld id="{FCEE2C88-6C8F-484D-AF69-578F576B1F44}" type="slidenum">
-              <a:rPr lang="en-US" smtClean="0"/>
-              <a:pPr/>
-              <a:t>9</a:t>
-            </a:fld>
-            <a:endParaRPr lang="en-US" dirty="0"/>
-          </a:p>
-        </p:txBody>
-      </p:sp>
-      <p:grpSp>
-        <p:nvGrpSpPr>
-          <p:cNvPr id="6" name="Gruppieren 5"/>
-          <p:cNvGrpSpPr/>
-          <p:nvPr/>
-        </p:nvGrpSpPr>
-        <p:grpSpPr>
-          <a:xfrm>
-            <a:off x="3718030" y="2462654"/>
-            <a:ext cx="4755935" cy="1525476"/>
-            <a:chOff x="3718030" y="2199857"/>
-            <a:chExt cx="4755935" cy="1525476"/>
-          </a:xfrm>
-        </p:grpSpPr>
-        <p:sp>
-          <p:nvSpPr>
-            <p:cNvPr id="3" name="Text Placeholder 33"/>
-            <p:cNvSpPr txBox="1">
-              <a:spLocks/>
-            </p:cNvSpPr>
-            <p:nvPr/>
-          </p:nvSpPr>
-          <p:spPr>
-            <a:xfrm>
-              <a:off x="3718030" y="3225392"/>
-              <a:ext cx="4755935" cy="499941"/>
-            </a:xfrm>
-            <a:prstGeom prst="rect">
-              <a:avLst/>
-            </a:prstGeom>
-          </p:spPr>
-          <p:txBody>
-            <a:bodyPr lIns="0" tIns="0" rIns="0" bIns="0"/>
-            <a:lstStyle>
-              <a:lvl1pPr marL="171450" indent="-171450" algn="l" defTabSz="685800" rtl="0" eaLnBrk="1" latinLnBrk="0" hangingPunct="1">
-                <a:lnSpc>
-                  <a:spcPct val="90000"/>
-                </a:lnSpc>
-                <a:spcBef>
-                  <a:spcPts val="750"/>
-                </a:spcBef>
-                <a:buFont typeface="Arial" panose="020B0604020202020204" pitchFamily="34" charset="0"/>
-                <a:buChar char="•"/>
-                <a:defRPr sz="2100" kern="1200">
-                  <a:solidFill>
-                    <a:schemeClr val="tx1"/>
-                  </a:solidFill>
-                  <a:latin typeface="Neris Thin" panose="00000300000000000000" pitchFamily="50" charset="0"/>
-                  <a:ea typeface="+mn-ea"/>
-                  <a:cs typeface="+mn-cs"/>
-                </a:defRPr>
-              </a:lvl1pPr>
-              <a:lvl2pPr marL="514350" indent="-171450" algn="l" defTabSz="685800" rtl="0" eaLnBrk="1" latinLnBrk="0" hangingPunct="1">
-                <a:lnSpc>
-                  <a:spcPct val="90000"/>
-                </a:lnSpc>
-                <a:spcBef>
-                  <a:spcPts val="375"/>
-                </a:spcBef>
-                <a:buFont typeface="Arial" panose="020B0604020202020204" pitchFamily="34" charset="0"/>
-                <a:buChar char="•"/>
-                <a:defRPr sz="1800" kern="1200">
-                  <a:solidFill>
-                    <a:schemeClr val="tx1"/>
-                  </a:solidFill>
-                  <a:latin typeface="Neris Thin" panose="00000300000000000000" pitchFamily="50" charset="0"/>
-                  <a:ea typeface="+mn-ea"/>
-                  <a:cs typeface="+mn-cs"/>
-                </a:defRPr>
-              </a:lvl2pPr>
-              <a:lvl3pPr marL="857250" indent="-171450" algn="l" defTabSz="685800" rtl="0" eaLnBrk="1" latinLnBrk="0" hangingPunct="1">
-                <a:lnSpc>
-                  <a:spcPct val="90000"/>
-                </a:lnSpc>
-                <a:spcBef>
-                  <a:spcPts val="375"/>
-                </a:spcBef>
-                <a:buFont typeface="Arial" panose="020B0604020202020204" pitchFamily="34" charset="0"/>
-                <a:buChar char="•"/>
-                <a:defRPr sz="1500" kern="1200">
-                  <a:solidFill>
-                    <a:schemeClr val="tx1"/>
-                  </a:solidFill>
-                  <a:latin typeface="Neris Thin" panose="00000300000000000000" pitchFamily="50" charset="0"/>
-                  <a:ea typeface="+mn-ea"/>
-                  <a:cs typeface="+mn-cs"/>
-                </a:defRPr>
-              </a:lvl3pPr>
-              <a:lvl4pPr marL="1200150" indent="-171450" algn="l" defTabSz="685800" rtl="0" eaLnBrk="1" latinLnBrk="0" hangingPunct="1">
-                <a:lnSpc>
-                  <a:spcPct val="90000"/>
-                </a:lnSpc>
-                <a:spcBef>
-                  <a:spcPts val="375"/>
-                </a:spcBef>
-                <a:buFont typeface="Arial" panose="020B0604020202020204" pitchFamily="34" charset="0"/>
-                <a:buChar char="•"/>
-                <a:defRPr sz="1350" kern="1200">
-                  <a:solidFill>
-                    <a:schemeClr val="tx1"/>
-                  </a:solidFill>
-                  <a:latin typeface="Neris Thin" panose="00000300000000000000" pitchFamily="50" charset="0"/>
-                  <a:ea typeface="+mn-ea"/>
-                  <a:cs typeface="+mn-cs"/>
-                </a:defRPr>
-              </a:lvl4pPr>
-              <a:lvl5pPr marL="1543050" indent="-171450" algn="l" defTabSz="685800" rtl="0" eaLnBrk="1" latinLnBrk="0" hangingPunct="1">
-                <a:lnSpc>
-                  <a:spcPct val="90000"/>
-                </a:lnSpc>
-                <a:spcBef>
-                  <a:spcPts val="375"/>
-                </a:spcBef>
-                <a:buFont typeface="Arial" panose="020B0604020202020204" pitchFamily="34" charset="0"/>
-                <a:buChar char="•"/>
-                <a:defRPr sz="1350" kern="1200">
-                  <a:solidFill>
-                    <a:schemeClr val="tx1"/>
-                  </a:solidFill>
-                  <a:latin typeface="Neris Thin" panose="00000300000000000000" pitchFamily="50" charset="0"/>
-                  <a:ea typeface="+mn-ea"/>
-                  <a:cs typeface="+mn-cs"/>
-                </a:defRPr>
-              </a:lvl5pPr>
-              <a:lvl6pPr marL="1885950" indent="-171450" algn="l" defTabSz="685800" rtl="0" eaLnBrk="1" latinLnBrk="0" hangingPunct="1">
-                <a:lnSpc>
-                  <a:spcPct val="90000"/>
-                </a:lnSpc>
-                <a:spcBef>
-                  <a:spcPts val="375"/>
-                </a:spcBef>
-                <a:buFont typeface="Arial" panose="020B0604020202020204" pitchFamily="34" charset="0"/>
-                <a:buChar char="•"/>
-                <a:defRPr sz="1350" kern="1200">
-                  <a:solidFill>
-                    <a:schemeClr val="tx1"/>
-                  </a:solidFill>
-                  <a:latin typeface="+mn-lt"/>
-                  <a:ea typeface="+mn-ea"/>
-                  <a:cs typeface="+mn-cs"/>
-                </a:defRPr>
-              </a:lvl6pPr>
-              <a:lvl7pPr marL="2228850" indent="-171450" algn="l" defTabSz="685800" rtl="0" eaLnBrk="1" latinLnBrk="0" hangingPunct="1">
-                <a:lnSpc>
-                  <a:spcPct val="90000"/>
-                </a:lnSpc>
-                <a:spcBef>
-                  <a:spcPts val="375"/>
-                </a:spcBef>
-                <a:buFont typeface="Arial" panose="020B0604020202020204" pitchFamily="34" charset="0"/>
-                <a:buChar char="•"/>
-                <a:defRPr sz="1350" kern="1200">
-                  <a:solidFill>
-                    <a:schemeClr val="tx1"/>
-                  </a:solidFill>
-                  <a:latin typeface="+mn-lt"/>
-                  <a:ea typeface="+mn-ea"/>
-                  <a:cs typeface="+mn-cs"/>
-                </a:defRPr>
-              </a:lvl7pPr>
-              <a:lvl8pPr marL="2571750" indent="-171450" algn="l" defTabSz="685800" rtl="0" eaLnBrk="1" latinLnBrk="0" hangingPunct="1">
-                <a:lnSpc>
-                  <a:spcPct val="90000"/>
-                </a:lnSpc>
-                <a:spcBef>
-                  <a:spcPts val="375"/>
-                </a:spcBef>
-                <a:buFont typeface="Arial" panose="020B0604020202020204" pitchFamily="34" charset="0"/>
-                <a:buChar char="•"/>
-                <a:defRPr sz="1350" kern="1200">
-                  <a:solidFill>
-                    <a:schemeClr val="tx1"/>
-                  </a:solidFill>
-                  <a:latin typeface="+mn-lt"/>
-                  <a:ea typeface="+mn-ea"/>
-                  <a:cs typeface="+mn-cs"/>
-                </a:defRPr>
-              </a:lvl8pPr>
-              <a:lvl9pPr marL="2914650" indent="-171450" algn="l" defTabSz="685800" rtl="0" eaLnBrk="1" latinLnBrk="0" hangingPunct="1">
-                <a:lnSpc>
-                  <a:spcPct val="90000"/>
-                </a:lnSpc>
-                <a:spcBef>
-                  <a:spcPts val="375"/>
-                </a:spcBef>
-                <a:buFont typeface="Arial" panose="020B0604020202020204" pitchFamily="34" charset="0"/>
-                <a:buChar char="•"/>
-                <a:defRPr sz="1350" kern="1200">
-                  <a:solidFill>
-                    <a:schemeClr val="tx1"/>
-                  </a:solidFill>
-                  <a:latin typeface="+mn-lt"/>
-                  <a:ea typeface="+mn-ea"/>
-                  <a:cs typeface="+mn-cs"/>
-                </a:defRPr>
-              </a:lvl9pPr>
-            </a:lstStyle>
-            <a:p>
-              <a:pPr marL="0" indent="0" algn="ctr">
-                <a:buNone/>
-              </a:pPr>
-              <a:r>
-                <a:rPr lang="en-AU" sz="3200" dirty="0" smtClean="0">
-                  <a:solidFill>
-                    <a:schemeClr val="tx2"/>
-                  </a:solidFill>
-                  <a:latin typeface="+mj-lt"/>
-                </a:rPr>
-                <a:t>Future Work</a:t>
-              </a:r>
-            </a:p>
-          </p:txBody>
-        </p:sp>
-        <p:sp>
-          <p:nvSpPr>
-            <p:cNvPr id="5" name="Oval 53"/>
-            <p:cNvSpPr>
-              <a:spLocks noChangeAspect="1"/>
-            </p:cNvSpPr>
-            <p:nvPr/>
-          </p:nvSpPr>
-          <p:spPr>
-            <a:xfrm>
-              <a:off x="5674088" y="2199857"/>
-              <a:ext cx="843821" cy="843819"/>
-            </a:xfrm>
-            <a:prstGeom prst="ellipse">
-              <a:avLst/>
-            </a:prstGeom>
-            <a:solidFill>
-              <a:schemeClr val="accent6"/>
-            </a:solidFill>
-            <a:ln>
-              <a:noFill/>
-            </a:ln>
-          </p:spPr>
-          <p:style>
-            <a:lnRef idx="2">
-              <a:schemeClr val="accent1">
-                <a:shade val="50000"/>
-              </a:schemeClr>
-            </a:lnRef>
-            <a:fillRef idx="1">
-              <a:schemeClr val="accent1"/>
-            </a:fillRef>
-            <a:effectRef idx="0">
-              <a:schemeClr val="accent1"/>
-            </a:effectRef>
-            <a:fontRef idx="minor">
-              <a:schemeClr val="lt1"/>
-            </a:fontRef>
-          </p:style>
-          <p:txBody>
-            <a:bodyPr rot="0" spcFirstLastPara="0" vertOverflow="overflow" horzOverflow="overflow" vert="horz" wrap="square" lIns="91440" tIns="45720" rIns="91440" bIns="45720" numCol="1" spcCol="0" rtlCol="0" fromWordArt="0" anchor="ctr" anchorCtr="0" forceAA="0" compatLnSpc="1">
-              <a:prstTxWarp prst="textNoShape">
-                <a:avLst/>
-              </a:prstTxWarp>
-              <a:noAutofit/>
-            </a:bodyPr>
-            <a:lstStyle/>
-            <a:p>
-              <a:pPr algn="ctr"/>
-              <a:r>
-                <a:rPr lang="en-AU" sz="2000" dirty="0">
-                  <a:solidFill>
-                    <a:srgbClr val="FFFFFF"/>
-                  </a:solidFill>
-                  <a:latin typeface="FontAwesome" pitchFamily="2" charset="0"/>
-                </a:rPr>
-                <a:t></a:t>
-              </a:r>
-              <a:endParaRPr lang="en-AU" sz="2000" dirty="0">
-                <a:solidFill>
-                  <a:schemeClr val="bg1"/>
-                </a:solidFill>
-                <a:latin typeface="FontAwesome" pitchFamily="2" charset="0"/>
-              </a:endParaRPr>
-            </a:p>
-          </p:txBody>
-        </p:sp>
-      </p:grpSp>
-    </p:spTree>
-    <p:extLst>
-      <p:ext uri="{BB962C8B-B14F-4D97-AF65-F5344CB8AC3E}">
-        <p14:creationId xmlns:p14="http://schemas.microsoft.com/office/powerpoint/2010/main" val="1119260509"/>
       </p:ext>
     </p:extLst>
   </p:cSld>

</xml_diff>

<commit_message>
fixed formatting of java code
</commit_message>
<xml_diff>
--- a/GroupF/Presentations/Final Presentation.pptx
+++ b/GroupF/Presentations/Final Presentation.pptx
@@ -4937,8 +4937,8 @@
         </p:nvSpPr>
         <p:spPr>
           <a:xfrm>
-            <a:off x="7151742" y="3272310"/>
-            <a:ext cx="4617155" cy="2308324"/>
+            <a:off x="6964348" y="3272310"/>
+            <a:ext cx="4938297" cy="2308324"/>
           </a:xfrm>
           <a:prstGeom prst="rect">
             <a:avLst/>
@@ -5032,6 +5032,7 @@
             </a:endParaRPr>
           </a:p>
           <a:p>
+            <a:pPr lvl="1"/>
             <a:r>
               <a:rPr lang="de-DE" b="1" dirty="0" smtClean="0">
                 <a:solidFill>
@@ -5085,6 +5086,7 @@
             </a:endParaRPr>
           </a:p>
           <a:p>
+            <a:pPr lvl="1"/>
             <a:r>
               <a:rPr lang="de-DE" b="1" dirty="0" smtClean="0">
                 <a:solidFill>
@@ -5132,6 +5134,7 @@
             </a:r>
           </a:p>
           <a:p>
+            <a:pPr lvl="1"/>
             <a:r>
               <a:rPr lang="de-DE" b="1" dirty="0" smtClean="0">
                 <a:solidFill>
@@ -5179,6 +5182,7 @@
             </a:r>
           </a:p>
           <a:p>
+            <a:pPr lvl="1"/>
             <a:r>
               <a:rPr lang="de-DE" b="1" dirty="0">
                 <a:solidFill>
@@ -5223,6 +5227,7 @@
             </a:endParaRPr>
           </a:p>
           <a:p>
+            <a:pPr lvl="1"/>
             <a:r>
               <a:rPr lang="de-DE" b="1" dirty="0" smtClean="0">
                 <a:solidFill>
@@ -5270,6 +5275,7 @@
             </a:r>
           </a:p>
           <a:p>
+            <a:pPr lvl="1"/>
             <a:r>
               <a:rPr lang="de-DE" b="1" dirty="0" smtClean="0">
                 <a:solidFill>
@@ -6726,7 +6732,7 @@
         </p:nvSpPr>
         <p:spPr>
           <a:xfrm>
-            <a:off x="1083316" y="1539664"/>
+            <a:off x="1096016" y="1539664"/>
             <a:ext cx="10014367" cy="4385816"/>
           </a:xfrm>
           <a:prstGeom prst="rect">

</xml_diff>

<commit_message>
fixed some formatting, added project structure slide
</commit_message>
<xml_diff>
--- a/GroupF/Presentations/Final Presentation.pptx
+++ b/GroupF/Presentations/Final Presentation.pptx
@@ -258,7 +258,7 @@
           <a:p>
             <a:fld id="{2AD1A594-041B-449E-89BC-5A6CB1F5A9AB}" type="datetimeFigureOut">
               <a:rPr lang="id-ID" smtClean="0"/>
-              <a:t>14/10/2015</a:t>
+              <a:t>18/10/2015</a:t>
             </a:fld>
             <a:endParaRPr lang="id-ID"/>
           </a:p>
@@ -423,7 +423,7 @@
           <a:p>
             <a:fld id="{3E3CCC32-3486-46B1-A8B7-921064D8D59D}" type="datetimeFigureOut">
               <a:rPr lang="en-US" smtClean="0"/>
-              <a:t>10/14/2015</a:t>
+              <a:t>10/18/2015</a:t>
             </a:fld>
             <a:endParaRPr lang="en-US"/>
           </a:p>
@@ -4389,7 +4389,13 @@
               <a:rPr lang="en-US" sz="2800" dirty="0" smtClean="0">
                 <a:ea typeface="Roboto medium" pitchFamily="2" charset="0"/>
               </a:rPr>
-              <a:t>Basic OAuth2 authentication mechanism. Must be configured in salesforce as external app. </a:t>
+              <a:t>User-agent authentication flow. </a:t>
+            </a:r>
+            <a:r>
+              <a:rPr lang="en-US" sz="2800" dirty="0" smtClean="0">
+                <a:ea typeface="Roboto medium" pitchFamily="2" charset="0"/>
+              </a:rPr>
+              <a:t>Must be configured in salesforce as external app. </a:t>
             </a:r>
           </a:p>
           <a:p>
@@ -4446,8 +4452,8 @@
         </p:blipFill>
         <p:spPr>
           <a:xfrm>
-            <a:off x="6447665" y="406889"/>
-            <a:ext cx="4825932" cy="6158187"/>
+            <a:off x="7010401" y="909713"/>
+            <a:ext cx="3700460" cy="5152540"/>
           </a:xfrm>
           <a:prstGeom prst="rect">
             <a:avLst/>
@@ -4479,7 +4485,15 @@
             <a:pPr algn="ctr"/>
             <a:r>
               <a:rPr lang="en-US" sz="1000" dirty="0" smtClean="0"/>
-              <a:t>Salesforce OAuth2 authentication [1]</a:t>
+              <a:t>Salesforce </a:t>
+            </a:r>
+            <a:r>
+              <a:rPr lang="en-US" sz="1000" dirty="0" smtClean="0"/>
+              <a:t>user-agent authentication flow [1</a:t>
+            </a:r>
+            <a:r>
+              <a:rPr lang="en-US" sz="1000" dirty="0" smtClean="0"/>
+              <a:t>]</a:t>
             </a:r>
             <a:endParaRPr lang="de-DE" sz="1000" dirty="0"/>
           </a:p>
@@ -4665,13 +4679,7 @@
               <a:rPr lang="en-US" sz="2800" b="1" dirty="0" err="1" smtClean="0">
                 <a:ea typeface="Roboto medium" pitchFamily="2" charset="0"/>
               </a:rPr>
-              <a:t>foaf</a:t>
-            </a:r>
-            <a:r>
-              <a:rPr lang="en-US" sz="2800" b="1" dirty="0" err="1" smtClean="0">
-                <a:ea typeface="Roboto medium" pitchFamily="2" charset="0"/>
-              </a:rPr>
-              <a:t>:person</a:t>
+              <a:t>foaf:person</a:t>
             </a:r>
             <a:r>
               <a:rPr lang="en-US" sz="2800" dirty="0" smtClean="0">
@@ -5526,33 +5534,19 @@
       </p:sp>
       <p:sp>
         <p:nvSpPr>
-          <p:cNvPr id="6" name="Rechteck 5"/>
+          <p:cNvPr id="7" name="Rechteck 6"/>
           <p:cNvSpPr/>
           <p:nvPr/>
         </p:nvSpPr>
         <p:spPr>
           <a:xfrm>
-            <a:off x="1521293" y="3000866"/>
-            <a:ext cx="9539111" cy="3416320"/>
+            <a:off x="1038578" y="2841423"/>
+            <a:ext cx="10430934" cy="3416320"/>
           </a:xfrm>
           <a:prstGeom prst="rect">
             <a:avLst/>
           </a:prstGeom>
         </p:spPr>
-        <p:style>
-          <a:lnRef idx="2">
-            <a:schemeClr val="dk1"/>
-          </a:lnRef>
-          <a:fillRef idx="1">
-            <a:schemeClr val="lt1"/>
-          </a:fillRef>
-          <a:effectRef idx="0">
-            <a:schemeClr val="dk1"/>
-          </a:effectRef>
-          <a:fontRef idx="minor">
-            <a:schemeClr val="dk1"/>
-          </a:fontRef>
-        </p:style>
         <p:txBody>
           <a:bodyPr wrap="square">
             <a:spAutoFit/>
@@ -5560,716 +5554,869 @@
           <a:lstStyle/>
           <a:p>
             <a:r>
-              <a:rPr lang="de-DE" b="1" dirty="0">
+              <a:rPr lang="en-GB" b="1" dirty="0">
                 <a:solidFill>
                   <a:srgbClr val="7F0055"/>
                 </a:solidFill>
-                <a:latin typeface="Courier New" panose="02070309020205020404" pitchFamily="49" charset="0"/>
+                <a:latin typeface="Consolas" panose="020B0609020204030204" pitchFamily="49" charset="0"/>
               </a:rPr>
               <a:t>public</a:t>
             </a:r>
             <a:r>
-              <a:rPr lang="de-DE" b="1" dirty="0">
+              <a:rPr lang="en-GB" b="1" dirty="0">
                 <a:solidFill>
                   <a:srgbClr val="000000"/>
                 </a:solidFill>
-                <a:latin typeface="Courier New" panose="02070309020205020404" pitchFamily="49" charset="0"/>
+                <a:latin typeface="Consolas" panose="020B0609020204030204" pitchFamily="49" charset="0"/>
               </a:rPr>
               <a:t> String </a:t>
             </a:r>
             <a:r>
-              <a:rPr lang="de-DE" b="1" dirty="0" err="1">
+              <a:rPr lang="en-GB" b="1" dirty="0" err="1">
                 <a:solidFill>
                   <a:srgbClr val="000000"/>
+                </a:solidFill>
+                <a:latin typeface="Consolas" panose="020B0609020204030204" pitchFamily="49" charset="0"/>
+              </a:rPr>
+              <a:t>toRdf</a:t>
+            </a:r>
+            <a:r>
+              <a:rPr lang="en-GB" b="1" dirty="0">
+                <a:solidFill>
+                  <a:srgbClr val="000000"/>
+                </a:solidFill>
+                <a:latin typeface="Consolas" panose="020B0609020204030204" pitchFamily="49" charset="0"/>
+              </a:rPr>
+              <a:t>() {</a:t>
+            </a:r>
+          </a:p>
+          <a:p>
+            <a:pPr lvl="1"/>
+            <a:r>
+              <a:rPr lang="en-GB" dirty="0">
+                <a:solidFill>
+                  <a:srgbClr val="000000"/>
+                </a:solidFill>
+                <a:latin typeface="Consolas" panose="020B0609020204030204" pitchFamily="49" charset="0"/>
+              </a:rPr>
+              <a:t>Model </a:t>
+            </a:r>
+            <a:r>
+              <a:rPr lang="en-GB" dirty="0" err="1">
+                <a:solidFill>
+                  <a:srgbClr val="6A3E3E"/>
+                </a:solidFill>
+                <a:latin typeface="Consolas" panose="020B0609020204030204" pitchFamily="49" charset="0"/>
+              </a:rPr>
+              <a:t>model</a:t>
+            </a:r>
+            <a:r>
+              <a:rPr lang="en-GB" dirty="0">
+                <a:solidFill>
+                  <a:srgbClr val="000000"/>
+                </a:solidFill>
+                <a:latin typeface="Consolas" panose="020B0609020204030204" pitchFamily="49" charset="0"/>
+              </a:rPr>
+              <a:t> = </a:t>
+            </a:r>
+            <a:r>
+              <a:rPr lang="en-GB" dirty="0" err="1">
+                <a:solidFill>
+                  <a:srgbClr val="000000"/>
+                </a:solidFill>
+                <a:latin typeface="Consolas" panose="020B0609020204030204" pitchFamily="49" charset="0"/>
+              </a:rPr>
+              <a:t>ModelFactory.</a:t>
+            </a:r>
+            <a:r>
+              <a:rPr lang="en-GB" i="1" dirty="0" err="1">
+                <a:solidFill>
+                  <a:srgbClr val="000000"/>
+                </a:solidFill>
+                <a:latin typeface="Consolas" panose="020B0609020204030204" pitchFamily="49" charset="0"/>
+              </a:rPr>
+              <a:t>createDefaultModel</a:t>
+            </a:r>
+            <a:r>
+              <a:rPr lang="en-GB" i="1" dirty="0">
+                <a:solidFill>
+                  <a:srgbClr val="000000"/>
+                </a:solidFill>
+                <a:latin typeface="Consolas" panose="020B0609020204030204" pitchFamily="49" charset="0"/>
+              </a:rPr>
+              <a:t>();</a:t>
+            </a:r>
+          </a:p>
+          <a:p>
+            <a:pPr lvl="1"/>
+            <a:r>
+              <a:rPr lang="en-GB" dirty="0">
+                <a:solidFill>
+                  <a:srgbClr val="000000"/>
+                </a:solidFill>
+                <a:latin typeface="Consolas" panose="020B0609020204030204" pitchFamily="49" charset="0"/>
+              </a:rPr>
+              <a:t>Resource </a:t>
+            </a:r>
+            <a:r>
+              <a:rPr lang="en-GB" dirty="0" err="1">
+                <a:solidFill>
+                  <a:srgbClr val="6A3E3E"/>
+                </a:solidFill>
+                <a:highlight>
+                  <a:srgbClr val="F0D8A8"/>
+                </a:highlight>
+                <a:latin typeface="Consolas" panose="020B0609020204030204" pitchFamily="49" charset="0"/>
+              </a:rPr>
+              <a:t>personResource</a:t>
+            </a:r>
+            <a:r>
+              <a:rPr lang="en-GB" dirty="0">
+                <a:solidFill>
+                  <a:srgbClr val="000000"/>
+                </a:solidFill>
+                <a:highlight>
+                  <a:srgbClr val="F0D8A8"/>
+                </a:highlight>
+                <a:latin typeface="Consolas" panose="020B0609020204030204" pitchFamily="49" charset="0"/>
+              </a:rPr>
+              <a:t> = </a:t>
+            </a:r>
+            <a:r>
+              <a:rPr lang="en-GB" dirty="0" err="1">
+                <a:solidFill>
+                  <a:srgbClr val="000000"/>
+                </a:solidFill>
+                <a:highlight>
+                  <a:srgbClr val="F0D8A8"/>
+                </a:highlight>
+                <a:latin typeface="Consolas" panose="020B0609020204030204" pitchFamily="49" charset="0"/>
+              </a:rPr>
+              <a:t>ResourceFactory.</a:t>
+            </a:r>
+            <a:r>
+              <a:rPr lang="en-GB" i="1" dirty="0" err="1">
+                <a:solidFill>
+                  <a:srgbClr val="000000"/>
+                </a:solidFill>
+                <a:highlight>
+                  <a:srgbClr val="F0D8A8"/>
+                </a:highlight>
+                <a:latin typeface="Consolas" panose="020B0609020204030204" pitchFamily="49" charset="0"/>
+              </a:rPr>
+              <a:t>createResource</a:t>
+            </a:r>
+            <a:r>
+              <a:rPr lang="en-GB" i="1" dirty="0">
+                <a:solidFill>
+                  <a:srgbClr val="000000"/>
+                </a:solidFill>
+                <a:highlight>
+                  <a:srgbClr val="F0D8A8"/>
+                </a:highlight>
+                <a:latin typeface="Consolas" panose="020B0609020204030204" pitchFamily="49" charset="0"/>
+              </a:rPr>
+              <a:t>(</a:t>
+            </a:r>
+            <a:r>
+              <a:rPr lang="en-GB" i="1" dirty="0" err="1">
+                <a:solidFill>
+                  <a:srgbClr val="000000"/>
+                </a:solidFill>
+                <a:highlight>
+                  <a:srgbClr val="F0D8A8"/>
+                </a:highlight>
+                <a:latin typeface="Consolas" panose="020B0609020204030204" pitchFamily="49" charset="0"/>
+              </a:rPr>
+              <a:t>FOAF.getURI</a:t>
+            </a:r>
+            <a:r>
+              <a:rPr lang="en-GB" i="1" dirty="0">
+                <a:solidFill>
+                  <a:srgbClr val="000000"/>
+                </a:solidFill>
+                <a:highlight>
+                  <a:srgbClr val="F0D8A8"/>
+                </a:highlight>
+                <a:latin typeface="Consolas" panose="020B0609020204030204" pitchFamily="49" charset="0"/>
+              </a:rPr>
+              <a:t>()</a:t>
+            </a:r>
+          </a:p>
+          <a:p>
+            <a:pPr lvl="1"/>
+            <a:r>
+              <a:rPr lang="en-GB" dirty="0">
+                <a:solidFill>
+                  <a:srgbClr val="000000"/>
+                </a:solidFill>
+                <a:latin typeface="Consolas" panose="020B0609020204030204" pitchFamily="49" charset="0"/>
+              </a:rPr>
+              <a:t>+ </a:t>
+            </a:r>
+            <a:r>
+              <a:rPr lang="en-GB" b="1" dirty="0" err="1">
+                <a:solidFill>
+                  <a:srgbClr val="7F0055"/>
+                </a:solidFill>
+                <a:latin typeface="Consolas" panose="020B0609020204030204" pitchFamily="49" charset="0"/>
+              </a:rPr>
+              <a:t>this</a:t>
+            </a:r>
+            <a:r>
+              <a:rPr lang="en-GB" b="1" dirty="0" err="1">
+                <a:solidFill>
+                  <a:srgbClr val="000000"/>
+                </a:solidFill>
+                <a:latin typeface="Consolas" panose="020B0609020204030204" pitchFamily="49" charset="0"/>
+              </a:rPr>
+              <a:t>.getFamilyName</a:t>
+            </a:r>
+            <a:r>
+              <a:rPr lang="en-GB" b="1" dirty="0">
+                <a:solidFill>
+                  <a:srgbClr val="000000"/>
+                </a:solidFill>
+                <a:latin typeface="Consolas" panose="020B0609020204030204" pitchFamily="49" charset="0"/>
+              </a:rPr>
+              <a:t>());</a:t>
+            </a:r>
+          </a:p>
+          <a:p>
+            <a:pPr lvl="1"/>
+            <a:r>
+              <a:rPr lang="en-GB" dirty="0" err="1">
+                <a:solidFill>
+                  <a:srgbClr val="6A3E3E"/>
+                </a:solidFill>
+                <a:latin typeface="Consolas" panose="020B0609020204030204" pitchFamily="49" charset="0"/>
+              </a:rPr>
+              <a:t>model</a:t>
+            </a:r>
+            <a:r>
+              <a:rPr lang="en-GB" dirty="0" err="1">
+                <a:solidFill>
+                  <a:srgbClr val="000000"/>
+                </a:solidFill>
+                <a:latin typeface="Consolas" panose="020B0609020204030204" pitchFamily="49" charset="0"/>
+              </a:rPr>
+              <a:t>.setNsPrefix</a:t>
+            </a:r>
+            <a:r>
+              <a:rPr lang="en-GB" dirty="0">
+                <a:solidFill>
+                  <a:srgbClr val="000000"/>
+                </a:solidFill>
+                <a:latin typeface="Consolas" panose="020B0609020204030204" pitchFamily="49" charset="0"/>
+              </a:rPr>
+              <a:t>(</a:t>
+            </a:r>
+            <a:r>
+              <a:rPr lang="en-GB" dirty="0">
+                <a:solidFill>
+                  <a:srgbClr val="2A00FF"/>
+                </a:solidFill>
+                <a:latin typeface="Consolas" panose="020B0609020204030204" pitchFamily="49" charset="0"/>
+              </a:rPr>
+              <a:t>"</a:t>
+            </a:r>
+            <a:r>
+              <a:rPr lang="en-GB" dirty="0" err="1">
+                <a:solidFill>
+                  <a:srgbClr val="2A00FF"/>
+                </a:solidFill>
+                <a:latin typeface="Consolas" panose="020B0609020204030204" pitchFamily="49" charset="0"/>
+              </a:rPr>
+              <a:t>foaf</a:t>
+            </a:r>
+            <a:r>
+              <a:rPr lang="en-GB" dirty="0">
+                <a:solidFill>
+                  <a:srgbClr val="2A00FF"/>
+                </a:solidFill>
+                <a:latin typeface="Consolas" panose="020B0609020204030204" pitchFamily="49" charset="0"/>
+              </a:rPr>
+              <a:t>"</a:t>
+            </a:r>
+            <a:r>
+              <a:rPr lang="en-GB" dirty="0">
+                <a:solidFill>
+                  <a:srgbClr val="000000"/>
+                </a:solidFill>
+                <a:latin typeface="Consolas" panose="020B0609020204030204" pitchFamily="49" charset="0"/>
+              </a:rPr>
+              <a:t>, FOAF.</a:t>
+            </a:r>
+            <a:r>
+              <a:rPr lang="en-GB" b="1" i="1" dirty="0">
+                <a:solidFill>
+                  <a:srgbClr val="0000C0"/>
+                </a:solidFill>
+                <a:latin typeface="Consolas" panose="020B0609020204030204" pitchFamily="49" charset="0"/>
+              </a:rPr>
+              <a:t>NS</a:t>
+            </a:r>
+            <a:r>
+              <a:rPr lang="en-GB" b="1" i="1" dirty="0">
+                <a:solidFill>
+                  <a:srgbClr val="000000"/>
+                </a:solidFill>
+                <a:latin typeface="Consolas" panose="020B0609020204030204" pitchFamily="49" charset="0"/>
+              </a:rPr>
+              <a:t>);</a:t>
+            </a:r>
+          </a:p>
+          <a:p>
+            <a:pPr lvl="1"/>
+            <a:r>
+              <a:rPr lang="en-GB" dirty="0" err="1">
+                <a:solidFill>
+                  <a:srgbClr val="6A3E3E"/>
+                </a:solidFill>
+                <a:latin typeface="Consolas" panose="020B0609020204030204" pitchFamily="49" charset="0"/>
+              </a:rPr>
+              <a:t>model</a:t>
+            </a:r>
+            <a:r>
+              <a:rPr lang="en-GB" dirty="0" err="1">
+                <a:solidFill>
+                  <a:srgbClr val="000000"/>
+                </a:solidFill>
+                <a:latin typeface="Consolas" panose="020B0609020204030204" pitchFamily="49" charset="0"/>
+              </a:rPr>
+              <a:t>.add</a:t>
+            </a:r>
+            <a:r>
+              <a:rPr lang="en-GB" dirty="0">
+                <a:solidFill>
+                  <a:srgbClr val="000000"/>
+                </a:solidFill>
+                <a:latin typeface="Consolas" panose="020B0609020204030204" pitchFamily="49" charset="0"/>
+              </a:rPr>
+              <a:t>(</a:t>
+            </a:r>
+            <a:r>
+              <a:rPr lang="en-GB" dirty="0" err="1">
+                <a:solidFill>
+                  <a:srgbClr val="6A3E3E"/>
                 </a:solidFill>
                 <a:highlight>
                   <a:srgbClr val="D4D4D4"/>
                 </a:highlight>
-                <a:latin typeface="Courier New" panose="02070309020205020404" pitchFamily="49" charset="0"/>
-              </a:rPr>
-              <a:t>toRdf</a:t>
-            </a:r>
-            <a:r>
-              <a:rPr lang="de-DE" b="1" dirty="0">
+                <a:latin typeface="Consolas" panose="020B0609020204030204" pitchFamily="49" charset="0"/>
+              </a:rPr>
+              <a:t>personResource</a:t>
+            </a:r>
+            <a:r>
+              <a:rPr lang="en-GB" dirty="0">
                 <a:solidFill>
                   <a:srgbClr val="000000"/>
                 </a:solidFill>
                 <a:highlight>
                   <a:srgbClr val="D4D4D4"/>
                 </a:highlight>
-                <a:latin typeface="Courier New" panose="02070309020205020404" pitchFamily="49" charset="0"/>
-              </a:rPr>
-              <a:t>() {</a:t>
+                <a:latin typeface="Consolas" panose="020B0609020204030204" pitchFamily="49" charset="0"/>
+              </a:rPr>
+              <a:t>, </a:t>
+            </a:r>
+            <a:r>
+              <a:rPr lang="en-GB" dirty="0" err="1">
+                <a:solidFill>
+                  <a:srgbClr val="000000"/>
+                </a:solidFill>
+                <a:highlight>
+                  <a:srgbClr val="D4D4D4"/>
+                </a:highlight>
+                <a:latin typeface="Consolas" panose="020B0609020204030204" pitchFamily="49" charset="0"/>
+              </a:rPr>
+              <a:t>RDF.</a:t>
+            </a:r>
+            <a:r>
+              <a:rPr lang="en-GB" b="1" i="1" dirty="0" err="1">
+                <a:solidFill>
+                  <a:srgbClr val="0000C0"/>
+                </a:solidFill>
+                <a:highlight>
+                  <a:srgbClr val="D4D4D4"/>
+                </a:highlight>
+                <a:latin typeface="Consolas" panose="020B0609020204030204" pitchFamily="49" charset="0"/>
+              </a:rPr>
+              <a:t>type</a:t>
+            </a:r>
+            <a:r>
+              <a:rPr lang="en-GB" b="1" i="1" dirty="0">
+                <a:solidFill>
+                  <a:srgbClr val="000000"/>
+                </a:solidFill>
+                <a:highlight>
+                  <a:srgbClr val="D4D4D4"/>
+                </a:highlight>
+                <a:latin typeface="Consolas" panose="020B0609020204030204" pitchFamily="49" charset="0"/>
+              </a:rPr>
+              <a:t>, </a:t>
+            </a:r>
+            <a:r>
+              <a:rPr lang="en-GB" b="1" i="1" dirty="0" err="1">
+                <a:solidFill>
+                  <a:srgbClr val="000000"/>
+                </a:solidFill>
+                <a:highlight>
+                  <a:srgbClr val="D4D4D4"/>
+                </a:highlight>
+                <a:latin typeface="Consolas" panose="020B0609020204030204" pitchFamily="49" charset="0"/>
+              </a:rPr>
+              <a:t>FOAF.</a:t>
+            </a:r>
+            <a:r>
+              <a:rPr lang="en-GB" b="1" i="1" dirty="0" err="1">
+                <a:solidFill>
+                  <a:srgbClr val="0000C0"/>
+                </a:solidFill>
+                <a:highlight>
+                  <a:srgbClr val="D4D4D4"/>
+                </a:highlight>
+                <a:latin typeface="Consolas" panose="020B0609020204030204" pitchFamily="49" charset="0"/>
+              </a:rPr>
+              <a:t>Person</a:t>
+            </a:r>
+            <a:r>
+              <a:rPr lang="en-GB" b="1" i="1" dirty="0">
+                <a:solidFill>
+                  <a:srgbClr val="000000"/>
+                </a:solidFill>
+                <a:highlight>
+                  <a:srgbClr val="D4D4D4"/>
+                </a:highlight>
+                <a:latin typeface="Consolas" panose="020B0609020204030204" pitchFamily="49" charset="0"/>
+              </a:rPr>
+              <a:t>)</a:t>
             </a:r>
           </a:p>
           <a:p>
             <a:pPr lvl="1"/>
             <a:r>
-              <a:rPr lang="de-DE" dirty="0">
+              <a:rPr lang="en-GB" dirty="0" smtClean="0">
                 <a:solidFill>
                   <a:srgbClr val="000000"/>
                 </a:solidFill>
-                <a:latin typeface="Courier New" panose="02070309020205020404" pitchFamily="49" charset="0"/>
-              </a:rPr>
-              <a:t>Model </a:t>
-            </a:r>
-            <a:r>
-              <a:rPr lang="de-DE" dirty="0" err="1">
+                <a:latin typeface="Consolas" panose="020B0609020204030204" pitchFamily="49" charset="0"/>
+              </a:rPr>
+              <a:t>	  .</a:t>
+            </a:r>
+            <a:r>
+              <a:rPr lang="en-GB" dirty="0">
+                <a:solidFill>
+                  <a:srgbClr val="000000"/>
+                </a:solidFill>
+                <a:latin typeface="Consolas" panose="020B0609020204030204" pitchFamily="49" charset="0"/>
+              </a:rPr>
+              <a:t>add(</a:t>
+            </a:r>
+            <a:r>
+              <a:rPr lang="en-GB" dirty="0" err="1">
                 <a:solidFill>
                   <a:srgbClr val="6A3E3E"/>
                 </a:solidFill>
-                <a:latin typeface="Courier New" panose="02070309020205020404" pitchFamily="49" charset="0"/>
+                <a:highlight>
+                  <a:srgbClr val="D4D4D4"/>
+                </a:highlight>
+                <a:latin typeface="Consolas" panose="020B0609020204030204" pitchFamily="49" charset="0"/>
+              </a:rPr>
+              <a:t>personResource</a:t>
+            </a:r>
+            <a:r>
+              <a:rPr lang="en-GB" dirty="0">
+                <a:solidFill>
+                  <a:srgbClr val="000000"/>
+                </a:solidFill>
+                <a:highlight>
+                  <a:srgbClr val="D4D4D4"/>
+                </a:highlight>
+                <a:latin typeface="Consolas" panose="020B0609020204030204" pitchFamily="49" charset="0"/>
+              </a:rPr>
+              <a:t>, </a:t>
+            </a:r>
+            <a:r>
+              <a:rPr lang="en-GB" dirty="0" err="1">
+                <a:solidFill>
+                  <a:srgbClr val="000000"/>
+                </a:solidFill>
+                <a:highlight>
+                  <a:srgbClr val="D4D4D4"/>
+                </a:highlight>
+                <a:latin typeface="Consolas" panose="020B0609020204030204" pitchFamily="49" charset="0"/>
+              </a:rPr>
+              <a:t>FOAF.</a:t>
+            </a:r>
+            <a:r>
+              <a:rPr lang="en-GB" b="1" i="1" dirty="0" err="1">
+                <a:solidFill>
+                  <a:srgbClr val="0000C0"/>
+                </a:solidFill>
+                <a:highlight>
+                  <a:srgbClr val="D4D4D4"/>
+                </a:highlight>
+                <a:latin typeface="Consolas" panose="020B0609020204030204" pitchFamily="49" charset="0"/>
+              </a:rPr>
+              <a:t>givenname</a:t>
+            </a:r>
+            <a:r>
+              <a:rPr lang="en-GB" b="1" i="1" dirty="0">
+                <a:solidFill>
+                  <a:srgbClr val="000000"/>
+                </a:solidFill>
+                <a:highlight>
+                  <a:srgbClr val="D4D4D4"/>
+                </a:highlight>
+                <a:latin typeface="Consolas" panose="020B0609020204030204" pitchFamily="49" charset="0"/>
+              </a:rPr>
+              <a:t>, </a:t>
+            </a:r>
+            <a:r>
+              <a:rPr lang="en-GB" b="1" i="1" dirty="0" err="1">
+                <a:solidFill>
+                  <a:srgbClr val="7F0055"/>
+                </a:solidFill>
+                <a:highlight>
+                  <a:srgbClr val="D4D4D4"/>
+                </a:highlight>
+                <a:latin typeface="Consolas" panose="020B0609020204030204" pitchFamily="49" charset="0"/>
+              </a:rPr>
+              <a:t>this</a:t>
+            </a:r>
+            <a:r>
+              <a:rPr lang="en-GB" b="1" i="1" dirty="0" err="1">
+                <a:solidFill>
+                  <a:srgbClr val="000000"/>
+                </a:solidFill>
+                <a:highlight>
+                  <a:srgbClr val="D4D4D4"/>
+                </a:highlight>
+                <a:latin typeface="Consolas" panose="020B0609020204030204" pitchFamily="49" charset="0"/>
+              </a:rPr>
+              <a:t>.getGivenName</a:t>
+            </a:r>
+            <a:r>
+              <a:rPr lang="en-GB" b="1" i="1" dirty="0">
+                <a:solidFill>
+                  <a:srgbClr val="000000"/>
+                </a:solidFill>
+                <a:highlight>
+                  <a:srgbClr val="D4D4D4"/>
+                </a:highlight>
+                <a:latin typeface="Consolas" panose="020B0609020204030204" pitchFamily="49" charset="0"/>
+              </a:rPr>
+              <a:t>())</a:t>
+            </a:r>
+          </a:p>
+          <a:p>
+            <a:pPr lvl="1"/>
+            <a:r>
+              <a:rPr lang="en-GB" dirty="0" smtClean="0">
+                <a:solidFill>
+                  <a:srgbClr val="000000"/>
+                </a:solidFill>
+                <a:latin typeface="Consolas" panose="020B0609020204030204" pitchFamily="49" charset="0"/>
+              </a:rPr>
+              <a:t>	</a:t>
+            </a:r>
+            <a:r>
+              <a:rPr lang="en-GB" smtClean="0">
+                <a:solidFill>
+                  <a:srgbClr val="000000"/>
+                </a:solidFill>
+                <a:latin typeface="Consolas" panose="020B0609020204030204" pitchFamily="49" charset="0"/>
+              </a:rPr>
+              <a:t>  .</a:t>
+            </a:r>
+            <a:r>
+              <a:rPr lang="en-GB" dirty="0">
+                <a:solidFill>
+                  <a:srgbClr val="000000"/>
+                </a:solidFill>
+                <a:latin typeface="Consolas" panose="020B0609020204030204" pitchFamily="49" charset="0"/>
+              </a:rPr>
+              <a:t>add(</a:t>
+            </a:r>
+            <a:r>
+              <a:rPr lang="en-GB" dirty="0" err="1">
+                <a:solidFill>
+                  <a:srgbClr val="6A3E3E"/>
+                </a:solidFill>
+                <a:highlight>
+                  <a:srgbClr val="D4D4D4"/>
+                </a:highlight>
+                <a:latin typeface="Consolas" panose="020B0609020204030204" pitchFamily="49" charset="0"/>
+              </a:rPr>
+              <a:t>personResource</a:t>
+            </a:r>
+            <a:r>
+              <a:rPr lang="en-GB" dirty="0">
+                <a:solidFill>
+                  <a:srgbClr val="000000"/>
+                </a:solidFill>
+                <a:highlight>
+                  <a:srgbClr val="D4D4D4"/>
+                </a:highlight>
+                <a:latin typeface="Consolas" panose="020B0609020204030204" pitchFamily="49" charset="0"/>
+              </a:rPr>
+              <a:t>, </a:t>
+            </a:r>
+            <a:r>
+              <a:rPr lang="en-GB" dirty="0" err="1">
+                <a:solidFill>
+                  <a:srgbClr val="000000"/>
+                </a:solidFill>
+                <a:highlight>
+                  <a:srgbClr val="D4D4D4"/>
+                </a:highlight>
+                <a:latin typeface="Consolas" panose="020B0609020204030204" pitchFamily="49" charset="0"/>
+              </a:rPr>
+              <a:t>FOAF.</a:t>
+            </a:r>
+            <a:r>
+              <a:rPr lang="en-GB" b="1" i="1" dirty="0" err="1">
+                <a:solidFill>
+                  <a:srgbClr val="0000C0"/>
+                </a:solidFill>
+                <a:highlight>
+                  <a:srgbClr val="D4D4D4"/>
+                </a:highlight>
+                <a:latin typeface="Consolas" panose="020B0609020204030204" pitchFamily="49" charset="0"/>
+              </a:rPr>
+              <a:t>family_name</a:t>
+            </a:r>
+            <a:r>
+              <a:rPr lang="en-GB" b="1" i="1" dirty="0">
+                <a:solidFill>
+                  <a:srgbClr val="000000"/>
+                </a:solidFill>
+                <a:highlight>
+                  <a:srgbClr val="D4D4D4"/>
+                </a:highlight>
+                <a:latin typeface="Consolas" panose="020B0609020204030204" pitchFamily="49" charset="0"/>
+              </a:rPr>
+              <a:t>, </a:t>
+            </a:r>
+            <a:r>
+              <a:rPr lang="en-GB" b="1" i="1" dirty="0" err="1">
+                <a:solidFill>
+                  <a:srgbClr val="7F0055"/>
+                </a:solidFill>
+                <a:highlight>
+                  <a:srgbClr val="D4D4D4"/>
+                </a:highlight>
+                <a:latin typeface="Consolas" panose="020B0609020204030204" pitchFamily="49" charset="0"/>
+              </a:rPr>
+              <a:t>this</a:t>
+            </a:r>
+            <a:r>
+              <a:rPr lang="en-GB" b="1" i="1" dirty="0" err="1">
+                <a:solidFill>
+                  <a:srgbClr val="000000"/>
+                </a:solidFill>
+                <a:highlight>
+                  <a:srgbClr val="D4D4D4"/>
+                </a:highlight>
+                <a:latin typeface="Consolas" panose="020B0609020204030204" pitchFamily="49" charset="0"/>
+              </a:rPr>
+              <a:t>.getFamilyName</a:t>
+            </a:r>
+            <a:r>
+              <a:rPr lang="en-GB" b="1" i="1" dirty="0">
+                <a:solidFill>
+                  <a:srgbClr val="000000"/>
+                </a:solidFill>
+                <a:highlight>
+                  <a:srgbClr val="D4D4D4"/>
+                </a:highlight>
+                <a:latin typeface="Consolas" panose="020B0609020204030204" pitchFamily="49" charset="0"/>
+              </a:rPr>
+              <a:t>());</a:t>
+            </a:r>
+          </a:p>
+          <a:p>
+            <a:pPr lvl="1"/>
+            <a:r>
+              <a:rPr lang="en-GB" dirty="0" err="1">
+                <a:solidFill>
+                  <a:srgbClr val="000000"/>
+                </a:solidFill>
+                <a:latin typeface="Consolas" panose="020B0609020204030204" pitchFamily="49" charset="0"/>
+              </a:rPr>
+              <a:t>OutputStream</a:t>
+            </a:r>
+            <a:r>
+              <a:rPr lang="en-GB" dirty="0">
+                <a:solidFill>
+                  <a:srgbClr val="000000"/>
+                </a:solidFill>
+                <a:latin typeface="Consolas" panose="020B0609020204030204" pitchFamily="49" charset="0"/>
+              </a:rPr>
+              <a:t> </a:t>
+            </a:r>
+            <a:r>
+              <a:rPr lang="en-GB" dirty="0" err="1">
+                <a:solidFill>
+                  <a:srgbClr val="6A3E3E"/>
+                </a:solidFill>
+                <a:latin typeface="Consolas" panose="020B0609020204030204" pitchFamily="49" charset="0"/>
+              </a:rPr>
+              <a:t>outputStream</a:t>
+            </a:r>
+            <a:r>
+              <a:rPr lang="en-GB" dirty="0">
+                <a:solidFill>
+                  <a:srgbClr val="000000"/>
+                </a:solidFill>
+                <a:latin typeface="Consolas" panose="020B0609020204030204" pitchFamily="49" charset="0"/>
+              </a:rPr>
+              <a:t> = </a:t>
+            </a:r>
+            <a:r>
+              <a:rPr lang="en-GB" b="1" dirty="0" smtClean="0">
+                <a:solidFill>
+                  <a:srgbClr val="7F0055"/>
+                </a:solidFill>
+                <a:latin typeface="Consolas" panose="020B0609020204030204" pitchFamily="49" charset="0"/>
+              </a:rPr>
+              <a:t>new</a:t>
+            </a:r>
+            <a:r>
+              <a:rPr lang="en-GB" b="1" dirty="0" smtClean="0">
+                <a:solidFill>
+                  <a:srgbClr val="000000"/>
+                </a:solidFill>
+                <a:latin typeface="Consolas" panose="020B0609020204030204" pitchFamily="49" charset="0"/>
+              </a:rPr>
+              <a:t> </a:t>
+            </a:r>
+            <a:r>
+              <a:rPr lang="en-GB" b="1" dirty="0" err="1">
+                <a:solidFill>
+                  <a:srgbClr val="000000"/>
+                </a:solidFill>
+                <a:latin typeface="Consolas" panose="020B0609020204030204" pitchFamily="49" charset="0"/>
+              </a:rPr>
+              <a:t>ByteArrayOutputStream</a:t>
+            </a:r>
+            <a:r>
+              <a:rPr lang="en-GB" b="1" dirty="0">
+                <a:solidFill>
+                  <a:srgbClr val="000000"/>
+                </a:solidFill>
+                <a:latin typeface="Consolas" panose="020B0609020204030204" pitchFamily="49" charset="0"/>
+              </a:rPr>
+              <a:t>();</a:t>
+            </a:r>
+          </a:p>
+          <a:p>
+            <a:pPr lvl="1"/>
+            <a:r>
+              <a:rPr lang="en-GB" dirty="0" err="1">
+                <a:solidFill>
+                  <a:srgbClr val="6A3E3E"/>
+                </a:solidFill>
+                <a:latin typeface="Consolas" panose="020B0609020204030204" pitchFamily="49" charset="0"/>
               </a:rPr>
               <a:t>model</a:t>
             </a:r>
             <a:r>
-              <a:rPr lang="de-DE" dirty="0">
+              <a:rPr lang="en-GB" dirty="0" err="1">
                 <a:solidFill>
                   <a:srgbClr val="000000"/>
                 </a:solidFill>
-                <a:latin typeface="Courier New" panose="02070309020205020404" pitchFamily="49" charset="0"/>
-              </a:rPr>
-              <a:t> = </a:t>
-            </a:r>
-            <a:r>
-              <a:rPr lang="de-DE" dirty="0" err="1">
+                <a:latin typeface="Consolas" panose="020B0609020204030204" pitchFamily="49" charset="0"/>
+              </a:rPr>
+              <a:t>.write</a:t>
+            </a:r>
+            <a:r>
+              <a:rPr lang="en-GB" dirty="0">
                 <a:solidFill>
                   <a:srgbClr val="000000"/>
                 </a:solidFill>
-                <a:latin typeface="Courier New" panose="02070309020205020404" pitchFamily="49" charset="0"/>
-              </a:rPr>
-              <a:t>ModelFactory.</a:t>
-            </a:r>
-            <a:r>
-              <a:rPr lang="de-DE" i="1" dirty="0" err="1">
+                <a:latin typeface="Consolas" panose="020B0609020204030204" pitchFamily="49" charset="0"/>
+              </a:rPr>
+              <a:t>(</a:t>
+            </a:r>
+            <a:r>
+              <a:rPr lang="en-GB" dirty="0" err="1">
+                <a:solidFill>
+                  <a:srgbClr val="6A3E3E"/>
+                </a:solidFill>
+                <a:latin typeface="Consolas" panose="020B0609020204030204" pitchFamily="49" charset="0"/>
+              </a:rPr>
+              <a:t>outputStream</a:t>
+            </a:r>
+            <a:r>
+              <a:rPr lang="en-GB" dirty="0">
                 <a:solidFill>
                   <a:srgbClr val="000000"/>
                 </a:solidFill>
-                <a:latin typeface="Courier New" panose="02070309020205020404" pitchFamily="49" charset="0"/>
-              </a:rPr>
-              <a:t>createDefaultModel</a:t>
-            </a:r>
-            <a:r>
-              <a:rPr lang="de-DE" i="1" dirty="0">
+                <a:latin typeface="Consolas" panose="020B0609020204030204" pitchFamily="49" charset="0"/>
+              </a:rPr>
+              <a:t>);</a:t>
+            </a:r>
+          </a:p>
+          <a:p>
+            <a:pPr lvl="1"/>
+            <a:r>
+              <a:rPr lang="en-GB" b="1" dirty="0">
+                <a:solidFill>
+                  <a:srgbClr val="7F0055"/>
+                </a:solidFill>
+                <a:latin typeface="Consolas" panose="020B0609020204030204" pitchFamily="49" charset="0"/>
+              </a:rPr>
+              <a:t>return</a:t>
+            </a:r>
+            <a:r>
+              <a:rPr lang="en-GB" b="1" dirty="0">
                 <a:solidFill>
                   <a:srgbClr val="000000"/>
                 </a:solidFill>
-                <a:latin typeface="Courier New" panose="02070309020205020404" pitchFamily="49" charset="0"/>
+                <a:latin typeface="Consolas" panose="020B0609020204030204" pitchFamily="49" charset="0"/>
+              </a:rPr>
+              <a:t> </a:t>
+            </a:r>
+            <a:r>
+              <a:rPr lang="en-GB" b="1" dirty="0" err="1">
+                <a:solidFill>
+                  <a:srgbClr val="6A3E3E"/>
+                </a:solidFill>
+                <a:latin typeface="Consolas" panose="020B0609020204030204" pitchFamily="49" charset="0"/>
+              </a:rPr>
+              <a:t>outputStream</a:t>
+            </a:r>
+            <a:r>
+              <a:rPr lang="en-GB" b="1" dirty="0" err="1">
+                <a:solidFill>
+                  <a:srgbClr val="000000"/>
+                </a:solidFill>
+                <a:latin typeface="Consolas" panose="020B0609020204030204" pitchFamily="49" charset="0"/>
+              </a:rPr>
+              <a:t>.toString</a:t>
+            </a:r>
+            <a:r>
+              <a:rPr lang="en-GB" b="1" dirty="0">
+                <a:solidFill>
+                  <a:srgbClr val="000000"/>
+                </a:solidFill>
+                <a:latin typeface="Consolas" panose="020B0609020204030204" pitchFamily="49" charset="0"/>
               </a:rPr>
               <a:t>();</a:t>
             </a:r>
           </a:p>
           <a:p>
-            <a:pPr lvl="1"/>
-            <a:r>
-              <a:rPr lang="fr-FR" dirty="0">
+            <a:r>
+              <a:rPr lang="en-GB" dirty="0">
                 <a:solidFill>
                   <a:srgbClr val="000000"/>
                 </a:solidFill>
-                <a:latin typeface="Courier New" panose="02070309020205020404" pitchFamily="49" charset="0"/>
-              </a:rPr>
-              <a:t>Resource </a:t>
-            </a:r>
-            <a:r>
-              <a:rPr lang="fr-FR" dirty="0" err="1">
-                <a:solidFill>
-                  <a:srgbClr val="6A3E3E"/>
-                </a:solidFill>
-                <a:latin typeface="Courier New" panose="02070309020205020404" pitchFamily="49" charset="0"/>
-              </a:rPr>
-              <a:t>personResource</a:t>
-            </a:r>
-            <a:r>
-              <a:rPr lang="fr-FR" dirty="0">
-                <a:solidFill>
-                  <a:srgbClr val="000000"/>
-                </a:solidFill>
-                <a:latin typeface="Courier New" panose="02070309020205020404" pitchFamily="49" charset="0"/>
-              </a:rPr>
-              <a:t> = </a:t>
-            </a:r>
-            <a:r>
-              <a:rPr lang="fr-FR" dirty="0" err="1">
-                <a:solidFill>
-                  <a:srgbClr val="000000"/>
-                </a:solidFill>
-                <a:latin typeface="Courier New" panose="02070309020205020404" pitchFamily="49" charset="0"/>
-              </a:rPr>
-              <a:t>ResourceFactory.</a:t>
-            </a:r>
-            <a:r>
-              <a:rPr lang="fr-FR" i="1" dirty="0" err="1">
-                <a:solidFill>
-                  <a:srgbClr val="000000"/>
-                </a:solidFill>
-                <a:latin typeface="Courier New" panose="02070309020205020404" pitchFamily="49" charset="0"/>
-              </a:rPr>
-              <a:t>createResource</a:t>
-            </a:r>
-            <a:r>
-              <a:rPr lang="fr-FR" i="1" dirty="0">
-                <a:solidFill>
-                  <a:srgbClr val="000000"/>
-                </a:solidFill>
-                <a:latin typeface="Courier New" panose="02070309020205020404" pitchFamily="49" charset="0"/>
-              </a:rPr>
-              <a:t>(</a:t>
-            </a:r>
-            <a:r>
-              <a:rPr lang="fr-FR" i="1" dirty="0">
-                <a:solidFill>
-                  <a:srgbClr val="2A00FF"/>
-                </a:solidFill>
-                <a:latin typeface="Courier New" panose="02070309020205020404" pitchFamily="49" charset="0"/>
-              </a:rPr>
-              <a:t>"https://vocab.eccenca.com/</a:t>
-            </a:r>
-            <a:r>
-              <a:rPr lang="fr-FR" i="1" dirty="0" err="1">
-                <a:solidFill>
-                  <a:srgbClr val="2A00FF"/>
-                </a:solidFill>
-                <a:latin typeface="Courier New" panose="02070309020205020404" pitchFamily="49" charset="0"/>
-              </a:rPr>
-              <a:t>mdm</a:t>
-            </a:r>
-            <a:r>
-              <a:rPr lang="fr-FR" i="1" dirty="0">
-                <a:solidFill>
-                  <a:srgbClr val="2A00FF"/>
-                </a:solidFill>
-                <a:latin typeface="Courier New" panose="02070309020205020404" pitchFamily="49" charset="0"/>
-              </a:rPr>
-              <a:t>/"</a:t>
-            </a:r>
-          </a:p>
-          <a:p>
-            <a:pPr lvl="1"/>
-            <a:r>
-              <a:rPr lang="de-DE" dirty="0">
-                <a:solidFill>
-                  <a:srgbClr val="000000"/>
-                </a:solidFill>
-                <a:latin typeface="Courier New" panose="02070309020205020404" pitchFamily="49" charset="0"/>
-              </a:rPr>
-              <a:t>+ </a:t>
-            </a:r>
-            <a:r>
-              <a:rPr lang="de-DE" b="1" dirty="0" err="1">
-                <a:solidFill>
-                  <a:srgbClr val="7F0055"/>
-                </a:solidFill>
-                <a:latin typeface="Courier New" panose="02070309020205020404" pitchFamily="49" charset="0"/>
-              </a:rPr>
-              <a:t>this</a:t>
-            </a:r>
-            <a:r>
-              <a:rPr lang="de-DE" b="1" dirty="0" err="1">
-                <a:solidFill>
-                  <a:srgbClr val="000000"/>
-                </a:solidFill>
-                <a:latin typeface="Courier New" panose="02070309020205020404" pitchFamily="49" charset="0"/>
-              </a:rPr>
-              <a:t>.getFamilyName</a:t>
-            </a:r>
-            <a:r>
-              <a:rPr lang="de-DE" b="1" dirty="0">
-                <a:solidFill>
-                  <a:srgbClr val="000000"/>
-                </a:solidFill>
-                <a:latin typeface="Courier New" panose="02070309020205020404" pitchFamily="49" charset="0"/>
-              </a:rPr>
-              <a:t>());</a:t>
-            </a:r>
-          </a:p>
-          <a:p>
-            <a:pPr lvl="1"/>
-            <a:r>
-              <a:rPr lang="de-DE" dirty="0" err="1">
-                <a:solidFill>
-                  <a:srgbClr val="6A3E3E"/>
-                </a:solidFill>
-                <a:latin typeface="Courier New" panose="02070309020205020404" pitchFamily="49" charset="0"/>
-              </a:rPr>
-              <a:t>model</a:t>
-            </a:r>
-            <a:r>
-              <a:rPr lang="de-DE" dirty="0" err="1">
-                <a:solidFill>
-                  <a:srgbClr val="000000"/>
-                </a:solidFill>
-                <a:latin typeface="Courier New" panose="02070309020205020404" pitchFamily="49" charset="0"/>
-              </a:rPr>
-              <a:t>.add</a:t>
-            </a:r>
-            <a:r>
-              <a:rPr lang="de-DE" dirty="0">
-                <a:solidFill>
-                  <a:srgbClr val="000000"/>
-                </a:solidFill>
-                <a:latin typeface="Courier New" panose="02070309020205020404" pitchFamily="49" charset="0"/>
-              </a:rPr>
-              <a:t>(</a:t>
-            </a:r>
-            <a:r>
-              <a:rPr lang="de-DE" dirty="0" err="1">
-                <a:solidFill>
-                  <a:srgbClr val="6A3E3E"/>
-                </a:solidFill>
-                <a:latin typeface="Courier New" panose="02070309020205020404" pitchFamily="49" charset="0"/>
-              </a:rPr>
-              <a:t>personResource</a:t>
-            </a:r>
-            <a:r>
-              <a:rPr lang="de-DE" dirty="0">
-                <a:solidFill>
-                  <a:srgbClr val="000000"/>
-                </a:solidFill>
-                <a:latin typeface="Courier New" panose="02070309020205020404" pitchFamily="49" charset="0"/>
-              </a:rPr>
-              <a:t>, </a:t>
-            </a:r>
-            <a:r>
-              <a:rPr lang="de-DE" dirty="0" err="1">
-                <a:solidFill>
-                  <a:srgbClr val="000000"/>
-                </a:solidFill>
-                <a:latin typeface="Courier New" panose="02070309020205020404" pitchFamily="49" charset="0"/>
-              </a:rPr>
-              <a:t>RDF.</a:t>
-            </a:r>
-            <a:r>
-              <a:rPr lang="de-DE" b="1" i="1" dirty="0" err="1">
-                <a:solidFill>
-                  <a:srgbClr val="0000C0"/>
-                </a:solidFill>
-                <a:latin typeface="Courier New" panose="02070309020205020404" pitchFamily="49" charset="0"/>
-              </a:rPr>
-              <a:t>type</a:t>
-            </a:r>
-            <a:r>
-              <a:rPr lang="de-DE" b="1" i="1" dirty="0">
-                <a:solidFill>
-                  <a:srgbClr val="000000"/>
-                </a:solidFill>
-                <a:latin typeface="Courier New" panose="02070309020205020404" pitchFamily="49" charset="0"/>
-              </a:rPr>
-              <a:t>, </a:t>
-            </a:r>
-            <a:r>
-              <a:rPr lang="de-DE" b="1" i="1" dirty="0" err="1">
-                <a:solidFill>
-                  <a:srgbClr val="000000"/>
-                </a:solidFill>
-                <a:latin typeface="Courier New" panose="02070309020205020404" pitchFamily="49" charset="0"/>
-              </a:rPr>
-              <a:t>FOAF.</a:t>
-            </a:r>
-            <a:r>
-              <a:rPr lang="de-DE" b="1" i="1" dirty="0" err="1">
-                <a:solidFill>
-                  <a:srgbClr val="0000C0"/>
-                </a:solidFill>
-                <a:latin typeface="Courier New" panose="02070309020205020404" pitchFamily="49" charset="0"/>
-              </a:rPr>
-              <a:t>Person</a:t>
-            </a:r>
-            <a:r>
-              <a:rPr lang="de-DE" b="1" i="1" dirty="0">
-                <a:solidFill>
-                  <a:srgbClr val="000000"/>
-                </a:solidFill>
-                <a:latin typeface="Courier New" panose="02070309020205020404" pitchFamily="49" charset="0"/>
-              </a:rPr>
-              <a:t>)</a:t>
-            </a:r>
-          </a:p>
-          <a:p>
-            <a:pPr lvl="1"/>
-            <a:r>
-              <a:rPr lang="de-DE" dirty="0">
-                <a:solidFill>
-                  <a:srgbClr val="000000"/>
-                </a:solidFill>
-                <a:latin typeface="Courier New" panose="02070309020205020404" pitchFamily="49" charset="0"/>
-              </a:rPr>
-              <a:t>.</a:t>
-            </a:r>
-            <a:r>
-              <a:rPr lang="de-DE" dirty="0" err="1">
-                <a:solidFill>
-                  <a:srgbClr val="000000"/>
-                </a:solidFill>
-                <a:latin typeface="Courier New" panose="02070309020205020404" pitchFamily="49" charset="0"/>
-              </a:rPr>
-              <a:t>add</a:t>
-            </a:r>
-            <a:r>
-              <a:rPr lang="de-DE" dirty="0">
-                <a:solidFill>
-                  <a:srgbClr val="000000"/>
-                </a:solidFill>
-                <a:latin typeface="Courier New" panose="02070309020205020404" pitchFamily="49" charset="0"/>
-              </a:rPr>
-              <a:t>(</a:t>
-            </a:r>
-            <a:r>
-              <a:rPr lang="de-DE" dirty="0" err="1">
-                <a:solidFill>
-                  <a:srgbClr val="6A3E3E"/>
-                </a:solidFill>
-                <a:latin typeface="Courier New" panose="02070309020205020404" pitchFamily="49" charset="0"/>
-              </a:rPr>
-              <a:t>personResource</a:t>
-            </a:r>
-            <a:r>
-              <a:rPr lang="de-DE" dirty="0">
-                <a:solidFill>
-                  <a:srgbClr val="000000"/>
-                </a:solidFill>
-                <a:latin typeface="Courier New" panose="02070309020205020404" pitchFamily="49" charset="0"/>
-              </a:rPr>
-              <a:t>, </a:t>
-            </a:r>
-            <a:r>
-              <a:rPr lang="de-DE" dirty="0" err="1">
-                <a:solidFill>
-                  <a:srgbClr val="000000"/>
-                </a:solidFill>
-                <a:latin typeface="Courier New" panose="02070309020205020404" pitchFamily="49" charset="0"/>
-              </a:rPr>
-              <a:t>FOAF.</a:t>
-            </a:r>
-            <a:r>
-              <a:rPr lang="de-DE" b="1" i="1" dirty="0" err="1">
-                <a:solidFill>
-                  <a:srgbClr val="0000C0"/>
-                </a:solidFill>
-                <a:latin typeface="Courier New" panose="02070309020205020404" pitchFamily="49" charset="0"/>
-              </a:rPr>
-              <a:t>givenname</a:t>
-            </a:r>
-            <a:r>
-              <a:rPr lang="de-DE" b="1" i="1" dirty="0">
-                <a:solidFill>
-                  <a:srgbClr val="000000"/>
-                </a:solidFill>
-                <a:latin typeface="Courier New" panose="02070309020205020404" pitchFamily="49" charset="0"/>
-              </a:rPr>
-              <a:t>, </a:t>
-            </a:r>
-            <a:r>
-              <a:rPr lang="de-DE" b="1" i="1" dirty="0" err="1">
-                <a:solidFill>
-                  <a:srgbClr val="7F0055"/>
-                </a:solidFill>
-                <a:latin typeface="Courier New" panose="02070309020205020404" pitchFamily="49" charset="0"/>
-              </a:rPr>
-              <a:t>this</a:t>
-            </a:r>
-            <a:r>
-              <a:rPr lang="de-DE" b="1" i="1" dirty="0" err="1">
-                <a:solidFill>
-                  <a:srgbClr val="000000"/>
-                </a:solidFill>
-                <a:latin typeface="Courier New" panose="02070309020205020404" pitchFamily="49" charset="0"/>
-              </a:rPr>
-              <a:t>.getGivenName</a:t>
-            </a:r>
-            <a:r>
-              <a:rPr lang="de-DE" b="1" i="1" dirty="0">
-                <a:solidFill>
-                  <a:srgbClr val="000000"/>
-                </a:solidFill>
-                <a:latin typeface="Courier New" panose="02070309020205020404" pitchFamily="49" charset="0"/>
-              </a:rPr>
-              <a:t>())</a:t>
-            </a:r>
-          </a:p>
-          <a:p>
-            <a:pPr lvl="1"/>
-            <a:r>
-              <a:rPr lang="de-DE" dirty="0">
-                <a:solidFill>
-                  <a:srgbClr val="000000"/>
-                </a:solidFill>
-                <a:latin typeface="Courier New" panose="02070309020205020404" pitchFamily="49" charset="0"/>
-              </a:rPr>
-              <a:t>.</a:t>
-            </a:r>
-            <a:r>
-              <a:rPr lang="de-DE" dirty="0" err="1">
-                <a:solidFill>
-                  <a:srgbClr val="000000"/>
-                </a:solidFill>
-                <a:latin typeface="Courier New" panose="02070309020205020404" pitchFamily="49" charset="0"/>
-              </a:rPr>
-              <a:t>add</a:t>
-            </a:r>
-            <a:r>
-              <a:rPr lang="de-DE" dirty="0">
-                <a:solidFill>
-                  <a:srgbClr val="000000"/>
-                </a:solidFill>
-                <a:latin typeface="Courier New" panose="02070309020205020404" pitchFamily="49" charset="0"/>
-              </a:rPr>
-              <a:t>(</a:t>
-            </a:r>
-            <a:r>
-              <a:rPr lang="de-DE" dirty="0" err="1">
-                <a:solidFill>
-                  <a:srgbClr val="6A3E3E"/>
-                </a:solidFill>
-                <a:latin typeface="Courier New" panose="02070309020205020404" pitchFamily="49" charset="0"/>
-              </a:rPr>
-              <a:t>personResource</a:t>
-            </a:r>
-            <a:r>
-              <a:rPr lang="de-DE" dirty="0">
-                <a:solidFill>
-                  <a:srgbClr val="000000"/>
-                </a:solidFill>
-                <a:latin typeface="Courier New" panose="02070309020205020404" pitchFamily="49" charset="0"/>
-              </a:rPr>
-              <a:t>, </a:t>
-            </a:r>
-            <a:r>
-              <a:rPr lang="de-DE" dirty="0" err="1">
-                <a:solidFill>
-                  <a:srgbClr val="000000"/>
-                </a:solidFill>
-                <a:latin typeface="Courier New" panose="02070309020205020404" pitchFamily="49" charset="0"/>
-              </a:rPr>
-              <a:t>FOAF.</a:t>
-            </a:r>
-            <a:r>
-              <a:rPr lang="de-DE" b="1" i="1" dirty="0" err="1">
-                <a:solidFill>
-                  <a:srgbClr val="0000C0"/>
-                </a:solidFill>
-                <a:latin typeface="Courier New" panose="02070309020205020404" pitchFamily="49" charset="0"/>
-              </a:rPr>
-              <a:t>family_name</a:t>
-            </a:r>
-            <a:r>
-              <a:rPr lang="de-DE" b="1" i="1" dirty="0">
-                <a:solidFill>
-                  <a:srgbClr val="000000"/>
-                </a:solidFill>
-                <a:latin typeface="Courier New" panose="02070309020205020404" pitchFamily="49" charset="0"/>
-              </a:rPr>
-              <a:t>, </a:t>
-            </a:r>
-            <a:r>
-              <a:rPr lang="de-DE" b="1" i="1" dirty="0" err="1">
-                <a:solidFill>
-                  <a:srgbClr val="7F0055"/>
-                </a:solidFill>
-                <a:latin typeface="Courier New" panose="02070309020205020404" pitchFamily="49" charset="0"/>
-              </a:rPr>
-              <a:t>this</a:t>
-            </a:r>
-            <a:r>
-              <a:rPr lang="de-DE" b="1" i="1" dirty="0" err="1">
-                <a:solidFill>
-                  <a:srgbClr val="000000"/>
-                </a:solidFill>
-                <a:latin typeface="Courier New" panose="02070309020205020404" pitchFamily="49" charset="0"/>
-              </a:rPr>
-              <a:t>.getFamilyName</a:t>
-            </a:r>
-            <a:r>
-              <a:rPr lang="de-DE" b="1" i="1" dirty="0">
-                <a:solidFill>
-                  <a:srgbClr val="000000"/>
-                </a:solidFill>
-                <a:latin typeface="Courier New" panose="02070309020205020404" pitchFamily="49" charset="0"/>
-              </a:rPr>
-              <a:t>());</a:t>
-            </a:r>
-          </a:p>
-          <a:p>
-            <a:pPr lvl="1"/>
-            <a:r>
-              <a:rPr lang="de-DE" dirty="0" err="1">
-                <a:solidFill>
-                  <a:srgbClr val="000000"/>
-                </a:solidFill>
-                <a:latin typeface="Courier New" panose="02070309020205020404" pitchFamily="49" charset="0"/>
-              </a:rPr>
-              <a:t>OutputStream</a:t>
-            </a:r>
-            <a:r>
-              <a:rPr lang="de-DE" dirty="0">
-                <a:solidFill>
-                  <a:srgbClr val="000000"/>
-                </a:solidFill>
-                <a:latin typeface="Courier New" panose="02070309020205020404" pitchFamily="49" charset="0"/>
-              </a:rPr>
-              <a:t> </a:t>
-            </a:r>
-            <a:r>
-              <a:rPr lang="de-DE" dirty="0" err="1">
-                <a:solidFill>
-                  <a:srgbClr val="6A3E3E"/>
-                </a:solidFill>
-                <a:latin typeface="Courier New" panose="02070309020205020404" pitchFamily="49" charset="0"/>
-              </a:rPr>
-              <a:t>outputStream</a:t>
-            </a:r>
-            <a:r>
-              <a:rPr lang="de-DE" dirty="0">
-                <a:solidFill>
-                  <a:srgbClr val="000000"/>
-                </a:solidFill>
-                <a:latin typeface="Courier New" panose="02070309020205020404" pitchFamily="49" charset="0"/>
-              </a:rPr>
-              <a:t> = </a:t>
-            </a:r>
-            <a:r>
-              <a:rPr lang="de-DE" b="1" dirty="0" err="1">
-                <a:solidFill>
-                  <a:srgbClr val="7F0055"/>
-                </a:solidFill>
-                <a:latin typeface="Courier New" panose="02070309020205020404" pitchFamily="49" charset="0"/>
-              </a:rPr>
-              <a:t>new</a:t>
-            </a:r>
-            <a:r>
-              <a:rPr lang="de-DE" b="1" dirty="0">
-                <a:solidFill>
-                  <a:srgbClr val="000000"/>
-                </a:solidFill>
-                <a:latin typeface="Courier New" panose="02070309020205020404" pitchFamily="49" charset="0"/>
-              </a:rPr>
-              <a:t> </a:t>
-            </a:r>
-            <a:r>
-              <a:rPr lang="de-DE" b="1" dirty="0" err="1">
-                <a:solidFill>
-                  <a:srgbClr val="000000"/>
-                </a:solidFill>
-                <a:latin typeface="Courier New" panose="02070309020205020404" pitchFamily="49" charset="0"/>
-              </a:rPr>
-              <a:t>ByteArrayOutputStream</a:t>
-            </a:r>
-            <a:r>
-              <a:rPr lang="de-DE" b="1" dirty="0">
-                <a:solidFill>
-                  <a:srgbClr val="000000"/>
-                </a:solidFill>
-                <a:latin typeface="Courier New" panose="02070309020205020404" pitchFamily="49" charset="0"/>
-              </a:rPr>
-              <a:t>();</a:t>
-            </a:r>
-          </a:p>
-          <a:p>
-            <a:pPr lvl="1"/>
-            <a:r>
-              <a:rPr lang="de-DE" dirty="0" err="1">
-                <a:solidFill>
-                  <a:srgbClr val="6A3E3E"/>
-                </a:solidFill>
-                <a:latin typeface="Courier New" panose="02070309020205020404" pitchFamily="49" charset="0"/>
-              </a:rPr>
-              <a:t>model</a:t>
-            </a:r>
-            <a:r>
-              <a:rPr lang="de-DE" dirty="0" err="1">
-                <a:solidFill>
-                  <a:srgbClr val="000000"/>
-                </a:solidFill>
-                <a:latin typeface="Courier New" panose="02070309020205020404" pitchFamily="49" charset="0"/>
-              </a:rPr>
-              <a:t>.write</a:t>
-            </a:r>
-            <a:r>
-              <a:rPr lang="de-DE" dirty="0">
-                <a:solidFill>
-                  <a:srgbClr val="000000"/>
-                </a:solidFill>
-                <a:latin typeface="Courier New" panose="02070309020205020404" pitchFamily="49" charset="0"/>
-              </a:rPr>
-              <a:t>(</a:t>
-            </a:r>
-            <a:r>
-              <a:rPr lang="de-DE" dirty="0" err="1">
-                <a:solidFill>
-                  <a:srgbClr val="6A3E3E"/>
-                </a:solidFill>
-                <a:latin typeface="Courier New" panose="02070309020205020404" pitchFamily="49" charset="0"/>
-              </a:rPr>
-              <a:t>outputStream</a:t>
-            </a:r>
-            <a:r>
-              <a:rPr lang="de-DE" dirty="0">
-                <a:solidFill>
-                  <a:srgbClr val="000000"/>
-                </a:solidFill>
-                <a:latin typeface="Courier New" panose="02070309020205020404" pitchFamily="49" charset="0"/>
-              </a:rPr>
-              <a:t>);</a:t>
-            </a:r>
-          </a:p>
-          <a:p>
-            <a:pPr lvl="1"/>
-            <a:r>
-              <a:rPr lang="de-DE" b="1" dirty="0" err="1">
-                <a:solidFill>
-                  <a:srgbClr val="7F0055"/>
-                </a:solidFill>
-                <a:latin typeface="Courier New" panose="02070309020205020404" pitchFamily="49" charset="0"/>
-              </a:rPr>
-              <a:t>return</a:t>
-            </a:r>
-            <a:r>
-              <a:rPr lang="de-DE" b="1" dirty="0">
-                <a:solidFill>
-                  <a:srgbClr val="000000"/>
-                </a:solidFill>
-                <a:latin typeface="Courier New" panose="02070309020205020404" pitchFamily="49" charset="0"/>
-              </a:rPr>
-              <a:t> </a:t>
-            </a:r>
-            <a:r>
-              <a:rPr lang="de-DE" b="1" dirty="0" err="1">
-                <a:solidFill>
-                  <a:srgbClr val="6A3E3E"/>
-                </a:solidFill>
-                <a:latin typeface="Courier New" panose="02070309020205020404" pitchFamily="49" charset="0"/>
-              </a:rPr>
-              <a:t>outputStream</a:t>
-            </a:r>
-            <a:r>
-              <a:rPr lang="de-DE" b="1" dirty="0" err="1">
-                <a:solidFill>
-                  <a:srgbClr val="000000"/>
-                </a:solidFill>
-                <a:latin typeface="Courier New" panose="02070309020205020404" pitchFamily="49" charset="0"/>
-              </a:rPr>
-              <a:t>.toString</a:t>
-            </a:r>
-            <a:r>
-              <a:rPr lang="de-DE" b="1" dirty="0">
-                <a:solidFill>
-                  <a:srgbClr val="000000"/>
-                </a:solidFill>
-                <a:latin typeface="Courier New" panose="02070309020205020404" pitchFamily="49" charset="0"/>
-              </a:rPr>
-              <a:t>();</a:t>
-            </a:r>
-          </a:p>
-          <a:p>
-            <a:r>
-              <a:rPr lang="de-DE" dirty="0">
-                <a:solidFill>
-                  <a:srgbClr val="000000"/>
-                </a:solidFill>
-                <a:latin typeface="Courier New" panose="02070309020205020404" pitchFamily="49" charset="0"/>
+                <a:latin typeface="Consolas" panose="020B0609020204030204" pitchFamily="49" charset="0"/>
               </a:rPr>
               <a:t>}</a:t>
             </a:r>
-            <a:endParaRPr lang="de-DE" dirty="0"/>
+            <a:endParaRPr lang="en-GB" dirty="0"/>
           </a:p>
         </p:txBody>
       </p:sp>
@@ -7320,7 +7467,7 @@
                 <a:latin typeface="Roboto medium" pitchFamily="2" charset="0"/>
                 <a:ea typeface="Roboto medium" pitchFamily="2" charset="0"/>
               </a:rPr>
-              <a:t>https://developer.salesforce.com/page/Digging_Deeper_into_OAuth_2.0_on_Force.com</a:t>
+              <a:t>https://developer.salesforce.com/docs/atlas.en-us.api_rest.meta/api_rest/intro_understanding_user_agent_oauth_flow.htm</a:t>
             </a:r>
             <a:endParaRPr lang="en-US" sz="1000" dirty="0" smtClean="0">
               <a:latin typeface="Roboto medium" pitchFamily="2" charset="0"/>

</xml_diff>

<commit_message>
added project structure slide
</commit_message>
<xml_diff>
--- a/GroupF/Presentations/Final Presentation.pptx
+++ b/GroupF/Presentations/Final Presentation.pptx
@@ -5,10 +5,10 @@
     <p:sldMasterId id="2147483648" r:id="rId1"/>
   </p:sldMasterIdLst>
   <p:notesMasterIdLst>
-    <p:notesMasterId r:id="rId21"/>
+    <p:notesMasterId r:id="rId22"/>
   </p:notesMasterIdLst>
   <p:handoutMasterIdLst>
-    <p:handoutMasterId r:id="rId22"/>
+    <p:handoutMasterId r:id="rId23"/>
   </p:handoutMasterIdLst>
   <p:sldIdLst>
     <p:sldId id="624" r:id="rId2"/>
@@ -24,12 +24,13 @@
     <p:sldId id="630" r:id="rId12"/>
     <p:sldId id="636" r:id="rId13"/>
     <p:sldId id="642" r:id="rId14"/>
-    <p:sldId id="644" r:id="rId15"/>
-    <p:sldId id="645" r:id="rId16"/>
-    <p:sldId id="631" r:id="rId17"/>
-    <p:sldId id="646" r:id="rId18"/>
-    <p:sldId id="634" r:id="rId19"/>
-    <p:sldId id="643" r:id="rId20"/>
+    <p:sldId id="647" r:id="rId15"/>
+    <p:sldId id="644" r:id="rId16"/>
+    <p:sldId id="645" r:id="rId17"/>
+    <p:sldId id="631" r:id="rId18"/>
+    <p:sldId id="646" r:id="rId19"/>
+    <p:sldId id="634" r:id="rId20"/>
+    <p:sldId id="643" r:id="rId21"/>
   </p:sldIdLst>
   <p:sldSz cx="12192000" cy="6858000"/>
   <p:notesSz cx="6858000" cy="9144000"/>
@@ -965,7 +966,7 @@
     </p:spTree>
     <p:extLst>
       <p:ext uri="{BB962C8B-B14F-4D97-AF65-F5344CB8AC3E}">
-        <p14:creationId xmlns:p14="http://schemas.microsoft.com/office/powerpoint/2010/main" val="2752209980"/>
+        <p14:creationId xmlns:p14="http://schemas.microsoft.com/office/powerpoint/2010/main" val="931395079"/>
       </p:ext>
     </p:extLst>
   </p:cSld>
@@ -1041,6 +1042,90 @@
             <a:fld id="{74D1495A-DD81-44F4-9F54-1F39867BF2D9}" type="slidenum">
               <a:rPr lang="en-US" smtClean="0"/>
               <a:t>15</a:t>
+            </a:fld>
+            <a:endParaRPr lang="en-US"/>
+          </a:p>
+        </p:txBody>
+      </p:sp>
+    </p:spTree>
+    <p:extLst>
+      <p:ext uri="{BB962C8B-B14F-4D97-AF65-F5344CB8AC3E}">
+        <p14:creationId xmlns:p14="http://schemas.microsoft.com/office/powerpoint/2010/main" val="2752209980"/>
+      </p:ext>
+    </p:extLst>
+  </p:cSld>
+  <p:clrMapOvr>
+    <a:masterClrMapping/>
+  </p:clrMapOvr>
+</p:notes>
+</file>
+
+<file path=ppt/notesSlides/notesSlide5.xml><?xml version="1.0" encoding="utf-8"?>
+<p:notes xmlns:a="http://schemas.openxmlformats.org/drawingml/2006/main" xmlns:r="http://schemas.openxmlformats.org/officeDocument/2006/relationships" xmlns:p="http://schemas.openxmlformats.org/presentationml/2006/main">
+  <p:cSld>
+    <p:spTree>
+      <p:nvGrpSpPr>
+        <p:cNvPr id="1" name=""/>
+        <p:cNvGrpSpPr/>
+        <p:nvPr/>
+      </p:nvGrpSpPr>
+      <p:grpSpPr>
+        <a:xfrm>
+          <a:off x="0" y="0"/>
+          <a:ext cx="0" cy="0"/>
+          <a:chOff x="0" y="0"/>
+          <a:chExt cx="0" cy="0"/>
+        </a:xfrm>
+      </p:grpSpPr>
+      <p:sp>
+        <p:nvSpPr>
+          <p:cNvPr id="2" name="Folienbildplatzhalter 1"/>
+          <p:cNvSpPr>
+            <a:spLocks noGrp="1" noRot="1" noChangeAspect="1"/>
+          </p:cNvSpPr>
+          <p:nvPr>
+            <p:ph type="sldImg"/>
+          </p:nvPr>
+        </p:nvSpPr>
+        <p:spPr/>
+      </p:sp>
+      <p:sp>
+        <p:nvSpPr>
+          <p:cNvPr id="3" name="Notizenplatzhalter 2"/>
+          <p:cNvSpPr>
+            <a:spLocks noGrp="1"/>
+          </p:cNvSpPr>
+          <p:nvPr>
+            <p:ph type="body" idx="1"/>
+          </p:nvPr>
+        </p:nvSpPr>
+        <p:spPr/>
+        <p:txBody>
+          <a:bodyPr/>
+          <a:lstStyle/>
+          <a:p>
+            <a:endParaRPr lang="de-DE" dirty="0"/>
+          </a:p>
+        </p:txBody>
+      </p:sp>
+      <p:sp>
+        <p:nvSpPr>
+          <p:cNvPr id="4" name="Foliennummernplatzhalter 3"/>
+          <p:cNvSpPr>
+            <a:spLocks noGrp="1"/>
+          </p:cNvSpPr>
+          <p:nvPr>
+            <p:ph type="sldNum" sz="quarter" idx="10"/>
+          </p:nvPr>
+        </p:nvSpPr>
+        <p:spPr/>
+        <p:txBody>
+          <a:bodyPr/>
+          <a:lstStyle/>
+          <a:p>
+            <a:fld id="{74D1495A-DD81-44F4-9F54-1F39867BF2D9}" type="slidenum">
+              <a:rPr lang="en-US" smtClean="0"/>
+              <a:t>16</a:t>
             </a:fld>
             <a:endParaRPr lang="en-US"/>
           </a:p>
@@ -4320,6 +4405,857 @@
           <a:p>
             <a:r>
               <a:rPr lang="de-DE" sz="3200" dirty="0" smtClean="0"/>
+              <a:t>Project </a:t>
+            </a:r>
+            <a:r>
+              <a:rPr lang="de-DE" sz="3200" dirty="0" err="1" smtClean="0"/>
+              <a:t>Structure</a:t>
+            </a:r>
+            <a:endParaRPr lang="en-US" sz="3200" dirty="0"/>
+          </a:p>
+        </p:txBody>
+      </p:sp>
+      <p:sp>
+        <p:nvSpPr>
+          <p:cNvPr id="5" name="Textplatzhalter 4"/>
+          <p:cNvSpPr>
+            <a:spLocks noGrp="1"/>
+          </p:cNvSpPr>
+          <p:nvPr>
+            <p:ph type="body" sz="quarter" idx="15"/>
+          </p:nvPr>
+        </p:nvSpPr>
+        <p:spPr/>
+        <p:txBody>
+          <a:bodyPr/>
+          <a:lstStyle/>
+          <a:p>
+            <a:endParaRPr lang="en-US"/>
+          </a:p>
+        </p:txBody>
+      </p:sp>
+      <p:grpSp>
+        <p:nvGrpSpPr>
+          <p:cNvPr id="124" name="Gruppieren 123"/>
+          <p:cNvGrpSpPr/>
+          <p:nvPr/>
+        </p:nvGrpSpPr>
+        <p:grpSpPr>
+          <a:xfrm>
+            <a:off x="2248043" y="2166062"/>
+            <a:ext cx="7710313" cy="2856089"/>
+            <a:chOff x="2248043" y="2166062"/>
+            <a:chExt cx="7710313" cy="2856089"/>
+          </a:xfrm>
+        </p:grpSpPr>
+        <p:sp>
+          <p:nvSpPr>
+            <p:cNvPr id="116" name="Rechteck 115"/>
+            <p:cNvSpPr/>
+            <p:nvPr/>
+          </p:nvSpPr>
+          <p:spPr>
+            <a:xfrm>
+              <a:off x="2248043" y="2166062"/>
+              <a:ext cx="7710313" cy="2856089"/>
+            </a:xfrm>
+            <a:prstGeom prst="rect">
+              <a:avLst/>
+            </a:prstGeom>
+          </p:spPr>
+          <p:style>
+            <a:lnRef idx="2">
+              <a:schemeClr val="accent1">
+                <a:shade val="50000"/>
+              </a:schemeClr>
+            </a:lnRef>
+            <a:fillRef idx="1">
+              <a:schemeClr val="accent1"/>
+            </a:fillRef>
+            <a:effectRef idx="0">
+              <a:schemeClr val="accent1"/>
+            </a:effectRef>
+            <a:fontRef idx="minor">
+              <a:schemeClr val="lt1"/>
+            </a:fontRef>
+          </p:style>
+          <p:txBody>
+            <a:bodyPr rtlCol="0" anchor="ctr"/>
+            <a:lstStyle/>
+            <a:p>
+              <a:pPr algn="ctr"/>
+              <a:endParaRPr lang="de-DE"/>
+            </a:p>
+          </p:txBody>
+        </p:sp>
+        <p:grpSp>
+          <p:nvGrpSpPr>
+            <p:cNvPr id="114" name="Gruppieren 113"/>
+            <p:cNvGrpSpPr/>
+            <p:nvPr/>
+          </p:nvGrpSpPr>
+          <p:grpSpPr>
+            <a:xfrm>
+              <a:off x="2652947" y="2581039"/>
+              <a:ext cx="6875103" cy="2026137"/>
+              <a:chOff x="1981259" y="2078836"/>
+              <a:chExt cx="6875103" cy="2026137"/>
+            </a:xfrm>
+          </p:grpSpPr>
+          <p:sp>
+            <p:nvSpPr>
+              <p:cNvPr id="14" name="Rechteck 13"/>
+              <p:cNvSpPr/>
+              <p:nvPr/>
+            </p:nvSpPr>
+            <p:spPr>
+              <a:xfrm>
+                <a:off x="1981259" y="3461506"/>
+                <a:ext cx="1343378" cy="643467"/>
+              </a:xfrm>
+              <a:prstGeom prst="rect">
+                <a:avLst/>
+              </a:prstGeom>
+              <a:solidFill>
+                <a:srgbClr val="CC6600"/>
+              </a:solidFill>
+            </p:spPr>
+            <p:style>
+              <a:lnRef idx="2">
+                <a:schemeClr val="dk1">
+                  <a:shade val="50000"/>
+                </a:schemeClr>
+              </a:lnRef>
+              <a:fillRef idx="1">
+                <a:schemeClr val="dk1"/>
+              </a:fillRef>
+              <a:effectRef idx="0">
+                <a:schemeClr val="dk1"/>
+              </a:effectRef>
+              <a:fontRef idx="minor">
+                <a:schemeClr val="lt1"/>
+              </a:fontRef>
+            </p:style>
+            <p:txBody>
+              <a:bodyPr rtlCol="0" anchor="ctr"/>
+              <a:lstStyle/>
+              <a:p>
+                <a:pPr algn="ctr"/>
+                <a:r>
+                  <a:rPr lang="en-US" sz="2400" dirty="0" err="1" smtClean="0"/>
+                  <a:t>config</a:t>
+                </a:r>
+                <a:endParaRPr lang="de-DE" sz="2400" dirty="0"/>
+              </a:p>
+            </p:txBody>
+          </p:sp>
+          <p:sp>
+            <p:nvSpPr>
+              <p:cNvPr id="15" name="Rechteck 14"/>
+              <p:cNvSpPr/>
+              <p:nvPr/>
+            </p:nvSpPr>
+            <p:spPr>
+              <a:xfrm>
+                <a:off x="7512984" y="3461504"/>
+                <a:ext cx="1343378" cy="643467"/>
+              </a:xfrm>
+              <a:prstGeom prst="rect">
+                <a:avLst/>
+              </a:prstGeom>
+              <a:solidFill>
+                <a:srgbClr val="CC6600"/>
+              </a:solidFill>
+            </p:spPr>
+            <p:style>
+              <a:lnRef idx="2">
+                <a:schemeClr val="dk1">
+                  <a:shade val="50000"/>
+                </a:schemeClr>
+              </a:lnRef>
+              <a:fillRef idx="1">
+                <a:schemeClr val="dk1"/>
+              </a:fillRef>
+              <a:effectRef idx="0">
+                <a:schemeClr val="dk1"/>
+              </a:effectRef>
+              <a:fontRef idx="minor">
+                <a:schemeClr val="lt1"/>
+              </a:fontRef>
+            </p:style>
+            <p:txBody>
+              <a:bodyPr rtlCol="0" anchor="ctr"/>
+              <a:lstStyle/>
+              <a:p>
+                <a:pPr algn="ctr"/>
+                <a:r>
+                  <a:rPr lang="en-US" sz="2400" dirty="0" smtClean="0"/>
+                  <a:t>model</a:t>
+                </a:r>
+                <a:endParaRPr lang="de-DE" sz="2400" dirty="0"/>
+              </a:p>
+            </p:txBody>
+          </p:sp>
+          <p:sp>
+            <p:nvSpPr>
+              <p:cNvPr id="16" name="Rechteck 15"/>
+              <p:cNvSpPr/>
+              <p:nvPr/>
+            </p:nvSpPr>
+            <p:spPr>
+              <a:xfrm>
+                <a:off x="4747122" y="3461505"/>
+                <a:ext cx="1535146" cy="643467"/>
+              </a:xfrm>
+              <a:prstGeom prst="rect">
+                <a:avLst/>
+              </a:prstGeom>
+              <a:solidFill>
+                <a:srgbClr val="CC6600"/>
+              </a:solidFill>
+            </p:spPr>
+            <p:style>
+              <a:lnRef idx="2">
+                <a:schemeClr val="dk1">
+                  <a:shade val="50000"/>
+                </a:schemeClr>
+              </a:lnRef>
+              <a:fillRef idx="1">
+                <a:schemeClr val="dk1"/>
+              </a:fillRef>
+              <a:effectRef idx="0">
+                <a:schemeClr val="dk1"/>
+              </a:effectRef>
+              <a:fontRef idx="minor">
+                <a:schemeClr val="lt1"/>
+              </a:fontRef>
+            </p:style>
+            <p:txBody>
+              <a:bodyPr rtlCol="0" anchor="ctr"/>
+              <a:lstStyle/>
+              <a:p>
+                <a:pPr algn="ctr"/>
+                <a:r>
+                  <a:rPr lang="en-US" sz="2400" dirty="0" smtClean="0"/>
+                  <a:t>controller</a:t>
+                </a:r>
+                <a:endParaRPr lang="de-DE" sz="2400" dirty="0"/>
+              </a:p>
+            </p:txBody>
+          </p:sp>
+          <p:sp>
+            <p:nvSpPr>
+              <p:cNvPr id="17" name="Rechteck 16"/>
+              <p:cNvSpPr/>
+              <p:nvPr/>
+            </p:nvSpPr>
+            <p:spPr>
+              <a:xfrm>
+                <a:off x="4747122" y="2078836"/>
+                <a:ext cx="1535146" cy="643467"/>
+              </a:xfrm>
+              <a:prstGeom prst="rect">
+                <a:avLst/>
+              </a:prstGeom>
+              <a:solidFill>
+                <a:srgbClr val="CC6600"/>
+              </a:solidFill>
+            </p:spPr>
+            <p:style>
+              <a:lnRef idx="2">
+                <a:schemeClr val="dk1">
+                  <a:shade val="50000"/>
+                </a:schemeClr>
+              </a:lnRef>
+              <a:fillRef idx="1">
+                <a:schemeClr val="dk1"/>
+              </a:fillRef>
+              <a:effectRef idx="0">
+                <a:schemeClr val="dk1"/>
+              </a:effectRef>
+              <a:fontRef idx="minor">
+                <a:schemeClr val="lt1"/>
+              </a:fontRef>
+            </p:style>
+            <p:txBody>
+              <a:bodyPr rtlCol="0" anchor="ctr"/>
+              <a:lstStyle/>
+              <a:p>
+                <a:pPr algn="ctr"/>
+                <a:r>
+                  <a:rPr lang="en-US" sz="2400" dirty="0" smtClean="0"/>
+                  <a:t>services</a:t>
+                </a:r>
+                <a:endParaRPr lang="de-DE" sz="2400" dirty="0"/>
+              </a:p>
+            </p:txBody>
+          </p:sp>
+          <p:cxnSp>
+            <p:nvCxnSpPr>
+              <p:cNvPr id="22" name="Gewinkelte Verbindung 21"/>
+              <p:cNvCxnSpPr>
+                <a:stCxn id="16" idx="1"/>
+                <a:endCxn id="14" idx="3"/>
+              </p:cNvCxnSpPr>
+              <p:nvPr/>
+            </p:nvCxnSpPr>
+            <p:spPr>
+              <a:xfrm rot="10800000" flipV="1">
+                <a:off x="3324638" y="3783238"/>
+                <a:ext cx="1422485" cy="1"/>
+              </a:xfrm>
+              <a:prstGeom prst="bentConnector3">
+                <a:avLst>
+                  <a:gd name="adj1" fmla="val 50000"/>
+                </a:avLst>
+              </a:prstGeom>
+              <a:ln>
+                <a:tailEnd type="triangle"/>
+              </a:ln>
+            </p:spPr>
+            <p:style>
+              <a:lnRef idx="3">
+                <a:schemeClr val="dk1"/>
+              </a:lnRef>
+              <a:fillRef idx="0">
+                <a:schemeClr val="dk1"/>
+              </a:fillRef>
+              <a:effectRef idx="2">
+                <a:schemeClr val="dk1"/>
+              </a:effectRef>
+              <a:fontRef idx="minor">
+                <a:schemeClr val="tx1"/>
+              </a:fontRef>
+            </p:style>
+          </p:cxnSp>
+          <p:cxnSp>
+            <p:nvCxnSpPr>
+              <p:cNvPr id="27" name="Gewinkelte Verbindung 26"/>
+              <p:cNvCxnSpPr>
+                <a:stCxn id="17" idx="1"/>
+                <a:endCxn id="14" idx="0"/>
+              </p:cNvCxnSpPr>
+              <p:nvPr/>
+            </p:nvCxnSpPr>
+            <p:spPr>
+              <a:xfrm rot="10800000" flipV="1">
+                <a:off x="2652948" y="2400570"/>
+                <a:ext cx="2094174" cy="1060936"/>
+              </a:xfrm>
+              <a:prstGeom prst="bentConnector2">
+                <a:avLst/>
+              </a:prstGeom>
+              <a:ln>
+                <a:tailEnd type="triangle"/>
+              </a:ln>
+            </p:spPr>
+            <p:style>
+              <a:lnRef idx="3">
+                <a:schemeClr val="dk1"/>
+              </a:lnRef>
+              <a:fillRef idx="0">
+                <a:schemeClr val="dk1"/>
+              </a:fillRef>
+              <a:effectRef idx="2">
+                <a:schemeClr val="dk1"/>
+              </a:effectRef>
+              <a:fontRef idx="minor">
+                <a:schemeClr val="tx1"/>
+              </a:fontRef>
+            </p:style>
+          </p:cxnSp>
+          <p:cxnSp>
+            <p:nvCxnSpPr>
+              <p:cNvPr id="31" name="Gerade Verbindung mit Pfeil 30"/>
+              <p:cNvCxnSpPr>
+                <a:stCxn id="16" idx="0"/>
+                <a:endCxn id="17" idx="2"/>
+              </p:cNvCxnSpPr>
+              <p:nvPr/>
+            </p:nvCxnSpPr>
+            <p:spPr>
+              <a:xfrm flipV="1">
+                <a:off x="5514695" y="2722303"/>
+                <a:ext cx="0" cy="739202"/>
+              </a:xfrm>
+              <a:prstGeom prst="straightConnector1">
+                <a:avLst/>
+              </a:prstGeom>
+              <a:ln>
+                <a:tailEnd type="triangle"/>
+              </a:ln>
+            </p:spPr>
+            <p:style>
+              <a:lnRef idx="3">
+                <a:schemeClr val="dk1"/>
+              </a:lnRef>
+              <a:fillRef idx="0">
+                <a:schemeClr val="dk1"/>
+              </a:fillRef>
+              <a:effectRef idx="2">
+                <a:schemeClr val="dk1"/>
+              </a:effectRef>
+              <a:fontRef idx="minor">
+                <a:schemeClr val="tx1"/>
+              </a:fontRef>
+            </p:style>
+          </p:cxnSp>
+          <p:cxnSp>
+            <p:nvCxnSpPr>
+              <p:cNvPr id="34" name="Gewinkelte Verbindung 33"/>
+              <p:cNvCxnSpPr>
+                <a:stCxn id="16" idx="3"/>
+                <a:endCxn id="15" idx="1"/>
+              </p:cNvCxnSpPr>
+              <p:nvPr/>
+            </p:nvCxnSpPr>
+            <p:spPr>
+              <a:xfrm flipV="1">
+                <a:off x="6282268" y="3783238"/>
+                <a:ext cx="1230716" cy="1"/>
+              </a:xfrm>
+              <a:prstGeom prst="bentConnector3">
+                <a:avLst>
+                  <a:gd name="adj1" fmla="val 50000"/>
+                </a:avLst>
+              </a:prstGeom>
+              <a:ln>
+                <a:tailEnd type="triangle"/>
+              </a:ln>
+            </p:spPr>
+            <p:style>
+              <a:lnRef idx="3">
+                <a:schemeClr val="dk1"/>
+              </a:lnRef>
+              <a:fillRef idx="0">
+                <a:schemeClr val="dk1"/>
+              </a:fillRef>
+              <a:effectRef idx="2">
+                <a:schemeClr val="dk1"/>
+              </a:effectRef>
+              <a:fontRef idx="minor">
+                <a:schemeClr val="tx1"/>
+              </a:fontRef>
+            </p:style>
+          </p:cxnSp>
+          <p:cxnSp>
+            <p:nvCxnSpPr>
+              <p:cNvPr id="61" name="Gewinkelte Verbindung 60"/>
+              <p:cNvCxnSpPr>
+                <a:stCxn id="17" idx="3"/>
+                <a:endCxn id="15" idx="0"/>
+              </p:cNvCxnSpPr>
+              <p:nvPr/>
+            </p:nvCxnSpPr>
+            <p:spPr>
+              <a:xfrm>
+                <a:off x="6282268" y="2400570"/>
+                <a:ext cx="1902405" cy="1060934"/>
+              </a:xfrm>
+              <a:prstGeom prst="bentConnector2">
+                <a:avLst/>
+              </a:prstGeom>
+              <a:ln>
+                <a:tailEnd type="triangle"/>
+              </a:ln>
+            </p:spPr>
+            <p:style>
+              <a:lnRef idx="3">
+                <a:schemeClr val="dk1"/>
+              </a:lnRef>
+              <a:fillRef idx="0">
+                <a:schemeClr val="dk1"/>
+              </a:fillRef>
+              <a:effectRef idx="2">
+                <a:schemeClr val="dk1"/>
+              </a:effectRef>
+              <a:fontRef idx="minor">
+                <a:schemeClr val="tx1"/>
+              </a:fontRef>
+            </p:style>
+          </p:cxnSp>
+        </p:grpSp>
+      </p:grpSp>
+      <p:sp>
+        <p:nvSpPr>
+          <p:cNvPr id="117" name="Textfeld 116"/>
+          <p:cNvSpPr txBox="1"/>
+          <p:nvPr/>
+        </p:nvSpPr>
+        <p:spPr>
+          <a:xfrm>
+            <a:off x="7809274" y="1253067"/>
+            <a:ext cx="3354636" cy="400110"/>
+          </a:xfrm>
+          <a:prstGeom prst="rect">
+            <a:avLst/>
+          </a:prstGeom>
+        </p:spPr>
+        <p:style>
+          <a:lnRef idx="2">
+            <a:schemeClr val="dk1"/>
+          </a:lnRef>
+          <a:fillRef idx="1">
+            <a:schemeClr val="lt1"/>
+          </a:fillRef>
+          <a:effectRef idx="0">
+            <a:schemeClr val="dk1"/>
+          </a:effectRef>
+          <a:fontRef idx="minor">
+            <a:schemeClr val="dk1"/>
+          </a:fontRef>
+        </p:style>
+        <p:txBody>
+          <a:bodyPr wrap="none" rtlCol="0">
+            <a:spAutoFit/>
+          </a:bodyPr>
+          <a:lstStyle/>
+          <a:p>
+            <a:r>
+              <a:rPr lang="en-US" sz="2000" dirty="0" smtClean="0"/>
+              <a:t>talks to salesforce REST API</a:t>
+            </a:r>
+            <a:endParaRPr lang="de-DE" sz="2000" dirty="0"/>
+          </a:p>
+        </p:txBody>
+      </p:sp>
+      <p:cxnSp>
+        <p:nvCxnSpPr>
+          <p:cNvPr id="126" name="Gerader Verbinder 125"/>
+          <p:cNvCxnSpPr/>
+          <p:nvPr/>
+        </p:nvCxnSpPr>
+        <p:spPr>
+          <a:xfrm flipV="1">
+            <a:off x="6953956" y="1653177"/>
+            <a:ext cx="855318" cy="927862"/>
+          </a:xfrm>
+          <a:prstGeom prst="line">
+            <a:avLst/>
+          </a:prstGeom>
+        </p:spPr>
+        <p:style>
+          <a:lnRef idx="3">
+            <a:schemeClr val="accent6"/>
+          </a:lnRef>
+          <a:fillRef idx="0">
+            <a:schemeClr val="accent6"/>
+          </a:fillRef>
+          <a:effectRef idx="2">
+            <a:schemeClr val="accent6"/>
+          </a:effectRef>
+          <a:fontRef idx="minor">
+            <a:schemeClr val="tx1"/>
+          </a:fontRef>
+        </p:style>
+      </p:cxnSp>
+      <p:cxnSp>
+        <p:nvCxnSpPr>
+          <p:cNvPr id="128" name="Gerader Verbinder 127"/>
+          <p:cNvCxnSpPr/>
+          <p:nvPr/>
+        </p:nvCxnSpPr>
+        <p:spPr>
+          <a:xfrm>
+            <a:off x="6953956" y="4607174"/>
+            <a:ext cx="1043017" cy="917247"/>
+          </a:xfrm>
+          <a:prstGeom prst="line">
+            <a:avLst/>
+          </a:prstGeom>
+        </p:spPr>
+        <p:style>
+          <a:lnRef idx="3">
+            <a:schemeClr val="accent6"/>
+          </a:lnRef>
+          <a:fillRef idx="0">
+            <a:schemeClr val="accent6"/>
+          </a:fillRef>
+          <a:effectRef idx="2">
+            <a:schemeClr val="accent6"/>
+          </a:effectRef>
+          <a:fontRef idx="minor">
+            <a:schemeClr val="tx1"/>
+          </a:fontRef>
+        </p:style>
+      </p:cxnSp>
+      <p:sp>
+        <p:nvSpPr>
+          <p:cNvPr id="130" name="Textfeld 129"/>
+          <p:cNvSpPr txBox="1"/>
+          <p:nvPr/>
+        </p:nvSpPr>
+        <p:spPr>
+          <a:xfrm>
+            <a:off x="7961674" y="5468053"/>
+            <a:ext cx="2107500" cy="400110"/>
+          </a:xfrm>
+          <a:prstGeom prst="rect">
+            <a:avLst/>
+          </a:prstGeom>
+        </p:spPr>
+        <p:style>
+          <a:lnRef idx="2">
+            <a:schemeClr val="dk1"/>
+          </a:lnRef>
+          <a:fillRef idx="1">
+            <a:schemeClr val="lt1"/>
+          </a:fillRef>
+          <a:effectRef idx="0">
+            <a:schemeClr val="dk1"/>
+          </a:effectRef>
+          <a:fontRef idx="minor">
+            <a:schemeClr val="dk1"/>
+          </a:fontRef>
+        </p:style>
+        <p:txBody>
+          <a:bodyPr wrap="none" rtlCol="0">
+            <a:spAutoFit/>
+          </a:bodyPr>
+          <a:lstStyle/>
+          <a:p>
+            <a:r>
+              <a:rPr lang="en-US" sz="2000" dirty="0" smtClean="0"/>
+              <a:t>handles requests</a:t>
+            </a:r>
+            <a:endParaRPr lang="de-DE" sz="2000" dirty="0"/>
+          </a:p>
+        </p:txBody>
+      </p:sp>
+      <p:sp>
+        <p:nvSpPr>
+          <p:cNvPr id="132" name="Textfeld 131"/>
+          <p:cNvSpPr txBox="1"/>
+          <p:nvPr/>
+        </p:nvSpPr>
+        <p:spPr>
+          <a:xfrm>
+            <a:off x="383025" y="5468053"/>
+            <a:ext cx="4076085" cy="400110"/>
+          </a:xfrm>
+          <a:prstGeom prst="rect">
+            <a:avLst/>
+          </a:prstGeom>
+        </p:spPr>
+        <p:style>
+          <a:lnRef idx="2">
+            <a:schemeClr val="dk1"/>
+          </a:lnRef>
+          <a:fillRef idx="1">
+            <a:schemeClr val="lt1"/>
+          </a:fillRef>
+          <a:effectRef idx="0">
+            <a:schemeClr val="dk1"/>
+          </a:effectRef>
+          <a:fontRef idx="minor">
+            <a:schemeClr val="dk1"/>
+          </a:fontRef>
+        </p:style>
+        <p:txBody>
+          <a:bodyPr wrap="square" rtlCol="0">
+            <a:spAutoFit/>
+          </a:bodyPr>
+          <a:lstStyle/>
+          <a:p>
+            <a:r>
+              <a:rPr lang="en-US" sz="2000" dirty="0" err="1" smtClean="0"/>
+              <a:t>config</a:t>
+            </a:r>
+            <a:r>
+              <a:rPr lang="en-US" sz="2000" dirty="0" smtClean="0"/>
+              <a:t> values separated from code</a:t>
+            </a:r>
+            <a:endParaRPr lang="de-DE" sz="2000" dirty="0"/>
+          </a:p>
+        </p:txBody>
+      </p:sp>
+      <p:cxnSp>
+        <p:nvCxnSpPr>
+          <p:cNvPr id="133" name="Gerader Verbinder 132"/>
+          <p:cNvCxnSpPr/>
+          <p:nvPr/>
+        </p:nvCxnSpPr>
+        <p:spPr>
+          <a:xfrm flipH="1">
+            <a:off x="2421068" y="4607176"/>
+            <a:ext cx="231879" cy="860877"/>
+          </a:xfrm>
+          <a:prstGeom prst="line">
+            <a:avLst/>
+          </a:prstGeom>
+        </p:spPr>
+        <p:style>
+          <a:lnRef idx="3">
+            <a:schemeClr val="accent6"/>
+          </a:lnRef>
+          <a:fillRef idx="0">
+            <a:schemeClr val="accent6"/>
+          </a:fillRef>
+          <a:effectRef idx="2">
+            <a:schemeClr val="accent6"/>
+          </a:effectRef>
+          <a:fontRef idx="minor">
+            <a:schemeClr val="tx1"/>
+          </a:fontRef>
+        </p:style>
+      </p:cxnSp>
+      <p:cxnSp>
+        <p:nvCxnSpPr>
+          <p:cNvPr id="137" name="Gerader Verbinder 136"/>
+          <p:cNvCxnSpPr/>
+          <p:nvPr/>
+        </p:nvCxnSpPr>
+        <p:spPr>
+          <a:xfrm flipV="1">
+            <a:off x="9528050" y="3467812"/>
+            <a:ext cx="662185" cy="495898"/>
+          </a:xfrm>
+          <a:prstGeom prst="line">
+            <a:avLst/>
+          </a:prstGeom>
+        </p:spPr>
+        <p:style>
+          <a:lnRef idx="3">
+            <a:schemeClr val="accent6"/>
+          </a:lnRef>
+          <a:fillRef idx="0">
+            <a:schemeClr val="accent6"/>
+          </a:fillRef>
+          <a:effectRef idx="2">
+            <a:schemeClr val="accent6"/>
+          </a:effectRef>
+          <a:fontRef idx="minor">
+            <a:schemeClr val="tx1"/>
+          </a:fontRef>
+        </p:style>
+      </p:cxnSp>
+      <p:sp>
+        <p:nvSpPr>
+          <p:cNvPr id="140" name="Textfeld 139"/>
+          <p:cNvSpPr txBox="1"/>
+          <p:nvPr/>
+        </p:nvSpPr>
+        <p:spPr>
+          <a:xfrm>
+            <a:off x="10199739" y="3452181"/>
+            <a:ext cx="1770036" cy="400110"/>
+          </a:xfrm>
+          <a:prstGeom prst="rect">
+            <a:avLst/>
+          </a:prstGeom>
+        </p:spPr>
+        <p:style>
+          <a:lnRef idx="2">
+            <a:schemeClr val="dk1"/>
+          </a:lnRef>
+          <a:fillRef idx="1">
+            <a:schemeClr val="lt1"/>
+          </a:fillRef>
+          <a:effectRef idx="0">
+            <a:schemeClr val="dk1"/>
+          </a:effectRef>
+          <a:fontRef idx="minor">
+            <a:schemeClr val="dk1"/>
+          </a:fontRef>
+        </p:style>
+        <p:txBody>
+          <a:bodyPr wrap="none" rtlCol="0">
+            <a:spAutoFit/>
+          </a:bodyPr>
+          <a:lstStyle/>
+          <a:p>
+            <a:r>
+              <a:rPr lang="en-US" sz="2000" dirty="0" err="1" smtClean="0"/>
+              <a:t>simlpe</a:t>
+            </a:r>
+            <a:r>
+              <a:rPr lang="en-US" sz="2000" dirty="0" smtClean="0"/>
+              <a:t> POJOs</a:t>
+            </a:r>
+            <a:endParaRPr lang="de-DE" sz="2000" dirty="0"/>
+          </a:p>
+        </p:txBody>
+      </p:sp>
+    </p:spTree>
+    <p:extLst>
+      <p:ext uri="{BB962C8B-B14F-4D97-AF65-F5344CB8AC3E}">
+        <p14:creationId xmlns:p14="http://schemas.microsoft.com/office/powerpoint/2010/main" val="1654290299"/>
+      </p:ext>
+    </p:extLst>
+  </p:cSld>
+  <p:clrMapOvr>
+    <a:masterClrMapping/>
+  </p:clrMapOvr>
+  <p:timing>
+    <p:tnLst>
+      <p:par>
+        <p:cTn id="1" dur="indefinite" restart="never" nodeType="tmRoot"/>
+      </p:par>
+    </p:tnLst>
+  </p:timing>
+</p:sld>
+</file>
+
+<file path=ppt/slides/slide14.xml><?xml version="1.0" encoding="utf-8"?>
+<p:sld xmlns:a="http://schemas.openxmlformats.org/drawingml/2006/main" xmlns:r="http://schemas.openxmlformats.org/officeDocument/2006/relationships" xmlns:p="http://schemas.openxmlformats.org/presentationml/2006/main">
+  <p:cSld>
+    <p:spTree>
+      <p:nvGrpSpPr>
+        <p:cNvPr id="1" name=""/>
+        <p:cNvGrpSpPr/>
+        <p:nvPr/>
+      </p:nvGrpSpPr>
+      <p:grpSpPr>
+        <a:xfrm>
+          <a:off x="0" y="0"/>
+          <a:ext cx="0" cy="0"/>
+          <a:chOff x="0" y="0"/>
+          <a:chExt cx="0" cy="0"/>
+        </a:xfrm>
+      </p:grpSpPr>
+      <p:sp>
+        <p:nvSpPr>
+          <p:cNvPr id="3" name="Foliennummernplatzhalter 2"/>
+          <p:cNvSpPr>
+            <a:spLocks noGrp="1"/>
+          </p:cNvSpPr>
+          <p:nvPr>
+            <p:ph type="sldNum" sz="quarter" idx="12"/>
+          </p:nvPr>
+        </p:nvSpPr>
+        <p:spPr/>
+        <p:txBody>
+          <a:bodyPr/>
+          <a:lstStyle/>
+          <a:p>
+            <a:fld id="{FCEE2C88-6C8F-484D-AF69-578F576B1F44}" type="slidenum">
+              <a:rPr lang="en-US" smtClean="0"/>
+              <a:pPr/>
+              <a:t>14</a:t>
+            </a:fld>
+            <a:endParaRPr lang="en-US" dirty="0"/>
+          </a:p>
+        </p:txBody>
+      </p:sp>
+      <p:sp>
+        <p:nvSpPr>
+          <p:cNvPr id="4" name="Textplatzhalter 3"/>
+          <p:cNvSpPr>
+            <a:spLocks noGrp="1"/>
+          </p:cNvSpPr>
+          <p:nvPr>
+            <p:ph type="body" sz="quarter" idx="14"/>
+          </p:nvPr>
+        </p:nvSpPr>
+        <p:spPr/>
+        <p:txBody>
+          <a:bodyPr>
+            <a:noAutofit/>
+          </a:bodyPr>
+          <a:lstStyle/>
+          <a:p>
+            <a:r>
+              <a:rPr lang="de-DE" sz="3200" dirty="0" smtClean="0"/>
               <a:t>REST API Client</a:t>
             </a:r>
             <a:endParaRPr lang="en-US" sz="3200" dirty="0"/>
@@ -4488,852 +5424,7 @@
     </p:spTree>
     <p:extLst>
       <p:ext uri="{BB962C8B-B14F-4D97-AF65-F5344CB8AC3E}">
-        <p14:creationId xmlns:p14="http://schemas.microsoft.com/office/powerpoint/2010/main" val="1654290299"/>
-      </p:ext>
-    </p:extLst>
-  </p:cSld>
-  <p:clrMapOvr>
-    <a:masterClrMapping/>
-  </p:clrMapOvr>
-  <p:timing>
-    <p:tnLst>
-      <p:par>
-        <p:cTn id="1" dur="indefinite" restart="never" nodeType="tmRoot"/>
-      </p:par>
-    </p:tnLst>
-  </p:timing>
-</p:sld>
-</file>
-
-<file path=ppt/slides/slide14.xml><?xml version="1.0" encoding="utf-8"?>
-<p:sld xmlns:a="http://schemas.openxmlformats.org/drawingml/2006/main" xmlns:r="http://schemas.openxmlformats.org/officeDocument/2006/relationships" xmlns:p="http://schemas.openxmlformats.org/presentationml/2006/main">
-  <p:cSld>
-    <p:spTree>
-      <p:nvGrpSpPr>
-        <p:cNvPr id="1" name=""/>
-        <p:cNvGrpSpPr/>
-        <p:nvPr/>
-      </p:nvGrpSpPr>
-      <p:grpSpPr>
-        <a:xfrm>
-          <a:off x="0" y="0"/>
-          <a:ext cx="0" cy="0"/>
-          <a:chOff x="0" y="0"/>
-          <a:chExt cx="0" cy="0"/>
-        </a:xfrm>
-      </p:grpSpPr>
-      <p:sp>
-        <p:nvSpPr>
-          <p:cNvPr id="3" name="Foliennummernplatzhalter 2"/>
-          <p:cNvSpPr>
-            <a:spLocks noGrp="1"/>
-          </p:cNvSpPr>
-          <p:nvPr>
-            <p:ph type="sldNum" sz="quarter" idx="12"/>
-          </p:nvPr>
-        </p:nvSpPr>
-        <p:spPr/>
-        <p:txBody>
-          <a:bodyPr/>
-          <a:lstStyle/>
-          <a:p>
-            <a:fld id="{FCEE2C88-6C8F-484D-AF69-578F576B1F44}" type="slidenum">
-              <a:rPr lang="en-US" smtClean="0"/>
-              <a:pPr/>
-              <a:t>14</a:t>
-            </a:fld>
-            <a:endParaRPr lang="en-US" dirty="0"/>
-          </a:p>
-        </p:txBody>
-      </p:sp>
-      <p:sp>
-        <p:nvSpPr>
-          <p:cNvPr id="4" name="Textplatzhalter 3"/>
-          <p:cNvSpPr>
-            <a:spLocks noGrp="1"/>
-          </p:cNvSpPr>
-          <p:nvPr>
-            <p:ph type="body" sz="quarter" idx="14"/>
-          </p:nvPr>
-        </p:nvSpPr>
-        <p:spPr/>
-        <p:txBody>
-          <a:bodyPr>
-            <a:noAutofit/>
-          </a:bodyPr>
-          <a:lstStyle/>
-          <a:p>
-            <a:r>
-              <a:rPr lang="en-US" sz="3200" dirty="0">
-                <a:latin typeface="Roboto medium" pitchFamily="2" charset="0"/>
-                <a:ea typeface="Roboto medium" pitchFamily="2" charset="0"/>
-              </a:rPr>
-              <a:t>RDF </a:t>
-            </a:r>
-            <a:r>
-              <a:rPr lang="en-US" sz="3200" dirty="0" smtClean="0">
-                <a:latin typeface="Roboto medium" pitchFamily="2" charset="0"/>
-                <a:ea typeface="Roboto medium" pitchFamily="2" charset="0"/>
-              </a:rPr>
-              <a:t>Transformer</a:t>
-            </a:r>
-            <a:endParaRPr lang="en-US" sz="3200" dirty="0">
-              <a:latin typeface="Roboto medium" pitchFamily="2" charset="0"/>
-              <a:ea typeface="Roboto medium" pitchFamily="2" charset="0"/>
-            </a:endParaRPr>
-          </a:p>
-        </p:txBody>
-      </p:sp>
-      <p:sp>
-        <p:nvSpPr>
-          <p:cNvPr id="5" name="Textplatzhalter 4"/>
-          <p:cNvSpPr>
-            <a:spLocks noGrp="1"/>
-          </p:cNvSpPr>
-          <p:nvPr>
-            <p:ph type="body" sz="quarter" idx="15"/>
-          </p:nvPr>
-        </p:nvSpPr>
-        <p:spPr/>
-        <p:txBody>
-          <a:bodyPr/>
-          <a:lstStyle/>
-          <a:p>
-            <a:endParaRPr lang="en-US"/>
-          </a:p>
-        </p:txBody>
-      </p:sp>
-      <p:sp>
-        <p:nvSpPr>
-          <p:cNvPr id="2" name="Textfeld 1"/>
-          <p:cNvSpPr txBox="1"/>
-          <p:nvPr/>
-        </p:nvSpPr>
-        <p:spPr>
-          <a:xfrm>
-            <a:off x="1038578" y="1364095"/>
-            <a:ext cx="10504542" cy="1908215"/>
-          </a:xfrm>
-          <a:prstGeom prst="rect">
-            <a:avLst/>
-          </a:prstGeom>
-          <a:noFill/>
-        </p:spPr>
-        <p:txBody>
-          <a:bodyPr wrap="square" rtlCol="0">
-            <a:spAutoFit/>
-          </a:bodyPr>
-          <a:lstStyle/>
-          <a:p>
-            <a:pPr>
-              <a:spcAft>
-                <a:spcPts val="1200"/>
-              </a:spcAft>
-            </a:pPr>
-            <a:r>
-              <a:rPr lang="en-US" sz="2400" dirty="0" smtClean="0">
-                <a:latin typeface="+mj-lt"/>
-                <a:ea typeface="Roboto medium" pitchFamily="2" charset="0"/>
-              </a:rPr>
-              <a:t>RDF </a:t>
-            </a:r>
-            <a:r>
-              <a:rPr lang="de-DE" sz="2400" b="1" dirty="0" smtClean="0">
-                <a:latin typeface="+mj-lt"/>
-              </a:rPr>
-              <a:t>→ </a:t>
-            </a:r>
-            <a:r>
-              <a:rPr lang="de-DE" sz="2400" dirty="0" err="1" smtClean="0">
-                <a:latin typeface="+mj-lt"/>
-              </a:rPr>
-              <a:t>Contact</a:t>
-            </a:r>
-            <a:endParaRPr lang="en-US" sz="2400" b="1" dirty="0">
-              <a:latin typeface="+mj-lt"/>
-              <a:ea typeface="Roboto medium" pitchFamily="2" charset="0"/>
-            </a:endParaRPr>
-          </a:p>
-          <a:p>
-            <a:r>
-              <a:rPr lang="en-US" sz="2800" dirty="0" smtClean="0">
-                <a:ea typeface="Roboto medium" pitchFamily="2" charset="0"/>
-              </a:rPr>
-              <a:t>ContactService extracts </a:t>
-            </a:r>
-            <a:r>
-              <a:rPr lang="en-US" sz="2800" b="1" dirty="0" err="1" smtClean="0">
-                <a:ea typeface="Roboto medium" pitchFamily="2" charset="0"/>
-              </a:rPr>
-              <a:t>foaf:person</a:t>
-            </a:r>
-            <a:r>
-              <a:rPr lang="en-US" sz="2800" dirty="0" smtClean="0">
-                <a:ea typeface="Roboto medium" pitchFamily="2" charset="0"/>
-              </a:rPr>
-              <a:t> types and transforms them to contact objects. Use reflection to iterate over properties.</a:t>
-            </a:r>
-          </a:p>
-          <a:p>
-            <a:endParaRPr lang="en-US" sz="2800" dirty="0" smtClean="0">
-              <a:ea typeface="Roboto medium" pitchFamily="2" charset="0"/>
-            </a:endParaRPr>
-          </a:p>
-        </p:txBody>
-      </p:sp>
-      <p:sp>
-        <p:nvSpPr>
-          <p:cNvPr id="7" name="Rechteck 6"/>
-          <p:cNvSpPr/>
-          <p:nvPr/>
-        </p:nvSpPr>
-        <p:spPr>
-          <a:xfrm>
-            <a:off x="344371" y="3272310"/>
-            <a:ext cx="6361230" cy="2308324"/>
-          </a:xfrm>
-          <a:prstGeom prst="rect">
-            <a:avLst/>
-          </a:prstGeom>
-        </p:spPr>
-        <p:style>
-          <a:lnRef idx="2">
-            <a:schemeClr val="dk1"/>
-          </a:lnRef>
-          <a:fillRef idx="1">
-            <a:schemeClr val="lt1"/>
-          </a:fillRef>
-          <a:effectRef idx="0">
-            <a:schemeClr val="dk1"/>
-          </a:effectRef>
-          <a:fontRef idx="minor">
-            <a:schemeClr val="dk1"/>
-          </a:fontRef>
-        </p:style>
-        <p:txBody>
-          <a:bodyPr wrap="square">
-            <a:spAutoFit/>
-          </a:bodyPr>
-          <a:lstStyle/>
-          <a:p>
-            <a:r>
-              <a:rPr lang="de-DE" dirty="0" err="1">
-                <a:latin typeface="Courier New" panose="02070309020205020404" pitchFamily="49" charset="0"/>
-              </a:rPr>
-              <a:t>eccenca:stramp</a:t>
-            </a:r>
-            <a:r>
-              <a:rPr lang="de-DE" dirty="0">
-                <a:latin typeface="Courier New" panose="02070309020205020404" pitchFamily="49" charset="0"/>
-              </a:rPr>
-              <a:t> a </a:t>
-            </a:r>
-            <a:r>
-              <a:rPr lang="de-DE" dirty="0" err="1">
-                <a:latin typeface="Courier New" panose="02070309020205020404" pitchFamily="49" charset="0"/>
-              </a:rPr>
-              <a:t>foaf:Person</a:t>
-            </a:r>
-            <a:r>
-              <a:rPr lang="de-DE" dirty="0">
-                <a:latin typeface="Courier New" panose="02070309020205020404" pitchFamily="49" charset="0"/>
-              </a:rPr>
-              <a:t> ;</a:t>
-            </a:r>
-          </a:p>
-          <a:p>
-            <a:r>
-              <a:rPr lang="de-DE" dirty="0">
-                <a:latin typeface="Courier New" panose="02070309020205020404" pitchFamily="49" charset="0"/>
-              </a:rPr>
-              <a:t>  </a:t>
-            </a:r>
-            <a:r>
-              <a:rPr lang="de-DE" dirty="0" err="1">
-                <a:latin typeface="Courier New" panose="02070309020205020404" pitchFamily="49" charset="0"/>
-              </a:rPr>
-              <a:t>foaf:title</a:t>
-            </a:r>
-            <a:r>
-              <a:rPr lang="de-DE" dirty="0">
-                <a:latin typeface="Courier New" panose="02070309020205020404" pitchFamily="49" charset="0"/>
-              </a:rPr>
-              <a:t> "</a:t>
-            </a:r>
-            <a:r>
-              <a:rPr lang="de-DE" u="sng" dirty="0">
-                <a:solidFill>
-                  <a:srgbClr val="000000"/>
-                </a:solidFill>
-                <a:latin typeface="Courier New" panose="02070309020205020404" pitchFamily="49" charset="0"/>
-              </a:rPr>
-              <a:t>Dr." ;</a:t>
-            </a:r>
-          </a:p>
-          <a:p>
-            <a:r>
-              <a:rPr lang="de-DE" dirty="0">
-                <a:latin typeface="Courier New" panose="02070309020205020404" pitchFamily="49" charset="0"/>
-              </a:rPr>
-              <a:t>  </a:t>
-            </a:r>
-            <a:r>
-              <a:rPr lang="de-DE" dirty="0" err="1">
-                <a:latin typeface="Courier New" panose="02070309020205020404" pitchFamily="49" charset="0"/>
-              </a:rPr>
-              <a:t>foaf:givenName</a:t>
-            </a:r>
-            <a:r>
-              <a:rPr lang="de-DE" dirty="0">
-                <a:latin typeface="Courier New" panose="02070309020205020404" pitchFamily="49" charset="0"/>
-              </a:rPr>
-              <a:t> "</a:t>
-            </a:r>
-            <a:r>
-              <a:rPr lang="de-DE" u="sng" dirty="0">
-                <a:solidFill>
-                  <a:srgbClr val="000000"/>
-                </a:solidFill>
-                <a:latin typeface="Courier New" panose="02070309020205020404" pitchFamily="49" charset="0"/>
-              </a:rPr>
-              <a:t>Sebastian" ;</a:t>
-            </a:r>
-          </a:p>
-          <a:p>
-            <a:r>
-              <a:rPr lang="de-DE" dirty="0">
-                <a:latin typeface="Courier New" panose="02070309020205020404" pitchFamily="49" charset="0"/>
-              </a:rPr>
-              <a:t>  </a:t>
-            </a:r>
-            <a:r>
-              <a:rPr lang="de-DE" dirty="0" err="1">
-                <a:latin typeface="Courier New" panose="02070309020205020404" pitchFamily="49" charset="0"/>
-              </a:rPr>
-              <a:t>foaf:familyName</a:t>
-            </a:r>
-            <a:r>
-              <a:rPr lang="de-DE" dirty="0">
-                <a:latin typeface="Courier New" panose="02070309020205020404" pitchFamily="49" charset="0"/>
-              </a:rPr>
-              <a:t> "Tramp" ;</a:t>
-            </a:r>
-          </a:p>
-          <a:p>
-            <a:r>
-              <a:rPr lang="de-DE" dirty="0">
-                <a:latin typeface="Courier New" panose="02070309020205020404" pitchFamily="49" charset="0"/>
-              </a:rPr>
-              <a:t> </a:t>
-            </a:r>
-            <a:r>
-              <a:rPr lang="de-DE" dirty="0" smtClean="0">
-                <a:latin typeface="Courier New" panose="02070309020205020404" pitchFamily="49" charset="0"/>
-              </a:rPr>
-              <a:t> </a:t>
-            </a:r>
-            <a:r>
-              <a:rPr lang="de-DE" dirty="0" err="1" smtClean="0">
-                <a:latin typeface="Courier New" panose="02070309020205020404" pitchFamily="49" charset="0"/>
-              </a:rPr>
-              <a:t>odette:position</a:t>
-            </a:r>
-            <a:r>
-              <a:rPr lang="de-DE" dirty="0" smtClean="0">
-                <a:latin typeface="Courier New" panose="02070309020205020404" pitchFamily="49" charset="0"/>
-              </a:rPr>
-              <a:t> </a:t>
-            </a:r>
-            <a:r>
-              <a:rPr lang="de-DE" dirty="0">
-                <a:latin typeface="Courier New" panose="02070309020205020404" pitchFamily="49" charset="0"/>
-              </a:rPr>
-              <a:t>"Head </a:t>
-            </a:r>
-            <a:r>
-              <a:rPr lang="de-DE" dirty="0" err="1">
-                <a:latin typeface="Courier New" panose="02070309020205020404" pitchFamily="49" charset="0"/>
-              </a:rPr>
-              <a:t>of</a:t>
-            </a:r>
-            <a:r>
-              <a:rPr lang="de-DE" dirty="0">
-                <a:latin typeface="Courier New" panose="02070309020205020404" pitchFamily="49" charset="0"/>
-              </a:rPr>
-              <a:t> Development" ;</a:t>
-            </a:r>
-          </a:p>
-          <a:p>
-            <a:r>
-              <a:rPr lang="de-DE" dirty="0">
-                <a:latin typeface="Courier New" panose="02070309020205020404" pitchFamily="49" charset="0"/>
-              </a:rPr>
-              <a:t>  </a:t>
-            </a:r>
-            <a:r>
-              <a:rPr lang="de-DE" dirty="0" err="1">
-                <a:latin typeface="Courier New" panose="02070309020205020404" pitchFamily="49" charset="0"/>
-              </a:rPr>
-              <a:t>odette:telephoneNumber</a:t>
-            </a:r>
-            <a:r>
-              <a:rPr lang="de-DE" dirty="0">
-                <a:latin typeface="Courier New" panose="02070309020205020404" pitchFamily="49" charset="0"/>
-              </a:rPr>
-              <a:t> "+49 341 26508028" ;</a:t>
-            </a:r>
-          </a:p>
-          <a:p>
-            <a:r>
-              <a:rPr lang="de-DE" dirty="0">
-                <a:latin typeface="Courier New" panose="02070309020205020404" pitchFamily="49" charset="0"/>
-              </a:rPr>
-              <a:t>  </a:t>
-            </a:r>
-            <a:r>
-              <a:rPr lang="de-DE" dirty="0" err="1">
-                <a:latin typeface="Courier New" panose="02070309020205020404" pitchFamily="49" charset="0"/>
-              </a:rPr>
-              <a:t>odette:emailAddress</a:t>
-            </a:r>
-            <a:r>
-              <a:rPr lang="de-DE" dirty="0">
-                <a:latin typeface="Courier New" panose="02070309020205020404" pitchFamily="49" charset="0"/>
-              </a:rPr>
-              <a:t> "</a:t>
-            </a:r>
-            <a:r>
-              <a:rPr lang="de-DE" u="sng" dirty="0">
-                <a:solidFill>
-                  <a:srgbClr val="000000"/>
-                </a:solidFill>
-                <a:latin typeface="Courier New" panose="02070309020205020404" pitchFamily="49" charset="0"/>
-              </a:rPr>
-              <a:t>stramp@brox.de" </a:t>
-            </a:r>
-          </a:p>
-          <a:p>
-            <a:r>
-              <a:rPr lang="de-DE" dirty="0">
-                <a:latin typeface="Courier New" panose="02070309020205020404" pitchFamily="49" charset="0"/>
-              </a:rPr>
-              <a:t>.</a:t>
-            </a:r>
-            <a:endParaRPr lang="de-DE" dirty="0"/>
-          </a:p>
-        </p:txBody>
-      </p:sp>
-      <p:sp>
-        <p:nvSpPr>
-          <p:cNvPr id="8" name="Rechteck 7"/>
-          <p:cNvSpPr/>
-          <p:nvPr/>
-        </p:nvSpPr>
-        <p:spPr>
-          <a:xfrm>
-            <a:off x="6964348" y="3272310"/>
-            <a:ext cx="4938297" cy="2308324"/>
-          </a:xfrm>
-          <a:prstGeom prst="rect">
-            <a:avLst/>
-          </a:prstGeom>
-        </p:spPr>
-        <p:style>
-          <a:lnRef idx="2">
-            <a:schemeClr val="dk1"/>
-          </a:lnRef>
-          <a:fillRef idx="1">
-            <a:schemeClr val="lt1"/>
-          </a:fillRef>
-          <a:effectRef idx="0">
-            <a:schemeClr val="dk1"/>
-          </a:effectRef>
-          <a:fontRef idx="minor">
-            <a:schemeClr val="dk1"/>
-          </a:fontRef>
-        </p:style>
-        <p:txBody>
-          <a:bodyPr wrap="square">
-            <a:spAutoFit/>
-          </a:bodyPr>
-          <a:lstStyle/>
-          <a:p>
-            <a:r>
-              <a:rPr lang="de-DE" b="1" dirty="0">
-                <a:solidFill>
-                  <a:srgbClr val="7F0055"/>
-                </a:solidFill>
-                <a:latin typeface="Courier New" panose="02070309020205020404" pitchFamily="49" charset="0"/>
-              </a:rPr>
-              <a:t>public</a:t>
-            </a:r>
-            <a:r>
-              <a:rPr lang="de-DE" b="1" dirty="0">
-                <a:solidFill>
-                  <a:srgbClr val="000000"/>
-                </a:solidFill>
-                <a:latin typeface="Courier New" panose="02070309020205020404" pitchFamily="49" charset="0"/>
-              </a:rPr>
-              <a:t> </a:t>
-            </a:r>
-            <a:r>
-              <a:rPr lang="de-DE" b="1" dirty="0" err="1">
-                <a:solidFill>
-                  <a:srgbClr val="7F0055"/>
-                </a:solidFill>
-                <a:latin typeface="Courier New" panose="02070309020205020404" pitchFamily="49" charset="0"/>
-              </a:rPr>
-              <a:t>class</a:t>
-            </a:r>
-            <a:r>
-              <a:rPr lang="de-DE" b="1" dirty="0">
-                <a:solidFill>
-                  <a:srgbClr val="000000"/>
-                </a:solidFill>
-                <a:latin typeface="Courier New" panose="02070309020205020404" pitchFamily="49" charset="0"/>
-              </a:rPr>
-              <a:t> </a:t>
-            </a:r>
-            <a:r>
-              <a:rPr lang="de-DE" b="1" dirty="0" err="1">
-                <a:solidFill>
-                  <a:srgbClr val="000000"/>
-                </a:solidFill>
-                <a:latin typeface="Courier New" panose="02070309020205020404" pitchFamily="49" charset="0"/>
-              </a:rPr>
-              <a:t>Contact</a:t>
-            </a:r>
-            <a:r>
-              <a:rPr lang="de-DE" b="1" dirty="0">
-                <a:solidFill>
-                  <a:srgbClr val="000000"/>
-                </a:solidFill>
-                <a:latin typeface="Courier New" panose="02070309020205020404" pitchFamily="49" charset="0"/>
-              </a:rPr>
-              <a:t> </a:t>
-            </a:r>
-            <a:r>
-              <a:rPr lang="de-DE" b="1" dirty="0" smtClean="0">
-                <a:solidFill>
-                  <a:srgbClr val="000000"/>
-                </a:solidFill>
-                <a:latin typeface="Courier New" panose="02070309020205020404" pitchFamily="49" charset="0"/>
-              </a:rPr>
-              <a:t>{</a:t>
-            </a:r>
-            <a:endParaRPr lang="de-DE" dirty="0">
-              <a:latin typeface="Courier New" panose="02070309020205020404" pitchFamily="49" charset="0"/>
-            </a:endParaRPr>
-          </a:p>
-          <a:p>
-            <a:pPr lvl="1"/>
-            <a:r>
-              <a:rPr lang="de-DE" b="1" dirty="0" smtClean="0">
-                <a:solidFill>
-                  <a:srgbClr val="7F0055"/>
-                </a:solidFill>
-                <a:latin typeface="Courier New" panose="02070309020205020404" pitchFamily="49" charset="0"/>
-              </a:rPr>
-              <a:t>private</a:t>
-            </a:r>
-            <a:r>
-              <a:rPr lang="de-DE" b="1" dirty="0" smtClean="0">
-                <a:solidFill>
-                  <a:srgbClr val="000000"/>
-                </a:solidFill>
-                <a:latin typeface="Courier New" panose="02070309020205020404" pitchFamily="49" charset="0"/>
-              </a:rPr>
-              <a:t> </a:t>
-            </a:r>
-            <a:r>
-              <a:rPr lang="de-DE" b="1" dirty="0">
-                <a:solidFill>
-                  <a:srgbClr val="000000"/>
-                </a:solidFill>
-                <a:latin typeface="Courier New" panose="02070309020205020404" pitchFamily="49" charset="0"/>
-              </a:rPr>
-              <a:t>String </a:t>
-            </a:r>
-            <a:r>
-              <a:rPr lang="de-DE" b="1" dirty="0" smtClean="0">
-                <a:solidFill>
-                  <a:srgbClr val="0000C0"/>
-                </a:solidFill>
-                <a:latin typeface="Courier New" panose="02070309020205020404" pitchFamily="49" charset="0"/>
-              </a:rPr>
-              <a:t>title</a:t>
-            </a:r>
-            <a:r>
-              <a:rPr lang="de-DE" b="1" dirty="0" smtClean="0">
-                <a:solidFill>
-                  <a:srgbClr val="000000"/>
-                </a:solidFill>
-                <a:latin typeface="Courier New" panose="02070309020205020404" pitchFamily="49" charset="0"/>
-              </a:rPr>
-              <a:t>;</a:t>
-            </a:r>
-            <a:endParaRPr lang="de-DE" b="1" dirty="0">
-              <a:solidFill>
-                <a:srgbClr val="000000"/>
-              </a:solidFill>
-              <a:latin typeface="Courier New" panose="02070309020205020404" pitchFamily="49" charset="0"/>
-            </a:endParaRPr>
-          </a:p>
-          <a:p>
-            <a:pPr lvl="1"/>
-            <a:r>
-              <a:rPr lang="de-DE" b="1" dirty="0" smtClean="0">
-                <a:solidFill>
-                  <a:srgbClr val="7F0055"/>
-                </a:solidFill>
-                <a:latin typeface="Courier New" panose="02070309020205020404" pitchFamily="49" charset="0"/>
-              </a:rPr>
-              <a:t>private</a:t>
-            </a:r>
-            <a:r>
-              <a:rPr lang="de-DE" b="1" dirty="0" smtClean="0">
-                <a:solidFill>
-                  <a:srgbClr val="000000"/>
-                </a:solidFill>
-                <a:latin typeface="Courier New" panose="02070309020205020404" pitchFamily="49" charset="0"/>
-              </a:rPr>
-              <a:t> </a:t>
-            </a:r>
-            <a:r>
-              <a:rPr lang="de-DE" b="1" dirty="0">
-                <a:solidFill>
-                  <a:srgbClr val="000000"/>
-                </a:solidFill>
-                <a:latin typeface="Courier New" panose="02070309020205020404" pitchFamily="49" charset="0"/>
-              </a:rPr>
-              <a:t>String </a:t>
-            </a:r>
-            <a:r>
-              <a:rPr lang="de-DE" b="1" dirty="0" err="1">
-                <a:solidFill>
-                  <a:srgbClr val="0000C0"/>
-                </a:solidFill>
-                <a:latin typeface="Courier New" panose="02070309020205020404" pitchFamily="49" charset="0"/>
-              </a:rPr>
-              <a:t>givenName</a:t>
-            </a:r>
-            <a:r>
-              <a:rPr lang="de-DE" b="1" dirty="0">
-                <a:solidFill>
-                  <a:srgbClr val="000000"/>
-                </a:solidFill>
-                <a:latin typeface="Courier New" panose="02070309020205020404" pitchFamily="49" charset="0"/>
-              </a:rPr>
-              <a:t>;</a:t>
-            </a:r>
-          </a:p>
-          <a:p>
-            <a:pPr lvl="1"/>
-            <a:r>
-              <a:rPr lang="de-DE" b="1" dirty="0" smtClean="0">
-                <a:solidFill>
-                  <a:srgbClr val="7F0055"/>
-                </a:solidFill>
-                <a:latin typeface="Courier New" panose="02070309020205020404" pitchFamily="49" charset="0"/>
-              </a:rPr>
-              <a:t>private</a:t>
-            </a:r>
-            <a:r>
-              <a:rPr lang="de-DE" b="1" dirty="0" smtClean="0">
-                <a:solidFill>
-                  <a:srgbClr val="000000"/>
-                </a:solidFill>
-                <a:latin typeface="Courier New" panose="02070309020205020404" pitchFamily="49" charset="0"/>
-              </a:rPr>
-              <a:t> </a:t>
-            </a:r>
-            <a:r>
-              <a:rPr lang="de-DE" b="1" dirty="0">
-                <a:solidFill>
-                  <a:srgbClr val="000000"/>
-                </a:solidFill>
-                <a:latin typeface="Courier New" panose="02070309020205020404" pitchFamily="49" charset="0"/>
-              </a:rPr>
-              <a:t>String </a:t>
-            </a:r>
-            <a:r>
-              <a:rPr lang="de-DE" b="1" dirty="0" err="1">
-                <a:solidFill>
-                  <a:srgbClr val="0000C0"/>
-                </a:solidFill>
-                <a:latin typeface="Courier New" panose="02070309020205020404" pitchFamily="49" charset="0"/>
-              </a:rPr>
-              <a:t>familyName</a:t>
-            </a:r>
-            <a:r>
-              <a:rPr lang="de-DE" b="1" dirty="0" smtClean="0">
-                <a:solidFill>
-                  <a:srgbClr val="000000"/>
-                </a:solidFill>
-                <a:latin typeface="Courier New" panose="02070309020205020404" pitchFamily="49" charset="0"/>
-              </a:rPr>
-              <a:t>;</a:t>
-            </a:r>
-          </a:p>
-          <a:p>
-            <a:pPr lvl="1"/>
-            <a:r>
-              <a:rPr lang="de-DE" b="1" dirty="0">
-                <a:solidFill>
-                  <a:srgbClr val="7F0055"/>
-                </a:solidFill>
-                <a:latin typeface="Courier New" panose="02070309020205020404" pitchFamily="49" charset="0"/>
-              </a:rPr>
-              <a:t>private</a:t>
-            </a:r>
-            <a:r>
-              <a:rPr lang="de-DE" b="1" dirty="0">
-                <a:solidFill>
-                  <a:srgbClr val="000000"/>
-                </a:solidFill>
-                <a:latin typeface="Courier New" panose="02070309020205020404" pitchFamily="49" charset="0"/>
-              </a:rPr>
-              <a:t> String </a:t>
-            </a:r>
-            <a:r>
-              <a:rPr lang="de-DE" b="1" dirty="0" err="1" smtClean="0">
-                <a:solidFill>
-                  <a:srgbClr val="0000C0"/>
-                </a:solidFill>
-                <a:latin typeface="Courier New" panose="02070309020205020404" pitchFamily="49" charset="0"/>
-              </a:rPr>
-              <a:t>position</a:t>
-            </a:r>
-            <a:r>
-              <a:rPr lang="de-DE" b="1" dirty="0" smtClean="0">
-                <a:solidFill>
-                  <a:srgbClr val="000000"/>
-                </a:solidFill>
-                <a:latin typeface="Courier New" panose="02070309020205020404" pitchFamily="49" charset="0"/>
-              </a:rPr>
-              <a:t>;</a:t>
-            </a:r>
-            <a:endParaRPr lang="de-DE" b="1" dirty="0">
-              <a:solidFill>
-                <a:srgbClr val="000000"/>
-              </a:solidFill>
-              <a:latin typeface="Courier New" panose="02070309020205020404" pitchFamily="49" charset="0"/>
-            </a:endParaRPr>
-          </a:p>
-          <a:p>
-            <a:pPr lvl="1"/>
-            <a:r>
-              <a:rPr lang="de-DE" b="1" dirty="0" smtClean="0">
-                <a:solidFill>
-                  <a:srgbClr val="7F0055"/>
-                </a:solidFill>
-                <a:latin typeface="Courier New" panose="02070309020205020404" pitchFamily="49" charset="0"/>
-              </a:rPr>
-              <a:t>private</a:t>
-            </a:r>
-            <a:r>
-              <a:rPr lang="de-DE" b="1" dirty="0" smtClean="0">
-                <a:solidFill>
-                  <a:srgbClr val="000000"/>
-                </a:solidFill>
-                <a:latin typeface="Courier New" panose="02070309020205020404" pitchFamily="49" charset="0"/>
-              </a:rPr>
-              <a:t> </a:t>
-            </a:r>
-            <a:r>
-              <a:rPr lang="de-DE" b="1" dirty="0">
-                <a:solidFill>
-                  <a:srgbClr val="000000"/>
-                </a:solidFill>
-                <a:latin typeface="Courier New" panose="02070309020205020404" pitchFamily="49" charset="0"/>
-              </a:rPr>
-              <a:t>String </a:t>
-            </a:r>
-            <a:r>
-              <a:rPr lang="de-DE" b="1" dirty="0" err="1">
-                <a:solidFill>
-                  <a:srgbClr val="0000C0"/>
-                </a:solidFill>
-                <a:latin typeface="Courier New" panose="02070309020205020404" pitchFamily="49" charset="0"/>
-              </a:rPr>
-              <a:t>telephoneNumber</a:t>
-            </a:r>
-            <a:r>
-              <a:rPr lang="de-DE" b="1" dirty="0">
-                <a:solidFill>
-                  <a:srgbClr val="000000"/>
-                </a:solidFill>
-                <a:latin typeface="Courier New" panose="02070309020205020404" pitchFamily="49" charset="0"/>
-              </a:rPr>
-              <a:t>;</a:t>
-            </a:r>
-          </a:p>
-          <a:p>
-            <a:pPr lvl="1"/>
-            <a:r>
-              <a:rPr lang="de-DE" b="1" dirty="0" smtClean="0">
-                <a:solidFill>
-                  <a:srgbClr val="7F0055"/>
-                </a:solidFill>
-                <a:latin typeface="Courier New" panose="02070309020205020404" pitchFamily="49" charset="0"/>
-              </a:rPr>
-              <a:t>private</a:t>
-            </a:r>
-            <a:r>
-              <a:rPr lang="de-DE" b="1" dirty="0" smtClean="0">
-                <a:solidFill>
-                  <a:srgbClr val="000000"/>
-                </a:solidFill>
-                <a:latin typeface="Courier New" panose="02070309020205020404" pitchFamily="49" charset="0"/>
-              </a:rPr>
-              <a:t> </a:t>
-            </a:r>
-            <a:r>
-              <a:rPr lang="de-DE" b="1" dirty="0">
-                <a:solidFill>
-                  <a:srgbClr val="000000"/>
-                </a:solidFill>
-                <a:latin typeface="Courier New" panose="02070309020205020404" pitchFamily="49" charset="0"/>
-              </a:rPr>
-              <a:t>String </a:t>
-            </a:r>
-            <a:r>
-              <a:rPr lang="de-DE" b="1" dirty="0" err="1">
-                <a:solidFill>
-                  <a:srgbClr val="0000C0"/>
-                </a:solidFill>
-                <a:latin typeface="Courier New" panose="02070309020205020404" pitchFamily="49" charset="0"/>
-              </a:rPr>
-              <a:t>emailAdress</a:t>
-            </a:r>
-            <a:r>
-              <a:rPr lang="de-DE" b="1" dirty="0" smtClean="0">
-                <a:solidFill>
-                  <a:srgbClr val="000000"/>
-                </a:solidFill>
-                <a:latin typeface="Courier New" panose="02070309020205020404" pitchFamily="49" charset="0"/>
-              </a:rPr>
-              <a:t>;</a:t>
-            </a:r>
-          </a:p>
-          <a:p>
-            <a:r>
-              <a:rPr lang="de-DE" b="1" dirty="0" smtClean="0">
-                <a:solidFill>
-                  <a:srgbClr val="000000"/>
-                </a:solidFill>
-                <a:latin typeface="Courier New" panose="02070309020205020404" pitchFamily="49" charset="0"/>
-              </a:rPr>
-              <a:t>}</a:t>
-            </a:r>
-            <a:endParaRPr lang="de-DE" dirty="0"/>
-          </a:p>
-        </p:txBody>
-      </p:sp>
-    </p:spTree>
-    <p:extLst>
-      <p:ext uri="{BB962C8B-B14F-4D97-AF65-F5344CB8AC3E}">
-        <p14:creationId xmlns:p14="http://schemas.microsoft.com/office/powerpoint/2010/main" val="3950506742"/>
+        <p14:creationId xmlns:p14="http://schemas.microsoft.com/office/powerpoint/2010/main" val="1797018046"/>
       </p:ext>
     </p:extLst>
   </p:cSld>
@@ -5457,6 +5548,857 @@
         <p:spPr>
           <a:xfrm>
             <a:off x="1038578" y="1364095"/>
+            <a:ext cx="10504542" cy="1908215"/>
+          </a:xfrm>
+          <a:prstGeom prst="rect">
+            <a:avLst/>
+          </a:prstGeom>
+          <a:noFill/>
+        </p:spPr>
+        <p:txBody>
+          <a:bodyPr wrap="square" rtlCol="0">
+            <a:spAutoFit/>
+          </a:bodyPr>
+          <a:lstStyle/>
+          <a:p>
+            <a:pPr>
+              <a:spcAft>
+                <a:spcPts val="1200"/>
+              </a:spcAft>
+            </a:pPr>
+            <a:r>
+              <a:rPr lang="en-US" sz="2400" dirty="0" smtClean="0">
+                <a:latin typeface="+mj-lt"/>
+                <a:ea typeface="Roboto medium" pitchFamily="2" charset="0"/>
+              </a:rPr>
+              <a:t>RDF </a:t>
+            </a:r>
+            <a:r>
+              <a:rPr lang="de-DE" sz="2400" b="1" dirty="0" smtClean="0">
+                <a:latin typeface="+mj-lt"/>
+              </a:rPr>
+              <a:t>→ </a:t>
+            </a:r>
+            <a:r>
+              <a:rPr lang="de-DE" sz="2400" dirty="0" err="1" smtClean="0">
+                <a:latin typeface="+mj-lt"/>
+              </a:rPr>
+              <a:t>Contact</a:t>
+            </a:r>
+            <a:endParaRPr lang="en-US" sz="2400" b="1" dirty="0">
+              <a:latin typeface="+mj-lt"/>
+              <a:ea typeface="Roboto medium" pitchFamily="2" charset="0"/>
+            </a:endParaRPr>
+          </a:p>
+          <a:p>
+            <a:r>
+              <a:rPr lang="en-US" sz="2800" dirty="0" smtClean="0">
+                <a:ea typeface="Roboto medium" pitchFamily="2" charset="0"/>
+              </a:rPr>
+              <a:t>ContactService extracts </a:t>
+            </a:r>
+            <a:r>
+              <a:rPr lang="en-US" sz="2800" b="1" smtClean="0">
+                <a:ea typeface="Roboto medium" pitchFamily="2" charset="0"/>
+              </a:rPr>
+              <a:t>foaf:Person</a:t>
+            </a:r>
+            <a:r>
+              <a:rPr lang="en-US" sz="2800" dirty="0" smtClean="0">
+                <a:ea typeface="Roboto medium" pitchFamily="2" charset="0"/>
+              </a:rPr>
+              <a:t> </a:t>
+            </a:r>
+            <a:r>
+              <a:rPr lang="en-US" sz="2800" dirty="0" smtClean="0">
+                <a:ea typeface="Roboto medium" pitchFamily="2" charset="0"/>
+              </a:rPr>
+              <a:t>types and transforms them to contact objects. Use reflection to iterate over properties.</a:t>
+            </a:r>
+          </a:p>
+          <a:p>
+            <a:endParaRPr lang="en-US" sz="2800" dirty="0" smtClean="0">
+              <a:ea typeface="Roboto medium" pitchFamily="2" charset="0"/>
+            </a:endParaRPr>
+          </a:p>
+        </p:txBody>
+      </p:sp>
+      <p:sp>
+        <p:nvSpPr>
+          <p:cNvPr id="7" name="Rechteck 6"/>
+          <p:cNvSpPr/>
+          <p:nvPr/>
+        </p:nvSpPr>
+        <p:spPr>
+          <a:xfrm>
+            <a:off x="344371" y="3272310"/>
+            <a:ext cx="6361230" cy="2308324"/>
+          </a:xfrm>
+          <a:prstGeom prst="rect">
+            <a:avLst/>
+          </a:prstGeom>
+        </p:spPr>
+        <p:style>
+          <a:lnRef idx="2">
+            <a:schemeClr val="dk1"/>
+          </a:lnRef>
+          <a:fillRef idx="1">
+            <a:schemeClr val="lt1"/>
+          </a:fillRef>
+          <a:effectRef idx="0">
+            <a:schemeClr val="dk1"/>
+          </a:effectRef>
+          <a:fontRef idx="minor">
+            <a:schemeClr val="dk1"/>
+          </a:fontRef>
+        </p:style>
+        <p:txBody>
+          <a:bodyPr wrap="square">
+            <a:spAutoFit/>
+          </a:bodyPr>
+          <a:lstStyle/>
+          <a:p>
+            <a:r>
+              <a:rPr lang="de-DE" dirty="0" err="1">
+                <a:latin typeface="Courier New" panose="02070309020205020404" pitchFamily="49" charset="0"/>
+              </a:rPr>
+              <a:t>eccenca:stramp</a:t>
+            </a:r>
+            <a:r>
+              <a:rPr lang="de-DE" dirty="0">
+                <a:latin typeface="Courier New" panose="02070309020205020404" pitchFamily="49" charset="0"/>
+              </a:rPr>
+              <a:t> a </a:t>
+            </a:r>
+            <a:r>
+              <a:rPr lang="de-DE" dirty="0" err="1">
+                <a:latin typeface="Courier New" panose="02070309020205020404" pitchFamily="49" charset="0"/>
+              </a:rPr>
+              <a:t>foaf:Person</a:t>
+            </a:r>
+            <a:r>
+              <a:rPr lang="de-DE" dirty="0">
+                <a:latin typeface="Courier New" panose="02070309020205020404" pitchFamily="49" charset="0"/>
+              </a:rPr>
+              <a:t> ;</a:t>
+            </a:r>
+          </a:p>
+          <a:p>
+            <a:r>
+              <a:rPr lang="de-DE" dirty="0">
+                <a:latin typeface="Courier New" panose="02070309020205020404" pitchFamily="49" charset="0"/>
+              </a:rPr>
+              <a:t>  </a:t>
+            </a:r>
+            <a:r>
+              <a:rPr lang="de-DE" dirty="0" err="1">
+                <a:latin typeface="Courier New" panose="02070309020205020404" pitchFamily="49" charset="0"/>
+              </a:rPr>
+              <a:t>foaf:title</a:t>
+            </a:r>
+            <a:r>
+              <a:rPr lang="de-DE" dirty="0">
+                <a:latin typeface="Courier New" panose="02070309020205020404" pitchFamily="49" charset="0"/>
+              </a:rPr>
+              <a:t> "</a:t>
+            </a:r>
+            <a:r>
+              <a:rPr lang="de-DE" u="sng" dirty="0">
+                <a:solidFill>
+                  <a:srgbClr val="000000"/>
+                </a:solidFill>
+                <a:latin typeface="Courier New" panose="02070309020205020404" pitchFamily="49" charset="0"/>
+              </a:rPr>
+              <a:t>Dr." ;</a:t>
+            </a:r>
+          </a:p>
+          <a:p>
+            <a:r>
+              <a:rPr lang="de-DE" dirty="0">
+                <a:latin typeface="Courier New" panose="02070309020205020404" pitchFamily="49" charset="0"/>
+              </a:rPr>
+              <a:t>  </a:t>
+            </a:r>
+            <a:r>
+              <a:rPr lang="de-DE" dirty="0" err="1">
+                <a:latin typeface="Courier New" panose="02070309020205020404" pitchFamily="49" charset="0"/>
+              </a:rPr>
+              <a:t>foaf:givenName</a:t>
+            </a:r>
+            <a:r>
+              <a:rPr lang="de-DE" dirty="0">
+                <a:latin typeface="Courier New" panose="02070309020205020404" pitchFamily="49" charset="0"/>
+              </a:rPr>
+              <a:t> "</a:t>
+            </a:r>
+            <a:r>
+              <a:rPr lang="de-DE" u="sng" dirty="0">
+                <a:solidFill>
+                  <a:srgbClr val="000000"/>
+                </a:solidFill>
+                <a:latin typeface="Courier New" panose="02070309020205020404" pitchFamily="49" charset="0"/>
+              </a:rPr>
+              <a:t>Sebastian" ;</a:t>
+            </a:r>
+          </a:p>
+          <a:p>
+            <a:r>
+              <a:rPr lang="de-DE" dirty="0">
+                <a:latin typeface="Courier New" panose="02070309020205020404" pitchFamily="49" charset="0"/>
+              </a:rPr>
+              <a:t>  </a:t>
+            </a:r>
+            <a:r>
+              <a:rPr lang="de-DE" dirty="0" err="1">
+                <a:latin typeface="Courier New" panose="02070309020205020404" pitchFamily="49" charset="0"/>
+              </a:rPr>
+              <a:t>foaf:familyName</a:t>
+            </a:r>
+            <a:r>
+              <a:rPr lang="de-DE" dirty="0">
+                <a:latin typeface="Courier New" panose="02070309020205020404" pitchFamily="49" charset="0"/>
+              </a:rPr>
+              <a:t> "Tramp" ;</a:t>
+            </a:r>
+          </a:p>
+          <a:p>
+            <a:r>
+              <a:rPr lang="de-DE" dirty="0">
+                <a:latin typeface="Courier New" panose="02070309020205020404" pitchFamily="49" charset="0"/>
+              </a:rPr>
+              <a:t> </a:t>
+            </a:r>
+            <a:r>
+              <a:rPr lang="de-DE" dirty="0" smtClean="0">
+                <a:latin typeface="Courier New" panose="02070309020205020404" pitchFamily="49" charset="0"/>
+              </a:rPr>
+              <a:t> </a:t>
+            </a:r>
+            <a:r>
+              <a:rPr lang="de-DE" dirty="0" err="1" smtClean="0">
+                <a:latin typeface="Courier New" panose="02070309020205020404" pitchFamily="49" charset="0"/>
+              </a:rPr>
+              <a:t>odette:position</a:t>
+            </a:r>
+            <a:r>
+              <a:rPr lang="de-DE" dirty="0" smtClean="0">
+                <a:latin typeface="Courier New" panose="02070309020205020404" pitchFamily="49" charset="0"/>
+              </a:rPr>
+              <a:t> </a:t>
+            </a:r>
+            <a:r>
+              <a:rPr lang="de-DE" dirty="0">
+                <a:latin typeface="Courier New" panose="02070309020205020404" pitchFamily="49" charset="0"/>
+              </a:rPr>
+              <a:t>"Head </a:t>
+            </a:r>
+            <a:r>
+              <a:rPr lang="de-DE" dirty="0" err="1">
+                <a:latin typeface="Courier New" panose="02070309020205020404" pitchFamily="49" charset="0"/>
+              </a:rPr>
+              <a:t>of</a:t>
+            </a:r>
+            <a:r>
+              <a:rPr lang="de-DE" dirty="0">
+                <a:latin typeface="Courier New" panose="02070309020205020404" pitchFamily="49" charset="0"/>
+              </a:rPr>
+              <a:t> Development" ;</a:t>
+            </a:r>
+          </a:p>
+          <a:p>
+            <a:r>
+              <a:rPr lang="de-DE" dirty="0">
+                <a:latin typeface="Courier New" panose="02070309020205020404" pitchFamily="49" charset="0"/>
+              </a:rPr>
+              <a:t>  </a:t>
+            </a:r>
+            <a:r>
+              <a:rPr lang="de-DE" dirty="0" err="1">
+                <a:latin typeface="Courier New" panose="02070309020205020404" pitchFamily="49" charset="0"/>
+              </a:rPr>
+              <a:t>odette:telephoneNumber</a:t>
+            </a:r>
+            <a:r>
+              <a:rPr lang="de-DE" dirty="0">
+                <a:latin typeface="Courier New" panose="02070309020205020404" pitchFamily="49" charset="0"/>
+              </a:rPr>
+              <a:t> "+49 341 26508028" ;</a:t>
+            </a:r>
+          </a:p>
+          <a:p>
+            <a:r>
+              <a:rPr lang="de-DE" dirty="0">
+                <a:latin typeface="Courier New" panose="02070309020205020404" pitchFamily="49" charset="0"/>
+              </a:rPr>
+              <a:t>  </a:t>
+            </a:r>
+            <a:r>
+              <a:rPr lang="de-DE" dirty="0" err="1">
+                <a:latin typeface="Courier New" panose="02070309020205020404" pitchFamily="49" charset="0"/>
+              </a:rPr>
+              <a:t>odette:emailAddress</a:t>
+            </a:r>
+            <a:r>
+              <a:rPr lang="de-DE" dirty="0">
+                <a:latin typeface="Courier New" panose="02070309020205020404" pitchFamily="49" charset="0"/>
+              </a:rPr>
+              <a:t> "</a:t>
+            </a:r>
+            <a:r>
+              <a:rPr lang="de-DE" u="sng" dirty="0">
+                <a:solidFill>
+                  <a:srgbClr val="000000"/>
+                </a:solidFill>
+                <a:latin typeface="Courier New" panose="02070309020205020404" pitchFamily="49" charset="0"/>
+              </a:rPr>
+              <a:t>stramp@brox.de" </a:t>
+            </a:r>
+          </a:p>
+          <a:p>
+            <a:r>
+              <a:rPr lang="de-DE" dirty="0">
+                <a:latin typeface="Courier New" panose="02070309020205020404" pitchFamily="49" charset="0"/>
+              </a:rPr>
+              <a:t>.</a:t>
+            </a:r>
+            <a:endParaRPr lang="de-DE" dirty="0"/>
+          </a:p>
+        </p:txBody>
+      </p:sp>
+      <p:sp>
+        <p:nvSpPr>
+          <p:cNvPr id="8" name="Rechteck 7"/>
+          <p:cNvSpPr/>
+          <p:nvPr/>
+        </p:nvSpPr>
+        <p:spPr>
+          <a:xfrm>
+            <a:off x="6964348" y="3272310"/>
+            <a:ext cx="4938297" cy="2308324"/>
+          </a:xfrm>
+          <a:prstGeom prst="rect">
+            <a:avLst/>
+          </a:prstGeom>
+        </p:spPr>
+        <p:style>
+          <a:lnRef idx="2">
+            <a:schemeClr val="dk1"/>
+          </a:lnRef>
+          <a:fillRef idx="1">
+            <a:schemeClr val="lt1"/>
+          </a:fillRef>
+          <a:effectRef idx="0">
+            <a:schemeClr val="dk1"/>
+          </a:effectRef>
+          <a:fontRef idx="minor">
+            <a:schemeClr val="dk1"/>
+          </a:fontRef>
+        </p:style>
+        <p:txBody>
+          <a:bodyPr wrap="square">
+            <a:spAutoFit/>
+          </a:bodyPr>
+          <a:lstStyle/>
+          <a:p>
+            <a:r>
+              <a:rPr lang="de-DE" b="1" dirty="0">
+                <a:solidFill>
+                  <a:srgbClr val="7F0055"/>
+                </a:solidFill>
+                <a:latin typeface="Courier New" panose="02070309020205020404" pitchFamily="49" charset="0"/>
+              </a:rPr>
+              <a:t>public</a:t>
+            </a:r>
+            <a:r>
+              <a:rPr lang="de-DE" b="1" dirty="0">
+                <a:solidFill>
+                  <a:srgbClr val="000000"/>
+                </a:solidFill>
+                <a:latin typeface="Courier New" panose="02070309020205020404" pitchFamily="49" charset="0"/>
+              </a:rPr>
+              <a:t> </a:t>
+            </a:r>
+            <a:r>
+              <a:rPr lang="de-DE" b="1" dirty="0" err="1">
+                <a:solidFill>
+                  <a:srgbClr val="7F0055"/>
+                </a:solidFill>
+                <a:latin typeface="Courier New" panose="02070309020205020404" pitchFamily="49" charset="0"/>
+              </a:rPr>
+              <a:t>class</a:t>
+            </a:r>
+            <a:r>
+              <a:rPr lang="de-DE" b="1" dirty="0">
+                <a:solidFill>
+                  <a:srgbClr val="000000"/>
+                </a:solidFill>
+                <a:latin typeface="Courier New" panose="02070309020205020404" pitchFamily="49" charset="0"/>
+              </a:rPr>
+              <a:t> </a:t>
+            </a:r>
+            <a:r>
+              <a:rPr lang="de-DE" b="1" dirty="0" err="1">
+                <a:solidFill>
+                  <a:srgbClr val="000000"/>
+                </a:solidFill>
+                <a:latin typeface="Courier New" panose="02070309020205020404" pitchFamily="49" charset="0"/>
+              </a:rPr>
+              <a:t>Contact</a:t>
+            </a:r>
+            <a:r>
+              <a:rPr lang="de-DE" b="1" dirty="0">
+                <a:solidFill>
+                  <a:srgbClr val="000000"/>
+                </a:solidFill>
+                <a:latin typeface="Courier New" panose="02070309020205020404" pitchFamily="49" charset="0"/>
+              </a:rPr>
+              <a:t> </a:t>
+            </a:r>
+            <a:r>
+              <a:rPr lang="de-DE" b="1" dirty="0" smtClean="0">
+                <a:solidFill>
+                  <a:srgbClr val="000000"/>
+                </a:solidFill>
+                <a:latin typeface="Courier New" panose="02070309020205020404" pitchFamily="49" charset="0"/>
+              </a:rPr>
+              <a:t>{</a:t>
+            </a:r>
+            <a:endParaRPr lang="de-DE" dirty="0">
+              <a:latin typeface="Courier New" panose="02070309020205020404" pitchFamily="49" charset="0"/>
+            </a:endParaRPr>
+          </a:p>
+          <a:p>
+            <a:pPr lvl="1"/>
+            <a:r>
+              <a:rPr lang="de-DE" b="1" dirty="0" smtClean="0">
+                <a:solidFill>
+                  <a:srgbClr val="7F0055"/>
+                </a:solidFill>
+                <a:latin typeface="Courier New" panose="02070309020205020404" pitchFamily="49" charset="0"/>
+              </a:rPr>
+              <a:t>private</a:t>
+            </a:r>
+            <a:r>
+              <a:rPr lang="de-DE" b="1" dirty="0" smtClean="0">
+                <a:solidFill>
+                  <a:srgbClr val="000000"/>
+                </a:solidFill>
+                <a:latin typeface="Courier New" panose="02070309020205020404" pitchFamily="49" charset="0"/>
+              </a:rPr>
+              <a:t> </a:t>
+            </a:r>
+            <a:r>
+              <a:rPr lang="de-DE" b="1" dirty="0">
+                <a:solidFill>
+                  <a:srgbClr val="000000"/>
+                </a:solidFill>
+                <a:latin typeface="Courier New" panose="02070309020205020404" pitchFamily="49" charset="0"/>
+              </a:rPr>
+              <a:t>String </a:t>
+            </a:r>
+            <a:r>
+              <a:rPr lang="de-DE" b="1" dirty="0" smtClean="0">
+                <a:solidFill>
+                  <a:srgbClr val="0000C0"/>
+                </a:solidFill>
+                <a:latin typeface="Courier New" panose="02070309020205020404" pitchFamily="49" charset="0"/>
+              </a:rPr>
+              <a:t>title</a:t>
+            </a:r>
+            <a:r>
+              <a:rPr lang="de-DE" b="1" dirty="0" smtClean="0">
+                <a:solidFill>
+                  <a:srgbClr val="000000"/>
+                </a:solidFill>
+                <a:latin typeface="Courier New" panose="02070309020205020404" pitchFamily="49" charset="0"/>
+              </a:rPr>
+              <a:t>;</a:t>
+            </a:r>
+            <a:endParaRPr lang="de-DE" b="1" dirty="0">
+              <a:solidFill>
+                <a:srgbClr val="000000"/>
+              </a:solidFill>
+              <a:latin typeface="Courier New" panose="02070309020205020404" pitchFamily="49" charset="0"/>
+            </a:endParaRPr>
+          </a:p>
+          <a:p>
+            <a:pPr lvl="1"/>
+            <a:r>
+              <a:rPr lang="de-DE" b="1" dirty="0" smtClean="0">
+                <a:solidFill>
+                  <a:srgbClr val="7F0055"/>
+                </a:solidFill>
+                <a:latin typeface="Courier New" panose="02070309020205020404" pitchFamily="49" charset="0"/>
+              </a:rPr>
+              <a:t>private</a:t>
+            </a:r>
+            <a:r>
+              <a:rPr lang="de-DE" b="1" dirty="0" smtClean="0">
+                <a:solidFill>
+                  <a:srgbClr val="000000"/>
+                </a:solidFill>
+                <a:latin typeface="Courier New" panose="02070309020205020404" pitchFamily="49" charset="0"/>
+              </a:rPr>
+              <a:t> </a:t>
+            </a:r>
+            <a:r>
+              <a:rPr lang="de-DE" b="1" dirty="0">
+                <a:solidFill>
+                  <a:srgbClr val="000000"/>
+                </a:solidFill>
+                <a:latin typeface="Courier New" panose="02070309020205020404" pitchFamily="49" charset="0"/>
+              </a:rPr>
+              <a:t>String </a:t>
+            </a:r>
+            <a:r>
+              <a:rPr lang="de-DE" b="1" dirty="0" err="1">
+                <a:solidFill>
+                  <a:srgbClr val="0000C0"/>
+                </a:solidFill>
+                <a:latin typeface="Courier New" panose="02070309020205020404" pitchFamily="49" charset="0"/>
+              </a:rPr>
+              <a:t>givenName</a:t>
+            </a:r>
+            <a:r>
+              <a:rPr lang="de-DE" b="1" dirty="0">
+                <a:solidFill>
+                  <a:srgbClr val="000000"/>
+                </a:solidFill>
+                <a:latin typeface="Courier New" panose="02070309020205020404" pitchFamily="49" charset="0"/>
+              </a:rPr>
+              <a:t>;</a:t>
+            </a:r>
+          </a:p>
+          <a:p>
+            <a:pPr lvl="1"/>
+            <a:r>
+              <a:rPr lang="de-DE" b="1" dirty="0" smtClean="0">
+                <a:solidFill>
+                  <a:srgbClr val="7F0055"/>
+                </a:solidFill>
+                <a:latin typeface="Courier New" panose="02070309020205020404" pitchFamily="49" charset="0"/>
+              </a:rPr>
+              <a:t>private</a:t>
+            </a:r>
+            <a:r>
+              <a:rPr lang="de-DE" b="1" dirty="0" smtClean="0">
+                <a:solidFill>
+                  <a:srgbClr val="000000"/>
+                </a:solidFill>
+                <a:latin typeface="Courier New" panose="02070309020205020404" pitchFamily="49" charset="0"/>
+              </a:rPr>
+              <a:t> </a:t>
+            </a:r>
+            <a:r>
+              <a:rPr lang="de-DE" b="1" dirty="0">
+                <a:solidFill>
+                  <a:srgbClr val="000000"/>
+                </a:solidFill>
+                <a:latin typeface="Courier New" panose="02070309020205020404" pitchFamily="49" charset="0"/>
+              </a:rPr>
+              <a:t>String </a:t>
+            </a:r>
+            <a:r>
+              <a:rPr lang="de-DE" b="1" dirty="0" err="1">
+                <a:solidFill>
+                  <a:srgbClr val="0000C0"/>
+                </a:solidFill>
+                <a:latin typeface="Courier New" panose="02070309020205020404" pitchFamily="49" charset="0"/>
+              </a:rPr>
+              <a:t>familyName</a:t>
+            </a:r>
+            <a:r>
+              <a:rPr lang="de-DE" b="1" dirty="0" smtClean="0">
+                <a:solidFill>
+                  <a:srgbClr val="000000"/>
+                </a:solidFill>
+                <a:latin typeface="Courier New" panose="02070309020205020404" pitchFamily="49" charset="0"/>
+              </a:rPr>
+              <a:t>;</a:t>
+            </a:r>
+          </a:p>
+          <a:p>
+            <a:pPr lvl="1"/>
+            <a:r>
+              <a:rPr lang="de-DE" b="1" dirty="0">
+                <a:solidFill>
+                  <a:srgbClr val="7F0055"/>
+                </a:solidFill>
+                <a:latin typeface="Courier New" panose="02070309020205020404" pitchFamily="49" charset="0"/>
+              </a:rPr>
+              <a:t>private</a:t>
+            </a:r>
+            <a:r>
+              <a:rPr lang="de-DE" b="1" dirty="0">
+                <a:solidFill>
+                  <a:srgbClr val="000000"/>
+                </a:solidFill>
+                <a:latin typeface="Courier New" panose="02070309020205020404" pitchFamily="49" charset="0"/>
+              </a:rPr>
+              <a:t> String </a:t>
+            </a:r>
+            <a:r>
+              <a:rPr lang="de-DE" b="1" dirty="0" err="1" smtClean="0">
+                <a:solidFill>
+                  <a:srgbClr val="0000C0"/>
+                </a:solidFill>
+                <a:latin typeface="Courier New" panose="02070309020205020404" pitchFamily="49" charset="0"/>
+              </a:rPr>
+              <a:t>position</a:t>
+            </a:r>
+            <a:r>
+              <a:rPr lang="de-DE" b="1" dirty="0" smtClean="0">
+                <a:solidFill>
+                  <a:srgbClr val="000000"/>
+                </a:solidFill>
+                <a:latin typeface="Courier New" panose="02070309020205020404" pitchFamily="49" charset="0"/>
+              </a:rPr>
+              <a:t>;</a:t>
+            </a:r>
+            <a:endParaRPr lang="de-DE" b="1" dirty="0">
+              <a:solidFill>
+                <a:srgbClr val="000000"/>
+              </a:solidFill>
+              <a:latin typeface="Courier New" panose="02070309020205020404" pitchFamily="49" charset="0"/>
+            </a:endParaRPr>
+          </a:p>
+          <a:p>
+            <a:pPr lvl="1"/>
+            <a:r>
+              <a:rPr lang="de-DE" b="1" dirty="0" smtClean="0">
+                <a:solidFill>
+                  <a:srgbClr val="7F0055"/>
+                </a:solidFill>
+                <a:latin typeface="Courier New" panose="02070309020205020404" pitchFamily="49" charset="0"/>
+              </a:rPr>
+              <a:t>private</a:t>
+            </a:r>
+            <a:r>
+              <a:rPr lang="de-DE" b="1" dirty="0" smtClean="0">
+                <a:solidFill>
+                  <a:srgbClr val="000000"/>
+                </a:solidFill>
+                <a:latin typeface="Courier New" panose="02070309020205020404" pitchFamily="49" charset="0"/>
+              </a:rPr>
+              <a:t> </a:t>
+            </a:r>
+            <a:r>
+              <a:rPr lang="de-DE" b="1" dirty="0">
+                <a:solidFill>
+                  <a:srgbClr val="000000"/>
+                </a:solidFill>
+                <a:latin typeface="Courier New" panose="02070309020205020404" pitchFamily="49" charset="0"/>
+              </a:rPr>
+              <a:t>String </a:t>
+            </a:r>
+            <a:r>
+              <a:rPr lang="de-DE" b="1" dirty="0" err="1">
+                <a:solidFill>
+                  <a:srgbClr val="0000C0"/>
+                </a:solidFill>
+                <a:latin typeface="Courier New" panose="02070309020205020404" pitchFamily="49" charset="0"/>
+              </a:rPr>
+              <a:t>telephoneNumber</a:t>
+            </a:r>
+            <a:r>
+              <a:rPr lang="de-DE" b="1" dirty="0">
+                <a:solidFill>
+                  <a:srgbClr val="000000"/>
+                </a:solidFill>
+                <a:latin typeface="Courier New" panose="02070309020205020404" pitchFamily="49" charset="0"/>
+              </a:rPr>
+              <a:t>;</a:t>
+            </a:r>
+          </a:p>
+          <a:p>
+            <a:pPr lvl="1"/>
+            <a:r>
+              <a:rPr lang="de-DE" b="1" dirty="0" smtClean="0">
+                <a:solidFill>
+                  <a:srgbClr val="7F0055"/>
+                </a:solidFill>
+                <a:latin typeface="Courier New" panose="02070309020205020404" pitchFamily="49" charset="0"/>
+              </a:rPr>
+              <a:t>private</a:t>
+            </a:r>
+            <a:r>
+              <a:rPr lang="de-DE" b="1" dirty="0" smtClean="0">
+                <a:solidFill>
+                  <a:srgbClr val="000000"/>
+                </a:solidFill>
+                <a:latin typeface="Courier New" panose="02070309020205020404" pitchFamily="49" charset="0"/>
+              </a:rPr>
+              <a:t> </a:t>
+            </a:r>
+            <a:r>
+              <a:rPr lang="de-DE" b="1" dirty="0">
+                <a:solidFill>
+                  <a:srgbClr val="000000"/>
+                </a:solidFill>
+                <a:latin typeface="Courier New" panose="02070309020205020404" pitchFamily="49" charset="0"/>
+              </a:rPr>
+              <a:t>String </a:t>
+            </a:r>
+            <a:r>
+              <a:rPr lang="de-DE" b="1" dirty="0" err="1">
+                <a:solidFill>
+                  <a:srgbClr val="0000C0"/>
+                </a:solidFill>
+                <a:latin typeface="Courier New" panose="02070309020205020404" pitchFamily="49" charset="0"/>
+              </a:rPr>
+              <a:t>emailAdress</a:t>
+            </a:r>
+            <a:r>
+              <a:rPr lang="de-DE" b="1" dirty="0" smtClean="0">
+                <a:solidFill>
+                  <a:srgbClr val="000000"/>
+                </a:solidFill>
+                <a:latin typeface="Courier New" panose="02070309020205020404" pitchFamily="49" charset="0"/>
+              </a:rPr>
+              <a:t>;</a:t>
+            </a:r>
+          </a:p>
+          <a:p>
+            <a:r>
+              <a:rPr lang="de-DE" b="1" dirty="0" smtClean="0">
+                <a:solidFill>
+                  <a:srgbClr val="000000"/>
+                </a:solidFill>
+                <a:latin typeface="Courier New" panose="02070309020205020404" pitchFamily="49" charset="0"/>
+              </a:rPr>
+              <a:t>}</a:t>
+            </a:r>
+            <a:endParaRPr lang="de-DE" dirty="0"/>
+          </a:p>
+        </p:txBody>
+      </p:sp>
+    </p:spTree>
+    <p:extLst>
+      <p:ext uri="{BB962C8B-B14F-4D97-AF65-F5344CB8AC3E}">
+        <p14:creationId xmlns:p14="http://schemas.microsoft.com/office/powerpoint/2010/main" val="3950506742"/>
+      </p:ext>
+    </p:extLst>
+  </p:cSld>
+  <p:clrMapOvr>
+    <a:masterClrMapping/>
+  </p:clrMapOvr>
+  <p:timing>
+    <p:tnLst>
+      <p:par>
+        <p:cTn id="1" dur="indefinite" restart="never" nodeType="tmRoot"/>
+      </p:par>
+    </p:tnLst>
+  </p:timing>
+</p:sld>
+</file>
+
+<file path=ppt/slides/slide16.xml><?xml version="1.0" encoding="utf-8"?>
+<p:sld xmlns:a="http://schemas.openxmlformats.org/drawingml/2006/main" xmlns:r="http://schemas.openxmlformats.org/officeDocument/2006/relationships" xmlns:p="http://schemas.openxmlformats.org/presentationml/2006/main">
+  <p:cSld>
+    <p:spTree>
+      <p:nvGrpSpPr>
+        <p:cNvPr id="1" name=""/>
+        <p:cNvGrpSpPr/>
+        <p:nvPr/>
+      </p:nvGrpSpPr>
+      <p:grpSpPr>
+        <a:xfrm>
+          <a:off x="0" y="0"/>
+          <a:ext cx="0" cy="0"/>
+          <a:chOff x="0" y="0"/>
+          <a:chExt cx="0" cy="0"/>
+        </a:xfrm>
+      </p:grpSpPr>
+      <p:sp>
+        <p:nvSpPr>
+          <p:cNvPr id="3" name="Foliennummernplatzhalter 2"/>
+          <p:cNvSpPr>
+            <a:spLocks noGrp="1"/>
+          </p:cNvSpPr>
+          <p:nvPr>
+            <p:ph type="sldNum" sz="quarter" idx="12"/>
+          </p:nvPr>
+        </p:nvSpPr>
+        <p:spPr/>
+        <p:txBody>
+          <a:bodyPr/>
+          <a:lstStyle/>
+          <a:p>
+            <a:fld id="{FCEE2C88-6C8F-484D-AF69-578F576B1F44}" type="slidenum">
+              <a:rPr lang="en-US" smtClean="0"/>
+              <a:pPr/>
+              <a:t>16</a:t>
+            </a:fld>
+            <a:endParaRPr lang="en-US" dirty="0"/>
+          </a:p>
+        </p:txBody>
+      </p:sp>
+      <p:sp>
+        <p:nvSpPr>
+          <p:cNvPr id="4" name="Textplatzhalter 3"/>
+          <p:cNvSpPr>
+            <a:spLocks noGrp="1"/>
+          </p:cNvSpPr>
+          <p:nvPr>
+            <p:ph type="body" sz="quarter" idx="14"/>
+          </p:nvPr>
+        </p:nvSpPr>
+        <p:spPr/>
+        <p:txBody>
+          <a:bodyPr>
+            <a:noAutofit/>
+          </a:bodyPr>
+          <a:lstStyle/>
+          <a:p>
+            <a:r>
+              <a:rPr lang="en-US" sz="3200" dirty="0">
+                <a:latin typeface="Roboto medium" pitchFamily="2" charset="0"/>
+                <a:ea typeface="Roboto medium" pitchFamily="2" charset="0"/>
+              </a:rPr>
+              <a:t>RDF </a:t>
+            </a:r>
+            <a:r>
+              <a:rPr lang="en-US" sz="3200" dirty="0" smtClean="0">
+                <a:latin typeface="Roboto medium" pitchFamily="2" charset="0"/>
+                <a:ea typeface="Roboto medium" pitchFamily="2" charset="0"/>
+              </a:rPr>
+              <a:t>Transformer</a:t>
+            </a:r>
+            <a:endParaRPr lang="en-US" sz="3200" dirty="0">
+              <a:latin typeface="Roboto medium" pitchFamily="2" charset="0"/>
+              <a:ea typeface="Roboto medium" pitchFamily="2" charset="0"/>
+            </a:endParaRPr>
+          </a:p>
+        </p:txBody>
+      </p:sp>
+      <p:sp>
+        <p:nvSpPr>
+          <p:cNvPr id="5" name="Textplatzhalter 4"/>
+          <p:cNvSpPr>
+            <a:spLocks noGrp="1"/>
+          </p:cNvSpPr>
+          <p:nvPr>
+            <p:ph type="body" sz="quarter" idx="15"/>
+          </p:nvPr>
+        </p:nvSpPr>
+        <p:spPr/>
+        <p:txBody>
+          <a:bodyPr/>
+          <a:lstStyle/>
+          <a:p>
+            <a:endParaRPr lang="en-US"/>
+          </a:p>
+        </p:txBody>
+      </p:sp>
+      <p:sp>
+        <p:nvSpPr>
+          <p:cNvPr id="2" name="Textfeld 1"/>
+          <p:cNvSpPr txBox="1"/>
+          <p:nvPr/>
+        </p:nvSpPr>
+        <p:spPr>
+          <a:xfrm>
+            <a:off x="1038578" y="1364095"/>
             <a:ext cx="10504542" cy="1477328"/>
           </a:xfrm>
           <a:prstGeom prst="rect">
@@ -5719,7 +6661,7 @@
               <a:t>(</a:t>
             </a:r>
             <a:r>
-              <a:rPr lang="en-GB" i="1" dirty="0" err="1">
+              <a:rPr lang="en-GB" dirty="0" err="1">
                 <a:solidFill>
                   <a:srgbClr val="000000"/>
                 </a:solidFill>
@@ -5728,7 +6670,19 @@
                 </a:highlight>
                 <a:latin typeface="Consolas" panose="020B0609020204030204" pitchFamily="49" charset="0"/>
               </a:rPr>
-              <a:t>FOAF.getURI</a:t>
+              <a:t>FOAF</a:t>
+            </a:r>
+            <a:r>
+              <a:rPr lang="en-GB" i="1" dirty="0" err="1">
+                <a:solidFill>
+                  <a:srgbClr val="000000"/>
+                </a:solidFill>
+                <a:highlight>
+                  <a:srgbClr val="F0D8A8"/>
+                </a:highlight>
+                <a:latin typeface="Consolas" panose="020B0609020204030204" pitchFamily="49" charset="0"/>
+              </a:rPr>
+              <a:t>.getURI</a:t>
             </a:r>
             <a:r>
               <a:rPr lang="en-GB" i="1" dirty="0">
@@ -6431,7 +7385,7 @@
 </p:sld>
 </file>
 
-<file path=ppt/slides/slide16.xml><?xml version="1.0" encoding="utf-8"?>
+<file path=ppt/slides/slide17.xml><?xml version="1.0" encoding="utf-8"?>
 <p:sld xmlns:a="http://schemas.openxmlformats.org/drawingml/2006/main" xmlns:r="http://schemas.openxmlformats.org/officeDocument/2006/relationships" xmlns:p="http://schemas.openxmlformats.org/presentationml/2006/main">
   <p:cSld>
     <p:spTree>
@@ -6466,7 +7420,7 @@
             <a:fld id="{FCEE2C88-6C8F-484D-AF69-578F576B1F44}" type="slidenum">
               <a:rPr lang="en-US" smtClean="0"/>
               <a:pPr/>
-              <a:t>16</a:t>
+              <a:t>17</a:t>
             </a:fld>
             <a:endParaRPr lang="en-US" dirty="0"/>
           </a:p>
@@ -6773,7 +7727,7 @@
 </p:sld>
 </file>
 
-<file path=ppt/slides/slide17.xml><?xml version="1.0" encoding="utf-8"?>
+<file path=ppt/slides/slide18.xml><?xml version="1.0" encoding="utf-8"?>
 <p:sld xmlns:a="http://schemas.openxmlformats.org/drawingml/2006/main" xmlns:r="http://schemas.openxmlformats.org/officeDocument/2006/relationships" xmlns:p="http://schemas.openxmlformats.org/presentationml/2006/main">
   <p:cSld>
     <p:spTree>
@@ -6808,7 +7762,7 @@
             <a:fld id="{FCEE2C88-6C8F-484D-AF69-578F576B1F44}" type="slidenum">
               <a:rPr lang="en-US" smtClean="0"/>
               <a:pPr/>
-              <a:t>17</a:t>
+              <a:t>18</a:t>
             </a:fld>
             <a:endParaRPr lang="en-US" dirty="0"/>
           </a:p>
@@ -6993,7 +7947,7 @@
 </p:sld>
 </file>
 
-<file path=ppt/slides/slide18.xml><?xml version="1.0" encoding="utf-8"?>
+<file path=ppt/slides/slide19.xml><?xml version="1.0" encoding="utf-8"?>
 <p:sld xmlns:a="http://schemas.openxmlformats.org/drawingml/2006/main" xmlns:r="http://schemas.openxmlformats.org/officeDocument/2006/relationships" xmlns:p="http://schemas.openxmlformats.org/presentationml/2006/main">
   <p:cSld>
     <p:spTree>
@@ -7028,7 +7982,7 @@
             <a:fld id="{FCEE2C88-6C8F-484D-AF69-578F576B1F44}" type="slidenum">
               <a:rPr lang="en-US" smtClean="0"/>
               <a:pPr/>
-              <a:t>18</a:t>
+              <a:t>19</a:t>
             </a:fld>
             <a:endParaRPr lang="en-US" dirty="0"/>
           </a:p>
@@ -7304,173 +8258,6 @@
     <p:extLst>
       <p:ext uri="{BB962C8B-B14F-4D97-AF65-F5344CB8AC3E}">
         <p14:creationId xmlns:p14="http://schemas.microsoft.com/office/powerpoint/2010/main" val="1093437298"/>
-      </p:ext>
-    </p:extLst>
-  </p:cSld>
-  <p:clrMapOvr>
-    <a:masterClrMapping/>
-  </p:clrMapOvr>
-  <p:timing>
-    <p:tnLst>
-      <p:par>
-        <p:cTn id="1" dur="indefinite" restart="never" nodeType="tmRoot"/>
-      </p:par>
-    </p:tnLst>
-  </p:timing>
-</p:sld>
-</file>
-
-<file path=ppt/slides/slide19.xml><?xml version="1.0" encoding="utf-8"?>
-<p:sld xmlns:a="http://schemas.openxmlformats.org/drawingml/2006/main" xmlns:r="http://schemas.openxmlformats.org/officeDocument/2006/relationships" xmlns:p="http://schemas.openxmlformats.org/presentationml/2006/main">
-  <p:cSld>
-    <p:spTree>
-      <p:nvGrpSpPr>
-        <p:cNvPr id="1" name=""/>
-        <p:cNvGrpSpPr/>
-        <p:nvPr/>
-      </p:nvGrpSpPr>
-      <p:grpSpPr>
-        <a:xfrm>
-          <a:off x="0" y="0"/>
-          <a:ext cx="0" cy="0"/>
-          <a:chOff x="0" y="0"/>
-          <a:chExt cx="0" cy="0"/>
-        </a:xfrm>
-      </p:grpSpPr>
-      <p:sp>
-        <p:nvSpPr>
-          <p:cNvPr id="3" name="Foliennummernplatzhalter 2"/>
-          <p:cNvSpPr>
-            <a:spLocks noGrp="1"/>
-          </p:cNvSpPr>
-          <p:nvPr>
-            <p:ph type="sldNum" sz="quarter" idx="12"/>
-          </p:nvPr>
-        </p:nvSpPr>
-        <p:spPr/>
-        <p:txBody>
-          <a:bodyPr/>
-          <a:lstStyle/>
-          <a:p>
-            <a:fld id="{FCEE2C88-6C8F-484D-AF69-578F576B1F44}" type="slidenum">
-              <a:rPr lang="en-US" smtClean="0"/>
-              <a:pPr/>
-              <a:t>19</a:t>
-            </a:fld>
-            <a:endParaRPr lang="en-US" dirty="0"/>
-          </a:p>
-        </p:txBody>
-      </p:sp>
-      <p:sp>
-        <p:nvSpPr>
-          <p:cNvPr id="4" name="Textplatzhalter 3"/>
-          <p:cNvSpPr>
-            <a:spLocks noGrp="1"/>
-          </p:cNvSpPr>
-          <p:nvPr>
-            <p:ph type="body" sz="quarter" idx="14"/>
-          </p:nvPr>
-        </p:nvSpPr>
-        <p:spPr/>
-        <p:txBody>
-          <a:bodyPr>
-            <a:noAutofit/>
-          </a:bodyPr>
-          <a:lstStyle/>
-          <a:p>
-            <a:r>
-              <a:rPr lang="de-DE" sz="3200" dirty="0" smtClean="0"/>
-              <a:t>References</a:t>
-            </a:r>
-            <a:endParaRPr lang="en-US" sz="3200" dirty="0"/>
-          </a:p>
-        </p:txBody>
-      </p:sp>
-      <p:sp>
-        <p:nvSpPr>
-          <p:cNvPr id="5" name="Textplatzhalter 4"/>
-          <p:cNvSpPr>
-            <a:spLocks noGrp="1"/>
-          </p:cNvSpPr>
-          <p:nvPr>
-            <p:ph type="body" sz="quarter" idx="15"/>
-          </p:nvPr>
-        </p:nvSpPr>
-        <p:spPr/>
-        <p:txBody>
-          <a:bodyPr/>
-          <a:lstStyle/>
-          <a:p>
-            <a:endParaRPr lang="en-US"/>
-          </a:p>
-        </p:txBody>
-      </p:sp>
-      <p:sp>
-        <p:nvSpPr>
-          <p:cNvPr id="2" name="Textfeld 1"/>
-          <p:cNvSpPr txBox="1"/>
-          <p:nvPr/>
-        </p:nvSpPr>
-        <p:spPr>
-          <a:xfrm>
-            <a:off x="913277" y="1585463"/>
-            <a:ext cx="10558289" cy="369332"/>
-          </a:xfrm>
-          <a:prstGeom prst="rect">
-            <a:avLst/>
-          </a:prstGeom>
-          <a:noFill/>
-        </p:spPr>
-        <p:txBody>
-          <a:bodyPr wrap="square" rtlCol="0">
-            <a:spAutoFit/>
-          </a:bodyPr>
-          <a:lstStyle/>
-          <a:p>
-            <a:pPr>
-              <a:spcAft>
-                <a:spcPts val="2400"/>
-              </a:spcAft>
-            </a:pPr>
-            <a:r>
-              <a:rPr lang="en-US" dirty="0" smtClean="0">
-                <a:latin typeface="Roboto medium" pitchFamily="2" charset="0"/>
-                <a:ea typeface="Roboto medium" pitchFamily="2" charset="0"/>
-              </a:rPr>
-              <a:t>[1] Salesforce </a:t>
-            </a:r>
-            <a:r>
-              <a:rPr lang="en-US" dirty="0" err="1" smtClean="0">
-                <a:latin typeface="Roboto medium" pitchFamily="2" charset="0"/>
-                <a:ea typeface="Roboto medium" pitchFamily="2" charset="0"/>
-              </a:rPr>
-              <a:t>Oauth</a:t>
-            </a:r>
-            <a:r>
-              <a:rPr lang="en-US" dirty="0">
-                <a:latin typeface="Roboto medium" pitchFamily="2" charset="0"/>
-                <a:ea typeface="Roboto medium" pitchFamily="2" charset="0"/>
-              </a:rPr>
-              <a:t> 2.0: </a:t>
-            </a:r>
-            <a:r>
-              <a:rPr lang="en-US" sz="1000" dirty="0">
-                <a:latin typeface="Roboto medium" pitchFamily="2" charset="0"/>
-                <a:ea typeface="Roboto medium" pitchFamily="2" charset="0"/>
-              </a:rPr>
-              <a:t>https://developer.salesforce.com/docs/atlas.en-us.api_rest.meta/api_rest/intro_understanding_user_agent_oauth_flow.htm</a:t>
-            </a:r>
-            <a:endParaRPr lang="en-US" sz="1000" dirty="0" smtClean="0">
-              <a:latin typeface="Roboto medium" pitchFamily="2" charset="0"/>
-              <a:ea typeface="Roboto medium" pitchFamily="2" charset="0"/>
-            </a:endParaRPr>
-          </a:p>
-        </p:txBody>
-      </p:sp>
-    </p:spTree>
-    <p:extLst>
-      <p:ext uri="{BB962C8B-B14F-4D97-AF65-F5344CB8AC3E}">
-        <p14:creationId xmlns:p14="http://schemas.microsoft.com/office/powerpoint/2010/main" val="3205970558"/>
       </p:ext>
     </p:extLst>
   </p:cSld>
@@ -9131,6 +9918,173 @@
     <p:extLst>
       <p:ext uri="{BB962C8B-B14F-4D97-AF65-F5344CB8AC3E}">
         <p14:creationId xmlns:p14="http://schemas.microsoft.com/office/powerpoint/2010/main" val="1508593330"/>
+      </p:ext>
+    </p:extLst>
+  </p:cSld>
+  <p:clrMapOvr>
+    <a:masterClrMapping/>
+  </p:clrMapOvr>
+  <p:timing>
+    <p:tnLst>
+      <p:par>
+        <p:cTn id="1" dur="indefinite" restart="never" nodeType="tmRoot"/>
+      </p:par>
+    </p:tnLst>
+  </p:timing>
+</p:sld>
+</file>
+
+<file path=ppt/slides/slide20.xml><?xml version="1.0" encoding="utf-8"?>
+<p:sld xmlns:a="http://schemas.openxmlformats.org/drawingml/2006/main" xmlns:r="http://schemas.openxmlformats.org/officeDocument/2006/relationships" xmlns:p="http://schemas.openxmlformats.org/presentationml/2006/main">
+  <p:cSld>
+    <p:spTree>
+      <p:nvGrpSpPr>
+        <p:cNvPr id="1" name=""/>
+        <p:cNvGrpSpPr/>
+        <p:nvPr/>
+      </p:nvGrpSpPr>
+      <p:grpSpPr>
+        <a:xfrm>
+          <a:off x="0" y="0"/>
+          <a:ext cx="0" cy="0"/>
+          <a:chOff x="0" y="0"/>
+          <a:chExt cx="0" cy="0"/>
+        </a:xfrm>
+      </p:grpSpPr>
+      <p:sp>
+        <p:nvSpPr>
+          <p:cNvPr id="3" name="Foliennummernplatzhalter 2"/>
+          <p:cNvSpPr>
+            <a:spLocks noGrp="1"/>
+          </p:cNvSpPr>
+          <p:nvPr>
+            <p:ph type="sldNum" sz="quarter" idx="12"/>
+          </p:nvPr>
+        </p:nvSpPr>
+        <p:spPr/>
+        <p:txBody>
+          <a:bodyPr/>
+          <a:lstStyle/>
+          <a:p>
+            <a:fld id="{FCEE2C88-6C8F-484D-AF69-578F576B1F44}" type="slidenum">
+              <a:rPr lang="en-US" smtClean="0"/>
+              <a:pPr/>
+              <a:t>20</a:t>
+            </a:fld>
+            <a:endParaRPr lang="en-US" dirty="0"/>
+          </a:p>
+        </p:txBody>
+      </p:sp>
+      <p:sp>
+        <p:nvSpPr>
+          <p:cNvPr id="4" name="Textplatzhalter 3"/>
+          <p:cNvSpPr>
+            <a:spLocks noGrp="1"/>
+          </p:cNvSpPr>
+          <p:nvPr>
+            <p:ph type="body" sz="quarter" idx="14"/>
+          </p:nvPr>
+        </p:nvSpPr>
+        <p:spPr/>
+        <p:txBody>
+          <a:bodyPr>
+            <a:noAutofit/>
+          </a:bodyPr>
+          <a:lstStyle/>
+          <a:p>
+            <a:r>
+              <a:rPr lang="de-DE" sz="3200" dirty="0" smtClean="0"/>
+              <a:t>References</a:t>
+            </a:r>
+            <a:endParaRPr lang="en-US" sz="3200" dirty="0"/>
+          </a:p>
+        </p:txBody>
+      </p:sp>
+      <p:sp>
+        <p:nvSpPr>
+          <p:cNvPr id="5" name="Textplatzhalter 4"/>
+          <p:cNvSpPr>
+            <a:spLocks noGrp="1"/>
+          </p:cNvSpPr>
+          <p:nvPr>
+            <p:ph type="body" sz="quarter" idx="15"/>
+          </p:nvPr>
+        </p:nvSpPr>
+        <p:spPr/>
+        <p:txBody>
+          <a:bodyPr/>
+          <a:lstStyle/>
+          <a:p>
+            <a:endParaRPr lang="en-US"/>
+          </a:p>
+        </p:txBody>
+      </p:sp>
+      <p:sp>
+        <p:nvSpPr>
+          <p:cNvPr id="2" name="Textfeld 1"/>
+          <p:cNvSpPr txBox="1"/>
+          <p:nvPr/>
+        </p:nvSpPr>
+        <p:spPr>
+          <a:xfrm>
+            <a:off x="913277" y="1585463"/>
+            <a:ext cx="10558289" cy="369332"/>
+          </a:xfrm>
+          <a:prstGeom prst="rect">
+            <a:avLst/>
+          </a:prstGeom>
+          <a:noFill/>
+        </p:spPr>
+        <p:txBody>
+          <a:bodyPr wrap="square" rtlCol="0">
+            <a:spAutoFit/>
+          </a:bodyPr>
+          <a:lstStyle/>
+          <a:p>
+            <a:pPr>
+              <a:spcAft>
+                <a:spcPts val="2400"/>
+              </a:spcAft>
+            </a:pPr>
+            <a:r>
+              <a:rPr lang="en-US" dirty="0" smtClean="0">
+                <a:latin typeface="Roboto medium" pitchFamily="2" charset="0"/>
+                <a:ea typeface="Roboto medium" pitchFamily="2" charset="0"/>
+              </a:rPr>
+              <a:t>[1] Salesforce </a:t>
+            </a:r>
+            <a:r>
+              <a:rPr lang="en-US" dirty="0" err="1" smtClean="0">
+                <a:latin typeface="Roboto medium" pitchFamily="2" charset="0"/>
+                <a:ea typeface="Roboto medium" pitchFamily="2" charset="0"/>
+              </a:rPr>
+              <a:t>Oauth</a:t>
+            </a:r>
+            <a:r>
+              <a:rPr lang="en-US" dirty="0">
+                <a:latin typeface="Roboto medium" pitchFamily="2" charset="0"/>
+                <a:ea typeface="Roboto medium" pitchFamily="2" charset="0"/>
+              </a:rPr>
+              <a:t> 2.0: </a:t>
+            </a:r>
+            <a:r>
+              <a:rPr lang="en-US" sz="1000" dirty="0">
+                <a:latin typeface="Roboto medium" pitchFamily="2" charset="0"/>
+                <a:ea typeface="Roboto medium" pitchFamily="2" charset="0"/>
+              </a:rPr>
+              <a:t>https://developer.salesforce.com/docs/atlas.en-us.api_rest.meta/api_rest/intro_understanding_user_agent_oauth_flow.htm</a:t>
+            </a:r>
+            <a:endParaRPr lang="en-US" sz="1000" dirty="0" smtClean="0">
+              <a:latin typeface="Roboto medium" pitchFamily="2" charset="0"/>
+              <a:ea typeface="Roboto medium" pitchFamily="2" charset="0"/>
+            </a:endParaRPr>
+          </a:p>
+        </p:txBody>
+      </p:sp>
+    </p:spTree>
+    <p:extLst>
+      <p:ext uri="{BB962C8B-B14F-4D97-AF65-F5344CB8AC3E}">
+        <p14:creationId xmlns:p14="http://schemas.microsoft.com/office/powerpoint/2010/main" val="3205970558"/>
       </p:ext>
     </p:extLst>
   </p:cSld>

</xml_diff>